<commit_message>
Added Diagrams to Presentation
</commit_message>
<xml_diff>
--- a/Contest.pptx
+++ b/Contest.pptx
@@ -1,30 +1,951 @@
 
 <file path=ppt/presentation.xml><?xml version="1.0" encoding="utf-8"?>
-<p:presentation xmlns:a="http://schemas.openxmlformats.org/drawingml/2006/main" xmlns:p="http://schemas.openxmlformats.org/presentationml/2006/main" xmlns:r="http://schemas.openxmlformats.org/officeDocument/2006/relationships">
+<p:presentation xmlns:a="http://schemas.openxmlformats.org/drawingml/2006/main" xmlns:r="http://schemas.openxmlformats.org/officeDocument/2006/relationships" xmlns:p="http://schemas.openxmlformats.org/presentationml/2006/main">
   <p:sldMasterIdLst>
-    <p:sldMasterId id="2147483648" r:id="rId2"/>
-    <p:sldMasterId id="2147483661" r:id="rId3"/>
-    <p:sldMasterId id="2147483674" r:id="rId4"/>
+    <p:sldMasterId id="2147483648" r:id="rId1"/>
+    <p:sldMasterId id="2147483661" r:id="rId2"/>
+    <p:sldMasterId id="2147483674" r:id="rId3"/>
   </p:sldMasterIdLst>
   <p:sldIdLst>
-    <p:sldId id="256" r:id="rId5"/>
-    <p:sldId id="257" r:id="rId6"/>
-    <p:sldId id="258" r:id="rId7"/>
-    <p:sldId id="259" r:id="rId8"/>
-    <p:sldId id="260" r:id="rId9"/>
-    <p:sldId id="261" r:id="rId10"/>
-    <p:sldId id="262" r:id="rId11"/>
-    <p:sldId id="263" r:id="rId12"/>
-    <p:sldId id="264" r:id="rId13"/>
-    <p:sldId id="265" r:id="rId14"/>
+    <p:sldId id="256" r:id="rId4"/>
+    <p:sldId id="257" r:id="rId5"/>
+    <p:sldId id="258" r:id="rId6"/>
+    <p:sldId id="259" r:id="rId7"/>
+    <p:sldId id="260" r:id="rId8"/>
+    <p:sldId id="261" r:id="rId9"/>
+    <p:sldId id="262" r:id="rId10"/>
+    <p:sldId id="263" r:id="rId11"/>
+    <p:sldId id="264" r:id="rId12"/>
+    <p:sldId id="267" r:id="rId13"/>
+    <p:sldId id="268" r:id="rId14"/>
+    <p:sldId id="265" r:id="rId15"/>
   </p:sldIdLst>
-  <p:sldSz cx="10693400" cy="7561262"/>
-  <p:notesSz cx="7559675" cy="10691812"/>
+  <p:sldSz cx="10693400" cy="7561263"/>
+  <p:notesSz cx="7559675" cy="10691813"/>
+  <p:defaultTextStyle>
+    <a:defPPr>
+      <a:defRPr lang="de-DE"/>
+    </a:defPPr>
+    <a:lvl1pPr marL="0" algn="l" defTabSz="457200" rtl="0" eaLnBrk="1" latinLnBrk="0" hangingPunct="1">
+      <a:defRPr sz="1800" kern="1200">
+        <a:solidFill>
+          <a:schemeClr val="tx1"/>
+        </a:solidFill>
+        <a:latin typeface="+mn-lt"/>
+        <a:ea typeface="+mn-ea"/>
+        <a:cs typeface="+mn-cs"/>
+      </a:defRPr>
+    </a:lvl1pPr>
+    <a:lvl2pPr marL="457200" algn="l" defTabSz="457200" rtl="0" eaLnBrk="1" latinLnBrk="0" hangingPunct="1">
+      <a:defRPr sz="1800" kern="1200">
+        <a:solidFill>
+          <a:schemeClr val="tx1"/>
+        </a:solidFill>
+        <a:latin typeface="+mn-lt"/>
+        <a:ea typeface="+mn-ea"/>
+        <a:cs typeface="+mn-cs"/>
+      </a:defRPr>
+    </a:lvl2pPr>
+    <a:lvl3pPr marL="914400" algn="l" defTabSz="457200" rtl="0" eaLnBrk="1" latinLnBrk="0" hangingPunct="1">
+      <a:defRPr sz="1800" kern="1200">
+        <a:solidFill>
+          <a:schemeClr val="tx1"/>
+        </a:solidFill>
+        <a:latin typeface="+mn-lt"/>
+        <a:ea typeface="+mn-ea"/>
+        <a:cs typeface="+mn-cs"/>
+      </a:defRPr>
+    </a:lvl3pPr>
+    <a:lvl4pPr marL="1371600" algn="l" defTabSz="457200" rtl="0" eaLnBrk="1" latinLnBrk="0" hangingPunct="1">
+      <a:defRPr sz="1800" kern="1200">
+        <a:solidFill>
+          <a:schemeClr val="tx1"/>
+        </a:solidFill>
+        <a:latin typeface="+mn-lt"/>
+        <a:ea typeface="+mn-ea"/>
+        <a:cs typeface="+mn-cs"/>
+      </a:defRPr>
+    </a:lvl4pPr>
+    <a:lvl5pPr marL="1828800" algn="l" defTabSz="457200" rtl="0" eaLnBrk="1" latinLnBrk="0" hangingPunct="1">
+      <a:defRPr sz="1800" kern="1200">
+        <a:solidFill>
+          <a:schemeClr val="tx1"/>
+        </a:solidFill>
+        <a:latin typeface="+mn-lt"/>
+        <a:ea typeface="+mn-ea"/>
+        <a:cs typeface="+mn-cs"/>
+      </a:defRPr>
+    </a:lvl5pPr>
+    <a:lvl6pPr marL="2286000" algn="l" defTabSz="457200" rtl="0" eaLnBrk="1" latinLnBrk="0" hangingPunct="1">
+      <a:defRPr sz="1800" kern="1200">
+        <a:solidFill>
+          <a:schemeClr val="tx1"/>
+        </a:solidFill>
+        <a:latin typeface="+mn-lt"/>
+        <a:ea typeface="+mn-ea"/>
+        <a:cs typeface="+mn-cs"/>
+      </a:defRPr>
+    </a:lvl6pPr>
+    <a:lvl7pPr marL="2743200" algn="l" defTabSz="457200" rtl="0" eaLnBrk="1" latinLnBrk="0" hangingPunct="1">
+      <a:defRPr sz="1800" kern="1200">
+        <a:solidFill>
+          <a:schemeClr val="tx1"/>
+        </a:solidFill>
+        <a:latin typeface="+mn-lt"/>
+        <a:ea typeface="+mn-ea"/>
+        <a:cs typeface="+mn-cs"/>
+      </a:defRPr>
+    </a:lvl7pPr>
+    <a:lvl8pPr marL="3200400" algn="l" defTabSz="457200" rtl="0" eaLnBrk="1" latinLnBrk="0" hangingPunct="1">
+      <a:defRPr sz="1800" kern="1200">
+        <a:solidFill>
+          <a:schemeClr val="tx1"/>
+        </a:solidFill>
+        <a:latin typeface="+mn-lt"/>
+        <a:ea typeface="+mn-ea"/>
+        <a:cs typeface="+mn-cs"/>
+      </a:defRPr>
+    </a:lvl8pPr>
+    <a:lvl9pPr marL="3657600" algn="l" defTabSz="457200" rtl="0" eaLnBrk="1" latinLnBrk="0" hangingPunct="1">
+      <a:defRPr sz="1800" kern="1200">
+        <a:solidFill>
+          <a:schemeClr val="tx1"/>
+        </a:solidFill>
+        <a:latin typeface="+mn-lt"/>
+        <a:ea typeface="+mn-ea"/>
+        <a:cs typeface="+mn-cs"/>
+      </a:defRPr>
+    </a:lvl9pPr>
+  </p:defaultTextStyle>
 </p:presentation>
 </file>
 
+<file path=ppt/charts/chart1.xml><?xml version="1.0" encoding="utf-8"?>
+<c:chartSpace xmlns:c="http://schemas.openxmlformats.org/drawingml/2006/chart" xmlns:a="http://schemas.openxmlformats.org/drawingml/2006/main" xmlns:r="http://schemas.openxmlformats.org/officeDocument/2006/relationships">
+  <c:date1904 val="0"/>
+  <c:lang val="de-DE"/>
+  <c:roundedCorners val="0"/>
+  <mc:AlternateContent xmlns:mc="http://schemas.openxmlformats.org/markup-compatibility/2006">
+    <mc:Choice xmlns:c14="http://schemas.microsoft.com/office/drawing/2007/8/2/chart" Requires="c14">
+      <c14:style val="118"/>
+    </mc:Choice>
+    <mc:Fallback>
+      <c:style val="18"/>
+    </mc:Fallback>
+  </mc:AlternateContent>
+  <c:chart>
+    <c:autoTitleDeleted val="0"/>
+    <c:plotArea>
+      <c:layout/>
+      <c:lineChart>
+        <c:grouping val="standard"/>
+        <c:varyColors val="0"/>
+        <c:ser>
+          <c:idx val="1"/>
+          <c:order val="0"/>
+          <c:tx>
+            <c:strRef>
+              <c:f>Bayes!$E$1</c:f>
+              <c:strCache>
+                <c:ptCount val="1"/>
+                <c:pt idx="0">
+                  <c:v>VisualWordTime Naive Bayes</c:v>
+                </c:pt>
+              </c:strCache>
+            </c:strRef>
+          </c:tx>
+          <c:marker>
+            <c:symbol val="none"/>
+          </c:marker>
+          <c:cat>
+            <c:numRef>
+              <c:f>Bayes!$A$2:$A$11</c:f>
+              <c:numCache>
+                <c:formatCode>General</c:formatCode>
+                <c:ptCount val="10"/>
+                <c:pt idx="0">
+                  <c:v>100.0</c:v>
+                </c:pt>
+                <c:pt idx="1">
+                  <c:v>200.0</c:v>
+                </c:pt>
+                <c:pt idx="2">
+                  <c:v>300.0</c:v>
+                </c:pt>
+                <c:pt idx="3">
+                  <c:v>400.0</c:v>
+                </c:pt>
+                <c:pt idx="4">
+                  <c:v>500.0</c:v>
+                </c:pt>
+                <c:pt idx="5">
+                  <c:v>600.0</c:v>
+                </c:pt>
+                <c:pt idx="6">
+                  <c:v>700.0</c:v>
+                </c:pt>
+                <c:pt idx="7">
+                  <c:v>800.0</c:v>
+                </c:pt>
+                <c:pt idx="8">
+                  <c:v>900.0</c:v>
+                </c:pt>
+                <c:pt idx="9">
+                  <c:v>1000.0</c:v>
+                </c:pt>
+              </c:numCache>
+            </c:numRef>
+          </c:cat>
+          <c:val>
+            <c:numRef>
+              <c:f>Bayes!$E$2:$E$11</c:f>
+              <c:numCache>
+                <c:formatCode>General</c:formatCode>
+                <c:ptCount val="10"/>
+                <c:pt idx="0">
+                  <c:v>100.76</c:v>
+                </c:pt>
+                <c:pt idx="1">
+                  <c:v>59.204</c:v>
+                </c:pt>
+                <c:pt idx="2">
+                  <c:v>32.387</c:v>
+                </c:pt>
+                <c:pt idx="3">
+                  <c:v>34.781</c:v>
+                </c:pt>
+                <c:pt idx="4">
+                  <c:v>33.757</c:v>
+                </c:pt>
+                <c:pt idx="5">
+                  <c:v>46.55</c:v>
+                </c:pt>
+                <c:pt idx="6">
+                  <c:v>42.112</c:v>
+                </c:pt>
+                <c:pt idx="7">
+                  <c:v>43.151</c:v>
+                </c:pt>
+                <c:pt idx="8">
+                  <c:v>45.438</c:v>
+                </c:pt>
+                <c:pt idx="9">
+                  <c:v>46.407</c:v>
+                </c:pt>
+              </c:numCache>
+            </c:numRef>
+          </c:val>
+          <c:smooth val="0"/>
+        </c:ser>
+        <c:ser>
+          <c:idx val="2"/>
+          <c:order val="1"/>
+          <c:tx>
+            <c:strRef>
+              <c:f>Bayes!$F$1</c:f>
+              <c:strCache>
+                <c:ptCount val="1"/>
+                <c:pt idx="0">
+                  <c:v>ClassifierTrainingTime Naive Bayes</c:v>
+                </c:pt>
+              </c:strCache>
+            </c:strRef>
+          </c:tx>
+          <c:marker>
+            <c:symbol val="none"/>
+          </c:marker>
+          <c:cat>
+            <c:numRef>
+              <c:f>Bayes!$A$2:$A$11</c:f>
+              <c:numCache>
+                <c:formatCode>General</c:formatCode>
+                <c:ptCount val="10"/>
+                <c:pt idx="0">
+                  <c:v>100.0</c:v>
+                </c:pt>
+                <c:pt idx="1">
+                  <c:v>200.0</c:v>
+                </c:pt>
+                <c:pt idx="2">
+                  <c:v>300.0</c:v>
+                </c:pt>
+                <c:pt idx="3">
+                  <c:v>400.0</c:v>
+                </c:pt>
+                <c:pt idx="4">
+                  <c:v>500.0</c:v>
+                </c:pt>
+                <c:pt idx="5">
+                  <c:v>600.0</c:v>
+                </c:pt>
+                <c:pt idx="6">
+                  <c:v>700.0</c:v>
+                </c:pt>
+                <c:pt idx="7">
+                  <c:v>800.0</c:v>
+                </c:pt>
+                <c:pt idx="8">
+                  <c:v>900.0</c:v>
+                </c:pt>
+                <c:pt idx="9">
+                  <c:v>1000.0</c:v>
+                </c:pt>
+              </c:numCache>
+            </c:numRef>
+          </c:cat>
+          <c:val>
+            <c:numRef>
+              <c:f>Bayes!$F$2:$F$11</c:f>
+              <c:numCache>
+                <c:formatCode>General</c:formatCode>
+                <c:ptCount val="10"/>
+                <c:pt idx="0">
+                  <c:v>0.016</c:v>
+                </c:pt>
+                <c:pt idx="1">
+                  <c:v>0.009</c:v>
+                </c:pt>
+                <c:pt idx="2">
+                  <c:v>0.01</c:v>
+                </c:pt>
+                <c:pt idx="3">
+                  <c:v>0.023</c:v>
+                </c:pt>
+                <c:pt idx="4">
+                  <c:v>0.019</c:v>
+                </c:pt>
+                <c:pt idx="5">
+                  <c:v>0.021</c:v>
+                </c:pt>
+                <c:pt idx="6">
+                  <c:v>0.026</c:v>
+                </c:pt>
+                <c:pt idx="7">
+                  <c:v>0.028</c:v>
+                </c:pt>
+                <c:pt idx="8">
+                  <c:v>0.031</c:v>
+                </c:pt>
+                <c:pt idx="9">
+                  <c:v>0.039</c:v>
+                </c:pt>
+              </c:numCache>
+            </c:numRef>
+          </c:val>
+          <c:smooth val="0"/>
+        </c:ser>
+        <c:ser>
+          <c:idx val="3"/>
+          <c:order val="2"/>
+          <c:tx>
+            <c:strRef>
+              <c:f>Bayes!$I$1</c:f>
+              <c:strCache>
+                <c:ptCount val="1"/>
+                <c:pt idx="0">
+                  <c:v>VisualWordTime SVM</c:v>
+                </c:pt>
+              </c:strCache>
+            </c:strRef>
+          </c:tx>
+          <c:marker>
+            <c:symbol val="none"/>
+          </c:marker>
+          <c:cat>
+            <c:numRef>
+              <c:f>Bayes!$A$2:$A$11</c:f>
+              <c:numCache>
+                <c:formatCode>General</c:formatCode>
+                <c:ptCount val="10"/>
+                <c:pt idx="0">
+                  <c:v>100.0</c:v>
+                </c:pt>
+                <c:pt idx="1">
+                  <c:v>200.0</c:v>
+                </c:pt>
+                <c:pt idx="2">
+                  <c:v>300.0</c:v>
+                </c:pt>
+                <c:pt idx="3">
+                  <c:v>400.0</c:v>
+                </c:pt>
+                <c:pt idx="4">
+                  <c:v>500.0</c:v>
+                </c:pt>
+                <c:pt idx="5">
+                  <c:v>600.0</c:v>
+                </c:pt>
+                <c:pt idx="6">
+                  <c:v>700.0</c:v>
+                </c:pt>
+                <c:pt idx="7">
+                  <c:v>800.0</c:v>
+                </c:pt>
+                <c:pt idx="8">
+                  <c:v>900.0</c:v>
+                </c:pt>
+                <c:pt idx="9">
+                  <c:v>1000.0</c:v>
+                </c:pt>
+              </c:numCache>
+            </c:numRef>
+          </c:cat>
+          <c:val>
+            <c:numRef>
+              <c:f>Bayes!$I$2:$I$11</c:f>
+              <c:numCache>
+                <c:formatCode>General</c:formatCode>
+                <c:ptCount val="10"/>
+                <c:pt idx="0">
+                  <c:v>242.336</c:v>
+                </c:pt>
+                <c:pt idx="1">
+                  <c:v>118.633</c:v>
+                </c:pt>
+                <c:pt idx="2">
+                  <c:v>55.853</c:v>
+                </c:pt>
+                <c:pt idx="3">
+                  <c:v>36.705</c:v>
+                </c:pt>
+                <c:pt idx="4">
+                  <c:v>51.719</c:v>
+                </c:pt>
+                <c:pt idx="5">
+                  <c:v>36.766</c:v>
+                </c:pt>
+                <c:pt idx="6">
+                  <c:v>35.657</c:v>
+                </c:pt>
+                <c:pt idx="7">
+                  <c:v>38.999</c:v>
+                </c:pt>
+                <c:pt idx="8">
+                  <c:v>47.83</c:v>
+                </c:pt>
+                <c:pt idx="9">
+                  <c:v>56.147</c:v>
+                </c:pt>
+              </c:numCache>
+            </c:numRef>
+          </c:val>
+          <c:smooth val="0"/>
+        </c:ser>
+        <c:ser>
+          <c:idx val="4"/>
+          <c:order val="3"/>
+          <c:tx>
+            <c:strRef>
+              <c:f>Bayes!$J$1</c:f>
+              <c:strCache>
+                <c:ptCount val="1"/>
+                <c:pt idx="0">
+                  <c:v>ClassifierTraningTime SVM</c:v>
+                </c:pt>
+              </c:strCache>
+            </c:strRef>
+          </c:tx>
+          <c:marker>
+            <c:symbol val="none"/>
+          </c:marker>
+          <c:cat>
+            <c:numRef>
+              <c:f>Bayes!$A$2:$A$11</c:f>
+              <c:numCache>
+                <c:formatCode>General</c:formatCode>
+                <c:ptCount val="10"/>
+                <c:pt idx="0">
+                  <c:v>100.0</c:v>
+                </c:pt>
+                <c:pt idx="1">
+                  <c:v>200.0</c:v>
+                </c:pt>
+                <c:pt idx="2">
+                  <c:v>300.0</c:v>
+                </c:pt>
+                <c:pt idx="3">
+                  <c:v>400.0</c:v>
+                </c:pt>
+                <c:pt idx="4">
+                  <c:v>500.0</c:v>
+                </c:pt>
+                <c:pt idx="5">
+                  <c:v>600.0</c:v>
+                </c:pt>
+                <c:pt idx="6">
+                  <c:v>700.0</c:v>
+                </c:pt>
+                <c:pt idx="7">
+                  <c:v>800.0</c:v>
+                </c:pt>
+                <c:pt idx="8">
+                  <c:v>900.0</c:v>
+                </c:pt>
+                <c:pt idx="9">
+                  <c:v>1000.0</c:v>
+                </c:pt>
+              </c:numCache>
+            </c:numRef>
+          </c:cat>
+          <c:val>
+            <c:numRef>
+              <c:f>Bayes!$J$2:$J$11</c:f>
+              <c:numCache>
+                <c:formatCode>General</c:formatCode>
+                <c:ptCount val="10"/>
+                <c:pt idx="0">
+                  <c:v>0.462</c:v>
+                </c:pt>
+                <c:pt idx="1">
+                  <c:v>0.438</c:v>
+                </c:pt>
+                <c:pt idx="2">
+                  <c:v>0.839</c:v>
+                </c:pt>
+                <c:pt idx="3">
+                  <c:v>0.901</c:v>
+                </c:pt>
+                <c:pt idx="4">
+                  <c:v>29.43</c:v>
+                </c:pt>
+                <c:pt idx="5">
+                  <c:v>3.751</c:v>
+                </c:pt>
+                <c:pt idx="6">
+                  <c:v>19.368</c:v>
+                </c:pt>
+                <c:pt idx="7">
+                  <c:v>2.523</c:v>
+                </c:pt>
+                <c:pt idx="8">
+                  <c:v>53.359</c:v>
+                </c:pt>
+                <c:pt idx="9">
+                  <c:v>185.05</c:v>
+                </c:pt>
+              </c:numCache>
+            </c:numRef>
+          </c:val>
+          <c:smooth val="0"/>
+        </c:ser>
+        <c:dLbls>
+          <c:showLegendKey val="0"/>
+          <c:showVal val="0"/>
+          <c:showCatName val="0"/>
+          <c:showSerName val="0"/>
+          <c:showPercent val="0"/>
+          <c:showBubbleSize val="0"/>
+        </c:dLbls>
+        <c:marker val="1"/>
+        <c:smooth val="0"/>
+        <c:axId val="-2109819832"/>
+        <c:axId val="-2110116936"/>
+      </c:lineChart>
+      <c:catAx>
+        <c:axId val="-2109819832"/>
+        <c:scaling>
+          <c:orientation val="minMax"/>
+        </c:scaling>
+        <c:delete val="0"/>
+        <c:axPos val="b"/>
+        <c:title>
+          <c:tx>
+            <c:rich>
+              <a:bodyPr/>
+              <a:lstStyle/>
+              <a:p>
+                <a:pPr>
+                  <a:defRPr/>
+                </a:pPr>
+                <a:r>
+                  <a:rPr lang="de-DE"/>
+                  <a:t>K</a:t>
+                </a:r>
+              </a:p>
+            </c:rich>
+          </c:tx>
+          <c:layout/>
+          <c:overlay val="0"/>
+        </c:title>
+        <c:numFmt formatCode="General" sourceLinked="1"/>
+        <c:majorTickMark val="out"/>
+        <c:minorTickMark val="none"/>
+        <c:tickLblPos val="nextTo"/>
+        <c:crossAx val="-2110116936"/>
+        <c:crosses val="autoZero"/>
+        <c:auto val="1"/>
+        <c:lblAlgn val="ctr"/>
+        <c:lblOffset val="100"/>
+        <c:noMultiLvlLbl val="0"/>
+      </c:catAx>
+      <c:valAx>
+        <c:axId val="-2110116936"/>
+        <c:scaling>
+          <c:orientation val="minMax"/>
+        </c:scaling>
+        <c:delete val="0"/>
+        <c:axPos val="l"/>
+        <c:majorGridlines/>
+        <c:title>
+          <c:tx>
+            <c:rich>
+              <a:bodyPr rot="-5400000" vert="horz"/>
+              <a:lstStyle/>
+              <a:p>
+                <a:pPr>
+                  <a:defRPr/>
+                </a:pPr>
+                <a:r>
+                  <a:rPr lang="de-DE"/>
+                  <a:t>Sekunden</a:t>
+                </a:r>
+              </a:p>
+            </c:rich>
+          </c:tx>
+          <c:layout/>
+          <c:overlay val="0"/>
+        </c:title>
+        <c:numFmt formatCode="General" sourceLinked="1"/>
+        <c:majorTickMark val="out"/>
+        <c:minorTickMark val="none"/>
+        <c:tickLblPos val="nextTo"/>
+        <c:crossAx val="-2109819832"/>
+        <c:crosses val="autoZero"/>
+        <c:crossBetween val="between"/>
+      </c:valAx>
+    </c:plotArea>
+    <c:legend>
+      <c:legendPos val="r"/>
+      <c:layout/>
+      <c:overlay val="0"/>
+    </c:legend>
+    <c:plotVisOnly val="1"/>
+    <c:dispBlanksAs val="gap"/>
+    <c:showDLblsOverMax val="0"/>
+  </c:chart>
+  <c:externalData r:id="rId1">
+    <c:autoUpdate val="0"/>
+  </c:externalData>
+</c:chartSpace>
+</file>
+
+<file path=ppt/charts/chart2.xml><?xml version="1.0" encoding="utf-8"?>
+<c:chartSpace xmlns:c="http://schemas.openxmlformats.org/drawingml/2006/chart" xmlns:a="http://schemas.openxmlformats.org/drawingml/2006/main" xmlns:r="http://schemas.openxmlformats.org/officeDocument/2006/relationships">
+  <c:date1904 val="0"/>
+  <c:lang val="de-DE"/>
+  <c:roundedCorners val="0"/>
+  <mc:AlternateContent xmlns:mc="http://schemas.openxmlformats.org/markup-compatibility/2006">
+    <mc:Choice xmlns:c14="http://schemas.microsoft.com/office/drawing/2007/8/2/chart" Requires="c14">
+      <c14:style val="118"/>
+    </mc:Choice>
+    <mc:Fallback>
+      <c:style val="18"/>
+    </mc:Fallback>
+  </mc:AlternateContent>
+  <c:chart>
+    <c:autoTitleDeleted val="0"/>
+    <c:plotArea>
+      <c:layout/>
+      <c:lineChart>
+        <c:grouping val="standard"/>
+        <c:varyColors val="0"/>
+        <c:ser>
+          <c:idx val="1"/>
+          <c:order val="0"/>
+          <c:tx>
+            <c:strRef>
+              <c:f>Bayes!$G$1</c:f>
+              <c:strCache>
+                <c:ptCount val="1"/>
+                <c:pt idx="0">
+                  <c:v>Accuracy Naive Bayes</c:v>
+                </c:pt>
+              </c:strCache>
+            </c:strRef>
+          </c:tx>
+          <c:marker>
+            <c:symbol val="none"/>
+          </c:marker>
+          <c:cat>
+            <c:numRef>
+              <c:f>Bayes!$A$2:$A$11</c:f>
+              <c:numCache>
+                <c:formatCode>General</c:formatCode>
+                <c:ptCount val="10"/>
+                <c:pt idx="0">
+                  <c:v>100.0</c:v>
+                </c:pt>
+                <c:pt idx="1">
+                  <c:v>200.0</c:v>
+                </c:pt>
+                <c:pt idx="2">
+                  <c:v>300.0</c:v>
+                </c:pt>
+                <c:pt idx="3">
+                  <c:v>400.0</c:v>
+                </c:pt>
+                <c:pt idx="4">
+                  <c:v>500.0</c:v>
+                </c:pt>
+                <c:pt idx="5">
+                  <c:v>600.0</c:v>
+                </c:pt>
+                <c:pt idx="6">
+                  <c:v>700.0</c:v>
+                </c:pt>
+                <c:pt idx="7">
+                  <c:v>800.0</c:v>
+                </c:pt>
+                <c:pt idx="8">
+                  <c:v>900.0</c:v>
+                </c:pt>
+                <c:pt idx="9">
+                  <c:v>1000.0</c:v>
+                </c:pt>
+              </c:numCache>
+            </c:numRef>
+          </c:cat>
+          <c:val>
+            <c:numRef>
+              <c:f>Bayes!$G$2:$G$11</c:f>
+              <c:numCache>
+                <c:formatCode>General</c:formatCode>
+                <c:ptCount val="10"/>
+                <c:pt idx="0">
+                  <c:v>82.34552332912988</c:v>
+                </c:pt>
+                <c:pt idx="1">
+                  <c:v>89.91172761664564</c:v>
+                </c:pt>
+                <c:pt idx="2">
+                  <c:v>91.29886506935687</c:v>
+                </c:pt>
+                <c:pt idx="3">
+                  <c:v>86.50693568726354</c:v>
+                </c:pt>
+                <c:pt idx="4">
+                  <c:v>83.7326607818411</c:v>
+                </c:pt>
+                <c:pt idx="5">
+                  <c:v>82.21941992433795</c:v>
+                </c:pt>
+                <c:pt idx="6">
+                  <c:v>79.82345523329131</c:v>
+                </c:pt>
+                <c:pt idx="7">
+                  <c:v>79.19293820933166</c:v>
+                </c:pt>
+                <c:pt idx="8">
+                  <c:v>77.93190416141236</c:v>
+                </c:pt>
+                <c:pt idx="9">
+                  <c:v>76.79697351828499</c:v>
+                </c:pt>
+              </c:numCache>
+            </c:numRef>
+          </c:val>
+          <c:smooth val="0"/>
+        </c:ser>
+        <c:ser>
+          <c:idx val="2"/>
+          <c:order val="1"/>
+          <c:tx>
+            <c:strRef>
+              <c:f>Bayes!$H$1</c:f>
+              <c:strCache>
+                <c:ptCount val="1"/>
+                <c:pt idx="0">
+                  <c:v>Accuracy SVM</c:v>
+                </c:pt>
+              </c:strCache>
+            </c:strRef>
+          </c:tx>
+          <c:marker>
+            <c:symbol val="none"/>
+          </c:marker>
+          <c:cat>
+            <c:numRef>
+              <c:f>Bayes!$A$2:$A$11</c:f>
+              <c:numCache>
+                <c:formatCode>General</c:formatCode>
+                <c:ptCount val="10"/>
+                <c:pt idx="0">
+                  <c:v>100.0</c:v>
+                </c:pt>
+                <c:pt idx="1">
+                  <c:v>200.0</c:v>
+                </c:pt>
+                <c:pt idx="2">
+                  <c:v>300.0</c:v>
+                </c:pt>
+                <c:pt idx="3">
+                  <c:v>400.0</c:v>
+                </c:pt>
+                <c:pt idx="4">
+                  <c:v>500.0</c:v>
+                </c:pt>
+                <c:pt idx="5">
+                  <c:v>600.0</c:v>
+                </c:pt>
+                <c:pt idx="6">
+                  <c:v>700.0</c:v>
+                </c:pt>
+                <c:pt idx="7">
+                  <c:v>800.0</c:v>
+                </c:pt>
+                <c:pt idx="8">
+                  <c:v>900.0</c:v>
+                </c:pt>
+                <c:pt idx="9">
+                  <c:v>1000.0</c:v>
+                </c:pt>
+              </c:numCache>
+            </c:numRef>
+          </c:cat>
+          <c:val>
+            <c:numRef>
+              <c:f>Bayes!$H$2:$H$11</c:f>
+              <c:numCache>
+                <c:formatCode>General</c:formatCode>
+                <c:ptCount val="10"/>
+                <c:pt idx="0">
+                  <c:v>93.69482976040352</c:v>
+                </c:pt>
+                <c:pt idx="1">
+                  <c:v>92.55989911727616</c:v>
+                </c:pt>
+                <c:pt idx="2">
+                  <c:v>93.69482976040352</c:v>
+                </c:pt>
+                <c:pt idx="3">
+                  <c:v>95.20807061790669</c:v>
+                </c:pt>
+                <c:pt idx="4">
+                  <c:v>86.25472887767971</c:v>
+                </c:pt>
+                <c:pt idx="5">
+                  <c:v>92.43379571248424</c:v>
+                </c:pt>
+                <c:pt idx="6">
+                  <c:v>91.29886506935687</c:v>
+                </c:pt>
+                <c:pt idx="7">
+                  <c:v>94.19924337957124</c:v>
+                </c:pt>
+                <c:pt idx="8">
+                  <c:v>95.83858764186634</c:v>
+                </c:pt>
+                <c:pt idx="9">
+                  <c:v>94.57755359394704</c:v>
+                </c:pt>
+              </c:numCache>
+            </c:numRef>
+          </c:val>
+          <c:smooth val="0"/>
+        </c:ser>
+        <c:dLbls>
+          <c:showLegendKey val="0"/>
+          <c:showVal val="0"/>
+          <c:showCatName val="0"/>
+          <c:showSerName val="0"/>
+          <c:showPercent val="0"/>
+          <c:showBubbleSize val="0"/>
+        </c:dLbls>
+        <c:marker val="1"/>
+        <c:smooth val="0"/>
+        <c:axId val="-2111782376"/>
+        <c:axId val="-2111827208"/>
+      </c:lineChart>
+      <c:catAx>
+        <c:axId val="-2111782376"/>
+        <c:scaling>
+          <c:orientation val="minMax"/>
+        </c:scaling>
+        <c:delete val="0"/>
+        <c:axPos val="b"/>
+        <c:title>
+          <c:tx>
+            <c:rich>
+              <a:bodyPr/>
+              <a:lstStyle/>
+              <a:p>
+                <a:pPr>
+                  <a:defRPr/>
+                </a:pPr>
+                <a:r>
+                  <a:rPr lang="de-DE"/>
+                  <a:t>K</a:t>
+                </a:r>
+              </a:p>
+            </c:rich>
+          </c:tx>
+          <c:layout/>
+          <c:overlay val="0"/>
+        </c:title>
+        <c:numFmt formatCode="General" sourceLinked="1"/>
+        <c:majorTickMark val="out"/>
+        <c:minorTickMark val="none"/>
+        <c:tickLblPos val="nextTo"/>
+        <c:crossAx val="-2111827208"/>
+        <c:crosses val="autoZero"/>
+        <c:auto val="1"/>
+        <c:lblAlgn val="ctr"/>
+        <c:lblOffset val="100"/>
+        <c:noMultiLvlLbl val="0"/>
+      </c:catAx>
+      <c:valAx>
+        <c:axId val="-2111827208"/>
+        <c:scaling>
+          <c:orientation val="minMax"/>
+        </c:scaling>
+        <c:delete val="0"/>
+        <c:axPos val="l"/>
+        <c:majorGridlines/>
+        <c:title>
+          <c:tx>
+            <c:rich>
+              <a:bodyPr rot="-5400000" vert="horz"/>
+              <a:lstStyle/>
+              <a:p>
+                <a:pPr>
+                  <a:defRPr/>
+                </a:pPr>
+                <a:r>
+                  <a:rPr lang="de-DE"/>
+                  <a:t>Sekunden</a:t>
+                </a:r>
+              </a:p>
+            </c:rich>
+          </c:tx>
+          <c:layout/>
+          <c:overlay val="0"/>
+        </c:title>
+        <c:numFmt formatCode="General" sourceLinked="1"/>
+        <c:majorTickMark val="out"/>
+        <c:minorTickMark val="none"/>
+        <c:tickLblPos val="nextTo"/>
+        <c:crossAx val="-2111782376"/>
+        <c:crosses val="autoZero"/>
+        <c:crossBetween val="between"/>
+      </c:valAx>
+    </c:plotArea>
+    <c:legend>
+      <c:legendPos val="r"/>
+      <c:layout/>
+      <c:overlay val="0"/>
+    </c:legend>
+    <c:plotVisOnly val="1"/>
+    <c:dispBlanksAs val="gap"/>
+    <c:showDLblsOverMax val="0"/>
+  </c:chart>
+  <c:externalData r:id="rId1">
+    <c:autoUpdate val="0"/>
+  </c:externalData>
+</c:chartSpace>
+</file>
+
 <file path=ppt/slideLayouts/slideLayout1.xml><?xml version="1.0" encoding="utf-8"?>
-<p:sldLayout xmlns:a="http://schemas.openxmlformats.org/drawingml/2006/main" xmlns:p="http://schemas.openxmlformats.org/presentationml/2006/main" xmlns:r="http://schemas.openxmlformats.org/officeDocument/2006/relationships" preserve="1" type="blank">
+<p:sldLayout xmlns:a="http://schemas.openxmlformats.org/drawingml/2006/main" xmlns:r="http://schemas.openxmlformats.org/officeDocument/2006/relationships" xmlns:p="http://schemas.openxmlformats.org/presentationml/2006/main" type="blank" preserve="1">
   <p:cSld name="Blank Slide">
     <p:spTree>
       <p:nvGrpSpPr>
@@ -42,11 +963,14 @@
       </p:grpSpPr>
     </p:spTree>
   </p:cSld>
+  <p:clrMapOvr>
+    <a:masterClrMapping/>
+  </p:clrMapOvr>
 </p:sldLayout>
 </file>
 
 <file path=ppt/slideLayouts/slideLayout10.xml><?xml version="1.0" encoding="utf-8"?>
-<p:sldLayout xmlns:a="http://schemas.openxmlformats.org/drawingml/2006/main" xmlns:p="http://schemas.openxmlformats.org/presentationml/2006/main" xmlns:r="http://schemas.openxmlformats.org/officeDocument/2006/relationships" preserve="1" type="objOverTx">
+<p:sldLayout xmlns:a="http://schemas.openxmlformats.org/drawingml/2006/main" xmlns:r="http://schemas.openxmlformats.org/officeDocument/2006/relationships" xmlns:p="http://schemas.openxmlformats.org/presentationml/2006/main" type="objOverTx" preserve="1">
   <p:cSld name="Title, Content over Content">
     <p:spTree>
       <p:nvGrpSpPr>
@@ -82,7 +1006,8 @@
           </a:prstGeom>
         </p:spPr>
         <p:txBody>
-          <a:bodyPr anchor="ctr" bIns="0" lIns="0" rIns="0" tIns="0" wrap="none"/>
+          <a:bodyPr wrap="none" lIns="0" tIns="0" rIns="0" bIns="0" anchor="ctr"/>
+          <a:lstStyle/>
           <a:p>
             <a:pPr algn="ctr"/>
             <a:endParaRPr/>
@@ -109,7 +1034,8 @@
           </a:prstGeom>
         </p:spPr>
         <p:txBody>
-          <a:bodyPr bIns="0" lIns="0" rIns="0" tIns="0" wrap="none"/>
+          <a:bodyPr wrap="none" lIns="0" tIns="0" rIns="0" bIns="0"/>
+          <a:lstStyle/>
           <a:p>
             <a:endParaRPr/>
           </a:p>
@@ -135,7 +1061,8 @@
           </a:prstGeom>
         </p:spPr>
         <p:txBody>
-          <a:bodyPr bIns="0" lIns="0" rIns="0" tIns="0" wrap="none"/>
+          <a:bodyPr wrap="none" lIns="0" tIns="0" rIns="0" bIns="0"/>
+          <a:lstStyle/>
           <a:p>
             <a:endParaRPr/>
           </a:p>
@@ -143,11 +1070,14 @@
       </p:sp>
     </p:spTree>
   </p:cSld>
+  <p:clrMapOvr>
+    <a:masterClrMapping/>
+  </p:clrMapOvr>
 </p:sldLayout>
 </file>
 
 <file path=ppt/slideLayouts/slideLayout11.xml><?xml version="1.0" encoding="utf-8"?>
-<p:sldLayout xmlns:a="http://schemas.openxmlformats.org/drawingml/2006/main" xmlns:p="http://schemas.openxmlformats.org/presentationml/2006/main" xmlns:r="http://schemas.openxmlformats.org/officeDocument/2006/relationships" preserve="1" type="fourObj">
+<p:sldLayout xmlns:a="http://schemas.openxmlformats.org/drawingml/2006/main" xmlns:r="http://schemas.openxmlformats.org/officeDocument/2006/relationships" xmlns:p="http://schemas.openxmlformats.org/presentationml/2006/main" type="fourObj" preserve="1">
   <p:cSld name="Title, 4 Content">
     <p:spTree>
       <p:nvGrpSpPr>
@@ -183,7 +1113,8 @@
           </a:prstGeom>
         </p:spPr>
         <p:txBody>
-          <a:bodyPr anchor="ctr" bIns="0" lIns="0" rIns="0" tIns="0" wrap="none"/>
+          <a:bodyPr wrap="none" lIns="0" tIns="0" rIns="0" bIns="0" anchor="ctr"/>
+          <a:lstStyle/>
           <a:p>
             <a:pPr algn="ctr"/>
             <a:endParaRPr/>
@@ -210,7 +1141,8 @@
           </a:prstGeom>
         </p:spPr>
         <p:txBody>
-          <a:bodyPr bIns="0" lIns="0" rIns="0" tIns="0" wrap="none"/>
+          <a:bodyPr wrap="none" lIns="0" tIns="0" rIns="0" bIns="0"/>
+          <a:lstStyle/>
           <a:p>
             <a:endParaRPr/>
           </a:p>
@@ -236,7 +1168,8 @@
           </a:prstGeom>
         </p:spPr>
         <p:txBody>
-          <a:bodyPr bIns="0" lIns="0" rIns="0" tIns="0" wrap="none"/>
+          <a:bodyPr wrap="none" lIns="0" tIns="0" rIns="0" bIns="0"/>
+          <a:lstStyle/>
           <a:p>
             <a:endParaRPr/>
           </a:p>
@@ -262,7 +1195,8 @@
           </a:prstGeom>
         </p:spPr>
         <p:txBody>
-          <a:bodyPr bIns="0" lIns="0" rIns="0" tIns="0" wrap="none"/>
+          <a:bodyPr wrap="none" lIns="0" tIns="0" rIns="0" bIns="0"/>
+          <a:lstStyle/>
           <a:p>
             <a:endParaRPr/>
           </a:p>
@@ -288,7 +1222,8 @@
           </a:prstGeom>
         </p:spPr>
         <p:txBody>
-          <a:bodyPr bIns="0" lIns="0" rIns="0" tIns="0" wrap="none"/>
+          <a:bodyPr wrap="none" lIns="0" tIns="0" rIns="0" bIns="0"/>
+          <a:lstStyle/>
           <a:p>
             <a:endParaRPr/>
           </a:p>
@@ -296,11 +1231,14 @@
       </p:sp>
     </p:spTree>
   </p:cSld>
+  <p:clrMapOvr>
+    <a:masterClrMapping/>
+  </p:clrMapOvr>
 </p:sldLayout>
 </file>
 
 <file path=ppt/slideLayouts/slideLayout12.xml><?xml version="1.0" encoding="utf-8"?>
-<p:sldLayout xmlns:a="http://schemas.openxmlformats.org/drawingml/2006/main" xmlns:p="http://schemas.openxmlformats.org/presentationml/2006/main" xmlns:r="http://schemas.openxmlformats.org/officeDocument/2006/relationships" preserve="1" type="blank">
+<p:sldLayout xmlns:a="http://schemas.openxmlformats.org/drawingml/2006/main" xmlns:r="http://schemas.openxmlformats.org/officeDocument/2006/relationships" xmlns:p="http://schemas.openxmlformats.org/presentationml/2006/main" type="blank" preserve="1">
   <p:cSld name="Title, 6 Content">
     <p:spTree>
       <p:nvGrpSpPr>
@@ -336,7 +1274,8 @@
           </a:prstGeom>
         </p:spPr>
         <p:txBody>
-          <a:bodyPr anchor="ctr" bIns="0" lIns="0" rIns="0" tIns="0" wrap="none"/>
+          <a:bodyPr wrap="none" lIns="0" tIns="0" rIns="0" bIns="0" anchor="ctr"/>
+          <a:lstStyle/>
           <a:p>
             <a:pPr algn="ctr"/>
             <a:endParaRPr/>
@@ -363,7 +1302,8 @@
           </a:prstGeom>
         </p:spPr>
         <p:txBody>
-          <a:bodyPr bIns="0" lIns="0" rIns="0" tIns="0" wrap="none"/>
+          <a:bodyPr wrap="none" lIns="0" tIns="0" rIns="0" bIns="0"/>
+          <a:lstStyle/>
           <a:p>
             <a:endParaRPr/>
           </a:p>
@@ -389,7 +1329,8 @@
           </a:prstGeom>
         </p:spPr>
         <p:txBody>
-          <a:bodyPr bIns="0" lIns="0" rIns="0" tIns="0" wrap="none"/>
+          <a:bodyPr wrap="none" lIns="0" tIns="0" rIns="0" bIns="0"/>
+          <a:lstStyle/>
           <a:p>
             <a:endParaRPr/>
           </a:p>
@@ -397,11 +1338,14 @@
       </p:sp>
     </p:spTree>
   </p:cSld>
+  <p:clrMapOvr>
+    <a:masterClrMapping/>
+  </p:clrMapOvr>
 </p:sldLayout>
 </file>
 
 <file path=ppt/slideLayouts/slideLayout13.xml><?xml version="1.0" encoding="utf-8"?>
-<p:sldLayout xmlns:a="http://schemas.openxmlformats.org/drawingml/2006/main" xmlns:p="http://schemas.openxmlformats.org/presentationml/2006/main" xmlns:r="http://schemas.openxmlformats.org/officeDocument/2006/relationships" preserve="1" type="blank">
+<p:sldLayout xmlns:a="http://schemas.openxmlformats.org/drawingml/2006/main" xmlns:r="http://schemas.openxmlformats.org/officeDocument/2006/relationships" xmlns:p="http://schemas.openxmlformats.org/presentationml/2006/main" type="blank" preserve="1">
   <p:cSld name="Blank Slide">
     <p:spTree>
       <p:nvGrpSpPr>
@@ -419,11 +1363,14 @@
       </p:grpSpPr>
     </p:spTree>
   </p:cSld>
+  <p:clrMapOvr>
+    <a:masterClrMapping/>
+  </p:clrMapOvr>
 </p:sldLayout>
 </file>
 
 <file path=ppt/slideLayouts/slideLayout14.xml><?xml version="1.0" encoding="utf-8"?>
-<p:sldLayout xmlns:a="http://schemas.openxmlformats.org/drawingml/2006/main" xmlns:p="http://schemas.openxmlformats.org/presentationml/2006/main" xmlns:r="http://schemas.openxmlformats.org/officeDocument/2006/relationships" preserve="1" type="tx">
+<p:sldLayout xmlns:a="http://schemas.openxmlformats.org/drawingml/2006/main" xmlns:r="http://schemas.openxmlformats.org/officeDocument/2006/relationships" xmlns:p="http://schemas.openxmlformats.org/presentationml/2006/main" type="tx" preserve="1">
   <p:cSld name="Title Slide">
     <p:spTree>
       <p:nvGrpSpPr>
@@ -459,7 +1406,8 @@
           </a:prstGeom>
         </p:spPr>
         <p:txBody>
-          <a:bodyPr anchor="ctr" bIns="0" lIns="0" rIns="0" tIns="0" wrap="none"/>
+          <a:bodyPr wrap="none" lIns="0" tIns="0" rIns="0" bIns="0" anchor="ctr"/>
+          <a:lstStyle/>
           <a:p>
             <a:pPr algn="ctr"/>
             <a:endParaRPr/>
@@ -486,7 +1434,8 @@
           </a:prstGeom>
         </p:spPr>
         <p:txBody>
-          <a:bodyPr anchor="ctr" bIns="0" lIns="0" rIns="0" tIns="0" wrap="none"/>
+          <a:bodyPr wrap="none" lIns="0" tIns="0" rIns="0" bIns="0" anchor="ctr"/>
+          <a:lstStyle/>
           <a:p>
             <a:pPr algn="ctr"/>
             <a:endParaRPr/>
@@ -495,11 +1444,14 @@
       </p:sp>
     </p:spTree>
   </p:cSld>
+  <p:clrMapOvr>
+    <a:masterClrMapping/>
+  </p:clrMapOvr>
 </p:sldLayout>
 </file>
 
 <file path=ppt/slideLayouts/slideLayout15.xml><?xml version="1.0" encoding="utf-8"?>
-<p:sldLayout xmlns:a="http://schemas.openxmlformats.org/drawingml/2006/main" xmlns:p="http://schemas.openxmlformats.org/presentationml/2006/main" xmlns:r="http://schemas.openxmlformats.org/officeDocument/2006/relationships" preserve="1" type="obj">
+<p:sldLayout xmlns:a="http://schemas.openxmlformats.org/drawingml/2006/main" xmlns:r="http://schemas.openxmlformats.org/officeDocument/2006/relationships" xmlns:p="http://schemas.openxmlformats.org/presentationml/2006/main" type="obj" preserve="1">
   <p:cSld name="Title, Content">
     <p:spTree>
       <p:nvGrpSpPr>
@@ -535,7 +1487,8 @@
           </a:prstGeom>
         </p:spPr>
         <p:txBody>
-          <a:bodyPr anchor="ctr" bIns="0" lIns="0" rIns="0" tIns="0" wrap="none"/>
+          <a:bodyPr wrap="none" lIns="0" tIns="0" rIns="0" bIns="0" anchor="ctr"/>
+          <a:lstStyle/>
           <a:p>
             <a:pPr algn="ctr"/>
             <a:endParaRPr/>
@@ -562,7 +1515,8 @@
           </a:prstGeom>
         </p:spPr>
         <p:txBody>
-          <a:bodyPr bIns="0" lIns="0" rIns="0" tIns="0" wrap="none"/>
+          <a:bodyPr wrap="none" lIns="0" tIns="0" rIns="0" bIns="0"/>
+          <a:lstStyle/>
           <a:p>
             <a:endParaRPr/>
           </a:p>
@@ -570,11 +1524,14 @@
       </p:sp>
     </p:spTree>
   </p:cSld>
+  <p:clrMapOvr>
+    <a:masterClrMapping/>
+  </p:clrMapOvr>
 </p:sldLayout>
 </file>
 
 <file path=ppt/slideLayouts/slideLayout16.xml><?xml version="1.0" encoding="utf-8"?>
-<p:sldLayout xmlns:a="http://schemas.openxmlformats.org/drawingml/2006/main" xmlns:p="http://schemas.openxmlformats.org/presentationml/2006/main" xmlns:r="http://schemas.openxmlformats.org/officeDocument/2006/relationships" preserve="1" type="twoObj">
+<p:sldLayout xmlns:a="http://schemas.openxmlformats.org/drawingml/2006/main" xmlns:r="http://schemas.openxmlformats.org/officeDocument/2006/relationships" xmlns:p="http://schemas.openxmlformats.org/presentationml/2006/main" type="twoObj" preserve="1">
   <p:cSld name="Title, 2 Content">
     <p:spTree>
       <p:nvGrpSpPr>
@@ -610,7 +1567,8 @@
           </a:prstGeom>
         </p:spPr>
         <p:txBody>
-          <a:bodyPr anchor="ctr" bIns="0" lIns="0" rIns="0" tIns="0" wrap="none"/>
+          <a:bodyPr wrap="none" lIns="0" tIns="0" rIns="0" bIns="0" anchor="ctr"/>
+          <a:lstStyle/>
           <a:p>
             <a:pPr algn="ctr"/>
             <a:endParaRPr/>
@@ -637,7 +1595,8 @@
           </a:prstGeom>
         </p:spPr>
         <p:txBody>
-          <a:bodyPr bIns="0" lIns="0" rIns="0" tIns="0" wrap="none"/>
+          <a:bodyPr wrap="none" lIns="0" tIns="0" rIns="0" bIns="0"/>
+          <a:lstStyle/>
           <a:p>
             <a:endParaRPr/>
           </a:p>
@@ -663,7 +1622,8 @@
           </a:prstGeom>
         </p:spPr>
         <p:txBody>
-          <a:bodyPr bIns="0" lIns="0" rIns="0" tIns="0" wrap="none"/>
+          <a:bodyPr wrap="none" lIns="0" tIns="0" rIns="0" bIns="0"/>
+          <a:lstStyle/>
           <a:p>
             <a:endParaRPr/>
           </a:p>
@@ -671,11 +1631,14 @@
       </p:sp>
     </p:spTree>
   </p:cSld>
+  <p:clrMapOvr>
+    <a:masterClrMapping/>
+  </p:clrMapOvr>
 </p:sldLayout>
 </file>
 
 <file path=ppt/slideLayouts/slideLayout17.xml><?xml version="1.0" encoding="utf-8"?>
-<p:sldLayout xmlns:a="http://schemas.openxmlformats.org/drawingml/2006/main" xmlns:p="http://schemas.openxmlformats.org/presentationml/2006/main" xmlns:r="http://schemas.openxmlformats.org/officeDocument/2006/relationships" preserve="1" type="titleOnly">
+<p:sldLayout xmlns:a="http://schemas.openxmlformats.org/drawingml/2006/main" xmlns:r="http://schemas.openxmlformats.org/officeDocument/2006/relationships" xmlns:p="http://schemas.openxmlformats.org/presentationml/2006/main" type="titleOnly" preserve="1">
   <p:cSld name="Title Only">
     <p:spTree>
       <p:nvGrpSpPr>
@@ -711,7 +1674,8 @@
           </a:prstGeom>
         </p:spPr>
         <p:txBody>
-          <a:bodyPr anchor="ctr" bIns="0" lIns="0" rIns="0" tIns="0" wrap="none"/>
+          <a:bodyPr wrap="none" lIns="0" tIns="0" rIns="0" bIns="0" anchor="ctr"/>
+          <a:lstStyle/>
           <a:p>
             <a:pPr algn="ctr"/>
             <a:endParaRPr/>
@@ -720,11 +1684,14 @@
       </p:sp>
     </p:spTree>
   </p:cSld>
+  <p:clrMapOvr>
+    <a:masterClrMapping/>
+  </p:clrMapOvr>
 </p:sldLayout>
 </file>
 
 <file path=ppt/slideLayouts/slideLayout18.xml><?xml version="1.0" encoding="utf-8"?>
-<p:sldLayout xmlns:a="http://schemas.openxmlformats.org/drawingml/2006/main" xmlns:p="http://schemas.openxmlformats.org/presentationml/2006/main" xmlns:r="http://schemas.openxmlformats.org/officeDocument/2006/relationships" preserve="1" type="objOnly">
+<p:sldLayout xmlns:a="http://schemas.openxmlformats.org/drawingml/2006/main" xmlns:r="http://schemas.openxmlformats.org/officeDocument/2006/relationships" xmlns:p="http://schemas.openxmlformats.org/presentationml/2006/main" type="objOnly" preserve="1">
   <p:cSld name="Centered Text">
     <p:spTree>
       <p:nvGrpSpPr>
@@ -760,7 +1727,8 @@
           </a:prstGeom>
         </p:spPr>
         <p:txBody>
-          <a:bodyPr anchor="ctr" bIns="0" lIns="0" rIns="0" tIns="0" wrap="none"/>
+          <a:bodyPr wrap="none" lIns="0" tIns="0" rIns="0" bIns="0" anchor="ctr"/>
+          <a:lstStyle/>
           <a:p>
             <a:pPr algn="ctr"/>
             <a:endParaRPr/>
@@ -769,11 +1737,14 @@
       </p:sp>
     </p:spTree>
   </p:cSld>
+  <p:clrMapOvr>
+    <a:masterClrMapping/>
+  </p:clrMapOvr>
 </p:sldLayout>
 </file>
 
 <file path=ppt/slideLayouts/slideLayout19.xml><?xml version="1.0" encoding="utf-8"?>
-<p:sldLayout xmlns:a="http://schemas.openxmlformats.org/drawingml/2006/main" xmlns:p="http://schemas.openxmlformats.org/presentationml/2006/main" xmlns:r="http://schemas.openxmlformats.org/officeDocument/2006/relationships" preserve="1" type="twoObjAndObj">
+<p:sldLayout xmlns:a="http://schemas.openxmlformats.org/drawingml/2006/main" xmlns:r="http://schemas.openxmlformats.org/officeDocument/2006/relationships" xmlns:p="http://schemas.openxmlformats.org/presentationml/2006/main" type="twoObjAndObj" preserve="1">
   <p:cSld name="Title, 2 Content and Content">
     <p:spTree>
       <p:nvGrpSpPr>
@@ -809,7 +1780,8 @@
           </a:prstGeom>
         </p:spPr>
         <p:txBody>
-          <a:bodyPr anchor="ctr" bIns="0" lIns="0" rIns="0" tIns="0" wrap="none"/>
+          <a:bodyPr wrap="none" lIns="0" tIns="0" rIns="0" bIns="0" anchor="ctr"/>
+          <a:lstStyle/>
           <a:p>
             <a:pPr algn="ctr"/>
             <a:endParaRPr/>
@@ -836,7 +1808,8 @@
           </a:prstGeom>
         </p:spPr>
         <p:txBody>
-          <a:bodyPr bIns="0" lIns="0" rIns="0" tIns="0" wrap="none"/>
+          <a:bodyPr wrap="none" lIns="0" tIns="0" rIns="0" bIns="0"/>
+          <a:lstStyle/>
           <a:p>
             <a:endParaRPr/>
           </a:p>
@@ -862,7 +1835,8 @@
           </a:prstGeom>
         </p:spPr>
         <p:txBody>
-          <a:bodyPr bIns="0" lIns="0" rIns="0" tIns="0" wrap="none"/>
+          <a:bodyPr wrap="none" lIns="0" tIns="0" rIns="0" bIns="0"/>
+          <a:lstStyle/>
           <a:p>
             <a:endParaRPr/>
           </a:p>
@@ -888,7 +1862,8 @@
           </a:prstGeom>
         </p:spPr>
         <p:txBody>
-          <a:bodyPr bIns="0" lIns="0" rIns="0" tIns="0" wrap="none"/>
+          <a:bodyPr wrap="none" lIns="0" tIns="0" rIns="0" bIns="0"/>
+          <a:lstStyle/>
           <a:p>
             <a:endParaRPr/>
           </a:p>
@@ -896,11 +1871,14 @@
       </p:sp>
     </p:spTree>
   </p:cSld>
+  <p:clrMapOvr>
+    <a:masterClrMapping/>
+  </p:clrMapOvr>
 </p:sldLayout>
 </file>
 
 <file path=ppt/slideLayouts/slideLayout2.xml><?xml version="1.0" encoding="utf-8"?>
-<p:sldLayout xmlns:a="http://schemas.openxmlformats.org/drawingml/2006/main" xmlns:p="http://schemas.openxmlformats.org/presentationml/2006/main" xmlns:r="http://schemas.openxmlformats.org/officeDocument/2006/relationships" preserve="1" type="tx">
+<p:sldLayout xmlns:a="http://schemas.openxmlformats.org/drawingml/2006/main" xmlns:r="http://schemas.openxmlformats.org/officeDocument/2006/relationships" xmlns:p="http://schemas.openxmlformats.org/presentationml/2006/main" type="tx" preserve="1">
   <p:cSld name="Title Slide">
     <p:spTree>
       <p:nvGrpSpPr>
@@ -936,7 +1914,8 @@
           </a:prstGeom>
         </p:spPr>
         <p:txBody>
-          <a:bodyPr anchor="ctr" bIns="0" lIns="0" rIns="0" tIns="0" wrap="none"/>
+          <a:bodyPr wrap="none" lIns="0" tIns="0" rIns="0" bIns="0" anchor="ctr"/>
+          <a:lstStyle/>
           <a:p>
             <a:pPr algn="ctr"/>
             <a:endParaRPr/>
@@ -963,7 +1942,8 @@
           </a:prstGeom>
         </p:spPr>
         <p:txBody>
-          <a:bodyPr anchor="ctr" bIns="0" lIns="0" rIns="0" tIns="0" wrap="none"/>
+          <a:bodyPr wrap="none" lIns="0" tIns="0" rIns="0" bIns="0" anchor="ctr"/>
+          <a:lstStyle/>
           <a:p>
             <a:pPr algn="ctr"/>
             <a:endParaRPr/>
@@ -972,11 +1952,14 @@
       </p:sp>
     </p:spTree>
   </p:cSld>
+  <p:clrMapOvr>
+    <a:masterClrMapping/>
+  </p:clrMapOvr>
 </p:sldLayout>
 </file>
 
 <file path=ppt/slideLayouts/slideLayout20.xml><?xml version="1.0" encoding="utf-8"?>
-<p:sldLayout xmlns:a="http://schemas.openxmlformats.org/drawingml/2006/main" xmlns:p="http://schemas.openxmlformats.org/presentationml/2006/main" xmlns:r="http://schemas.openxmlformats.org/officeDocument/2006/relationships" preserve="1" type="objAndTwoObj">
+<p:sldLayout xmlns:a="http://schemas.openxmlformats.org/drawingml/2006/main" xmlns:r="http://schemas.openxmlformats.org/officeDocument/2006/relationships" xmlns:p="http://schemas.openxmlformats.org/presentationml/2006/main" type="objAndTwoObj" preserve="1">
   <p:cSld name="Title Content and 2 Content">
     <p:spTree>
       <p:nvGrpSpPr>
@@ -1012,7 +1995,8 @@
           </a:prstGeom>
         </p:spPr>
         <p:txBody>
-          <a:bodyPr anchor="ctr" bIns="0" lIns="0" rIns="0" tIns="0" wrap="none"/>
+          <a:bodyPr wrap="none" lIns="0" tIns="0" rIns="0" bIns="0" anchor="ctr"/>
+          <a:lstStyle/>
           <a:p>
             <a:pPr algn="ctr"/>
             <a:endParaRPr/>
@@ -1039,7 +2023,8 @@
           </a:prstGeom>
         </p:spPr>
         <p:txBody>
-          <a:bodyPr bIns="0" lIns="0" rIns="0" tIns="0" wrap="none"/>
+          <a:bodyPr wrap="none" lIns="0" tIns="0" rIns="0" bIns="0"/>
+          <a:lstStyle/>
           <a:p>
             <a:endParaRPr/>
           </a:p>
@@ -1065,7 +2050,8 @@
           </a:prstGeom>
         </p:spPr>
         <p:txBody>
-          <a:bodyPr bIns="0" lIns="0" rIns="0" tIns="0" wrap="none"/>
+          <a:bodyPr wrap="none" lIns="0" tIns="0" rIns="0" bIns="0"/>
+          <a:lstStyle/>
           <a:p>
             <a:endParaRPr/>
           </a:p>
@@ -1091,7 +2077,8 @@
           </a:prstGeom>
         </p:spPr>
         <p:txBody>
-          <a:bodyPr bIns="0" lIns="0" rIns="0" tIns="0" wrap="none"/>
+          <a:bodyPr wrap="none" lIns="0" tIns="0" rIns="0" bIns="0"/>
+          <a:lstStyle/>
           <a:p>
             <a:endParaRPr/>
           </a:p>
@@ -1099,11 +2086,14 @@
       </p:sp>
     </p:spTree>
   </p:cSld>
+  <p:clrMapOvr>
+    <a:masterClrMapping/>
+  </p:clrMapOvr>
 </p:sldLayout>
 </file>
 
 <file path=ppt/slideLayouts/slideLayout21.xml><?xml version="1.0" encoding="utf-8"?>
-<p:sldLayout xmlns:a="http://schemas.openxmlformats.org/drawingml/2006/main" xmlns:p="http://schemas.openxmlformats.org/presentationml/2006/main" xmlns:r="http://schemas.openxmlformats.org/officeDocument/2006/relationships" preserve="1" type="twoObjOverTx">
+<p:sldLayout xmlns:a="http://schemas.openxmlformats.org/drawingml/2006/main" xmlns:r="http://schemas.openxmlformats.org/officeDocument/2006/relationships" xmlns:p="http://schemas.openxmlformats.org/presentationml/2006/main" type="twoObjOverTx" preserve="1">
   <p:cSld name="Title, 2 Content over Content">
     <p:spTree>
       <p:nvGrpSpPr>
@@ -1139,7 +2129,8 @@
           </a:prstGeom>
         </p:spPr>
         <p:txBody>
-          <a:bodyPr anchor="ctr" bIns="0" lIns="0" rIns="0" tIns="0" wrap="none"/>
+          <a:bodyPr wrap="none" lIns="0" tIns="0" rIns="0" bIns="0" anchor="ctr"/>
+          <a:lstStyle/>
           <a:p>
             <a:pPr algn="ctr"/>
             <a:endParaRPr/>
@@ -1166,7 +2157,8 @@
           </a:prstGeom>
         </p:spPr>
         <p:txBody>
-          <a:bodyPr bIns="0" lIns="0" rIns="0" tIns="0" wrap="none"/>
+          <a:bodyPr wrap="none" lIns="0" tIns="0" rIns="0" bIns="0"/>
+          <a:lstStyle/>
           <a:p>
             <a:endParaRPr/>
           </a:p>
@@ -1192,7 +2184,8 @@
           </a:prstGeom>
         </p:spPr>
         <p:txBody>
-          <a:bodyPr bIns="0" lIns="0" rIns="0" tIns="0" wrap="none"/>
+          <a:bodyPr wrap="none" lIns="0" tIns="0" rIns="0" bIns="0"/>
+          <a:lstStyle/>
           <a:p>
             <a:endParaRPr/>
           </a:p>
@@ -1218,7 +2211,8 @@
           </a:prstGeom>
         </p:spPr>
         <p:txBody>
-          <a:bodyPr bIns="0" lIns="0" rIns="0" tIns="0" wrap="none"/>
+          <a:bodyPr wrap="none" lIns="0" tIns="0" rIns="0" bIns="0"/>
+          <a:lstStyle/>
           <a:p>
             <a:endParaRPr/>
           </a:p>
@@ -1226,11 +2220,14 @@
       </p:sp>
     </p:spTree>
   </p:cSld>
+  <p:clrMapOvr>
+    <a:masterClrMapping/>
+  </p:clrMapOvr>
 </p:sldLayout>
 </file>
 
 <file path=ppt/slideLayouts/slideLayout22.xml><?xml version="1.0" encoding="utf-8"?>
-<p:sldLayout xmlns:a="http://schemas.openxmlformats.org/drawingml/2006/main" xmlns:p="http://schemas.openxmlformats.org/presentationml/2006/main" xmlns:r="http://schemas.openxmlformats.org/officeDocument/2006/relationships" preserve="1" type="objOverTx">
+<p:sldLayout xmlns:a="http://schemas.openxmlformats.org/drawingml/2006/main" xmlns:r="http://schemas.openxmlformats.org/officeDocument/2006/relationships" xmlns:p="http://schemas.openxmlformats.org/presentationml/2006/main" type="objOverTx" preserve="1">
   <p:cSld name="Title, Content over Content">
     <p:spTree>
       <p:nvGrpSpPr>
@@ -1266,7 +2263,8 @@
           </a:prstGeom>
         </p:spPr>
         <p:txBody>
-          <a:bodyPr anchor="ctr" bIns="0" lIns="0" rIns="0" tIns="0" wrap="none"/>
+          <a:bodyPr wrap="none" lIns="0" tIns="0" rIns="0" bIns="0" anchor="ctr"/>
+          <a:lstStyle/>
           <a:p>
             <a:pPr algn="ctr"/>
             <a:endParaRPr/>
@@ -1293,7 +2291,8 @@
           </a:prstGeom>
         </p:spPr>
         <p:txBody>
-          <a:bodyPr bIns="0" lIns="0" rIns="0" tIns="0" wrap="none"/>
+          <a:bodyPr wrap="none" lIns="0" tIns="0" rIns="0" bIns="0"/>
+          <a:lstStyle/>
           <a:p>
             <a:endParaRPr/>
           </a:p>
@@ -1319,7 +2318,8 @@
           </a:prstGeom>
         </p:spPr>
         <p:txBody>
-          <a:bodyPr bIns="0" lIns="0" rIns="0" tIns="0" wrap="none"/>
+          <a:bodyPr wrap="none" lIns="0" tIns="0" rIns="0" bIns="0"/>
+          <a:lstStyle/>
           <a:p>
             <a:endParaRPr/>
           </a:p>
@@ -1327,11 +2327,14 @@
       </p:sp>
     </p:spTree>
   </p:cSld>
+  <p:clrMapOvr>
+    <a:masterClrMapping/>
+  </p:clrMapOvr>
 </p:sldLayout>
 </file>
 
 <file path=ppt/slideLayouts/slideLayout23.xml><?xml version="1.0" encoding="utf-8"?>
-<p:sldLayout xmlns:a="http://schemas.openxmlformats.org/drawingml/2006/main" xmlns:p="http://schemas.openxmlformats.org/presentationml/2006/main" xmlns:r="http://schemas.openxmlformats.org/officeDocument/2006/relationships" preserve="1" type="fourObj">
+<p:sldLayout xmlns:a="http://schemas.openxmlformats.org/drawingml/2006/main" xmlns:r="http://schemas.openxmlformats.org/officeDocument/2006/relationships" xmlns:p="http://schemas.openxmlformats.org/presentationml/2006/main" type="fourObj" preserve="1">
   <p:cSld name="Title, 4 Content">
     <p:spTree>
       <p:nvGrpSpPr>
@@ -1367,7 +2370,8 @@
           </a:prstGeom>
         </p:spPr>
         <p:txBody>
-          <a:bodyPr anchor="ctr" bIns="0" lIns="0" rIns="0" tIns="0" wrap="none"/>
+          <a:bodyPr wrap="none" lIns="0" tIns="0" rIns="0" bIns="0" anchor="ctr"/>
+          <a:lstStyle/>
           <a:p>
             <a:pPr algn="ctr"/>
             <a:endParaRPr/>
@@ -1394,7 +2398,8 @@
           </a:prstGeom>
         </p:spPr>
         <p:txBody>
-          <a:bodyPr bIns="0" lIns="0" rIns="0" tIns="0" wrap="none"/>
+          <a:bodyPr wrap="none" lIns="0" tIns="0" rIns="0" bIns="0"/>
+          <a:lstStyle/>
           <a:p>
             <a:endParaRPr/>
           </a:p>
@@ -1420,7 +2425,8 @@
           </a:prstGeom>
         </p:spPr>
         <p:txBody>
-          <a:bodyPr bIns="0" lIns="0" rIns="0" tIns="0" wrap="none"/>
+          <a:bodyPr wrap="none" lIns="0" tIns="0" rIns="0" bIns="0"/>
+          <a:lstStyle/>
           <a:p>
             <a:endParaRPr/>
           </a:p>
@@ -1446,7 +2452,8 @@
           </a:prstGeom>
         </p:spPr>
         <p:txBody>
-          <a:bodyPr bIns="0" lIns="0" rIns="0" tIns="0" wrap="none"/>
+          <a:bodyPr wrap="none" lIns="0" tIns="0" rIns="0" bIns="0"/>
+          <a:lstStyle/>
           <a:p>
             <a:endParaRPr/>
           </a:p>
@@ -1472,7 +2479,8 @@
           </a:prstGeom>
         </p:spPr>
         <p:txBody>
-          <a:bodyPr bIns="0" lIns="0" rIns="0" tIns="0" wrap="none"/>
+          <a:bodyPr wrap="none" lIns="0" tIns="0" rIns="0" bIns="0"/>
+          <a:lstStyle/>
           <a:p>
             <a:endParaRPr/>
           </a:p>
@@ -1480,11 +2488,14 @@
       </p:sp>
     </p:spTree>
   </p:cSld>
+  <p:clrMapOvr>
+    <a:masterClrMapping/>
+  </p:clrMapOvr>
 </p:sldLayout>
 </file>
 
 <file path=ppt/slideLayouts/slideLayout24.xml><?xml version="1.0" encoding="utf-8"?>
-<p:sldLayout xmlns:a="http://schemas.openxmlformats.org/drawingml/2006/main" xmlns:p="http://schemas.openxmlformats.org/presentationml/2006/main" xmlns:r="http://schemas.openxmlformats.org/officeDocument/2006/relationships" preserve="1" type="blank">
+<p:sldLayout xmlns:a="http://schemas.openxmlformats.org/drawingml/2006/main" xmlns:r="http://schemas.openxmlformats.org/officeDocument/2006/relationships" xmlns:p="http://schemas.openxmlformats.org/presentationml/2006/main" type="blank" preserve="1">
   <p:cSld name="Title, 6 Content">
     <p:spTree>
       <p:nvGrpSpPr>
@@ -1520,7 +2531,8 @@
           </a:prstGeom>
         </p:spPr>
         <p:txBody>
-          <a:bodyPr anchor="ctr" bIns="0" lIns="0" rIns="0" tIns="0" wrap="none"/>
+          <a:bodyPr wrap="none" lIns="0" tIns="0" rIns="0" bIns="0" anchor="ctr"/>
+          <a:lstStyle/>
           <a:p>
             <a:pPr algn="ctr"/>
             <a:endParaRPr/>
@@ -1547,7 +2559,8 @@
           </a:prstGeom>
         </p:spPr>
         <p:txBody>
-          <a:bodyPr bIns="0" lIns="0" rIns="0" tIns="0" wrap="none"/>
+          <a:bodyPr wrap="none" lIns="0" tIns="0" rIns="0" bIns="0"/>
+          <a:lstStyle/>
           <a:p>
             <a:endParaRPr/>
           </a:p>
@@ -1573,7 +2586,8 @@
           </a:prstGeom>
         </p:spPr>
         <p:txBody>
-          <a:bodyPr bIns="0" lIns="0" rIns="0" tIns="0" wrap="none"/>
+          <a:bodyPr wrap="none" lIns="0" tIns="0" rIns="0" bIns="0"/>
+          <a:lstStyle/>
           <a:p>
             <a:endParaRPr/>
           </a:p>
@@ -1581,11 +2595,14 @@
       </p:sp>
     </p:spTree>
   </p:cSld>
+  <p:clrMapOvr>
+    <a:masterClrMapping/>
+  </p:clrMapOvr>
 </p:sldLayout>
 </file>
 
 <file path=ppt/slideLayouts/slideLayout25.xml><?xml version="1.0" encoding="utf-8"?>
-<p:sldLayout xmlns:a="http://schemas.openxmlformats.org/drawingml/2006/main" xmlns:p="http://schemas.openxmlformats.org/presentationml/2006/main" xmlns:r="http://schemas.openxmlformats.org/officeDocument/2006/relationships" preserve="1" type="blank">
+<p:sldLayout xmlns:a="http://schemas.openxmlformats.org/drawingml/2006/main" xmlns:r="http://schemas.openxmlformats.org/officeDocument/2006/relationships" xmlns:p="http://schemas.openxmlformats.org/presentationml/2006/main" type="blank" preserve="1">
   <p:cSld name="Blank Slide">
     <p:spTree>
       <p:nvGrpSpPr>
@@ -1603,11 +2620,14 @@
       </p:grpSpPr>
     </p:spTree>
   </p:cSld>
+  <p:clrMapOvr>
+    <a:masterClrMapping/>
+  </p:clrMapOvr>
 </p:sldLayout>
 </file>
 
 <file path=ppt/slideLayouts/slideLayout26.xml><?xml version="1.0" encoding="utf-8"?>
-<p:sldLayout xmlns:a="http://schemas.openxmlformats.org/drawingml/2006/main" xmlns:p="http://schemas.openxmlformats.org/presentationml/2006/main" xmlns:r="http://schemas.openxmlformats.org/officeDocument/2006/relationships" preserve="1" type="tx">
+<p:sldLayout xmlns:a="http://schemas.openxmlformats.org/drawingml/2006/main" xmlns:r="http://schemas.openxmlformats.org/officeDocument/2006/relationships" xmlns:p="http://schemas.openxmlformats.org/presentationml/2006/main" type="tx" preserve="1">
   <p:cSld name="Title Slide">
     <p:spTree>
       <p:nvGrpSpPr>
@@ -1643,7 +2663,8 @@
           </a:prstGeom>
         </p:spPr>
         <p:txBody>
-          <a:bodyPr anchor="ctr" bIns="0" lIns="0" rIns="0" tIns="0" wrap="none"/>
+          <a:bodyPr wrap="none" lIns="0" tIns="0" rIns="0" bIns="0" anchor="ctr"/>
+          <a:lstStyle/>
           <a:p>
             <a:pPr algn="ctr"/>
             <a:endParaRPr/>
@@ -1670,7 +2691,8 @@
           </a:prstGeom>
         </p:spPr>
         <p:txBody>
-          <a:bodyPr anchor="ctr" bIns="0" lIns="0" rIns="0" tIns="0" wrap="none"/>
+          <a:bodyPr wrap="none" lIns="0" tIns="0" rIns="0" bIns="0" anchor="ctr"/>
+          <a:lstStyle/>
           <a:p>
             <a:pPr algn="ctr"/>
             <a:endParaRPr/>
@@ -1679,11 +2701,14 @@
       </p:sp>
     </p:spTree>
   </p:cSld>
+  <p:clrMapOvr>
+    <a:masterClrMapping/>
+  </p:clrMapOvr>
 </p:sldLayout>
 </file>
 
 <file path=ppt/slideLayouts/slideLayout27.xml><?xml version="1.0" encoding="utf-8"?>
-<p:sldLayout xmlns:a="http://schemas.openxmlformats.org/drawingml/2006/main" xmlns:p="http://schemas.openxmlformats.org/presentationml/2006/main" xmlns:r="http://schemas.openxmlformats.org/officeDocument/2006/relationships" preserve="1" type="obj">
+<p:sldLayout xmlns:a="http://schemas.openxmlformats.org/drawingml/2006/main" xmlns:r="http://schemas.openxmlformats.org/officeDocument/2006/relationships" xmlns:p="http://schemas.openxmlformats.org/presentationml/2006/main" type="obj" preserve="1">
   <p:cSld name="Title, Content">
     <p:spTree>
       <p:nvGrpSpPr>
@@ -1719,7 +2744,8 @@
           </a:prstGeom>
         </p:spPr>
         <p:txBody>
-          <a:bodyPr anchor="ctr" bIns="0" lIns="0" rIns="0" tIns="0" wrap="none"/>
+          <a:bodyPr wrap="none" lIns="0" tIns="0" rIns="0" bIns="0" anchor="ctr"/>
+          <a:lstStyle/>
           <a:p>
             <a:pPr algn="ctr"/>
             <a:endParaRPr/>
@@ -1746,7 +2772,8 @@
           </a:prstGeom>
         </p:spPr>
         <p:txBody>
-          <a:bodyPr bIns="0" lIns="0" rIns="0" tIns="0" wrap="none"/>
+          <a:bodyPr wrap="none" lIns="0" tIns="0" rIns="0" bIns="0"/>
+          <a:lstStyle/>
           <a:p>
             <a:endParaRPr/>
           </a:p>
@@ -1754,11 +2781,14 @@
       </p:sp>
     </p:spTree>
   </p:cSld>
+  <p:clrMapOvr>
+    <a:masterClrMapping/>
+  </p:clrMapOvr>
 </p:sldLayout>
 </file>
 
 <file path=ppt/slideLayouts/slideLayout28.xml><?xml version="1.0" encoding="utf-8"?>
-<p:sldLayout xmlns:a="http://schemas.openxmlformats.org/drawingml/2006/main" xmlns:p="http://schemas.openxmlformats.org/presentationml/2006/main" xmlns:r="http://schemas.openxmlformats.org/officeDocument/2006/relationships" preserve="1" type="twoObj">
+<p:sldLayout xmlns:a="http://schemas.openxmlformats.org/drawingml/2006/main" xmlns:r="http://schemas.openxmlformats.org/officeDocument/2006/relationships" xmlns:p="http://schemas.openxmlformats.org/presentationml/2006/main" type="twoObj" preserve="1">
   <p:cSld name="Title, 2 Content">
     <p:spTree>
       <p:nvGrpSpPr>
@@ -1794,7 +2824,8 @@
           </a:prstGeom>
         </p:spPr>
         <p:txBody>
-          <a:bodyPr anchor="ctr" bIns="0" lIns="0" rIns="0" tIns="0" wrap="none"/>
+          <a:bodyPr wrap="none" lIns="0" tIns="0" rIns="0" bIns="0" anchor="ctr"/>
+          <a:lstStyle/>
           <a:p>
             <a:pPr algn="ctr"/>
             <a:endParaRPr/>
@@ -1821,7 +2852,8 @@
           </a:prstGeom>
         </p:spPr>
         <p:txBody>
-          <a:bodyPr bIns="0" lIns="0" rIns="0" tIns="0" wrap="none"/>
+          <a:bodyPr wrap="none" lIns="0" tIns="0" rIns="0" bIns="0"/>
+          <a:lstStyle/>
           <a:p>
             <a:endParaRPr/>
           </a:p>
@@ -1847,7 +2879,8 @@
           </a:prstGeom>
         </p:spPr>
         <p:txBody>
-          <a:bodyPr bIns="0" lIns="0" rIns="0" tIns="0" wrap="none"/>
+          <a:bodyPr wrap="none" lIns="0" tIns="0" rIns="0" bIns="0"/>
+          <a:lstStyle/>
           <a:p>
             <a:endParaRPr/>
           </a:p>
@@ -1855,11 +2888,14 @@
       </p:sp>
     </p:spTree>
   </p:cSld>
+  <p:clrMapOvr>
+    <a:masterClrMapping/>
+  </p:clrMapOvr>
 </p:sldLayout>
 </file>
 
 <file path=ppt/slideLayouts/slideLayout29.xml><?xml version="1.0" encoding="utf-8"?>
-<p:sldLayout xmlns:a="http://schemas.openxmlformats.org/drawingml/2006/main" xmlns:p="http://schemas.openxmlformats.org/presentationml/2006/main" xmlns:r="http://schemas.openxmlformats.org/officeDocument/2006/relationships" preserve="1" type="titleOnly">
+<p:sldLayout xmlns:a="http://schemas.openxmlformats.org/drawingml/2006/main" xmlns:r="http://schemas.openxmlformats.org/officeDocument/2006/relationships" xmlns:p="http://schemas.openxmlformats.org/presentationml/2006/main" type="titleOnly" preserve="1">
   <p:cSld name="Title Only">
     <p:spTree>
       <p:nvGrpSpPr>
@@ -1895,7 +2931,8 @@
           </a:prstGeom>
         </p:spPr>
         <p:txBody>
-          <a:bodyPr anchor="ctr" bIns="0" lIns="0" rIns="0" tIns="0" wrap="none"/>
+          <a:bodyPr wrap="none" lIns="0" tIns="0" rIns="0" bIns="0" anchor="ctr"/>
+          <a:lstStyle/>
           <a:p>
             <a:pPr algn="ctr"/>
             <a:endParaRPr/>
@@ -1904,11 +2941,14 @@
       </p:sp>
     </p:spTree>
   </p:cSld>
+  <p:clrMapOvr>
+    <a:masterClrMapping/>
+  </p:clrMapOvr>
 </p:sldLayout>
 </file>
 
 <file path=ppt/slideLayouts/slideLayout3.xml><?xml version="1.0" encoding="utf-8"?>
-<p:sldLayout xmlns:a="http://schemas.openxmlformats.org/drawingml/2006/main" xmlns:p="http://schemas.openxmlformats.org/presentationml/2006/main" xmlns:r="http://schemas.openxmlformats.org/officeDocument/2006/relationships" preserve="1" type="obj">
+<p:sldLayout xmlns:a="http://schemas.openxmlformats.org/drawingml/2006/main" xmlns:r="http://schemas.openxmlformats.org/officeDocument/2006/relationships" xmlns:p="http://schemas.openxmlformats.org/presentationml/2006/main" type="obj" preserve="1">
   <p:cSld name="Title, Content">
     <p:spTree>
       <p:nvGrpSpPr>
@@ -1944,7 +2984,8 @@
           </a:prstGeom>
         </p:spPr>
         <p:txBody>
-          <a:bodyPr anchor="ctr" bIns="0" lIns="0" rIns="0" tIns="0" wrap="none"/>
+          <a:bodyPr wrap="none" lIns="0" tIns="0" rIns="0" bIns="0" anchor="ctr"/>
+          <a:lstStyle/>
           <a:p>
             <a:pPr algn="ctr"/>
             <a:endParaRPr/>
@@ -1971,7 +3012,8 @@
           </a:prstGeom>
         </p:spPr>
         <p:txBody>
-          <a:bodyPr bIns="0" lIns="0" rIns="0" tIns="0" wrap="none"/>
+          <a:bodyPr wrap="none" lIns="0" tIns="0" rIns="0" bIns="0"/>
+          <a:lstStyle/>
           <a:p>
             <a:endParaRPr/>
           </a:p>
@@ -1979,11 +3021,14 @@
       </p:sp>
     </p:spTree>
   </p:cSld>
+  <p:clrMapOvr>
+    <a:masterClrMapping/>
+  </p:clrMapOvr>
 </p:sldLayout>
 </file>
 
 <file path=ppt/slideLayouts/slideLayout30.xml><?xml version="1.0" encoding="utf-8"?>
-<p:sldLayout xmlns:a="http://schemas.openxmlformats.org/drawingml/2006/main" xmlns:p="http://schemas.openxmlformats.org/presentationml/2006/main" xmlns:r="http://schemas.openxmlformats.org/officeDocument/2006/relationships" preserve="1" type="objOnly">
+<p:sldLayout xmlns:a="http://schemas.openxmlformats.org/drawingml/2006/main" xmlns:r="http://schemas.openxmlformats.org/officeDocument/2006/relationships" xmlns:p="http://schemas.openxmlformats.org/presentationml/2006/main" type="objOnly" preserve="1">
   <p:cSld name="Centered Text">
     <p:spTree>
       <p:nvGrpSpPr>
@@ -2019,7 +3064,8 @@
           </a:prstGeom>
         </p:spPr>
         <p:txBody>
-          <a:bodyPr anchor="ctr" bIns="0" lIns="0" rIns="0" tIns="0" wrap="none"/>
+          <a:bodyPr wrap="none" lIns="0" tIns="0" rIns="0" bIns="0" anchor="ctr"/>
+          <a:lstStyle/>
           <a:p>
             <a:pPr algn="ctr"/>
             <a:endParaRPr/>
@@ -2028,11 +3074,14 @@
       </p:sp>
     </p:spTree>
   </p:cSld>
+  <p:clrMapOvr>
+    <a:masterClrMapping/>
+  </p:clrMapOvr>
 </p:sldLayout>
 </file>
 
 <file path=ppt/slideLayouts/slideLayout31.xml><?xml version="1.0" encoding="utf-8"?>
-<p:sldLayout xmlns:a="http://schemas.openxmlformats.org/drawingml/2006/main" xmlns:p="http://schemas.openxmlformats.org/presentationml/2006/main" xmlns:r="http://schemas.openxmlformats.org/officeDocument/2006/relationships" preserve="1" type="twoObjAndObj">
+<p:sldLayout xmlns:a="http://schemas.openxmlformats.org/drawingml/2006/main" xmlns:r="http://schemas.openxmlformats.org/officeDocument/2006/relationships" xmlns:p="http://schemas.openxmlformats.org/presentationml/2006/main" type="twoObjAndObj" preserve="1">
   <p:cSld name="Title, 2 Content and Content">
     <p:spTree>
       <p:nvGrpSpPr>
@@ -2068,7 +3117,8 @@
           </a:prstGeom>
         </p:spPr>
         <p:txBody>
-          <a:bodyPr anchor="ctr" bIns="0" lIns="0" rIns="0" tIns="0" wrap="none"/>
+          <a:bodyPr wrap="none" lIns="0" tIns="0" rIns="0" bIns="0" anchor="ctr"/>
+          <a:lstStyle/>
           <a:p>
             <a:pPr algn="ctr"/>
             <a:endParaRPr/>
@@ -2095,7 +3145,8 @@
           </a:prstGeom>
         </p:spPr>
         <p:txBody>
-          <a:bodyPr bIns="0" lIns="0" rIns="0" tIns="0" wrap="none"/>
+          <a:bodyPr wrap="none" lIns="0" tIns="0" rIns="0" bIns="0"/>
+          <a:lstStyle/>
           <a:p>
             <a:endParaRPr/>
           </a:p>
@@ -2121,7 +3172,8 @@
           </a:prstGeom>
         </p:spPr>
         <p:txBody>
-          <a:bodyPr bIns="0" lIns="0" rIns="0" tIns="0" wrap="none"/>
+          <a:bodyPr wrap="none" lIns="0" tIns="0" rIns="0" bIns="0"/>
+          <a:lstStyle/>
           <a:p>
             <a:endParaRPr/>
           </a:p>
@@ -2147,7 +3199,8 @@
           </a:prstGeom>
         </p:spPr>
         <p:txBody>
-          <a:bodyPr bIns="0" lIns="0" rIns="0" tIns="0" wrap="none"/>
+          <a:bodyPr wrap="none" lIns="0" tIns="0" rIns="0" bIns="0"/>
+          <a:lstStyle/>
           <a:p>
             <a:endParaRPr/>
           </a:p>
@@ -2155,11 +3208,14 @@
       </p:sp>
     </p:spTree>
   </p:cSld>
+  <p:clrMapOvr>
+    <a:masterClrMapping/>
+  </p:clrMapOvr>
 </p:sldLayout>
 </file>
 
 <file path=ppt/slideLayouts/slideLayout32.xml><?xml version="1.0" encoding="utf-8"?>
-<p:sldLayout xmlns:a="http://schemas.openxmlformats.org/drawingml/2006/main" xmlns:p="http://schemas.openxmlformats.org/presentationml/2006/main" xmlns:r="http://schemas.openxmlformats.org/officeDocument/2006/relationships" preserve="1" type="objAndTwoObj">
+<p:sldLayout xmlns:a="http://schemas.openxmlformats.org/drawingml/2006/main" xmlns:r="http://schemas.openxmlformats.org/officeDocument/2006/relationships" xmlns:p="http://schemas.openxmlformats.org/presentationml/2006/main" type="objAndTwoObj" preserve="1">
   <p:cSld name="Title Content and 2 Content">
     <p:spTree>
       <p:nvGrpSpPr>
@@ -2195,7 +3251,8 @@
           </a:prstGeom>
         </p:spPr>
         <p:txBody>
-          <a:bodyPr anchor="ctr" bIns="0" lIns="0" rIns="0" tIns="0" wrap="none"/>
+          <a:bodyPr wrap="none" lIns="0" tIns="0" rIns="0" bIns="0" anchor="ctr"/>
+          <a:lstStyle/>
           <a:p>
             <a:pPr algn="ctr"/>
             <a:endParaRPr/>
@@ -2222,7 +3279,8 @@
           </a:prstGeom>
         </p:spPr>
         <p:txBody>
-          <a:bodyPr bIns="0" lIns="0" rIns="0" tIns="0" wrap="none"/>
+          <a:bodyPr wrap="none" lIns="0" tIns="0" rIns="0" bIns="0"/>
+          <a:lstStyle/>
           <a:p>
             <a:endParaRPr/>
           </a:p>
@@ -2248,7 +3306,8 @@
           </a:prstGeom>
         </p:spPr>
         <p:txBody>
-          <a:bodyPr bIns="0" lIns="0" rIns="0" tIns="0" wrap="none"/>
+          <a:bodyPr wrap="none" lIns="0" tIns="0" rIns="0" bIns="0"/>
+          <a:lstStyle/>
           <a:p>
             <a:endParaRPr/>
           </a:p>
@@ -2274,7 +3333,8 @@
           </a:prstGeom>
         </p:spPr>
         <p:txBody>
-          <a:bodyPr bIns="0" lIns="0" rIns="0" tIns="0" wrap="none"/>
+          <a:bodyPr wrap="none" lIns="0" tIns="0" rIns="0" bIns="0"/>
+          <a:lstStyle/>
           <a:p>
             <a:endParaRPr/>
           </a:p>
@@ -2282,11 +3342,14 @@
       </p:sp>
     </p:spTree>
   </p:cSld>
+  <p:clrMapOvr>
+    <a:masterClrMapping/>
+  </p:clrMapOvr>
 </p:sldLayout>
 </file>
 
 <file path=ppt/slideLayouts/slideLayout33.xml><?xml version="1.0" encoding="utf-8"?>
-<p:sldLayout xmlns:a="http://schemas.openxmlformats.org/drawingml/2006/main" xmlns:p="http://schemas.openxmlformats.org/presentationml/2006/main" xmlns:r="http://schemas.openxmlformats.org/officeDocument/2006/relationships" preserve="1" type="twoObjOverTx">
+<p:sldLayout xmlns:a="http://schemas.openxmlformats.org/drawingml/2006/main" xmlns:r="http://schemas.openxmlformats.org/officeDocument/2006/relationships" xmlns:p="http://schemas.openxmlformats.org/presentationml/2006/main" type="twoObjOverTx" preserve="1">
   <p:cSld name="Title, 2 Content over Content">
     <p:spTree>
       <p:nvGrpSpPr>
@@ -2322,7 +3385,8 @@
           </a:prstGeom>
         </p:spPr>
         <p:txBody>
-          <a:bodyPr anchor="ctr" bIns="0" lIns="0" rIns="0" tIns="0" wrap="none"/>
+          <a:bodyPr wrap="none" lIns="0" tIns="0" rIns="0" bIns="0" anchor="ctr"/>
+          <a:lstStyle/>
           <a:p>
             <a:pPr algn="ctr"/>
             <a:endParaRPr/>
@@ -2349,7 +3413,8 @@
           </a:prstGeom>
         </p:spPr>
         <p:txBody>
-          <a:bodyPr bIns="0" lIns="0" rIns="0" tIns="0" wrap="none"/>
+          <a:bodyPr wrap="none" lIns="0" tIns="0" rIns="0" bIns="0"/>
+          <a:lstStyle/>
           <a:p>
             <a:endParaRPr/>
           </a:p>
@@ -2375,7 +3440,8 @@
           </a:prstGeom>
         </p:spPr>
         <p:txBody>
-          <a:bodyPr bIns="0" lIns="0" rIns="0" tIns="0" wrap="none"/>
+          <a:bodyPr wrap="none" lIns="0" tIns="0" rIns="0" bIns="0"/>
+          <a:lstStyle/>
           <a:p>
             <a:endParaRPr/>
           </a:p>
@@ -2401,7 +3467,8 @@
           </a:prstGeom>
         </p:spPr>
         <p:txBody>
-          <a:bodyPr bIns="0" lIns="0" rIns="0" tIns="0" wrap="none"/>
+          <a:bodyPr wrap="none" lIns="0" tIns="0" rIns="0" bIns="0"/>
+          <a:lstStyle/>
           <a:p>
             <a:endParaRPr/>
           </a:p>
@@ -2409,11 +3476,14 @@
       </p:sp>
     </p:spTree>
   </p:cSld>
+  <p:clrMapOvr>
+    <a:masterClrMapping/>
+  </p:clrMapOvr>
 </p:sldLayout>
 </file>
 
 <file path=ppt/slideLayouts/slideLayout34.xml><?xml version="1.0" encoding="utf-8"?>
-<p:sldLayout xmlns:a="http://schemas.openxmlformats.org/drawingml/2006/main" xmlns:p="http://schemas.openxmlformats.org/presentationml/2006/main" xmlns:r="http://schemas.openxmlformats.org/officeDocument/2006/relationships" preserve="1" type="objOverTx">
+<p:sldLayout xmlns:a="http://schemas.openxmlformats.org/drawingml/2006/main" xmlns:r="http://schemas.openxmlformats.org/officeDocument/2006/relationships" xmlns:p="http://schemas.openxmlformats.org/presentationml/2006/main" type="objOverTx" preserve="1">
   <p:cSld name="Title, Content over Content">
     <p:spTree>
       <p:nvGrpSpPr>
@@ -2449,7 +3519,8 @@
           </a:prstGeom>
         </p:spPr>
         <p:txBody>
-          <a:bodyPr anchor="ctr" bIns="0" lIns="0" rIns="0" tIns="0" wrap="none"/>
+          <a:bodyPr wrap="none" lIns="0" tIns="0" rIns="0" bIns="0" anchor="ctr"/>
+          <a:lstStyle/>
           <a:p>
             <a:pPr algn="ctr"/>
             <a:endParaRPr/>
@@ -2476,7 +3547,8 @@
           </a:prstGeom>
         </p:spPr>
         <p:txBody>
-          <a:bodyPr bIns="0" lIns="0" rIns="0" tIns="0" wrap="none"/>
+          <a:bodyPr wrap="none" lIns="0" tIns="0" rIns="0" bIns="0"/>
+          <a:lstStyle/>
           <a:p>
             <a:endParaRPr/>
           </a:p>
@@ -2502,7 +3574,8 @@
           </a:prstGeom>
         </p:spPr>
         <p:txBody>
-          <a:bodyPr bIns="0" lIns="0" rIns="0" tIns="0" wrap="none"/>
+          <a:bodyPr wrap="none" lIns="0" tIns="0" rIns="0" bIns="0"/>
+          <a:lstStyle/>
           <a:p>
             <a:endParaRPr/>
           </a:p>
@@ -2510,11 +3583,14 @@
       </p:sp>
     </p:spTree>
   </p:cSld>
+  <p:clrMapOvr>
+    <a:masterClrMapping/>
+  </p:clrMapOvr>
 </p:sldLayout>
 </file>
 
 <file path=ppt/slideLayouts/slideLayout35.xml><?xml version="1.0" encoding="utf-8"?>
-<p:sldLayout xmlns:a="http://schemas.openxmlformats.org/drawingml/2006/main" xmlns:p="http://schemas.openxmlformats.org/presentationml/2006/main" xmlns:r="http://schemas.openxmlformats.org/officeDocument/2006/relationships" preserve="1" type="fourObj">
+<p:sldLayout xmlns:a="http://schemas.openxmlformats.org/drawingml/2006/main" xmlns:r="http://schemas.openxmlformats.org/officeDocument/2006/relationships" xmlns:p="http://schemas.openxmlformats.org/presentationml/2006/main" type="fourObj" preserve="1">
   <p:cSld name="Title, 4 Content">
     <p:spTree>
       <p:nvGrpSpPr>
@@ -2550,7 +3626,8 @@
           </a:prstGeom>
         </p:spPr>
         <p:txBody>
-          <a:bodyPr anchor="ctr" bIns="0" lIns="0" rIns="0" tIns="0" wrap="none"/>
+          <a:bodyPr wrap="none" lIns="0" tIns="0" rIns="0" bIns="0" anchor="ctr"/>
+          <a:lstStyle/>
           <a:p>
             <a:pPr algn="ctr"/>
             <a:endParaRPr/>
@@ -2577,7 +3654,8 @@
           </a:prstGeom>
         </p:spPr>
         <p:txBody>
-          <a:bodyPr bIns="0" lIns="0" rIns="0" tIns="0" wrap="none"/>
+          <a:bodyPr wrap="none" lIns="0" tIns="0" rIns="0" bIns="0"/>
+          <a:lstStyle/>
           <a:p>
             <a:endParaRPr/>
           </a:p>
@@ -2603,7 +3681,8 @@
           </a:prstGeom>
         </p:spPr>
         <p:txBody>
-          <a:bodyPr bIns="0" lIns="0" rIns="0" tIns="0" wrap="none"/>
+          <a:bodyPr wrap="none" lIns="0" tIns="0" rIns="0" bIns="0"/>
+          <a:lstStyle/>
           <a:p>
             <a:endParaRPr/>
           </a:p>
@@ -2629,7 +3708,8 @@
           </a:prstGeom>
         </p:spPr>
         <p:txBody>
-          <a:bodyPr bIns="0" lIns="0" rIns="0" tIns="0" wrap="none"/>
+          <a:bodyPr wrap="none" lIns="0" tIns="0" rIns="0" bIns="0"/>
+          <a:lstStyle/>
           <a:p>
             <a:endParaRPr/>
           </a:p>
@@ -2655,7 +3735,8 @@
           </a:prstGeom>
         </p:spPr>
         <p:txBody>
-          <a:bodyPr bIns="0" lIns="0" rIns="0" tIns="0" wrap="none"/>
+          <a:bodyPr wrap="none" lIns="0" tIns="0" rIns="0" bIns="0"/>
+          <a:lstStyle/>
           <a:p>
             <a:endParaRPr/>
           </a:p>
@@ -2663,11 +3744,14 @@
       </p:sp>
     </p:spTree>
   </p:cSld>
+  <p:clrMapOvr>
+    <a:masterClrMapping/>
+  </p:clrMapOvr>
 </p:sldLayout>
 </file>
 
 <file path=ppt/slideLayouts/slideLayout36.xml><?xml version="1.0" encoding="utf-8"?>
-<p:sldLayout xmlns:a="http://schemas.openxmlformats.org/drawingml/2006/main" xmlns:p="http://schemas.openxmlformats.org/presentationml/2006/main" xmlns:r="http://schemas.openxmlformats.org/officeDocument/2006/relationships" preserve="1" type="blank">
+<p:sldLayout xmlns:a="http://schemas.openxmlformats.org/drawingml/2006/main" xmlns:r="http://schemas.openxmlformats.org/officeDocument/2006/relationships" xmlns:p="http://schemas.openxmlformats.org/presentationml/2006/main" type="blank" preserve="1">
   <p:cSld name="Title, 6 Content">
     <p:spTree>
       <p:nvGrpSpPr>
@@ -2703,7 +3787,8 @@
           </a:prstGeom>
         </p:spPr>
         <p:txBody>
-          <a:bodyPr anchor="ctr" bIns="0" lIns="0" rIns="0" tIns="0" wrap="none"/>
+          <a:bodyPr wrap="none" lIns="0" tIns="0" rIns="0" bIns="0" anchor="ctr"/>
+          <a:lstStyle/>
           <a:p>
             <a:pPr algn="ctr"/>
             <a:endParaRPr/>
@@ -2730,7 +3815,8 @@
           </a:prstGeom>
         </p:spPr>
         <p:txBody>
-          <a:bodyPr bIns="0" lIns="0" rIns="0" tIns="0" wrap="none"/>
+          <a:bodyPr wrap="none" lIns="0" tIns="0" rIns="0" bIns="0"/>
+          <a:lstStyle/>
           <a:p>
             <a:endParaRPr/>
           </a:p>
@@ -2756,7 +3842,8 @@
           </a:prstGeom>
         </p:spPr>
         <p:txBody>
-          <a:bodyPr bIns="0" lIns="0" rIns="0" tIns="0" wrap="none"/>
+          <a:bodyPr wrap="none" lIns="0" tIns="0" rIns="0" bIns="0"/>
+          <a:lstStyle/>
           <a:p>
             <a:endParaRPr/>
           </a:p>
@@ -2764,11 +3851,14 @@
       </p:sp>
     </p:spTree>
   </p:cSld>
+  <p:clrMapOvr>
+    <a:masterClrMapping/>
+  </p:clrMapOvr>
 </p:sldLayout>
 </file>
 
 <file path=ppt/slideLayouts/slideLayout4.xml><?xml version="1.0" encoding="utf-8"?>
-<p:sldLayout xmlns:a="http://schemas.openxmlformats.org/drawingml/2006/main" xmlns:p="http://schemas.openxmlformats.org/presentationml/2006/main" xmlns:r="http://schemas.openxmlformats.org/officeDocument/2006/relationships" preserve="1" type="twoObj">
+<p:sldLayout xmlns:a="http://schemas.openxmlformats.org/drawingml/2006/main" xmlns:r="http://schemas.openxmlformats.org/officeDocument/2006/relationships" xmlns:p="http://schemas.openxmlformats.org/presentationml/2006/main" type="twoObj" preserve="1">
   <p:cSld name="Title, 2 Content">
     <p:spTree>
       <p:nvGrpSpPr>
@@ -2804,7 +3894,8 @@
           </a:prstGeom>
         </p:spPr>
         <p:txBody>
-          <a:bodyPr anchor="ctr" bIns="0" lIns="0" rIns="0" tIns="0" wrap="none"/>
+          <a:bodyPr wrap="none" lIns="0" tIns="0" rIns="0" bIns="0" anchor="ctr"/>
+          <a:lstStyle/>
           <a:p>
             <a:pPr algn="ctr"/>
             <a:endParaRPr/>
@@ -2831,7 +3922,8 @@
           </a:prstGeom>
         </p:spPr>
         <p:txBody>
-          <a:bodyPr bIns="0" lIns="0" rIns="0" tIns="0" wrap="none"/>
+          <a:bodyPr wrap="none" lIns="0" tIns="0" rIns="0" bIns="0"/>
+          <a:lstStyle/>
           <a:p>
             <a:endParaRPr/>
           </a:p>
@@ -2857,7 +3949,8 @@
           </a:prstGeom>
         </p:spPr>
         <p:txBody>
-          <a:bodyPr bIns="0" lIns="0" rIns="0" tIns="0" wrap="none"/>
+          <a:bodyPr wrap="none" lIns="0" tIns="0" rIns="0" bIns="0"/>
+          <a:lstStyle/>
           <a:p>
             <a:endParaRPr/>
           </a:p>
@@ -2865,11 +3958,14 @@
       </p:sp>
     </p:spTree>
   </p:cSld>
+  <p:clrMapOvr>
+    <a:masterClrMapping/>
+  </p:clrMapOvr>
 </p:sldLayout>
 </file>
 
 <file path=ppt/slideLayouts/slideLayout5.xml><?xml version="1.0" encoding="utf-8"?>
-<p:sldLayout xmlns:a="http://schemas.openxmlformats.org/drawingml/2006/main" xmlns:p="http://schemas.openxmlformats.org/presentationml/2006/main" xmlns:r="http://schemas.openxmlformats.org/officeDocument/2006/relationships" preserve="1" type="titleOnly">
+<p:sldLayout xmlns:a="http://schemas.openxmlformats.org/drawingml/2006/main" xmlns:r="http://schemas.openxmlformats.org/officeDocument/2006/relationships" xmlns:p="http://schemas.openxmlformats.org/presentationml/2006/main" type="titleOnly" preserve="1">
   <p:cSld name="Title Only">
     <p:spTree>
       <p:nvGrpSpPr>
@@ -2905,7 +4001,8 @@
           </a:prstGeom>
         </p:spPr>
         <p:txBody>
-          <a:bodyPr anchor="ctr" bIns="0" lIns="0" rIns="0" tIns="0" wrap="none"/>
+          <a:bodyPr wrap="none" lIns="0" tIns="0" rIns="0" bIns="0" anchor="ctr"/>
+          <a:lstStyle/>
           <a:p>
             <a:pPr algn="ctr"/>
             <a:endParaRPr/>
@@ -2914,11 +4011,14 @@
       </p:sp>
     </p:spTree>
   </p:cSld>
+  <p:clrMapOvr>
+    <a:masterClrMapping/>
+  </p:clrMapOvr>
 </p:sldLayout>
 </file>
 
 <file path=ppt/slideLayouts/slideLayout6.xml><?xml version="1.0" encoding="utf-8"?>
-<p:sldLayout xmlns:a="http://schemas.openxmlformats.org/drawingml/2006/main" xmlns:p="http://schemas.openxmlformats.org/presentationml/2006/main" xmlns:r="http://schemas.openxmlformats.org/officeDocument/2006/relationships" preserve="1" type="objOnly">
+<p:sldLayout xmlns:a="http://schemas.openxmlformats.org/drawingml/2006/main" xmlns:r="http://schemas.openxmlformats.org/officeDocument/2006/relationships" xmlns:p="http://schemas.openxmlformats.org/presentationml/2006/main" type="objOnly" preserve="1">
   <p:cSld name="Centered Text">
     <p:spTree>
       <p:nvGrpSpPr>
@@ -2954,7 +4054,8 @@
           </a:prstGeom>
         </p:spPr>
         <p:txBody>
-          <a:bodyPr anchor="ctr" bIns="0" lIns="0" rIns="0" tIns="0" wrap="none"/>
+          <a:bodyPr wrap="none" lIns="0" tIns="0" rIns="0" bIns="0" anchor="ctr"/>
+          <a:lstStyle/>
           <a:p>
             <a:pPr algn="ctr"/>
             <a:endParaRPr/>
@@ -2963,11 +4064,14 @@
       </p:sp>
     </p:spTree>
   </p:cSld>
+  <p:clrMapOvr>
+    <a:masterClrMapping/>
+  </p:clrMapOvr>
 </p:sldLayout>
 </file>
 
 <file path=ppt/slideLayouts/slideLayout7.xml><?xml version="1.0" encoding="utf-8"?>
-<p:sldLayout xmlns:a="http://schemas.openxmlformats.org/drawingml/2006/main" xmlns:p="http://schemas.openxmlformats.org/presentationml/2006/main" xmlns:r="http://schemas.openxmlformats.org/officeDocument/2006/relationships" preserve="1" type="twoObjAndObj">
+<p:sldLayout xmlns:a="http://schemas.openxmlformats.org/drawingml/2006/main" xmlns:r="http://schemas.openxmlformats.org/officeDocument/2006/relationships" xmlns:p="http://schemas.openxmlformats.org/presentationml/2006/main" type="twoObjAndObj" preserve="1">
   <p:cSld name="Title, 2 Content and Content">
     <p:spTree>
       <p:nvGrpSpPr>
@@ -3003,7 +4107,8 @@
           </a:prstGeom>
         </p:spPr>
         <p:txBody>
-          <a:bodyPr anchor="ctr" bIns="0" lIns="0" rIns="0" tIns="0" wrap="none"/>
+          <a:bodyPr wrap="none" lIns="0" tIns="0" rIns="0" bIns="0" anchor="ctr"/>
+          <a:lstStyle/>
           <a:p>
             <a:pPr algn="ctr"/>
             <a:endParaRPr/>
@@ -3030,7 +4135,8 @@
           </a:prstGeom>
         </p:spPr>
         <p:txBody>
-          <a:bodyPr bIns="0" lIns="0" rIns="0" tIns="0" wrap="none"/>
+          <a:bodyPr wrap="none" lIns="0" tIns="0" rIns="0" bIns="0"/>
+          <a:lstStyle/>
           <a:p>
             <a:endParaRPr/>
           </a:p>
@@ -3056,7 +4162,8 @@
           </a:prstGeom>
         </p:spPr>
         <p:txBody>
-          <a:bodyPr bIns="0" lIns="0" rIns="0" tIns="0" wrap="none"/>
+          <a:bodyPr wrap="none" lIns="0" tIns="0" rIns="0" bIns="0"/>
+          <a:lstStyle/>
           <a:p>
             <a:endParaRPr/>
           </a:p>
@@ -3082,7 +4189,8 @@
           </a:prstGeom>
         </p:spPr>
         <p:txBody>
-          <a:bodyPr bIns="0" lIns="0" rIns="0" tIns="0" wrap="none"/>
+          <a:bodyPr wrap="none" lIns="0" tIns="0" rIns="0" bIns="0"/>
+          <a:lstStyle/>
           <a:p>
             <a:endParaRPr/>
           </a:p>
@@ -3090,11 +4198,14 @@
       </p:sp>
     </p:spTree>
   </p:cSld>
+  <p:clrMapOvr>
+    <a:masterClrMapping/>
+  </p:clrMapOvr>
 </p:sldLayout>
 </file>
 
 <file path=ppt/slideLayouts/slideLayout8.xml><?xml version="1.0" encoding="utf-8"?>
-<p:sldLayout xmlns:a="http://schemas.openxmlformats.org/drawingml/2006/main" xmlns:p="http://schemas.openxmlformats.org/presentationml/2006/main" xmlns:r="http://schemas.openxmlformats.org/officeDocument/2006/relationships" preserve="1" type="objAndTwoObj">
+<p:sldLayout xmlns:a="http://schemas.openxmlformats.org/drawingml/2006/main" xmlns:r="http://schemas.openxmlformats.org/officeDocument/2006/relationships" xmlns:p="http://schemas.openxmlformats.org/presentationml/2006/main" type="objAndTwoObj" preserve="1">
   <p:cSld name="Title Content and 2 Content">
     <p:spTree>
       <p:nvGrpSpPr>
@@ -3130,7 +4241,8 @@
           </a:prstGeom>
         </p:spPr>
         <p:txBody>
-          <a:bodyPr anchor="ctr" bIns="0" lIns="0" rIns="0" tIns="0" wrap="none"/>
+          <a:bodyPr wrap="none" lIns="0" tIns="0" rIns="0" bIns="0" anchor="ctr"/>
+          <a:lstStyle/>
           <a:p>
             <a:pPr algn="ctr"/>
             <a:endParaRPr/>
@@ -3157,7 +4269,8 @@
           </a:prstGeom>
         </p:spPr>
         <p:txBody>
-          <a:bodyPr bIns="0" lIns="0" rIns="0" tIns="0" wrap="none"/>
+          <a:bodyPr wrap="none" lIns="0" tIns="0" rIns="0" bIns="0"/>
+          <a:lstStyle/>
           <a:p>
             <a:endParaRPr/>
           </a:p>
@@ -3183,7 +4296,8 @@
           </a:prstGeom>
         </p:spPr>
         <p:txBody>
-          <a:bodyPr bIns="0" lIns="0" rIns="0" tIns="0" wrap="none"/>
+          <a:bodyPr wrap="none" lIns="0" tIns="0" rIns="0" bIns="0"/>
+          <a:lstStyle/>
           <a:p>
             <a:endParaRPr/>
           </a:p>
@@ -3209,7 +4323,8 @@
           </a:prstGeom>
         </p:spPr>
         <p:txBody>
-          <a:bodyPr bIns="0" lIns="0" rIns="0" tIns="0" wrap="none"/>
+          <a:bodyPr wrap="none" lIns="0" tIns="0" rIns="0" bIns="0"/>
+          <a:lstStyle/>
           <a:p>
             <a:endParaRPr/>
           </a:p>
@@ -3217,11 +4332,14 @@
       </p:sp>
     </p:spTree>
   </p:cSld>
+  <p:clrMapOvr>
+    <a:masterClrMapping/>
+  </p:clrMapOvr>
 </p:sldLayout>
 </file>
 
 <file path=ppt/slideLayouts/slideLayout9.xml><?xml version="1.0" encoding="utf-8"?>
-<p:sldLayout xmlns:a="http://schemas.openxmlformats.org/drawingml/2006/main" xmlns:p="http://schemas.openxmlformats.org/presentationml/2006/main" xmlns:r="http://schemas.openxmlformats.org/officeDocument/2006/relationships" preserve="1" type="twoObjOverTx">
+<p:sldLayout xmlns:a="http://schemas.openxmlformats.org/drawingml/2006/main" xmlns:r="http://schemas.openxmlformats.org/officeDocument/2006/relationships" xmlns:p="http://schemas.openxmlformats.org/presentationml/2006/main" type="twoObjOverTx" preserve="1">
   <p:cSld name="Title, 2 Content over Content">
     <p:spTree>
       <p:nvGrpSpPr>
@@ -3257,7 +4375,8 @@
           </a:prstGeom>
         </p:spPr>
         <p:txBody>
-          <a:bodyPr anchor="ctr" bIns="0" lIns="0" rIns="0" tIns="0" wrap="none"/>
+          <a:bodyPr wrap="none" lIns="0" tIns="0" rIns="0" bIns="0" anchor="ctr"/>
+          <a:lstStyle/>
           <a:p>
             <a:pPr algn="ctr"/>
             <a:endParaRPr/>
@@ -3284,7 +4403,8 @@
           </a:prstGeom>
         </p:spPr>
         <p:txBody>
-          <a:bodyPr bIns="0" lIns="0" rIns="0" tIns="0" wrap="none"/>
+          <a:bodyPr wrap="none" lIns="0" tIns="0" rIns="0" bIns="0"/>
+          <a:lstStyle/>
           <a:p>
             <a:endParaRPr/>
           </a:p>
@@ -3310,7 +4430,8 @@
           </a:prstGeom>
         </p:spPr>
         <p:txBody>
-          <a:bodyPr bIns="0" lIns="0" rIns="0" tIns="0" wrap="none"/>
+          <a:bodyPr wrap="none" lIns="0" tIns="0" rIns="0" bIns="0"/>
+          <a:lstStyle/>
           <a:p>
             <a:endParaRPr/>
           </a:p>
@@ -3336,7 +4457,8 @@
           </a:prstGeom>
         </p:spPr>
         <p:txBody>
-          <a:bodyPr bIns="0" lIns="0" rIns="0" tIns="0" wrap="none"/>
+          <a:bodyPr wrap="none" lIns="0" tIns="0" rIns="0" bIns="0"/>
+          <a:lstStyle/>
           <a:p>
             <a:endParaRPr/>
           </a:p>
@@ -3344,17 +4466,21 @@
       </p:sp>
     </p:spTree>
   </p:cSld>
+  <p:clrMapOvr>
+    <a:masterClrMapping/>
+  </p:clrMapOvr>
 </p:sldLayout>
 </file>
 
 <file path=ppt/slideMasters/slideMaster1.xml><?xml version="1.0" encoding="utf-8"?>
-<p:sldMaster xmlns:a="http://schemas.openxmlformats.org/drawingml/2006/main" xmlns:p="http://schemas.openxmlformats.org/presentationml/2006/main" xmlns:r="http://schemas.openxmlformats.org/officeDocument/2006/relationships">
+<p:sldMaster xmlns:a="http://schemas.openxmlformats.org/drawingml/2006/main" xmlns:r="http://schemas.openxmlformats.org/officeDocument/2006/relationships" xmlns:p="http://schemas.openxmlformats.org/presentationml/2006/main">
   <p:cSld>
     <p:bg>
       <p:bgPr>
         <a:solidFill>
-          <a:srgbClr val="ffffff"/>
+          <a:srgbClr val="FFFFFF"/>
         </a:solidFill>
+        <a:effectLst/>
       </p:bgPr>
     </p:bg>
     <p:spTree>
@@ -3373,12 +4499,12 @@
       </p:grpSpPr>
       <p:pic>
         <p:nvPicPr>
-          <p:cNvPr descr="" id="0" name="Picture 7"/>
+          <p:cNvPr id="5" name="Picture 7"/>
           <p:cNvPicPr/>
           <p:nvPr/>
         </p:nvPicPr>
         <p:blipFill>
-          <a:blip r:embed="rId2"/>
+          <a:blip r:embed="rId14"/>
           <a:stretch>
             <a:fillRect/>
           </a:stretch>
@@ -3395,7 +4521,7 @@
       </p:pic>
       <p:sp>
         <p:nvSpPr>
-          <p:cNvPr id="1" name="Line 1"/>
+          <p:cNvPr id="6" name="Line 1"/>
           <p:cNvSpPr/>
           <p:nvPr/>
         </p:nvSpPr>
@@ -3417,12 +4543,12 @@
       </p:sp>
       <p:pic>
         <p:nvPicPr>
-          <p:cNvPr descr="" id="2" name="Picture 7"/>
+          <p:cNvPr id="2" name="Picture 7"/>
           <p:cNvPicPr/>
           <p:nvPr/>
         </p:nvPicPr>
         <p:blipFill>
-          <a:blip r:embed="rId3"/>
+          <a:blip r:embed="rId14"/>
           <a:stretch>
             <a:fillRect/>
           </a:stretch>
@@ -3457,7 +4583,8 @@
           </a:prstGeom>
         </p:spPr>
         <p:txBody>
-          <a:bodyPr anchor="ctr" bIns="0" lIns="0" rIns="0" tIns="0" wrap="none"/>
+          <a:bodyPr wrap="none" lIns="0" tIns="0" rIns="0" bIns="0" anchor="ctr"/>
+          <a:lstStyle/>
           <a:p>
             <a:r>
               <a:rPr lang="en-US"/>
@@ -3487,7 +4614,8 @@
           </a:prstGeom>
         </p:spPr>
         <p:txBody>
-          <a:bodyPr bIns="0" lIns="0" rIns="0" tIns="0" wrap="none"/>
+          <a:bodyPr wrap="none" lIns="0" tIns="0" rIns="0" bIns="0"/>
+          <a:lstStyle/>
           <a:p>
             <a:pPr>
               <a:buSzPct val="25000"/>
@@ -3576,32 +4704,38 @@
       </p:sp>
     </p:spTree>
   </p:cSld>
-  <p:clrMap accent1="accent1" accent2="accent2" accent3="accent3" accent4="accent4" accent5="accent5" accent6="accent6" bg1="lt1" bg2="lt2" folHlink="folHlink" hlink="hlink" tx1="dk1" tx2="dk2"/>
+  <p:clrMap bg1="lt1" tx1="dk1" bg2="lt2" tx2="dk2" accent1="accent1" accent2="accent2" accent3="accent3" accent4="accent4" accent5="accent5" accent6="accent6" hlink="hlink" folHlink="folHlink"/>
   <p:sldLayoutIdLst>
-    <p:sldLayoutId id="2147483649" r:id="rId4"/>
-    <p:sldLayoutId id="2147483650" r:id="rId5"/>
-    <p:sldLayoutId id="2147483651" r:id="rId6"/>
-    <p:sldLayoutId id="2147483652" r:id="rId7"/>
-    <p:sldLayoutId id="2147483653" r:id="rId8"/>
-    <p:sldLayoutId id="2147483654" r:id="rId9"/>
-    <p:sldLayoutId id="2147483655" r:id="rId10"/>
-    <p:sldLayoutId id="2147483656" r:id="rId11"/>
-    <p:sldLayoutId id="2147483657" r:id="rId12"/>
-    <p:sldLayoutId id="2147483658" r:id="rId13"/>
-    <p:sldLayoutId id="2147483659" r:id="rId14"/>
-    <p:sldLayoutId id="2147483660" r:id="rId15"/>
+    <p:sldLayoutId id="2147483649" r:id="rId1"/>
+    <p:sldLayoutId id="2147483650" r:id="rId2"/>
+    <p:sldLayoutId id="2147483651" r:id="rId3"/>
+    <p:sldLayoutId id="2147483652" r:id="rId4"/>
+    <p:sldLayoutId id="2147483653" r:id="rId5"/>
+    <p:sldLayoutId id="2147483654" r:id="rId6"/>
+    <p:sldLayoutId id="2147483655" r:id="rId7"/>
+    <p:sldLayoutId id="2147483656" r:id="rId8"/>
+    <p:sldLayoutId id="2147483657" r:id="rId9"/>
+    <p:sldLayoutId id="2147483658" r:id="rId10"/>
+    <p:sldLayoutId id="2147483659" r:id="rId11"/>
+    <p:sldLayoutId id="2147483660" r:id="rId12"/>
   </p:sldLayoutIdLst>
+  <p:txStyles>
+    <p:titleStyle/>
+    <p:bodyStyle/>
+    <p:otherStyle/>
+  </p:txStyles>
 </p:sldMaster>
 </file>
 
 <file path=ppt/slideMasters/slideMaster2.xml><?xml version="1.0" encoding="utf-8"?>
-<p:sldMaster xmlns:a="http://schemas.openxmlformats.org/drawingml/2006/main" xmlns:p="http://schemas.openxmlformats.org/presentationml/2006/main" xmlns:r="http://schemas.openxmlformats.org/officeDocument/2006/relationships">
+<p:sldMaster xmlns:a="http://schemas.openxmlformats.org/drawingml/2006/main" xmlns:r="http://schemas.openxmlformats.org/officeDocument/2006/relationships" xmlns:p="http://schemas.openxmlformats.org/presentationml/2006/main">
   <p:cSld>
     <p:bg>
       <p:bgPr>
         <a:solidFill>
-          <a:srgbClr val="ffffff"/>
+          <a:srgbClr val="FFFFFF"/>
         </a:solidFill>
+        <a:effectLst/>
       </p:bgPr>
     </p:bg>
     <p:spTree>
@@ -3620,12 +4754,12 @@
       </p:grpSpPr>
       <p:pic>
         <p:nvPicPr>
-          <p:cNvPr descr="" id="37" name="Picture 7"/>
+          <p:cNvPr id="37" name="Picture 7"/>
           <p:cNvPicPr/>
           <p:nvPr/>
         </p:nvPicPr>
         <p:blipFill>
-          <a:blip r:embed="rId2"/>
+          <a:blip r:embed="rId14"/>
           <a:stretch>
             <a:fillRect/>
           </a:stretch>
@@ -3682,7 +4816,8 @@
           </a:prstGeom>
         </p:spPr>
         <p:txBody>
-          <a:bodyPr anchor="ctr" bIns="0" lIns="0" rIns="0" tIns="0" wrap="none"/>
+          <a:bodyPr wrap="none" lIns="0" tIns="0" rIns="0" bIns="0" anchor="ctr"/>
+          <a:lstStyle/>
           <a:p>
             <a:pPr algn="ctr"/>
             <a:r>
@@ -3713,7 +4848,8 @@
           </a:prstGeom>
         </p:spPr>
         <p:txBody>
-          <a:bodyPr bIns="0" lIns="0" rIns="0" tIns="0" wrap="none"/>
+          <a:bodyPr wrap="none" lIns="0" tIns="0" rIns="0" bIns="0"/>
+          <a:lstStyle/>
           <a:p>
             <a:pPr>
               <a:buSzPct val="25000"/>
@@ -3802,32 +4938,38 @@
       </p:sp>
     </p:spTree>
   </p:cSld>
-  <p:clrMap accent1="accent1" accent2="accent2" accent3="accent3" accent4="accent4" accent5="accent5" accent6="accent6" bg1="lt1" bg2="lt2" folHlink="folHlink" hlink="hlink" tx1="dk1" tx2="dk2"/>
+  <p:clrMap bg1="lt1" tx1="dk1" bg2="lt2" tx2="dk2" accent1="accent1" accent2="accent2" accent3="accent3" accent4="accent4" accent5="accent5" accent6="accent6" hlink="hlink" folHlink="folHlink"/>
   <p:sldLayoutIdLst>
-    <p:sldLayoutId id="2147483662" r:id="rId3"/>
-    <p:sldLayoutId id="2147483663" r:id="rId4"/>
-    <p:sldLayoutId id="2147483664" r:id="rId5"/>
-    <p:sldLayoutId id="2147483665" r:id="rId6"/>
-    <p:sldLayoutId id="2147483666" r:id="rId7"/>
-    <p:sldLayoutId id="2147483667" r:id="rId8"/>
-    <p:sldLayoutId id="2147483668" r:id="rId9"/>
-    <p:sldLayoutId id="2147483669" r:id="rId10"/>
-    <p:sldLayoutId id="2147483670" r:id="rId11"/>
-    <p:sldLayoutId id="2147483671" r:id="rId12"/>
-    <p:sldLayoutId id="2147483672" r:id="rId13"/>
-    <p:sldLayoutId id="2147483673" r:id="rId14"/>
+    <p:sldLayoutId id="2147483662" r:id="rId1"/>
+    <p:sldLayoutId id="2147483663" r:id="rId2"/>
+    <p:sldLayoutId id="2147483664" r:id="rId3"/>
+    <p:sldLayoutId id="2147483665" r:id="rId4"/>
+    <p:sldLayoutId id="2147483666" r:id="rId5"/>
+    <p:sldLayoutId id="2147483667" r:id="rId6"/>
+    <p:sldLayoutId id="2147483668" r:id="rId7"/>
+    <p:sldLayoutId id="2147483669" r:id="rId8"/>
+    <p:sldLayoutId id="2147483670" r:id="rId9"/>
+    <p:sldLayoutId id="2147483671" r:id="rId10"/>
+    <p:sldLayoutId id="2147483672" r:id="rId11"/>
+    <p:sldLayoutId id="2147483673" r:id="rId12"/>
   </p:sldLayoutIdLst>
+  <p:txStyles>
+    <p:titleStyle/>
+    <p:bodyStyle/>
+    <p:otherStyle/>
+  </p:txStyles>
 </p:sldMaster>
 </file>
 
 <file path=ppt/slideMasters/slideMaster3.xml><?xml version="1.0" encoding="utf-8"?>
-<p:sldMaster xmlns:a="http://schemas.openxmlformats.org/drawingml/2006/main" xmlns:p="http://schemas.openxmlformats.org/presentationml/2006/main" xmlns:r="http://schemas.openxmlformats.org/officeDocument/2006/relationships">
+<p:sldMaster xmlns:a="http://schemas.openxmlformats.org/drawingml/2006/main" xmlns:r="http://schemas.openxmlformats.org/officeDocument/2006/relationships" xmlns:p="http://schemas.openxmlformats.org/presentationml/2006/main">
   <p:cSld>
     <p:bg>
       <p:bgPr>
         <a:solidFill>
-          <a:srgbClr val="ffffff"/>
+          <a:srgbClr val="FFFFFF"/>
         </a:solidFill>
+        <a:effectLst/>
       </p:bgPr>
     </p:bg>
     <p:spTree>
@@ -3846,12 +4988,12 @@
       </p:grpSpPr>
       <p:pic>
         <p:nvPicPr>
-          <p:cNvPr descr="" id="73" name="Picture 7"/>
+          <p:cNvPr id="73" name="Picture 7"/>
           <p:cNvPicPr/>
           <p:nvPr/>
         </p:nvPicPr>
         <p:blipFill>
-          <a:blip r:embed="rId2"/>
+          <a:blip r:embed="rId14"/>
           <a:stretch>
             <a:fillRect/>
           </a:stretch>
@@ -3890,12 +5032,12 @@
       </p:sp>
       <p:pic>
         <p:nvPicPr>
-          <p:cNvPr descr="" id="75" name="Picture 7"/>
+          <p:cNvPr id="75" name="Picture 7"/>
           <p:cNvPicPr/>
           <p:nvPr/>
         </p:nvPicPr>
         <p:blipFill>
-          <a:blip r:embed="rId3"/>
+          <a:blip r:embed="rId14"/>
           <a:stretch>
             <a:fillRect/>
           </a:stretch>
@@ -3930,7 +5072,8 @@
           </a:prstGeom>
         </p:spPr>
         <p:txBody>
-          <a:bodyPr anchor="ctr" bIns="0" lIns="0" rIns="0" tIns="0" wrap="none"/>
+          <a:bodyPr wrap="none" lIns="0" tIns="0" rIns="0" bIns="0" anchor="ctr"/>
+          <a:lstStyle/>
           <a:p>
             <a:pPr algn="ctr"/>
             <a:r>
@@ -3961,7 +5104,8 @@
           </a:prstGeom>
         </p:spPr>
         <p:txBody>
-          <a:bodyPr bIns="0" lIns="0" rIns="0" tIns="0" wrap="none"/>
+          <a:bodyPr wrap="none" lIns="0" tIns="0" rIns="0" bIns="0"/>
+          <a:lstStyle/>
           <a:p>
             <a:pPr>
               <a:buSzPct val="25000"/>
@@ -4050,26 +5194,31 @@
       </p:sp>
     </p:spTree>
   </p:cSld>
-  <p:clrMap accent1="accent1" accent2="accent2" accent3="accent3" accent4="accent4" accent5="accent5" accent6="accent6" bg1="lt1" bg2="lt2" folHlink="folHlink" hlink="hlink" tx1="dk1" tx2="dk2"/>
+  <p:clrMap bg1="lt1" tx1="dk1" bg2="lt2" tx2="dk2" accent1="accent1" accent2="accent2" accent3="accent3" accent4="accent4" accent5="accent5" accent6="accent6" hlink="hlink" folHlink="folHlink"/>
   <p:sldLayoutIdLst>
-    <p:sldLayoutId id="2147483675" r:id="rId4"/>
-    <p:sldLayoutId id="2147483676" r:id="rId5"/>
-    <p:sldLayoutId id="2147483677" r:id="rId6"/>
-    <p:sldLayoutId id="2147483678" r:id="rId7"/>
-    <p:sldLayoutId id="2147483679" r:id="rId8"/>
-    <p:sldLayoutId id="2147483680" r:id="rId9"/>
-    <p:sldLayoutId id="2147483681" r:id="rId10"/>
-    <p:sldLayoutId id="2147483682" r:id="rId11"/>
-    <p:sldLayoutId id="2147483683" r:id="rId12"/>
-    <p:sldLayoutId id="2147483684" r:id="rId13"/>
-    <p:sldLayoutId id="2147483685" r:id="rId14"/>
-    <p:sldLayoutId id="2147483686" r:id="rId15"/>
+    <p:sldLayoutId id="2147483675" r:id="rId1"/>
+    <p:sldLayoutId id="2147483676" r:id="rId2"/>
+    <p:sldLayoutId id="2147483677" r:id="rId3"/>
+    <p:sldLayoutId id="2147483678" r:id="rId4"/>
+    <p:sldLayoutId id="2147483679" r:id="rId5"/>
+    <p:sldLayoutId id="2147483680" r:id="rId6"/>
+    <p:sldLayoutId id="2147483681" r:id="rId7"/>
+    <p:sldLayoutId id="2147483682" r:id="rId8"/>
+    <p:sldLayoutId id="2147483683" r:id="rId9"/>
+    <p:sldLayoutId id="2147483684" r:id="rId10"/>
+    <p:sldLayoutId id="2147483685" r:id="rId11"/>
+    <p:sldLayoutId id="2147483686" r:id="rId12"/>
   </p:sldLayoutIdLst>
+  <p:txStyles>
+    <p:titleStyle/>
+    <p:bodyStyle/>
+    <p:otherStyle/>
+  </p:txStyles>
 </p:sldMaster>
 </file>
 
 <file path=ppt/slides/slide1.xml><?xml version="1.0" encoding="utf-8"?>
-<p:sld xmlns:a="http://schemas.openxmlformats.org/drawingml/2006/main" xmlns:p="http://schemas.openxmlformats.org/presentationml/2006/main" xmlns:r="http://schemas.openxmlformats.org/officeDocument/2006/relationships">
+<p:sld xmlns:a="http://schemas.openxmlformats.org/drawingml/2006/main" xmlns:r="http://schemas.openxmlformats.org/officeDocument/2006/relationships" xmlns:p="http://schemas.openxmlformats.org/presentationml/2006/main">
   <p:cSld>
     <p:spTree>
       <p:nvGrpSpPr>
@@ -4087,12 +5236,12 @@
       </p:grpSpPr>
       <p:pic>
         <p:nvPicPr>
-          <p:cNvPr descr="" id="110" name="Grafik 3"/>
+          <p:cNvPr id="110" name="Grafik 3"/>
           <p:cNvPicPr/>
           <p:nvPr/>
         </p:nvPicPr>
         <p:blipFill>
-          <a:blip r:embed="rId1"/>
+          <a:blip r:embed="rId2"/>
           <a:stretch>
             <a:fillRect/>
           </a:stretch>
@@ -4123,7 +5272,8 @@
           </a:prstGeom>
         </p:spPr>
         <p:txBody>
-          <a:bodyPr bIns="0" lIns="0" rIns="0" tIns="0"/>
+          <a:bodyPr lIns="0" tIns="0" rIns="0" bIns="0"/>
+          <a:lstStyle/>
           <a:p>
             <a:pPr algn="ctr">
               <a:lnSpc>
@@ -4159,7 +5309,8 @@
           </a:prstGeom>
         </p:spPr>
         <p:txBody>
-          <a:bodyPr bIns="0" lIns="0" rIns="0" tIns="0"/>
+          <a:bodyPr lIns="0" tIns="0" rIns="0" bIns="0"/>
+          <a:lstStyle/>
           <a:p>
             <a:pPr>
               <a:lnSpc>
@@ -4167,7 +5318,7 @@
               </a:lnSpc>
             </a:pPr>
             <a:r>
-              <a:rPr b="1" lang="en-US" sz="3600">
+              <a:rPr lang="en-US" sz="3600" b="1">
                 <a:solidFill>
                   <a:srgbClr val="000000"/>
                 </a:solidFill>
@@ -4197,11 +5348,472 @@
       </p:sp>
     </p:spTree>
   </p:cSld>
+  <p:clrMapOvr>
+    <a:masterClrMapping/>
+  </p:clrMapOvr>
 </p:sld>
 </file>
 
 <file path=ppt/slides/slide10.xml><?xml version="1.0" encoding="utf-8"?>
-<p:sld xmlns:a="http://schemas.openxmlformats.org/drawingml/2006/main" xmlns:p="http://schemas.openxmlformats.org/presentationml/2006/main" xmlns:r="http://schemas.openxmlformats.org/officeDocument/2006/relationships">
+<p:sld xmlns:a="http://schemas.openxmlformats.org/drawingml/2006/main" xmlns:r="http://schemas.openxmlformats.org/officeDocument/2006/relationships" xmlns:p="http://schemas.openxmlformats.org/presentationml/2006/main">
+  <p:cSld>
+    <p:spTree>
+      <p:nvGrpSpPr>
+        <p:cNvPr id="1" name=""/>
+        <p:cNvGrpSpPr/>
+        <p:nvPr/>
+      </p:nvGrpSpPr>
+      <p:grpSpPr>
+        <a:xfrm>
+          <a:off x="0" y="0"/>
+          <a:ext cx="0" cy="0"/>
+          <a:chOff x="0" y="0"/>
+          <a:chExt cx="0" cy="0"/>
+        </a:xfrm>
+      </p:grpSpPr>
+      <p:sp>
+        <p:nvSpPr>
+          <p:cNvPr id="148" name="CustomShape 1"/>
+          <p:cNvSpPr/>
+          <p:nvPr/>
+        </p:nvSpPr>
+        <p:spPr>
+          <a:xfrm>
+            <a:off x="8221680" y="7197840"/>
+            <a:ext cx="864360" cy="178560"/>
+          </a:xfrm>
+          <a:prstGeom prst="rect">
+            <a:avLst/>
+          </a:prstGeom>
+        </p:spPr>
+        <p:txBody>
+          <a:bodyPr lIns="0" tIns="0" rIns="0" bIns="0" anchor="b"/>
+          <a:lstStyle/>
+          <a:p>
+            <a:pPr>
+              <a:lnSpc>
+                <a:spcPct val="100000"/>
+              </a:lnSpc>
+            </a:pPr>
+            <a:r>
+              <a:rPr lang="en-US" sz="1200">
+                <a:solidFill>
+                  <a:srgbClr val="000000"/>
+                </a:solidFill>
+                <a:latin typeface="Calibri"/>
+              </a:rPr>
+              <a:t>6/5/13</a:t>
+            </a:r>
+            <a:endParaRPr/>
+          </a:p>
+        </p:txBody>
+      </p:sp>
+      <p:sp>
+        <p:nvSpPr>
+          <p:cNvPr id="149" name="CustomShape 2"/>
+          <p:cNvSpPr/>
+          <p:nvPr/>
+        </p:nvSpPr>
+        <p:spPr>
+          <a:xfrm>
+            <a:off x="736560" y="7197840"/>
+            <a:ext cx="7484400" cy="178560"/>
+          </a:xfrm>
+          <a:prstGeom prst="rect">
+            <a:avLst/>
+          </a:prstGeom>
+        </p:spPr>
+        <p:txBody>
+          <a:bodyPr lIns="0" tIns="0" rIns="0" bIns="0" anchor="b"/>
+          <a:lstStyle/>
+          <a:p>
+            <a:pPr>
+              <a:lnSpc>
+                <a:spcPct val="100000"/>
+              </a:lnSpc>
+            </a:pPr>
+            <a:r>
+              <a:rPr lang="en-US" sz="1200">
+                <a:solidFill>
+                  <a:srgbClr val="000000"/>
+                </a:solidFill>
+                <a:latin typeface="Calibri"/>
+              </a:rPr>
+              <a:t>Terrorismus</a:t>
+            </a:r>
+            <a:endParaRPr/>
+          </a:p>
+        </p:txBody>
+      </p:sp>
+      <p:sp>
+        <p:nvSpPr>
+          <p:cNvPr id="150" name="CustomShape 3"/>
+          <p:cNvSpPr/>
+          <p:nvPr/>
+        </p:nvSpPr>
+        <p:spPr>
+          <a:xfrm>
+            <a:off x="9086760" y="7197840"/>
+            <a:ext cx="862920" cy="178560"/>
+          </a:xfrm>
+          <a:prstGeom prst="rect">
+            <a:avLst/>
+          </a:prstGeom>
+        </p:spPr>
+        <p:txBody>
+          <a:bodyPr lIns="0" tIns="0" rIns="0" bIns="0" anchor="b"/>
+          <a:lstStyle/>
+          <a:p>
+            <a:pPr>
+              <a:lnSpc>
+                <a:spcPct val="100000"/>
+              </a:lnSpc>
+            </a:pPr>
+            <a:fld id="{21FBB5D7-22DB-470E-AA37-9D582303BBB4}" type="slidenum">
+              <a:rPr lang="en-US" sz="1200">
+                <a:solidFill>
+                  <a:srgbClr val="000000"/>
+                </a:solidFill>
+                <a:latin typeface="Calibri"/>
+              </a:rPr>
+              <a:t>10</a:t>
+            </a:fld>
+            <a:endParaRPr/>
+          </a:p>
+        </p:txBody>
+      </p:sp>
+      <p:sp>
+        <p:nvSpPr>
+          <p:cNvPr id="151" name="CustomShape 4"/>
+          <p:cNvSpPr/>
+          <p:nvPr/>
+        </p:nvSpPr>
+        <p:spPr>
+          <a:xfrm>
+            <a:off x="736560" y="1509840"/>
+            <a:ext cx="9213120" cy="361080"/>
+          </a:xfrm>
+          <a:prstGeom prst="rect">
+            <a:avLst/>
+          </a:prstGeom>
+        </p:spPr>
+        <p:txBody>
+          <a:bodyPr lIns="0" tIns="0" rIns="0" bIns="0"/>
+          <a:lstStyle/>
+          <a:p>
+            <a:pPr>
+              <a:lnSpc>
+                <a:spcPct val="100000"/>
+              </a:lnSpc>
+            </a:pPr>
+            <a:r>
+              <a:rPr lang="en-US" sz="2000" b="1" dirty="0" err="1" smtClean="0">
+                <a:solidFill>
+                  <a:srgbClr val="000000"/>
+                </a:solidFill>
+                <a:latin typeface="Calibri"/>
+              </a:rPr>
+              <a:t>Erkenntnisse</a:t>
+            </a:r>
+            <a:endParaRPr dirty="0"/>
+          </a:p>
+        </p:txBody>
+      </p:sp>
+      <p:graphicFrame>
+        <p:nvGraphicFramePr>
+          <p:cNvPr id="8" name="Diagramm 7"/>
+          <p:cNvGraphicFramePr>
+            <a:graphicFrameLocks/>
+          </p:cNvGraphicFramePr>
+          <p:nvPr>
+            <p:extLst>
+              <p:ext uri="{D42A27DB-BD31-4B8C-83A1-F6EECF244321}">
+                <p14:modId xmlns:p14="http://schemas.microsoft.com/office/powerpoint/2010/main" val="2123035825"/>
+              </p:ext>
+            </p:extLst>
+          </p:nvPr>
+        </p:nvGraphicFramePr>
+        <p:xfrm>
+          <a:off x="736560" y="2004457"/>
+          <a:ext cx="9213120" cy="4832350"/>
+        </p:xfrm>
+        <a:graphic>
+          <a:graphicData uri="http://schemas.openxmlformats.org/drawingml/2006/chart">
+            <c:chart xmlns:c="http://schemas.openxmlformats.org/drawingml/2006/chart" xmlns:r="http://schemas.openxmlformats.org/officeDocument/2006/relationships" r:id="rId2"/>
+          </a:graphicData>
+        </a:graphic>
+      </p:graphicFrame>
+    </p:spTree>
+    <p:extLst>
+      <p:ext uri="{BB962C8B-B14F-4D97-AF65-F5344CB8AC3E}">
+        <p14:creationId xmlns:p14="http://schemas.microsoft.com/office/powerpoint/2010/main" val="1497363059"/>
+      </p:ext>
+    </p:extLst>
+  </p:cSld>
+  <p:clrMapOvr>
+    <a:masterClrMapping/>
+  </p:clrMapOvr>
+  <p:timing>
+    <p:tnLst>
+      <p:par>
+        <p:cTn xmlns:p14="http://schemas.microsoft.com/office/powerpoint/2010/main" id="1" dur="indefinite" restart="never" nodeType="tmRoot">
+          <p:childTnLst>
+            <p:seq>
+              <p:cTn id="2" nodeType="mainSeq"/>
+              <p:prevCondLst>
+                <p:cond evt="onPrev" delay="0">
+                  <p:tgtEl>
+                    <p:sldTgt/>
+                  </p:tgtEl>
+                </p:cond>
+              </p:prevCondLst>
+              <p:nextCondLst>
+                <p:cond evt="onNext" delay="0">
+                  <p:tgtEl>
+                    <p:sldTgt/>
+                  </p:tgtEl>
+                </p:cond>
+              </p:nextCondLst>
+            </p:seq>
+          </p:childTnLst>
+        </p:cTn>
+      </p:par>
+    </p:tnLst>
+  </p:timing>
+</p:sld>
+</file>
+
+<file path=ppt/slides/slide11.xml><?xml version="1.0" encoding="utf-8"?>
+<p:sld xmlns:a="http://schemas.openxmlformats.org/drawingml/2006/main" xmlns:r="http://schemas.openxmlformats.org/officeDocument/2006/relationships" xmlns:p="http://schemas.openxmlformats.org/presentationml/2006/main">
+  <p:cSld>
+    <p:spTree>
+      <p:nvGrpSpPr>
+        <p:cNvPr id="1" name=""/>
+        <p:cNvGrpSpPr/>
+        <p:nvPr/>
+      </p:nvGrpSpPr>
+      <p:grpSpPr>
+        <a:xfrm>
+          <a:off x="0" y="0"/>
+          <a:ext cx="0" cy="0"/>
+          <a:chOff x="0" y="0"/>
+          <a:chExt cx="0" cy="0"/>
+        </a:xfrm>
+      </p:grpSpPr>
+      <p:sp>
+        <p:nvSpPr>
+          <p:cNvPr id="148" name="CustomShape 1"/>
+          <p:cNvSpPr/>
+          <p:nvPr/>
+        </p:nvSpPr>
+        <p:spPr>
+          <a:xfrm>
+            <a:off x="8221680" y="7197840"/>
+            <a:ext cx="864360" cy="178560"/>
+          </a:xfrm>
+          <a:prstGeom prst="rect">
+            <a:avLst/>
+          </a:prstGeom>
+        </p:spPr>
+        <p:txBody>
+          <a:bodyPr lIns="0" tIns="0" rIns="0" bIns="0" anchor="b"/>
+          <a:lstStyle/>
+          <a:p>
+            <a:pPr>
+              <a:lnSpc>
+                <a:spcPct val="100000"/>
+              </a:lnSpc>
+            </a:pPr>
+            <a:r>
+              <a:rPr lang="en-US" sz="1200">
+                <a:solidFill>
+                  <a:srgbClr val="000000"/>
+                </a:solidFill>
+                <a:latin typeface="Calibri"/>
+              </a:rPr>
+              <a:t>6/5/13</a:t>
+            </a:r>
+            <a:endParaRPr/>
+          </a:p>
+        </p:txBody>
+      </p:sp>
+      <p:sp>
+        <p:nvSpPr>
+          <p:cNvPr id="149" name="CustomShape 2"/>
+          <p:cNvSpPr/>
+          <p:nvPr/>
+        </p:nvSpPr>
+        <p:spPr>
+          <a:xfrm>
+            <a:off x="736560" y="7197840"/>
+            <a:ext cx="7484400" cy="178560"/>
+          </a:xfrm>
+          <a:prstGeom prst="rect">
+            <a:avLst/>
+          </a:prstGeom>
+        </p:spPr>
+        <p:txBody>
+          <a:bodyPr lIns="0" tIns="0" rIns="0" bIns="0" anchor="b"/>
+          <a:lstStyle/>
+          <a:p>
+            <a:pPr>
+              <a:lnSpc>
+                <a:spcPct val="100000"/>
+              </a:lnSpc>
+            </a:pPr>
+            <a:r>
+              <a:rPr lang="en-US" sz="1200">
+                <a:solidFill>
+                  <a:srgbClr val="000000"/>
+                </a:solidFill>
+                <a:latin typeface="Calibri"/>
+              </a:rPr>
+              <a:t>Terrorismus</a:t>
+            </a:r>
+            <a:endParaRPr/>
+          </a:p>
+        </p:txBody>
+      </p:sp>
+      <p:sp>
+        <p:nvSpPr>
+          <p:cNvPr id="150" name="CustomShape 3"/>
+          <p:cNvSpPr/>
+          <p:nvPr/>
+        </p:nvSpPr>
+        <p:spPr>
+          <a:xfrm>
+            <a:off x="9086760" y="7197840"/>
+            <a:ext cx="862920" cy="178560"/>
+          </a:xfrm>
+          <a:prstGeom prst="rect">
+            <a:avLst/>
+          </a:prstGeom>
+        </p:spPr>
+        <p:txBody>
+          <a:bodyPr lIns="0" tIns="0" rIns="0" bIns="0" anchor="b"/>
+          <a:lstStyle/>
+          <a:p>
+            <a:pPr>
+              <a:lnSpc>
+                <a:spcPct val="100000"/>
+              </a:lnSpc>
+            </a:pPr>
+            <a:fld id="{21FBB5D7-22DB-470E-AA37-9D582303BBB4}" type="slidenum">
+              <a:rPr lang="en-US" sz="1200">
+                <a:solidFill>
+                  <a:srgbClr val="000000"/>
+                </a:solidFill>
+                <a:latin typeface="Calibri"/>
+              </a:rPr>
+              <a:t>11</a:t>
+            </a:fld>
+            <a:endParaRPr/>
+          </a:p>
+        </p:txBody>
+      </p:sp>
+      <p:sp>
+        <p:nvSpPr>
+          <p:cNvPr id="151" name="CustomShape 4"/>
+          <p:cNvSpPr/>
+          <p:nvPr/>
+        </p:nvSpPr>
+        <p:spPr>
+          <a:xfrm>
+            <a:off x="736560" y="1509840"/>
+            <a:ext cx="9213120" cy="361080"/>
+          </a:xfrm>
+          <a:prstGeom prst="rect">
+            <a:avLst/>
+          </a:prstGeom>
+        </p:spPr>
+        <p:txBody>
+          <a:bodyPr lIns="0" tIns="0" rIns="0" bIns="0"/>
+          <a:lstStyle/>
+          <a:p>
+            <a:pPr>
+              <a:lnSpc>
+                <a:spcPct val="100000"/>
+              </a:lnSpc>
+            </a:pPr>
+            <a:r>
+              <a:rPr lang="en-US" sz="2000" b="1" dirty="0" err="1" smtClean="0">
+                <a:solidFill>
+                  <a:srgbClr val="000000"/>
+                </a:solidFill>
+                <a:latin typeface="Calibri"/>
+              </a:rPr>
+              <a:t>Erkenntnisse</a:t>
+            </a:r>
+            <a:endParaRPr dirty="0"/>
+          </a:p>
+        </p:txBody>
+      </p:sp>
+      <p:graphicFrame>
+        <p:nvGraphicFramePr>
+          <p:cNvPr id="8" name="Diagramm 7"/>
+          <p:cNvGraphicFramePr>
+            <a:graphicFrameLocks/>
+          </p:cNvGraphicFramePr>
+          <p:nvPr>
+            <p:extLst>
+              <p:ext uri="{D42A27DB-BD31-4B8C-83A1-F6EECF244321}">
+                <p14:modId xmlns:p14="http://schemas.microsoft.com/office/powerpoint/2010/main" val="2300890442"/>
+              </p:ext>
+            </p:extLst>
+          </p:nvPr>
+        </p:nvGraphicFramePr>
+        <p:xfrm>
+          <a:off x="736560" y="1891837"/>
+          <a:ext cx="9213120" cy="4889500"/>
+        </p:xfrm>
+        <a:graphic>
+          <a:graphicData uri="http://schemas.openxmlformats.org/drawingml/2006/chart">
+            <c:chart xmlns:c="http://schemas.openxmlformats.org/drawingml/2006/chart" xmlns:r="http://schemas.openxmlformats.org/officeDocument/2006/relationships" r:id="rId2"/>
+          </a:graphicData>
+        </a:graphic>
+      </p:graphicFrame>
+    </p:spTree>
+    <p:extLst>
+      <p:ext uri="{BB962C8B-B14F-4D97-AF65-F5344CB8AC3E}">
+        <p14:creationId xmlns:p14="http://schemas.microsoft.com/office/powerpoint/2010/main" val="574254658"/>
+      </p:ext>
+    </p:extLst>
+  </p:cSld>
+  <p:clrMapOvr>
+    <a:masterClrMapping/>
+  </p:clrMapOvr>
+  <p:timing>
+    <p:tnLst>
+      <p:par>
+        <p:cTn xmlns:p14="http://schemas.microsoft.com/office/powerpoint/2010/main" id="1" dur="indefinite" restart="never" nodeType="tmRoot">
+          <p:childTnLst>
+            <p:seq>
+              <p:cTn id="2" nodeType="mainSeq"/>
+              <p:prevCondLst>
+                <p:cond evt="onPrev" delay="0">
+                  <p:tgtEl>
+                    <p:sldTgt/>
+                  </p:tgtEl>
+                </p:cond>
+              </p:prevCondLst>
+              <p:nextCondLst>
+                <p:cond evt="onNext" delay="0">
+                  <p:tgtEl>
+                    <p:sldTgt/>
+                  </p:tgtEl>
+                </p:cond>
+              </p:nextCondLst>
+            </p:seq>
+          </p:childTnLst>
+        </p:cTn>
+      </p:par>
+    </p:tnLst>
+  </p:timing>
+</p:sld>
+</file>
+
+<file path=ppt/slides/slide12.xml><?xml version="1.0" encoding="utf-8"?>
+<p:sld xmlns:a="http://schemas.openxmlformats.org/drawingml/2006/main" xmlns:r="http://schemas.openxmlformats.org/officeDocument/2006/relationships" xmlns:p="http://schemas.openxmlformats.org/presentationml/2006/main">
   <p:cSld>
     <p:spTree>
       <p:nvGrpSpPr>
@@ -4219,12 +5831,12 @@
       </p:grpSpPr>
       <p:pic>
         <p:nvPicPr>
-          <p:cNvPr descr="" id="153" name="Grafik 3"/>
+          <p:cNvPr id="153" name="Grafik 3"/>
           <p:cNvPicPr/>
           <p:nvPr/>
         </p:nvPicPr>
         <p:blipFill>
-          <a:blip r:embed="rId1"/>
+          <a:blip r:embed="rId2"/>
           <a:stretch>
             <a:fillRect/>
           </a:stretch>
@@ -4255,7 +5867,8 @@
           </a:prstGeom>
         </p:spPr>
         <p:txBody>
-          <a:bodyPr bIns="0" lIns="0" rIns="0" tIns="0"/>
+          <a:bodyPr lIns="0" tIns="0" rIns="0" bIns="0"/>
+          <a:lstStyle/>
           <a:p>
             <a:pPr algn="ctr">
               <a:lnSpc>
@@ -4291,7 +5904,8 @@
           </a:prstGeom>
         </p:spPr>
         <p:txBody>
-          <a:bodyPr bIns="0" lIns="0" rIns="0" tIns="0"/>
+          <a:bodyPr lIns="0" tIns="0" rIns="0" bIns="0"/>
+          <a:lstStyle/>
           <a:p>
             <a:pPr>
               <a:lnSpc>
@@ -4299,7 +5913,7 @@
               </a:lnSpc>
             </a:pPr>
             <a:r>
-              <a:rPr b="1" lang="en-US" sz="3600">
+              <a:rPr lang="en-US" sz="3600" b="1">
                 <a:solidFill>
                   <a:srgbClr val="000000"/>
                 </a:solidFill>
@@ -4329,11 +5943,14 @@
       </p:sp>
     </p:spTree>
   </p:cSld>
+  <p:clrMapOvr>
+    <a:masterClrMapping/>
+  </p:clrMapOvr>
 </p:sld>
 </file>
 
 <file path=ppt/slides/slide2.xml><?xml version="1.0" encoding="utf-8"?>
-<p:sld xmlns:a="http://schemas.openxmlformats.org/drawingml/2006/main" xmlns:p="http://schemas.openxmlformats.org/presentationml/2006/main" xmlns:r="http://schemas.openxmlformats.org/officeDocument/2006/relationships">
+<p:sld xmlns:a="http://schemas.openxmlformats.org/drawingml/2006/main" xmlns:r="http://schemas.openxmlformats.org/officeDocument/2006/relationships" xmlns:p="http://schemas.openxmlformats.org/presentationml/2006/main">
   <p:cSld>
     <p:spTree>
       <p:nvGrpSpPr>
@@ -4365,7 +5982,8 @@
           </a:prstGeom>
         </p:spPr>
         <p:txBody>
-          <a:bodyPr anchor="b" bIns="0" lIns="0" rIns="0" tIns="0"/>
+          <a:bodyPr lIns="0" tIns="0" rIns="0" bIns="0" anchor="b"/>
+          <a:lstStyle/>
           <a:p>
             <a:pPr>
               <a:lnSpc>
@@ -4401,7 +6019,8 @@
           </a:prstGeom>
         </p:spPr>
         <p:txBody>
-          <a:bodyPr anchor="b" bIns="0" lIns="0" rIns="0" tIns="0"/>
+          <a:bodyPr lIns="0" tIns="0" rIns="0" bIns="0" anchor="b"/>
+          <a:lstStyle/>
           <a:p>
             <a:pPr>
               <a:lnSpc>
@@ -4437,7 +6056,8 @@
           </a:prstGeom>
         </p:spPr>
         <p:txBody>
-          <a:bodyPr anchor="b" bIns="0" lIns="0" rIns="0" tIns="0"/>
+          <a:bodyPr lIns="0" tIns="0" rIns="0" bIns="0" anchor="b"/>
+          <a:lstStyle/>
           <a:p>
             <a:pPr>
               <a:lnSpc>
@@ -4451,7 +6071,7 @@
                 </a:solidFill>
                 <a:latin typeface="Calibri"/>
               </a:rPr>
-              <a:t>&lt;number&gt;</a:t>
+              <a:t>2</a:t>
             </a:fld>
             <a:endParaRPr/>
           </a:p>
@@ -4473,7 +6093,8 @@
           </a:prstGeom>
         </p:spPr>
         <p:txBody>
-          <a:bodyPr bIns="0" lIns="0" rIns="0" tIns="0"/>
+          <a:bodyPr lIns="0" tIns="0" rIns="0" bIns="0"/>
+          <a:lstStyle/>
           <a:p>
             <a:pPr>
               <a:lnSpc>
@@ -4481,7 +6102,7 @@
               </a:lnSpc>
             </a:pPr>
             <a:r>
-              <a:rPr b="1" lang="en-US" sz="2000">
+              <a:rPr lang="en-US" sz="2000" b="1">
                 <a:solidFill>
                   <a:srgbClr val="000000"/>
                 </a:solidFill>
@@ -4509,7 +6130,8 @@
           </a:prstGeom>
         </p:spPr>
         <p:txBody>
-          <a:bodyPr bIns="0" lIns="0" rIns="0" tIns="0"/>
+          <a:bodyPr lIns="0" tIns="0" rIns="0" bIns="0"/>
+          <a:lstStyle/>
           <a:p>
             <a:pPr>
               <a:lnSpc>
@@ -4525,8 +6147,18 @@
                 </a:solidFill>
                 <a:latin typeface="Calibri"/>
               </a:rPr>
-              <a:t> </a:t>
+              <a:t> Clustering</a:t>
             </a:r>
+            <a:endParaRPr/>
+          </a:p>
+          <a:p>
+            <a:pPr>
+              <a:lnSpc>
+                <a:spcPct val="100000"/>
+              </a:lnSpc>
+              <a:buFont typeface="Arial"/>
+              <a:buChar char="•"/>
+            </a:pPr>
             <a:r>
               <a:rPr lang="en-US" sz="2000">
                 <a:solidFill>
@@ -4534,7 +6166,7 @@
                 </a:solidFill>
                 <a:latin typeface="Calibri"/>
               </a:rPr>
-              <a:t>Clustering</a:t>
+              <a:t> Naive Bayes</a:t>
             </a:r>
             <a:endParaRPr/>
           </a:p>
@@ -4553,8 +6185,18 @@
                 </a:solidFill>
                 <a:latin typeface="Calibri"/>
               </a:rPr>
-              <a:t> </a:t>
+              <a:t> Support Vector Machine</a:t>
             </a:r>
+            <a:endParaRPr/>
+          </a:p>
+          <a:p>
+            <a:pPr>
+              <a:lnSpc>
+                <a:spcPct val="100000"/>
+              </a:lnSpc>
+              <a:buFont typeface="Arial"/>
+              <a:buChar char="•"/>
+            </a:pPr>
             <a:r>
               <a:rPr lang="en-US" sz="2000">
                 <a:solidFill>
@@ -4562,63 +6204,7 @@
                 </a:solidFill>
                 <a:latin typeface="Calibri"/>
               </a:rPr>
-              <a:t>Naive Bayes</a:t>
-            </a:r>
-            <a:endParaRPr/>
-          </a:p>
-          <a:p>
-            <a:pPr>
-              <a:lnSpc>
-                <a:spcPct val="100000"/>
-              </a:lnSpc>
-              <a:buFont typeface="Arial"/>
-              <a:buChar char="•"/>
-            </a:pPr>
-            <a:r>
-              <a:rPr lang="en-US" sz="2000">
-                <a:solidFill>
-                  <a:srgbClr val="000000"/>
-                </a:solidFill>
-                <a:latin typeface="Calibri"/>
-              </a:rPr>
-              <a:t> </a:t>
-            </a:r>
-            <a:r>
-              <a:rPr lang="en-US" sz="2000">
-                <a:solidFill>
-                  <a:srgbClr val="000000"/>
-                </a:solidFill>
-                <a:latin typeface="Calibri"/>
-              </a:rPr>
-              <a:t>Support Vector Machine</a:t>
-            </a:r>
-            <a:endParaRPr/>
-          </a:p>
-          <a:p>
-            <a:pPr>
-              <a:lnSpc>
-                <a:spcPct val="100000"/>
-              </a:lnSpc>
-              <a:buFont typeface="Arial"/>
-              <a:buChar char="•"/>
-            </a:pPr>
-            <a:r>
-              <a:rPr lang="en-US" sz="2000">
-                <a:solidFill>
-                  <a:srgbClr val="000000"/>
-                </a:solidFill>
-                <a:latin typeface="Calibri"/>
-              </a:rPr>
-              <a:t> </a:t>
-            </a:r>
-            <a:r>
-              <a:rPr lang="en-US" sz="2000">
-                <a:solidFill>
-                  <a:srgbClr val="000000"/>
-                </a:solidFill>
-                <a:latin typeface="Calibri"/>
-              </a:rPr>
-              <a:t>Erkenntnisse</a:t>
+              <a:t> Erkenntnisse</a:t>
             </a:r>
             <a:endParaRPr/>
           </a:p>
@@ -4626,22 +6212,25 @@
       </p:sp>
     </p:spTree>
   </p:cSld>
+  <p:clrMapOvr>
+    <a:masterClrMapping/>
+  </p:clrMapOvr>
   <p:timing>
     <p:tnLst>
       <p:par>
-        <p:cTn dur="indefinite" id="1" nodeType="tmRoot" restart="never">
+        <p:cTn xmlns:p14="http://schemas.microsoft.com/office/powerpoint/2010/main" id="1" dur="indefinite" restart="never" nodeType="tmRoot">
           <p:childTnLst>
             <p:seq>
               <p:cTn id="2" nodeType="mainSeq"/>
               <p:prevCondLst>
-                <p:cond delay="0" evt="onPrev">
+                <p:cond evt="onPrev" delay="0">
                   <p:tgtEl>
                     <p:sldTgt/>
                   </p:tgtEl>
                 </p:cond>
               </p:prevCondLst>
               <p:nextCondLst>
-                <p:cond delay="0" evt="onNext">
+                <p:cond evt="onNext" delay="0">
                   <p:tgtEl>
                     <p:sldTgt/>
                   </p:tgtEl>
@@ -4657,7 +6246,7 @@
 </file>
 
 <file path=ppt/slides/slide3.xml><?xml version="1.0" encoding="utf-8"?>
-<p:sld xmlns:a="http://schemas.openxmlformats.org/drawingml/2006/main" xmlns:p="http://schemas.openxmlformats.org/presentationml/2006/main" xmlns:r="http://schemas.openxmlformats.org/officeDocument/2006/relationships">
+<p:sld xmlns:a="http://schemas.openxmlformats.org/drawingml/2006/main" xmlns:r="http://schemas.openxmlformats.org/officeDocument/2006/relationships" xmlns:p="http://schemas.openxmlformats.org/presentationml/2006/main">
   <p:cSld>
     <p:spTree>
       <p:nvGrpSpPr>
@@ -4689,7 +6278,8 @@
           </a:prstGeom>
         </p:spPr>
         <p:txBody>
-          <a:bodyPr anchor="b" bIns="0" lIns="0" rIns="0" tIns="0"/>
+          <a:bodyPr lIns="0" tIns="0" rIns="0" bIns="0" anchor="b"/>
+          <a:lstStyle/>
           <a:p>
             <a:pPr>
               <a:lnSpc>
@@ -4725,7 +6315,8 @@
           </a:prstGeom>
         </p:spPr>
         <p:txBody>
-          <a:bodyPr anchor="b" bIns="0" lIns="0" rIns="0" tIns="0"/>
+          <a:bodyPr lIns="0" tIns="0" rIns="0" bIns="0" anchor="b"/>
+          <a:lstStyle/>
           <a:p>
             <a:pPr>
               <a:lnSpc>
@@ -4761,7 +6352,8 @@
           </a:prstGeom>
         </p:spPr>
         <p:txBody>
-          <a:bodyPr anchor="b" bIns="0" lIns="0" rIns="0" tIns="0"/>
+          <a:bodyPr lIns="0" tIns="0" rIns="0" bIns="0" anchor="b"/>
+          <a:lstStyle/>
           <a:p>
             <a:pPr>
               <a:lnSpc>
@@ -4775,7 +6367,7 @@
                 </a:solidFill>
                 <a:latin typeface="Calibri"/>
               </a:rPr>
-              <a:t>&lt;number&gt;</a:t>
+              <a:t>3</a:t>
             </a:fld>
             <a:endParaRPr/>
           </a:p>
@@ -4797,7 +6389,8 @@
           </a:prstGeom>
         </p:spPr>
         <p:txBody>
-          <a:bodyPr bIns="0" lIns="0" rIns="0" tIns="0"/>
+          <a:bodyPr lIns="0" tIns="0" rIns="0" bIns="0"/>
+          <a:lstStyle/>
           <a:p>
             <a:pPr>
               <a:lnSpc>
@@ -4805,7 +6398,7 @@
               </a:lnSpc>
             </a:pPr>
             <a:r>
-              <a:rPr b="1" lang="en-US" sz="2000">
+              <a:rPr lang="en-US" sz="2000" b="1">
                 <a:solidFill>
                   <a:srgbClr val="000000"/>
                 </a:solidFill>
@@ -4833,7 +6426,8 @@
           </a:prstGeom>
         </p:spPr>
         <p:txBody>
-          <a:bodyPr bIns="0" lIns="0" rIns="0" tIns="0"/>
+          <a:bodyPr lIns="0" tIns="0" rIns="0" bIns="0"/>
+          <a:lstStyle/>
           <a:p>
             <a:pPr>
               <a:lnSpc>
@@ -4849,8 +6443,18 @@
                 </a:solidFill>
                 <a:latin typeface="Calibri"/>
               </a:rPr>
-              <a:t> </a:t>
+              <a:t> K-Medoids</a:t>
             </a:r>
+            <a:endParaRPr/>
+          </a:p>
+          <a:p>
+            <a:pPr>
+              <a:lnSpc>
+                <a:spcPct val="100000"/>
+              </a:lnSpc>
+              <a:buFont typeface="Arial"/>
+              <a:buChar char="•"/>
+            </a:pPr>
             <a:r>
               <a:rPr lang="en-US" sz="2000">
                 <a:solidFill>
@@ -4858,7 +6462,7 @@
                 </a:solidFill>
                 <a:latin typeface="Calibri"/>
               </a:rPr>
-              <a:t>K-Medoids</a:t>
+              <a:t> Erste K Features als Center</a:t>
             </a:r>
             <a:endParaRPr/>
           </a:p>
@@ -4877,8 +6481,18 @@
                 </a:solidFill>
                 <a:latin typeface="Calibri"/>
               </a:rPr>
-              <a:t> </a:t>
+              <a:t> Parallelisierte Suche der Center</a:t>
             </a:r>
+            <a:endParaRPr/>
+          </a:p>
+          <a:p>
+            <a:pPr>
+              <a:lnSpc>
+                <a:spcPct val="100000"/>
+              </a:lnSpc>
+              <a:buFont typeface="Arial"/>
+              <a:buChar char="•"/>
+            </a:pPr>
             <a:r>
               <a:rPr lang="en-US" sz="2000">
                 <a:solidFill>
@@ -4886,63 +6500,7 @@
                 </a:solidFill>
                 <a:latin typeface="Calibri"/>
               </a:rPr>
-              <a:t>Erste K Features als Center</a:t>
-            </a:r>
-            <a:endParaRPr/>
-          </a:p>
-          <a:p>
-            <a:pPr>
-              <a:lnSpc>
-                <a:spcPct val="100000"/>
-              </a:lnSpc>
-              <a:buFont typeface="Arial"/>
-              <a:buChar char="•"/>
-            </a:pPr>
-            <a:r>
-              <a:rPr lang="en-US" sz="2000">
-                <a:solidFill>
-                  <a:srgbClr val="000000"/>
-                </a:solidFill>
-                <a:latin typeface="Calibri"/>
-              </a:rPr>
-              <a:t> </a:t>
-            </a:r>
-            <a:r>
-              <a:rPr lang="en-US" sz="2000">
-                <a:solidFill>
-                  <a:srgbClr val="000000"/>
-                </a:solidFill>
-                <a:latin typeface="Calibri"/>
-              </a:rPr>
-              <a:t>Parallelisierte Suche der Center</a:t>
-            </a:r>
-            <a:endParaRPr/>
-          </a:p>
-          <a:p>
-            <a:pPr>
-              <a:lnSpc>
-                <a:spcPct val="100000"/>
-              </a:lnSpc>
-              <a:buFont typeface="Arial"/>
-              <a:buChar char="•"/>
-            </a:pPr>
-            <a:r>
-              <a:rPr lang="en-US" sz="2000">
-                <a:solidFill>
-                  <a:srgbClr val="000000"/>
-                </a:solidFill>
-                <a:latin typeface="Calibri"/>
-              </a:rPr>
-              <a:t> </a:t>
-            </a:r>
-            <a:r>
-              <a:rPr lang="en-US" sz="2000">
-                <a:solidFill>
-                  <a:srgbClr val="000000"/>
-                </a:solidFill>
-                <a:latin typeface="Calibri"/>
-              </a:rPr>
-              <a:t>Parallelisierte Bearbeitung der Cluster</a:t>
+              <a:t> Parallelisierte Bearbeitung der Cluster</a:t>
             </a:r>
             <a:endParaRPr/>
           </a:p>
@@ -4950,11 +6508,14 @@
       </p:sp>
     </p:spTree>
   </p:cSld>
+  <p:clrMapOvr>
+    <a:masterClrMapping/>
+  </p:clrMapOvr>
 </p:sld>
 </file>
 
 <file path=ppt/slides/slide4.xml><?xml version="1.0" encoding="utf-8"?>
-<p:sld xmlns:a="http://schemas.openxmlformats.org/drawingml/2006/main" xmlns:p="http://schemas.openxmlformats.org/presentationml/2006/main" xmlns:r="http://schemas.openxmlformats.org/officeDocument/2006/relationships">
+<p:sld xmlns:a="http://schemas.openxmlformats.org/drawingml/2006/main" xmlns:r="http://schemas.openxmlformats.org/officeDocument/2006/relationships" xmlns:p="http://schemas.openxmlformats.org/presentationml/2006/main">
   <p:cSld>
     <p:spTree>
       <p:nvGrpSpPr>
@@ -4986,7 +6547,8 @@
           </a:prstGeom>
         </p:spPr>
         <p:txBody>
-          <a:bodyPr anchor="b" bIns="0" lIns="0" rIns="0" tIns="0"/>
+          <a:bodyPr lIns="0" tIns="0" rIns="0" bIns="0" anchor="b"/>
+          <a:lstStyle/>
           <a:p>
             <a:pPr>
               <a:lnSpc>
@@ -5022,7 +6584,8 @@
           </a:prstGeom>
         </p:spPr>
         <p:txBody>
-          <a:bodyPr anchor="b" bIns="0" lIns="0" rIns="0" tIns="0"/>
+          <a:bodyPr lIns="0" tIns="0" rIns="0" bIns="0" anchor="b"/>
+          <a:lstStyle/>
           <a:p>
             <a:pPr>
               <a:lnSpc>
@@ -5058,7 +6621,8 @@
           </a:prstGeom>
         </p:spPr>
         <p:txBody>
-          <a:bodyPr anchor="b" bIns="0" lIns="0" rIns="0" tIns="0"/>
+          <a:bodyPr lIns="0" tIns="0" rIns="0" bIns="0" anchor="b"/>
+          <a:lstStyle/>
           <a:p>
             <a:pPr>
               <a:lnSpc>
@@ -5072,7 +6636,7 @@
                 </a:solidFill>
                 <a:latin typeface="Calibri"/>
               </a:rPr>
-              <a:t>&lt;number&gt;</a:t>
+              <a:t>4</a:t>
             </a:fld>
             <a:endParaRPr/>
           </a:p>
@@ -5094,7 +6658,8 @@
           </a:prstGeom>
         </p:spPr>
         <p:txBody>
-          <a:bodyPr bIns="0" lIns="0" rIns="0" tIns="0"/>
+          <a:bodyPr lIns="0" tIns="0" rIns="0" bIns="0"/>
+          <a:lstStyle/>
           <a:p>
             <a:pPr>
               <a:lnSpc>
@@ -5102,7 +6667,7 @@
               </a:lnSpc>
             </a:pPr>
             <a:r>
-              <a:rPr b="1" lang="en-US" sz="2000">
+              <a:rPr lang="en-US" sz="2000" b="1">
                 <a:solidFill>
                   <a:srgbClr val="000000"/>
                 </a:solidFill>
@@ -5130,7 +6695,8 @@
           </a:prstGeom>
         </p:spPr>
         <p:txBody>
-          <a:bodyPr bIns="0" lIns="0" rIns="0" tIns="0"/>
+          <a:bodyPr lIns="0" tIns="0" rIns="0" bIns="0"/>
+          <a:lstStyle/>
           <a:p>
             <a:pPr>
               <a:lnSpc>
@@ -5192,29 +6758,7 @@
       </p:sp>
       <p:pic>
         <p:nvPicPr>
-          <p:cNvPr descr="" id="129" name=""/>
-          <p:cNvPicPr/>
-          <p:nvPr/>
-        </p:nvPicPr>
-        <p:blipFill>
-          <a:blip r:embed="rId1"/>
-          <a:stretch>
-            <a:fillRect/>
-          </a:stretch>
-        </p:blipFill>
-        <p:spPr>
-          <a:xfrm>
-            <a:off x="1104120" y="4114800"/>
-            <a:ext cx="2644560" cy="423360"/>
-          </a:xfrm>
-          <a:prstGeom prst="rect">
-            <a:avLst/>
-          </a:prstGeom>
-        </p:spPr>
-      </p:pic>
-      <p:pic>
-        <p:nvPicPr>
-          <p:cNvPr descr="" id="130" name=""/>
+          <p:cNvPr id="129" name="Bild 128"/>
           <p:cNvPicPr/>
           <p:nvPr/>
         </p:nvPicPr>
@@ -5226,6 +6770,28 @@
         </p:blipFill>
         <p:spPr>
           <a:xfrm>
+            <a:off x="1104120" y="4114800"/>
+            <a:ext cx="2644560" cy="423360"/>
+          </a:xfrm>
+          <a:prstGeom prst="rect">
+            <a:avLst/>
+          </a:prstGeom>
+        </p:spPr>
+      </p:pic>
+      <p:pic>
+        <p:nvPicPr>
+          <p:cNvPr id="130" name="Bild 129"/>
+          <p:cNvPicPr/>
+          <p:nvPr/>
+        </p:nvPicPr>
+        <p:blipFill>
+          <a:blip r:embed="rId3"/>
+          <a:stretch>
+            <a:fillRect/>
+          </a:stretch>
+        </p:blipFill>
+        <p:spPr>
+          <a:xfrm>
             <a:off x="1097280" y="5303520"/>
             <a:ext cx="7255080" cy="1005480"/>
           </a:xfrm>
@@ -5236,22 +6802,25 @@
       </p:pic>
     </p:spTree>
   </p:cSld>
+  <p:clrMapOvr>
+    <a:masterClrMapping/>
+  </p:clrMapOvr>
   <p:timing>
     <p:tnLst>
       <p:par>
-        <p:cTn dur="indefinite" id="3" nodeType="tmRoot" restart="never">
+        <p:cTn xmlns:p14="http://schemas.microsoft.com/office/powerpoint/2010/main" id="1" dur="indefinite" restart="never" nodeType="tmRoot">
           <p:childTnLst>
             <p:seq>
-              <p:cTn id="4" nodeType="mainSeq"/>
+              <p:cTn id="2" nodeType="mainSeq"/>
               <p:prevCondLst>
-                <p:cond delay="0" evt="onPrev">
+                <p:cond evt="onPrev" delay="0">
                   <p:tgtEl>
                     <p:sldTgt/>
                   </p:tgtEl>
                 </p:cond>
               </p:prevCondLst>
               <p:nextCondLst>
-                <p:cond delay="0" evt="onNext">
+                <p:cond evt="onNext" delay="0">
                   <p:tgtEl>
                     <p:sldTgt/>
                   </p:tgtEl>
@@ -5267,7 +6836,7 @@
 </file>
 
 <file path=ppt/slides/slide5.xml><?xml version="1.0" encoding="utf-8"?>
-<p:sld xmlns:a="http://schemas.openxmlformats.org/drawingml/2006/main" xmlns:p="http://schemas.openxmlformats.org/presentationml/2006/main" xmlns:r="http://schemas.openxmlformats.org/officeDocument/2006/relationships">
+<p:sld xmlns:a="http://schemas.openxmlformats.org/drawingml/2006/main" xmlns:r="http://schemas.openxmlformats.org/officeDocument/2006/relationships" xmlns:p="http://schemas.openxmlformats.org/presentationml/2006/main">
   <p:cSld>
     <p:spTree>
       <p:nvGrpSpPr>
@@ -5299,7 +6868,8 @@
           </a:prstGeom>
         </p:spPr>
         <p:txBody>
-          <a:bodyPr anchor="b" bIns="0" lIns="0" rIns="0" tIns="0"/>
+          <a:bodyPr lIns="0" tIns="0" rIns="0" bIns="0" anchor="b"/>
+          <a:lstStyle/>
           <a:p>
             <a:pPr>
               <a:lnSpc>
@@ -5335,7 +6905,8 @@
           </a:prstGeom>
         </p:spPr>
         <p:txBody>
-          <a:bodyPr anchor="b" bIns="0" lIns="0" rIns="0" tIns="0"/>
+          <a:bodyPr lIns="0" tIns="0" rIns="0" bIns="0" anchor="b"/>
+          <a:lstStyle/>
           <a:p>
             <a:pPr>
               <a:lnSpc>
@@ -5371,7 +6942,8 @@
           </a:prstGeom>
         </p:spPr>
         <p:txBody>
-          <a:bodyPr anchor="b" bIns="0" lIns="0" rIns="0" tIns="0"/>
+          <a:bodyPr lIns="0" tIns="0" rIns="0" bIns="0" anchor="b"/>
+          <a:lstStyle/>
           <a:p>
             <a:pPr>
               <a:lnSpc>
@@ -5385,7 +6957,7 @@
                 </a:solidFill>
                 <a:latin typeface="Calibri"/>
               </a:rPr>
-              <a:t>&lt;number&gt;</a:t>
+              <a:t>5</a:t>
             </a:fld>
             <a:endParaRPr/>
           </a:p>
@@ -5407,7 +6979,8 @@
           </a:prstGeom>
         </p:spPr>
         <p:txBody>
-          <a:bodyPr bIns="0" lIns="0" rIns="0" tIns="0"/>
+          <a:bodyPr lIns="0" tIns="0" rIns="0" bIns="0"/>
+          <a:lstStyle/>
           <a:p>
             <a:pPr>
               <a:lnSpc>
@@ -5415,7 +6988,7 @@
               </a:lnSpc>
             </a:pPr>
             <a:r>
-              <a:rPr b="1" lang="en-US" sz="2000">
+              <a:rPr lang="en-US" sz="2000" b="1">
                 <a:solidFill>
                   <a:srgbClr val="000000"/>
                 </a:solidFill>
@@ -5443,7 +7016,8 @@
           </a:prstGeom>
         </p:spPr>
         <p:txBody>
-          <a:bodyPr bIns="0" lIns="0" rIns="0" tIns="0"/>
+          <a:bodyPr lIns="0" tIns="0" rIns="0" bIns="0"/>
+          <a:lstStyle/>
           <a:p>
             <a:pPr>
               <a:lnSpc>
@@ -5610,22 +7184,25 @@
       </p:sp>
     </p:spTree>
   </p:cSld>
+  <p:clrMapOvr>
+    <a:masterClrMapping/>
+  </p:clrMapOvr>
   <p:timing>
     <p:tnLst>
       <p:par>
-        <p:cTn dur="indefinite" id="5" nodeType="tmRoot" restart="never">
+        <p:cTn xmlns:p14="http://schemas.microsoft.com/office/powerpoint/2010/main" id="1" dur="indefinite" restart="never" nodeType="tmRoot">
           <p:childTnLst>
             <p:seq>
-              <p:cTn id="6" nodeType="mainSeq"/>
+              <p:cTn id="2" nodeType="mainSeq"/>
               <p:prevCondLst>
-                <p:cond delay="0" evt="onPrev">
+                <p:cond evt="onPrev" delay="0">
                   <p:tgtEl>
                     <p:sldTgt/>
                   </p:tgtEl>
                 </p:cond>
               </p:prevCondLst>
               <p:nextCondLst>
-                <p:cond delay="0" evt="onNext">
+                <p:cond evt="onNext" delay="0">
                   <p:tgtEl>
                     <p:sldTgt/>
                   </p:tgtEl>
@@ -5641,7 +7218,7 @@
 </file>
 
 <file path=ppt/slides/slide6.xml><?xml version="1.0" encoding="utf-8"?>
-<p:sld xmlns:a="http://schemas.openxmlformats.org/drawingml/2006/main" xmlns:p="http://schemas.openxmlformats.org/presentationml/2006/main" xmlns:r="http://schemas.openxmlformats.org/officeDocument/2006/relationships">
+<p:sld xmlns:a="http://schemas.openxmlformats.org/drawingml/2006/main" xmlns:r="http://schemas.openxmlformats.org/officeDocument/2006/relationships" xmlns:p="http://schemas.openxmlformats.org/presentationml/2006/main">
   <p:cSld>
     <p:spTree>
       <p:nvGrpSpPr>
@@ -5673,7 +7250,8 @@
           </a:prstGeom>
         </p:spPr>
         <p:txBody>
-          <a:bodyPr anchor="b" bIns="0" lIns="0" rIns="0" tIns="0"/>
+          <a:bodyPr lIns="0" tIns="0" rIns="0" bIns="0" anchor="b"/>
+          <a:lstStyle/>
           <a:p>
             <a:pPr>
               <a:lnSpc>
@@ -5709,7 +7287,8 @@
           </a:prstGeom>
         </p:spPr>
         <p:txBody>
-          <a:bodyPr anchor="b" bIns="0" lIns="0" rIns="0" tIns="0"/>
+          <a:bodyPr lIns="0" tIns="0" rIns="0" bIns="0" anchor="b"/>
+          <a:lstStyle/>
           <a:p>
             <a:pPr>
               <a:lnSpc>
@@ -5745,7 +7324,8 @@
           </a:prstGeom>
         </p:spPr>
         <p:txBody>
-          <a:bodyPr anchor="b" bIns="0" lIns="0" rIns="0" tIns="0"/>
+          <a:bodyPr lIns="0" tIns="0" rIns="0" bIns="0" anchor="b"/>
+          <a:lstStyle/>
           <a:p>
             <a:pPr>
               <a:lnSpc>
@@ -5759,7 +7339,7 @@
                 </a:solidFill>
                 <a:latin typeface="Calibri"/>
               </a:rPr>
-              <a:t>&lt;number&gt;</a:t>
+              <a:t>6</a:t>
             </a:fld>
             <a:endParaRPr/>
           </a:p>
@@ -5767,12 +7347,12 @@
       </p:sp>
       <p:pic>
         <p:nvPicPr>
-          <p:cNvPr descr="" id="139" name=""/>
+          <p:cNvPr id="139" name="Bild 138"/>
           <p:cNvPicPr/>
           <p:nvPr/>
         </p:nvPicPr>
         <p:blipFill>
-          <a:blip r:embed="rId1"/>
+          <a:blip r:embed="rId2"/>
           <a:stretch>
             <a:fillRect/>
           </a:stretch>
@@ -5789,11 +7369,14 @@
       </p:pic>
     </p:spTree>
   </p:cSld>
+  <p:clrMapOvr>
+    <a:masterClrMapping/>
+  </p:clrMapOvr>
 </p:sld>
 </file>
 
 <file path=ppt/slides/slide7.xml><?xml version="1.0" encoding="utf-8"?>
-<p:sld xmlns:a="http://schemas.openxmlformats.org/drawingml/2006/main" xmlns:p="http://schemas.openxmlformats.org/presentationml/2006/main" xmlns:r="http://schemas.openxmlformats.org/officeDocument/2006/relationships">
+<p:sld xmlns:a="http://schemas.openxmlformats.org/drawingml/2006/main" xmlns:r="http://schemas.openxmlformats.org/officeDocument/2006/relationships" xmlns:p="http://schemas.openxmlformats.org/presentationml/2006/main">
   <p:cSld>
     <p:spTree>
       <p:nvGrpSpPr>
@@ -5825,7 +7408,8 @@
           </a:prstGeom>
         </p:spPr>
         <p:txBody>
-          <a:bodyPr anchor="b" bIns="0" lIns="0" rIns="0" tIns="0"/>
+          <a:bodyPr lIns="0" tIns="0" rIns="0" bIns="0" anchor="b"/>
+          <a:lstStyle/>
           <a:p>
             <a:pPr>
               <a:lnSpc>
@@ -5861,7 +7445,8 @@
           </a:prstGeom>
         </p:spPr>
         <p:txBody>
-          <a:bodyPr anchor="b" bIns="0" lIns="0" rIns="0" tIns="0"/>
+          <a:bodyPr lIns="0" tIns="0" rIns="0" bIns="0" anchor="b"/>
+          <a:lstStyle/>
           <a:p>
             <a:pPr>
               <a:lnSpc>
@@ -5897,7 +7482,8 @@
           </a:prstGeom>
         </p:spPr>
         <p:txBody>
-          <a:bodyPr anchor="b" bIns="0" lIns="0" rIns="0" tIns="0"/>
+          <a:bodyPr lIns="0" tIns="0" rIns="0" bIns="0" anchor="b"/>
+          <a:lstStyle/>
           <a:p>
             <a:pPr>
               <a:lnSpc>
@@ -5911,7 +7497,7 @@
                 </a:solidFill>
                 <a:latin typeface="Calibri"/>
               </a:rPr>
-              <a:t>&lt;number&gt;</a:t>
+              <a:t>7</a:t>
             </a:fld>
             <a:endParaRPr/>
           </a:p>
@@ -5919,12 +7505,12 @@
       </p:sp>
       <p:pic>
         <p:nvPicPr>
-          <p:cNvPr descr="" id="143" name=""/>
+          <p:cNvPr id="143" name="Bild 142"/>
           <p:cNvPicPr/>
           <p:nvPr/>
         </p:nvPicPr>
         <p:blipFill>
-          <a:blip r:embed="rId1"/>
+          <a:blip r:embed="rId2"/>
           <a:stretch>
             <a:fillRect/>
           </a:stretch>
@@ -5941,11 +7527,14 @@
       </p:pic>
     </p:spTree>
   </p:cSld>
+  <p:clrMapOvr>
+    <a:masterClrMapping/>
+  </p:clrMapOvr>
 </p:sld>
 </file>
 
 <file path=ppt/slides/slide8.xml><?xml version="1.0" encoding="utf-8"?>
-<p:sld xmlns:a="http://schemas.openxmlformats.org/drawingml/2006/main" xmlns:p="http://schemas.openxmlformats.org/presentationml/2006/main" xmlns:r="http://schemas.openxmlformats.org/officeDocument/2006/relationships">
+<p:sld xmlns:a="http://schemas.openxmlformats.org/drawingml/2006/main" xmlns:r="http://schemas.openxmlformats.org/officeDocument/2006/relationships" xmlns:p="http://schemas.openxmlformats.org/presentationml/2006/main">
   <p:cSld>
     <p:spTree>
       <p:nvGrpSpPr>
@@ -5977,7 +7566,8 @@
           </a:prstGeom>
         </p:spPr>
         <p:txBody>
-          <a:bodyPr anchor="b" bIns="0" lIns="0" rIns="0" tIns="0"/>
+          <a:bodyPr lIns="0" tIns="0" rIns="0" bIns="0" anchor="b"/>
+          <a:lstStyle/>
           <a:p>
             <a:pPr>
               <a:lnSpc>
@@ -6013,7 +7603,8 @@
           </a:prstGeom>
         </p:spPr>
         <p:txBody>
-          <a:bodyPr anchor="b" bIns="0" lIns="0" rIns="0" tIns="0"/>
+          <a:bodyPr lIns="0" tIns="0" rIns="0" bIns="0" anchor="b"/>
+          <a:lstStyle/>
           <a:p>
             <a:pPr>
               <a:lnSpc>
@@ -6049,7 +7640,8 @@
           </a:prstGeom>
         </p:spPr>
         <p:txBody>
-          <a:bodyPr anchor="b" bIns="0" lIns="0" rIns="0" tIns="0"/>
+          <a:bodyPr lIns="0" tIns="0" rIns="0" bIns="0" anchor="b"/>
+          <a:lstStyle/>
           <a:p>
             <a:pPr>
               <a:lnSpc>
@@ -6063,7 +7655,7 @@
                 </a:solidFill>
                 <a:latin typeface="Calibri"/>
               </a:rPr>
-              <a:t>&lt;number&gt;</a:t>
+              <a:t>8</a:t>
             </a:fld>
             <a:endParaRPr/>
           </a:p>
@@ -6071,12 +7663,12 @@
       </p:sp>
       <p:pic>
         <p:nvPicPr>
-          <p:cNvPr descr="" id="147" name=""/>
+          <p:cNvPr id="147" name="Bild 146"/>
           <p:cNvPicPr/>
           <p:nvPr/>
         </p:nvPicPr>
         <p:blipFill>
-          <a:blip r:embed="rId1"/>
+          <a:blip r:embed="rId2"/>
           <a:stretch>
             <a:fillRect/>
           </a:stretch>
@@ -6093,11 +7685,14 @@
       </p:pic>
     </p:spTree>
   </p:cSld>
+  <p:clrMapOvr>
+    <a:masterClrMapping/>
+  </p:clrMapOvr>
 </p:sld>
 </file>
 
 <file path=ppt/slides/slide9.xml><?xml version="1.0" encoding="utf-8"?>
-<p:sld xmlns:a="http://schemas.openxmlformats.org/drawingml/2006/main" xmlns:p="http://schemas.openxmlformats.org/presentationml/2006/main" xmlns:r="http://schemas.openxmlformats.org/officeDocument/2006/relationships">
+<p:sld xmlns:a="http://schemas.openxmlformats.org/drawingml/2006/main" xmlns:r="http://schemas.openxmlformats.org/officeDocument/2006/relationships" xmlns:p="http://schemas.openxmlformats.org/presentationml/2006/main">
   <p:cSld>
     <p:spTree>
       <p:nvGrpSpPr>
@@ -6129,7 +7724,8 @@
           </a:prstGeom>
         </p:spPr>
         <p:txBody>
-          <a:bodyPr anchor="b" bIns="0" lIns="0" rIns="0" tIns="0"/>
+          <a:bodyPr lIns="0" tIns="0" rIns="0" bIns="0" anchor="b"/>
+          <a:lstStyle/>
           <a:p>
             <a:pPr>
               <a:lnSpc>
@@ -6165,7 +7761,8 @@
           </a:prstGeom>
         </p:spPr>
         <p:txBody>
-          <a:bodyPr anchor="b" bIns="0" lIns="0" rIns="0" tIns="0"/>
+          <a:bodyPr lIns="0" tIns="0" rIns="0" bIns="0" anchor="b"/>
+          <a:lstStyle/>
           <a:p>
             <a:pPr>
               <a:lnSpc>
@@ -6201,7 +7798,8 @@
           </a:prstGeom>
         </p:spPr>
         <p:txBody>
-          <a:bodyPr anchor="b" bIns="0" lIns="0" rIns="0" tIns="0"/>
+          <a:bodyPr lIns="0" tIns="0" rIns="0" bIns="0" anchor="b"/>
+          <a:lstStyle/>
           <a:p>
             <a:pPr>
               <a:lnSpc>
@@ -6215,7 +7813,7 @@
                 </a:solidFill>
                 <a:latin typeface="Calibri"/>
               </a:rPr>
-              <a:t>&lt;number&gt;</a:t>
+              <a:t>9</a:t>
             </a:fld>
             <a:endParaRPr/>
           </a:p>
@@ -6237,7 +7835,8 @@
           </a:prstGeom>
         </p:spPr>
         <p:txBody>
-          <a:bodyPr bIns="0" lIns="0" rIns="0" tIns="0"/>
+          <a:bodyPr lIns="0" tIns="0" rIns="0" bIns="0"/>
+          <a:lstStyle/>
           <a:p>
             <a:pPr>
               <a:lnSpc>
@@ -6245,7 +7844,7 @@
               </a:lnSpc>
             </a:pPr>
             <a:r>
-              <a:rPr b="1" lang="en-US" sz="2000">
+              <a:rPr lang="en-US" sz="2000" b="1">
                 <a:solidFill>
                   <a:srgbClr val="000000"/>
                 </a:solidFill>
@@ -6273,7 +7872,8 @@
           </a:prstGeom>
         </p:spPr>
         <p:txBody>
-          <a:bodyPr bIns="0" lIns="0" rIns="0" tIns="0"/>
+          <a:bodyPr lIns="0" tIns="0" rIns="0" bIns="0"/>
+          <a:lstStyle/>
           <a:p>
             <a:pPr>
               <a:lnSpc>
@@ -6289,16 +7889,7 @@
                 </a:solidFill>
                 <a:latin typeface="Calibri"/>
               </a:rPr>
-              <a:t> </a:t>
-            </a:r>
-            <a:r>
-              <a:rPr lang="en-US" sz="2000">
-                <a:solidFill>
-                  <a:srgbClr val="000000"/>
-                </a:solidFill>
-                <a:latin typeface="Calibri"/>
-              </a:rPr>
-              <a:t>RBF- Kernel ist parametrisierbar</a:t>
+              <a:t> RBF- Kernel ist parametrisierbar</a:t>
             </a:r>
             <a:endParaRPr/>
           </a:p>
@@ -6444,22 +8035,25 @@
       </p:sp>
     </p:spTree>
   </p:cSld>
+  <p:clrMapOvr>
+    <a:masterClrMapping/>
+  </p:clrMapOvr>
   <p:timing>
     <p:tnLst>
       <p:par>
-        <p:cTn dur="indefinite" id="7" nodeType="tmRoot" restart="never">
+        <p:cTn xmlns:p14="http://schemas.microsoft.com/office/powerpoint/2010/main" id="1" dur="indefinite" restart="never" nodeType="tmRoot">
           <p:childTnLst>
             <p:seq>
-              <p:cTn id="8" nodeType="mainSeq"/>
+              <p:cTn id="2" nodeType="mainSeq"/>
               <p:prevCondLst>
-                <p:cond delay="0" evt="onPrev">
+                <p:cond evt="onPrev" delay="0">
                   <p:tgtEl>
                     <p:sldTgt/>
                   </p:tgtEl>
                 </p:cond>
               </p:prevCondLst>
               <p:nextCondLst>
-                <p:cond delay="0" evt="onNext">
+                <p:cond evt="onNext" delay="0">
                   <p:tgtEl>
                     <p:sldTgt/>
                   </p:tgtEl>
@@ -6694,6 +8288,8 @@
       </a:bgFillStyleLst>
     </a:fmtScheme>
   </a:themeElements>
+  <a:objectDefaults/>
+  <a:extraClrSchemeLst/>
 </a:theme>
 </file>
 
@@ -6917,6 +8513,8 @@
       </a:bgFillStyleLst>
     </a:fmtScheme>
   </a:themeElements>
+  <a:objectDefaults/>
+  <a:extraClrSchemeLst/>
 </a:theme>
 </file>
 
@@ -7140,5 +8738,7 @@
       </a:bgFillStyleLst>
     </a:fmtScheme>
   </a:themeElements>
+  <a:objectDefaults/>
+  <a:extraClrSchemeLst/>
 </a:theme>
 </file>
</xml_diff>

<commit_message>
last minute slide changes
</commit_message>
<xml_diff>
--- a/Contest.pptx
+++ b/Contest.pptx
@@ -6,6 +6,9 @@
     <p:sldMasterId id="2147483661" r:id="rId2"/>
     <p:sldMasterId id="2147483674" r:id="rId3"/>
   </p:sldMasterIdLst>
+  <p:notesMasterIdLst>
+    <p:notesMasterId r:id="rId17"/>
+  </p:notesMasterIdLst>
   <p:sldIdLst>
     <p:sldId id="256" r:id="rId4"/>
     <p:sldId id="257" r:id="rId5"/>
@@ -16,9 +19,10 @@
     <p:sldId id="262" r:id="rId10"/>
     <p:sldId id="263" r:id="rId11"/>
     <p:sldId id="264" r:id="rId12"/>
-    <p:sldId id="267" r:id="rId13"/>
-    <p:sldId id="268" r:id="rId14"/>
-    <p:sldId id="265" r:id="rId15"/>
+    <p:sldId id="269" r:id="rId13"/>
+    <p:sldId id="267" r:id="rId14"/>
+    <p:sldId id="268" r:id="rId15"/>
+    <p:sldId id="265" r:id="rId16"/>
   </p:sldIdLst>
   <p:sldSz cx="10693400" cy="7561263"/>
   <p:notesSz cx="7559675" cy="10691813"/>
@@ -123,7 +127,7 @@
 <file path=ppt/charts/chart1.xml><?xml version="1.0" encoding="utf-8"?>
 <c:chartSpace xmlns:c="http://schemas.openxmlformats.org/drawingml/2006/chart" xmlns:a="http://schemas.openxmlformats.org/drawingml/2006/main" xmlns:r="http://schemas.openxmlformats.org/officeDocument/2006/relationships">
   <c:date1904 val="0"/>
-  <c:lang val="de-DE"/>
+  <c:lang val="en-US"/>
   <c:roundedCorners val="0"/>
   <mc:AlternateContent xmlns:mc="http://schemas.openxmlformats.org/markup-compatibility/2006">
     <mc:Choice xmlns:c14="http://schemas.microsoft.com/office/drawing/2007/8/2/chart" Requires="c14">
@@ -538,11 +542,11 @@
         </c:dLbls>
         <c:marker val="1"/>
         <c:smooth val="0"/>
-        <c:axId val="-2109819832"/>
-        <c:axId val="-2110116936"/>
+        <c:axId val="2043582632"/>
+        <c:axId val="2094732088"/>
       </c:lineChart>
       <c:catAx>
-        <c:axId val="-2109819832"/>
+        <c:axId val="2043582632"/>
         <c:scaling>
           <c:orientation val="minMax"/>
         </c:scaling>
@@ -571,7 +575,7 @@
         <c:majorTickMark val="out"/>
         <c:minorTickMark val="none"/>
         <c:tickLblPos val="nextTo"/>
-        <c:crossAx val="-2110116936"/>
+        <c:crossAx val="2094732088"/>
         <c:crosses val="autoZero"/>
         <c:auto val="1"/>
         <c:lblAlgn val="ctr"/>
@@ -579,7 +583,7 @@
         <c:noMultiLvlLbl val="0"/>
       </c:catAx>
       <c:valAx>
-        <c:axId val="-2110116936"/>
+        <c:axId val="2094732088"/>
         <c:scaling>
           <c:orientation val="minMax"/>
         </c:scaling>
@@ -609,7 +613,7 @@
         <c:majorTickMark val="out"/>
         <c:minorTickMark val="none"/>
         <c:tickLblPos val="nextTo"/>
-        <c:crossAx val="-2109819832"/>
+        <c:crossAx val="2043582632"/>
         <c:crosses val="autoZero"/>
         <c:crossBetween val="between"/>
       </c:valAx>
@@ -632,7 +636,7 @@
 <file path=ppt/charts/chart2.xml><?xml version="1.0" encoding="utf-8"?>
 <c:chartSpace xmlns:c="http://schemas.openxmlformats.org/drawingml/2006/chart" xmlns:a="http://schemas.openxmlformats.org/drawingml/2006/main" xmlns:r="http://schemas.openxmlformats.org/officeDocument/2006/relationships">
   <c:date1904 val="0"/>
-  <c:lang val="de-DE"/>
+  <c:lang val="en-US"/>
   <c:roundedCorners val="0"/>
   <mc:AlternateContent xmlns:mc="http://schemas.openxmlformats.org/markup-compatibility/2006">
     <mc:Choice xmlns:c14="http://schemas.microsoft.com/office/drawing/2007/8/2/chart" Requires="c14">
@@ -727,19 +731,19 @@
                   <c:v>83.7326607818411</c:v>
                 </c:pt>
                 <c:pt idx="5">
-                  <c:v>82.21941992433795</c:v>
+                  <c:v>82.21941992433798</c:v>
                 </c:pt>
                 <c:pt idx="6">
-                  <c:v>79.82345523329131</c:v>
+                  <c:v>79.8234552332913</c:v>
                 </c:pt>
                 <c:pt idx="7">
-                  <c:v>79.19293820933166</c:v>
+                  <c:v>79.19293820933164</c:v>
                 </c:pt>
                 <c:pt idx="8">
-                  <c:v>77.93190416141236</c:v>
+                  <c:v>77.93190416141237</c:v>
                 </c:pt>
                 <c:pt idx="9">
-                  <c:v>76.79697351828499</c:v>
+                  <c:v>76.79697351828497</c:v>
                 </c:pt>
               </c:numCache>
             </c:numRef>
@@ -812,19 +816,19 @@
                   <c:v>93.69482976040352</c:v>
                 </c:pt>
                 <c:pt idx="1">
-                  <c:v>92.55989911727616</c:v>
+                  <c:v>92.55989911727615</c:v>
                 </c:pt>
                 <c:pt idx="2">
                   <c:v>93.69482976040352</c:v>
                 </c:pt>
                 <c:pt idx="3">
-                  <c:v>95.20807061790669</c:v>
+                  <c:v>95.20807061790667</c:v>
                 </c:pt>
                 <c:pt idx="4">
-                  <c:v>86.25472887767971</c:v>
+                  <c:v>86.2547288776797</c:v>
                 </c:pt>
                 <c:pt idx="5">
-                  <c:v>92.43379571248424</c:v>
+                  <c:v>92.43379571248421</c:v>
                 </c:pt>
                 <c:pt idx="6">
                   <c:v>91.29886506935687</c:v>
@@ -836,7 +840,7 @@
                   <c:v>95.83858764186634</c:v>
                 </c:pt>
                 <c:pt idx="9">
-                  <c:v>94.57755359394704</c:v>
+                  <c:v>94.57755359394705</c:v>
                 </c:pt>
               </c:numCache>
             </c:numRef>
@@ -853,11 +857,11 @@
         </c:dLbls>
         <c:marker val="1"/>
         <c:smooth val="0"/>
-        <c:axId val="-2111782376"/>
-        <c:axId val="-2111827208"/>
+        <c:axId val="2056728392"/>
+        <c:axId val="2043349032"/>
       </c:lineChart>
       <c:catAx>
-        <c:axId val="-2111782376"/>
+        <c:axId val="2056728392"/>
         <c:scaling>
           <c:orientation val="minMax"/>
         </c:scaling>
@@ -886,7 +890,7 @@
         <c:majorTickMark val="out"/>
         <c:minorTickMark val="none"/>
         <c:tickLblPos val="nextTo"/>
-        <c:crossAx val="-2111827208"/>
+        <c:crossAx val="2043349032"/>
         <c:crosses val="autoZero"/>
         <c:auto val="1"/>
         <c:lblAlgn val="ctr"/>
@@ -894,7 +898,7 @@
         <c:noMultiLvlLbl val="0"/>
       </c:catAx>
       <c:valAx>
-        <c:axId val="-2111827208"/>
+        <c:axId val="2043349032"/>
         <c:scaling>
           <c:orientation val="minMax"/>
         </c:scaling>
@@ -924,7 +928,7 @@
         <c:majorTickMark val="out"/>
         <c:minorTickMark val="none"/>
         <c:tickLblPos val="nextTo"/>
-        <c:crossAx val="-2111782376"/>
+        <c:crossAx val="2056728392"/>
         <c:crosses val="autoZero"/>
         <c:crossBetween val="between"/>
       </c:valAx>
@@ -942,6 +946,456 @@
     <c:autoUpdate val="0"/>
   </c:externalData>
 </c:chartSpace>
+</file>
+
+<file path=ppt/notesMasters/notesMaster1.xml><?xml version="1.0" encoding="utf-8"?>
+<p:notesMaster xmlns:a="http://schemas.openxmlformats.org/drawingml/2006/main" xmlns:r="http://schemas.openxmlformats.org/officeDocument/2006/relationships" xmlns:p="http://schemas.openxmlformats.org/presentationml/2006/main">
+  <p:cSld>
+    <p:bg>
+      <p:bgRef idx="1001">
+        <a:schemeClr val="bg1"/>
+      </p:bgRef>
+    </p:bg>
+    <p:spTree>
+      <p:nvGrpSpPr>
+        <p:cNvPr id="1" name=""/>
+        <p:cNvGrpSpPr/>
+        <p:nvPr/>
+      </p:nvGrpSpPr>
+      <p:grpSpPr>
+        <a:xfrm>
+          <a:off x="0" y="0"/>
+          <a:ext cx="0" cy="0"/>
+          <a:chOff x="0" y="0"/>
+          <a:chExt cx="0" cy="0"/>
+        </a:xfrm>
+      </p:grpSpPr>
+      <p:sp>
+        <p:nvSpPr>
+          <p:cNvPr id="2" name="Header Placeholder 1"/>
+          <p:cNvSpPr>
+            <a:spLocks noGrp="1"/>
+          </p:cNvSpPr>
+          <p:nvPr>
+            <p:ph type="hdr" sz="quarter"/>
+          </p:nvPr>
+        </p:nvSpPr>
+        <p:spPr>
+          <a:xfrm>
+            <a:off x="0" y="0"/>
+            <a:ext cx="3276600" cy="534988"/>
+          </a:xfrm>
+          <a:prstGeom prst="rect">
+            <a:avLst/>
+          </a:prstGeom>
+        </p:spPr>
+        <p:txBody>
+          <a:bodyPr vert="horz" lIns="91440" tIns="45720" rIns="91440" bIns="45720" rtlCol="0"/>
+          <a:lstStyle>
+            <a:lvl1pPr algn="l">
+              <a:defRPr sz="1200"/>
+            </a:lvl1pPr>
+          </a:lstStyle>
+          <a:p>
+            <a:endParaRPr lang="en-US"/>
+          </a:p>
+        </p:txBody>
+      </p:sp>
+      <p:sp>
+        <p:nvSpPr>
+          <p:cNvPr id="3" name="Date Placeholder 2"/>
+          <p:cNvSpPr>
+            <a:spLocks noGrp="1"/>
+          </p:cNvSpPr>
+          <p:nvPr>
+            <p:ph type="dt" idx="1"/>
+          </p:nvPr>
+        </p:nvSpPr>
+        <p:spPr>
+          <a:xfrm>
+            <a:off x="4281488" y="0"/>
+            <a:ext cx="3276600" cy="534988"/>
+          </a:xfrm>
+          <a:prstGeom prst="rect">
+            <a:avLst/>
+          </a:prstGeom>
+        </p:spPr>
+        <p:txBody>
+          <a:bodyPr vert="horz" lIns="91440" tIns="45720" rIns="91440" bIns="45720" rtlCol="0"/>
+          <a:lstStyle>
+            <a:lvl1pPr algn="r">
+              <a:defRPr sz="1200"/>
+            </a:lvl1pPr>
+          </a:lstStyle>
+          <a:p>
+            <a:fld id="{C184181A-207B-0C49-BF98-2B3835C8D9A7}" type="datetimeFigureOut">
+              <a:rPr lang="en-US" smtClean="0"/>
+              <a:t>05.06.13</a:t>
+            </a:fld>
+            <a:endParaRPr lang="en-US"/>
+          </a:p>
+        </p:txBody>
+      </p:sp>
+      <p:sp>
+        <p:nvSpPr>
+          <p:cNvPr id="4" name="Slide Image Placeholder 3"/>
+          <p:cNvSpPr>
+            <a:spLocks noGrp="1" noRot="1" noChangeAspect="1"/>
+          </p:cNvSpPr>
+          <p:nvPr>
+            <p:ph type="sldImg" idx="2"/>
+          </p:nvPr>
+        </p:nvSpPr>
+        <p:spPr>
+          <a:xfrm>
+            <a:off x="944563" y="801688"/>
+            <a:ext cx="5670550" cy="4010025"/>
+          </a:xfrm>
+          <a:prstGeom prst="rect">
+            <a:avLst/>
+          </a:prstGeom>
+          <a:noFill/>
+          <a:ln w="12700">
+            <a:solidFill>
+              <a:prstClr val="black"/>
+            </a:solidFill>
+          </a:ln>
+        </p:spPr>
+        <p:txBody>
+          <a:bodyPr vert="horz" lIns="91440" tIns="45720" rIns="91440" bIns="45720" rtlCol="0" anchor="ctr"/>
+          <a:lstStyle/>
+          <a:p>
+            <a:endParaRPr lang="en-US"/>
+          </a:p>
+        </p:txBody>
+      </p:sp>
+      <p:sp>
+        <p:nvSpPr>
+          <p:cNvPr id="5" name="Notes Placeholder 4"/>
+          <p:cNvSpPr>
+            <a:spLocks noGrp="1"/>
+          </p:cNvSpPr>
+          <p:nvPr>
+            <p:ph type="body" sz="quarter" idx="3"/>
+          </p:nvPr>
+        </p:nvSpPr>
+        <p:spPr>
+          <a:xfrm>
+            <a:off x="755650" y="5078413"/>
+            <a:ext cx="6048375" cy="4811712"/>
+          </a:xfrm>
+          <a:prstGeom prst="rect">
+            <a:avLst/>
+          </a:prstGeom>
+        </p:spPr>
+        <p:txBody>
+          <a:bodyPr vert="horz" lIns="91440" tIns="45720" rIns="91440" bIns="45720" rtlCol="0"/>
+          <a:lstStyle/>
+          <a:p>
+            <a:pPr lvl="0"/>
+            <a:r>
+              <a:rPr lang="de-CH" smtClean="0"/>
+              <a:t>Click to edit Master text styles</a:t>
+            </a:r>
+          </a:p>
+          <a:p>
+            <a:pPr lvl="1"/>
+            <a:r>
+              <a:rPr lang="de-CH" smtClean="0"/>
+              <a:t>Second level</a:t>
+            </a:r>
+          </a:p>
+          <a:p>
+            <a:pPr lvl="2"/>
+            <a:r>
+              <a:rPr lang="de-CH" smtClean="0"/>
+              <a:t>Third level</a:t>
+            </a:r>
+          </a:p>
+          <a:p>
+            <a:pPr lvl="3"/>
+            <a:r>
+              <a:rPr lang="de-CH" smtClean="0"/>
+              <a:t>Fourth level</a:t>
+            </a:r>
+          </a:p>
+          <a:p>
+            <a:pPr lvl="4"/>
+            <a:r>
+              <a:rPr lang="de-CH" smtClean="0"/>
+              <a:t>Fifth level</a:t>
+            </a:r>
+            <a:endParaRPr lang="en-US"/>
+          </a:p>
+        </p:txBody>
+      </p:sp>
+      <p:sp>
+        <p:nvSpPr>
+          <p:cNvPr id="6" name="Footer Placeholder 5"/>
+          <p:cNvSpPr>
+            <a:spLocks noGrp="1"/>
+          </p:cNvSpPr>
+          <p:nvPr>
+            <p:ph type="ftr" sz="quarter" idx="4"/>
+          </p:nvPr>
+        </p:nvSpPr>
+        <p:spPr>
+          <a:xfrm>
+            <a:off x="0" y="10155238"/>
+            <a:ext cx="3276600" cy="534987"/>
+          </a:xfrm>
+          <a:prstGeom prst="rect">
+            <a:avLst/>
+          </a:prstGeom>
+        </p:spPr>
+        <p:txBody>
+          <a:bodyPr vert="horz" lIns="91440" tIns="45720" rIns="91440" bIns="45720" rtlCol="0" anchor="b"/>
+          <a:lstStyle>
+            <a:lvl1pPr algn="l">
+              <a:defRPr sz="1200"/>
+            </a:lvl1pPr>
+          </a:lstStyle>
+          <a:p>
+            <a:endParaRPr lang="en-US"/>
+          </a:p>
+        </p:txBody>
+      </p:sp>
+      <p:sp>
+        <p:nvSpPr>
+          <p:cNvPr id="7" name="Slide Number Placeholder 6"/>
+          <p:cNvSpPr>
+            <a:spLocks noGrp="1"/>
+          </p:cNvSpPr>
+          <p:nvPr>
+            <p:ph type="sldNum" sz="quarter" idx="5"/>
+          </p:nvPr>
+        </p:nvSpPr>
+        <p:spPr>
+          <a:xfrm>
+            <a:off x="4281488" y="10155238"/>
+            <a:ext cx="3276600" cy="534987"/>
+          </a:xfrm>
+          <a:prstGeom prst="rect">
+            <a:avLst/>
+          </a:prstGeom>
+        </p:spPr>
+        <p:txBody>
+          <a:bodyPr vert="horz" lIns="91440" tIns="45720" rIns="91440" bIns="45720" rtlCol="0" anchor="b"/>
+          <a:lstStyle>
+            <a:lvl1pPr algn="r">
+              <a:defRPr sz="1200"/>
+            </a:lvl1pPr>
+          </a:lstStyle>
+          <a:p>
+            <a:fld id="{3C082AAF-E8A5-CA4F-B030-53A1DB0BCE5F}" type="slidenum">
+              <a:rPr lang="en-US" smtClean="0"/>
+              <a:t>‹#›</a:t>
+            </a:fld>
+            <a:endParaRPr lang="en-US"/>
+          </a:p>
+        </p:txBody>
+      </p:sp>
+    </p:spTree>
+    <p:extLst>
+      <p:ext uri="{BB962C8B-B14F-4D97-AF65-F5344CB8AC3E}">
+        <p14:creationId xmlns:p14="http://schemas.microsoft.com/office/powerpoint/2010/main" val="328779024"/>
+      </p:ext>
+    </p:extLst>
+  </p:cSld>
+  <p:clrMap bg1="lt1" tx1="dk1" bg2="lt2" tx2="dk2" accent1="accent1" accent2="accent2" accent3="accent3" accent4="accent4" accent5="accent5" accent6="accent6" hlink="hlink" folHlink="folHlink"/>
+  <p:notesStyle>
+    <a:lvl1pPr marL="0" algn="l" defTabSz="457200" rtl="0" eaLnBrk="1" latinLnBrk="0" hangingPunct="1">
+      <a:defRPr sz="1200" kern="1200">
+        <a:solidFill>
+          <a:schemeClr val="tx1"/>
+        </a:solidFill>
+        <a:latin typeface="+mn-lt"/>
+        <a:ea typeface="+mn-ea"/>
+        <a:cs typeface="+mn-cs"/>
+      </a:defRPr>
+    </a:lvl1pPr>
+    <a:lvl2pPr marL="457200" algn="l" defTabSz="457200" rtl="0" eaLnBrk="1" latinLnBrk="0" hangingPunct="1">
+      <a:defRPr sz="1200" kern="1200">
+        <a:solidFill>
+          <a:schemeClr val="tx1"/>
+        </a:solidFill>
+        <a:latin typeface="+mn-lt"/>
+        <a:ea typeface="+mn-ea"/>
+        <a:cs typeface="+mn-cs"/>
+      </a:defRPr>
+    </a:lvl2pPr>
+    <a:lvl3pPr marL="914400" algn="l" defTabSz="457200" rtl="0" eaLnBrk="1" latinLnBrk="0" hangingPunct="1">
+      <a:defRPr sz="1200" kern="1200">
+        <a:solidFill>
+          <a:schemeClr val="tx1"/>
+        </a:solidFill>
+        <a:latin typeface="+mn-lt"/>
+        <a:ea typeface="+mn-ea"/>
+        <a:cs typeface="+mn-cs"/>
+      </a:defRPr>
+    </a:lvl3pPr>
+    <a:lvl4pPr marL="1371600" algn="l" defTabSz="457200" rtl="0" eaLnBrk="1" latinLnBrk="0" hangingPunct="1">
+      <a:defRPr sz="1200" kern="1200">
+        <a:solidFill>
+          <a:schemeClr val="tx1"/>
+        </a:solidFill>
+        <a:latin typeface="+mn-lt"/>
+        <a:ea typeface="+mn-ea"/>
+        <a:cs typeface="+mn-cs"/>
+      </a:defRPr>
+    </a:lvl4pPr>
+    <a:lvl5pPr marL="1828800" algn="l" defTabSz="457200" rtl="0" eaLnBrk="1" latinLnBrk="0" hangingPunct="1">
+      <a:defRPr sz="1200" kern="1200">
+        <a:solidFill>
+          <a:schemeClr val="tx1"/>
+        </a:solidFill>
+        <a:latin typeface="+mn-lt"/>
+        <a:ea typeface="+mn-ea"/>
+        <a:cs typeface="+mn-cs"/>
+      </a:defRPr>
+    </a:lvl5pPr>
+    <a:lvl6pPr marL="2286000" algn="l" defTabSz="457200" rtl="0" eaLnBrk="1" latinLnBrk="0" hangingPunct="1">
+      <a:defRPr sz="1200" kern="1200">
+        <a:solidFill>
+          <a:schemeClr val="tx1"/>
+        </a:solidFill>
+        <a:latin typeface="+mn-lt"/>
+        <a:ea typeface="+mn-ea"/>
+        <a:cs typeface="+mn-cs"/>
+      </a:defRPr>
+    </a:lvl6pPr>
+    <a:lvl7pPr marL="2743200" algn="l" defTabSz="457200" rtl="0" eaLnBrk="1" latinLnBrk="0" hangingPunct="1">
+      <a:defRPr sz="1200" kern="1200">
+        <a:solidFill>
+          <a:schemeClr val="tx1"/>
+        </a:solidFill>
+        <a:latin typeface="+mn-lt"/>
+        <a:ea typeface="+mn-ea"/>
+        <a:cs typeface="+mn-cs"/>
+      </a:defRPr>
+    </a:lvl7pPr>
+    <a:lvl8pPr marL="3200400" algn="l" defTabSz="457200" rtl="0" eaLnBrk="1" latinLnBrk="0" hangingPunct="1">
+      <a:defRPr sz="1200" kern="1200">
+        <a:solidFill>
+          <a:schemeClr val="tx1"/>
+        </a:solidFill>
+        <a:latin typeface="+mn-lt"/>
+        <a:ea typeface="+mn-ea"/>
+        <a:cs typeface="+mn-cs"/>
+      </a:defRPr>
+    </a:lvl8pPr>
+    <a:lvl9pPr marL="3657600" algn="l" defTabSz="457200" rtl="0" eaLnBrk="1" latinLnBrk="0" hangingPunct="1">
+      <a:defRPr sz="1200" kern="1200">
+        <a:solidFill>
+          <a:schemeClr val="tx1"/>
+        </a:solidFill>
+        <a:latin typeface="+mn-lt"/>
+        <a:ea typeface="+mn-ea"/>
+        <a:cs typeface="+mn-cs"/>
+      </a:defRPr>
+    </a:lvl9pPr>
+  </p:notesStyle>
+</p:notesMaster>
+</file>
+
+<file path=ppt/notesSlides/notesSlide1.xml><?xml version="1.0" encoding="utf-8"?>
+<p:notes xmlns:a="http://schemas.openxmlformats.org/drawingml/2006/main" xmlns:r="http://schemas.openxmlformats.org/officeDocument/2006/relationships" xmlns:p="http://schemas.openxmlformats.org/presentationml/2006/main">
+  <p:cSld>
+    <p:spTree>
+      <p:nvGrpSpPr>
+        <p:cNvPr id="1" name=""/>
+        <p:cNvGrpSpPr/>
+        <p:nvPr/>
+      </p:nvGrpSpPr>
+      <p:grpSpPr>
+        <a:xfrm>
+          <a:off x="0" y="0"/>
+          <a:ext cx="0" cy="0"/>
+          <a:chOff x="0" y="0"/>
+          <a:chExt cx="0" cy="0"/>
+        </a:xfrm>
+      </p:grpSpPr>
+      <p:sp>
+        <p:nvSpPr>
+          <p:cNvPr id="2" name="Slide Image Placeholder 1"/>
+          <p:cNvSpPr>
+            <a:spLocks noGrp="1" noRot="1" noChangeAspect="1"/>
+          </p:cNvSpPr>
+          <p:nvPr>
+            <p:ph type="sldImg"/>
+          </p:nvPr>
+        </p:nvSpPr>
+        <p:spPr/>
+      </p:sp>
+      <p:sp>
+        <p:nvSpPr>
+          <p:cNvPr id="3" name="Notes Placeholder 2"/>
+          <p:cNvSpPr>
+            <a:spLocks noGrp="1"/>
+          </p:cNvSpPr>
+          <p:nvPr>
+            <p:ph type="body" idx="1"/>
+          </p:nvPr>
+        </p:nvSpPr>
+        <p:spPr/>
+        <p:txBody>
+          <a:bodyPr/>
+          <a:lstStyle/>
+          <a:p>
+            <a:r>
+              <a:rPr lang="en-US" dirty="0" smtClean="0"/>
+              <a:t>90% </a:t>
+            </a:r>
+            <a:r>
+              <a:rPr lang="en-US" dirty="0" err="1" smtClean="0"/>
+              <a:t>oder</a:t>
+            </a:r>
+            <a:r>
+              <a:rPr lang="en-US" baseline="0" dirty="0" smtClean="0"/>
+              <a:t> 200 </a:t>
+            </a:r>
+            <a:r>
+              <a:rPr lang="en-US" baseline="0" dirty="0" err="1" smtClean="0"/>
+              <a:t>Iterationen</a:t>
+            </a:r>
+            <a:endParaRPr lang="en-US" dirty="0"/>
+          </a:p>
+        </p:txBody>
+      </p:sp>
+      <p:sp>
+        <p:nvSpPr>
+          <p:cNvPr id="4" name="Slide Number Placeholder 3"/>
+          <p:cNvSpPr>
+            <a:spLocks noGrp="1"/>
+          </p:cNvSpPr>
+          <p:nvPr>
+            <p:ph type="sldNum" sz="quarter" idx="10"/>
+          </p:nvPr>
+        </p:nvSpPr>
+        <p:spPr/>
+        <p:txBody>
+          <a:bodyPr/>
+          <a:lstStyle/>
+          <a:p>
+            <a:fld id="{3C082AAF-E8A5-CA4F-B030-53A1DB0BCE5F}" type="slidenum">
+              <a:rPr lang="en-US" smtClean="0"/>
+              <a:t>11</a:t>
+            </a:fld>
+            <a:endParaRPr lang="en-US"/>
+          </a:p>
+        </p:txBody>
+      </p:sp>
+    </p:spTree>
+    <p:extLst>
+      <p:ext uri="{BB962C8B-B14F-4D97-AF65-F5344CB8AC3E}">
+        <p14:creationId xmlns:p14="http://schemas.microsoft.com/office/powerpoint/2010/main" val="794740156"/>
+      </p:ext>
+    </p:extLst>
+  </p:cSld>
+  <p:clrMapOvr>
+    <a:masterClrMapping/>
+  </p:clrMapOvr>
+</p:notes>
 </file>
 
 <file path=ppt/slideLayouts/slideLayout1.xml><?xml version="1.0" encoding="utf-8"?>
@@ -5351,6 +5805,13 @@
   <p:clrMapOvr>
     <a:masterClrMapping/>
   </p:clrMapOvr>
+  <p:timing>
+    <p:tnLst>
+      <p:par>
+        <p:cTn xmlns:p14="http://schemas.microsoft.com/office/powerpoint/2010/main" id="1" dur="indefinite" restart="never" nodeType="tmRoot"/>
+      </p:par>
+    </p:tnLst>
+  </p:timing>
 </p:sld>
 </file>
 
@@ -5519,34 +5980,388 @@
           </a:p>
         </p:txBody>
       </p:sp>
-      <p:graphicFrame>
-        <p:nvGraphicFramePr>
-          <p:cNvPr id="8" name="Diagramm 7"/>
-          <p:cNvGraphicFramePr>
-            <a:graphicFrameLocks/>
-          </p:cNvGraphicFramePr>
-          <p:nvPr>
-            <p:extLst>
-              <p:ext uri="{D42A27DB-BD31-4B8C-83A1-F6EECF244321}">
-                <p14:modId xmlns:p14="http://schemas.microsoft.com/office/powerpoint/2010/main" val="2123035825"/>
-              </p:ext>
-            </p:extLst>
-          </p:nvPr>
-        </p:nvGraphicFramePr>
-        <p:xfrm>
-          <a:off x="736560" y="2004457"/>
-          <a:ext cx="9213120" cy="4832350"/>
-        </p:xfrm>
-        <a:graphic>
-          <a:graphicData uri="http://schemas.openxmlformats.org/drawingml/2006/chart">
-            <c:chart xmlns:c="http://schemas.openxmlformats.org/drawingml/2006/chart" xmlns:r="http://schemas.openxmlformats.org/officeDocument/2006/relationships" r:id="rId2"/>
-          </a:graphicData>
-        </a:graphic>
-      </p:graphicFrame>
+      <p:sp>
+        <p:nvSpPr>
+          <p:cNvPr id="152" name="CustomShape 5"/>
+          <p:cNvSpPr/>
+          <p:nvPr/>
+        </p:nvSpPr>
+        <p:spPr>
+          <a:xfrm>
+            <a:off x="738360" y="2197080"/>
+            <a:ext cx="9213120" cy="4463280"/>
+          </a:xfrm>
+          <a:prstGeom prst="rect">
+            <a:avLst/>
+          </a:prstGeom>
+        </p:spPr>
+        <p:txBody>
+          <a:bodyPr lIns="0" tIns="0" rIns="0" bIns="0"/>
+          <a:lstStyle/>
+          <a:p>
+            <a:pPr>
+              <a:lnSpc>
+                <a:spcPct val="100000"/>
+              </a:lnSpc>
+              <a:buFont typeface="Arial"/>
+              <a:buChar char="•"/>
+            </a:pPr>
+            <a:r>
+              <a:rPr lang="en-US" sz="2000" dirty="0">
+                <a:solidFill>
+                  <a:srgbClr val="000000"/>
+                </a:solidFill>
+                <a:latin typeface="Calibri"/>
+              </a:rPr>
+              <a:t> </a:t>
+            </a:r>
+            <a:r>
+              <a:rPr lang="en-US" sz="2000" dirty="0" smtClean="0">
+                <a:solidFill>
+                  <a:srgbClr val="000000"/>
+                </a:solidFill>
+                <a:latin typeface="Calibri"/>
+              </a:rPr>
+              <a:t>Clustering </a:t>
+            </a:r>
+            <a:r>
+              <a:rPr lang="en-US" sz="2000" dirty="0" err="1" smtClean="0">
+                <a:solidFill>
+                  <a:srgbClr val="000000"/>
+                </a:solidFill>
+                <a:latin typeface="Calibri"/>
+              </a:rPr>
+              <a:t>zufällig</a:t>
+            </a:r>
+            <a:r>
+              <a:rPr lang="en-US" sz="2000" dirty="0" smtClean="0">
+                <a:solidFill>
+                  <a:srgbClr val="000000"/>
+                </a:solidFill>
+                <a:latin typeface="Calibri"/>
+              </a:rPr>
+              <a:t> </a:t>
+            </a:r>
+            <a:r>
+              <a:rPr lang="en-US" sz="2000" dirty="0" err="1" smtClean="0">
+                <a:solidFill>
+                  <a:srgbClr val="000000"/>
+                </a:solidFill>
+                <a:latin typeface="Calibri"/>
+              </a:rPr>
+              <a:t>wählen</a:t>
+            </a:r>
+            <a:endParaRPr lang="en-US" sz="2000" dirty="0" smtClean="0">
+              <a:solidFill>
+                <a:srgbClr val="000000"/>
+              </a:solidFill>
+              <a:latin typeface="Calibri"/>
+            </a:endParaRPr>
+          </a:p>
+          <a:p>
+            <a:pPr lvl="1">
+              <a:buFont typeface="Arial"/>
+              <a:buChar char="•"/>
+            </a:pPr>
+            <a:r>
+              <a:rPr lang="en-US" dirty="0" smtClean="0">
+                <a:solidFill>
+                  <a:srgbClr val="000000"/>
+                </a:solidFill>
+                <a:latin typeface="Calibri"/>
+              </a:rPr>
+              <a:t> </a:t>
+            </a:r>
+            <a:r>
+              <a:rPr lang="en-US" dirty="0" err="1" smtClean="0">
+                <a:solidFill>
+                  <a:srgbClr val="000000"/>
+                </a:solidFill>
+                <a:latin typeface="Calibri"/>
+              </a:rPr>
+              <a:t>Einbusse</a:t>
+            </a:r>
+            <a:r>
+              <a:rPr lang="en-US" dirty="0" smtClean="0">
+                <a:solidFill>
+                  <a:srgbClr val="000000"/>
+                </a:solidFill>
+                <a:latin typeface="Calibri"/>
+              </a:rPr>
+              <a:t>: ca. </a:t>
+            </a:r>
+            <a:r>
+              <a:rPr lang="en-US" dirty="0" smtClean="0">
+                <a:solidFill>
+                  <a:srgbClr val="000000"/>
+                </a:solidFill>
+                <a:latin typeface="Calibri"/>
+              </a:rPr>
+              <a:t>5% in der </a:t>
+            </a:r>
+            <a:r>
+              <a:rPr lang="en-US" dirty="0" err="1" smtClean="0">
+                <a:solidFill>
+                  <a:srgbClr val="000000"/>
+                </a:solidFill>
+                <a:latin typeface="Calibri"/>
+              </a:rPr>
+              <a:t>Genauigkeit</a:t>
+            </a:r>
+            <a:endParaRPr lang="en-US" dirty="0" smtClean="0">
+              <a:solidFill>
+                <a:srgbClr val="000000"/>
+              </a:solidFill>
+              <a:latin typeface="Calibri"/>
+            </a:endParaRPr>
+          </a:p>
+          <a:p>
+            <a:pPr lvl="1">
+              <a:buFont typeface="Arial"/>
+              <a:buChar char="•"/>
+            </a:pPr>
+            <a:r>
+              <a:rPr lang="en-US" dirty="0">
+                <a:solidFill>
+                  <a:srgbClr val="000000"/>
+                </a:solidFill>
+                <a:latin typeface="Calibri"/>
+              </a:rPr>
+              <a:t> </a:t>
+            </a:r>
+            <a:r>
+              <a:rPr lang="en-US" dirty="0" err="1" smtClean="0">
+                <a:solidFill>
+                  <a:srgbClr val="000000"/>
+                </a:solidFill>
+                <a:latin typeface="Calibri"/>
+              </a:rPr>
+              <a:t>Zeitgewinn</a:t>
+            </a:r>
+            <a:r>
+              <a:rPr lang="en-US" dirty="0" smtClean="0">
+                <a:solidFill>
+                  <a:srgbClr val="000000"/>
+                </a:solidFill>
+                <a:latin typeface="Calibri"/>
+              </a:rPr>
+              <a:t>: </a:t>
+            </a:r>
+            <a:r>
+              <a:rPr lang="en-US" dirty="0" err="1" smtClean="0">
+                <a:solidFill>
+                  <a:srgbClr val="000000"/>
+                </a:solidFill>
+                <a:latin typeface="Calibri"/>
+              </a:rPr>
+              <a:t>sehr</a:t>
+            </a:r>
+            <a:r>
+              <a:rPr lang="en-US" dirty="0" smtClean="0">
+                <a:solidFill>
+                  <a:srgbClr val="000000"/>
+                </a:solidFill>
+                <a:latin typeface="Calibri"/>
+              </a:rPr>
+              <a:t> gross</a:t>
+            </a:r>
+          </a:p>
+          <a:p>
+            <a:pPr>
+              <a:buFont typeface="Arial"/>
+              <a:buChar char="•"/>
+            </a:pPr>
+            <a:r>
+              <a:rPr lang="en-US" dirty="0">
+                <a:solidFill>
+                  <a:srgbClr val="000000"/>
+                </a:solidFill>
+                <a:latin typeface="Calibri"/>
+              </a:rPr>
+              <a:t> </a:t>
+            </a:r>
+            <a:r>
+              <a:rPr lang="en-US" dirty="0" err="1" smtClean="0">
+                <a:solidFill>
+                  <a:srgbClr val="000000"/>
+                </a:solidFill>
+                <a:latin typeface="Calibri"/>
+              </a:rPr>
+              <a:t>Anzahl</a:t>
+            </a:r>
+            <a:r>
+              <a:rPr lang="en-US" dirty="0" smtClean="0">
+                <a:solidFill>
+                  <a:srgbClr val="000000"/>
+                </a:solidFill>
+                <a:latin typeface="Calibri"/>
+              </a:rPr>
+              <a:t> Features</a:t>
+            </a:r>
+          </a:p>
+          <a:p>
+            <a:pPr lvl="1">
+              <a:buFont typeface="Arial"/>
+              <a:buChar char="•"/>
+            </a:pPr>
+            <a:r>
+              <a:rPr lang="en-US" dirty="0">
+                <a:solidFill>
+                  <a:srgbClr val="000000"/>
+                </a:solidFill>
+                <a:latin typeface="Calibri"/>
+              </a:rPr>
+              <a:t> </a:t>
+            </a:r>
+            <a:r>
+              <a:rPr lang="en-US" dirty="0" err="1" smtClean="0">
+                <a:solidFill>
+                  <a:srgbClr val="000000"/>
+                </a:solidFill>
+                <a:latin typeface="Calibri"/>
+              </a:rPr>
+              <a:t>Genauigkeit</a:t>
+            </a:r>
+            <a:r>
+              <a:rPr lang="en-US" dirty="0" smtClean="0">
+                <a:solidFill>
+                  <a:srgbClr val="000000"/>
+                </a:solidFill>
+                <a:latin typeface="Calibri"/>
+              </a:rPr>
+              <a:t> </a:t>
+            </a:r>
+            <a:r>
+              <a:rPr lang="en-US" dirty="0" err="1" smtClean="0">
+                <a:solidFill>
+                  <a:srgbClr val="000000"/>
+                </a:solidFill>
+                <a:latin typeface="Calibri"/>
+              </a:rPr>
+              <a:t>kein</a:t>
+            </a:r>
+            <a:r>
+              <a:rPr lang="en-US" dirty="0" smtClean="0">
+                <a:solidFill>
+                  <a:srgbClr val="000000"/>
+                </a:solidFill>
+                <a:latin typeface="Calibri"/>
+              </a:rPr>
+              <a:t> </a:t>
+            </a:r>
+            <a:r>
+              <a:rPr lang="en-US" dirty="0" err="1" smtClean="0">
+                <a:solidFill>
+                  <a:srgbClr val="000000"/>
+                </a:solidFill>
+                <a:latin typeface="Calibri"/>
+              </a:rPr>
+              <a:t>grossen</a:t>
+            </a:r>
+            <a:r>
+              <a:rPr lang="en-US" dirty="0" smtClean="0">
+                <a:solidFill>
+                  <a:srgbClr val="000000"/>
+                </a:solidFill>
+                <a:latin typeface="Calibri"/>
+              </a:rPr>
+              <a:t> </a:t>
+            </a:r>
+            <a:r>
+              <a:rPr lang="en-US" dirty="0" err="1" smtClean="0">
+                <a:solidFill>
+                  <a:srgbClr val="000000"/>
+                </a:solidFill>
+                <a:latin typeface="Calibri"/>
+              </a:rPr>
+              <a:t>Einfluss</a:t>
+            </a:r>
+            <a:endParaRPr lang="en-US" dirty="0" smtClean="0">
+              <a:solidFill>
+                <a:srgbClr val="000000"/>
+              </a:solidFill>
+              <a:latin typeface="Calibri"/>
+            </a:endParaRPr>
+          </a:p>
+          <a:p>
+            <a:pPr lvl="1">
+              <a:buFont typeface="Arial"/>
+              <a:buChar char="•"/>
+            </a:pPr>
+            <a:r>
+              <a:rPr lang="en-US" dirty="0" smtClean="0">
+                <a:solidFill>
+                  <a:srgbClr val="000000"/>
+                </a:solidFill>
+                <a:latin typeface="Calibri"/>
+              </a:rPr>
+              <a:t> </a:t>
+            </a:r>
+            <a:r>
+              <a:rPr lang="en-US" dirty="0" err="1" smtClean="0">
+                <a:solidFill>
+                  <a:srgbClr val="000000"/>
+                </a:solidFill>
+                <a:latin typeface="Calibri"/>
+              </a:rPr>
+              <a:t>Zeit</a:t>
+            </a:r>
+            <a:r>
+              <a:rPr lang="en-US" dirty="0" smtClean="0">
+                <a:solidFill>
+                  <a:srgbClr val="000000"/>
+                </a:solidFill>
+                <a:latin typeface="Calibri"/>
+              </a:rPr>
+              <a:t> </a:t>
+            </a:r>
+            <a:r>
+              <a:rPr lang="en-US" dirty="0" err="1" smtClean="0">
+                <a:solidFill>
+                  <a:srgbClr val="000000"/>
+                </a:solidFill>
+                <a:latin typeface="Calibri"/>
+              </a:rPr>
+              <a:t>nimmt</a:t>
+            </a:r>
+            <a:r>
+              <a:rPr lang="en-US" dirty="0" smtClean="0">
+                <a:solidFill>
+                  <a:srgbClr val="000000"/>
+                </a:solidFill>
+                <a:latin typeface="Calibri"/>
+              </a:rPr>
+              <a:t> </a:t>
+            </a:r>
+            <a:r>
+              <a:rPr lang="en-US" smtClean="0">
+                <a:solidFill>
+                  <a:srgbClr val="000000"/>
+                </a:solidFill>
+                <a:latin typeface="Calibri"/>
+              </a:rPr>
+              <a:t>zu</a:t>
+            </a:r>
+            <a:endParaRPr lang="en-US" dirty="0" smtClean="0">
+              <a:solidFill>
+                <a:srgbClr val="000000"/>
+              </a:solidFill>
+              <a:latin typeface="Calibri"/>
+            </a:endParaRPr>
+          </a:p>
+          <a:p>
+            <a:pPr>
+              <a:buFont typeface="Arial"/>
+              <a:buChar char="•"/>
+            </a:pPr>
+            <a:endParaRPr dirty="0"/>
+          </a:p>
+        </p:txBody>
+      </p:sp>
     </p:spTree>
     <p:extLst>
       <p:ext uri="{BB962C8B-B14F-4D97-AF65-F5344CB8AC3E}">
-        <p14:creationId xmlns:p14="http://schemas.microsoft.com/office/powerpoint/2010/main" val="1497363059"/>
+        <p14:creationId xmlns:p14="http://schemas.microsoft.com/office/powerpoint/2010/main" val="2766054698"/>
       </p:ext>
     </p:extLst>
   </p:cSld>
@@ -5757,25 +6572,25 @@
           <p:nvPr>
             <p:extLst>
               <p:ext uri="{D42A27DB-BD31-4B8C-83A1-F6EECF244321}">
-                <p14:modId xmlns:p14="http://schemas.microsoft.com/office/powerpoint/2010/main" val="2300890442"/>
+                <p14:modId xmlns:p14="http://schemas.microsoft.com/office/powerpoint/2010/main" val="2123035825"/>
               </p:ext>
             </p:extLst>
           </p:nvPr>
         </p:nvGraphicFramePr>
         <p:xfrm>
-          <a:off x="736560" y="1891837"/>
-          <a:ext cx="9213120" cy="4889500"/>
+          <a:off x="736560" y="2004457"/>
+          <a:ext cx="9213120" cy="4832350"/>
         </p:xfrm>
         <a:graphic>
           <a:graphicData uri="http://schemas.openxmlformats.org/drawingml/2006/chart">
-            <c:chart xmlns:c="http://schemas.openxmlformats.org/drawingml/2006/chart" xmlns:r="http://schemas.openxmlformats.org/officeDocument/2006/relationships" r:id="rId2"/>
+            <c:chart xmlns:c="http://schemas.openxmlformats.org/drawingml/2006/chart" xmlns:r="http://schemas.openxmlformats.org/officeDocument/2006/relationships" r:id="rId3"/>
           </a:graphicData>
         </a:graphic>
       </p:graphicFrame>
     </p:spTree>
     <p:extLst>
       <p:ext uri="{BB962C8B-B14F-4D97-AF65-F5344CB8AC3E}">
-        <p14:creationId xmlns:p14="http://schemas.microsoft.com/office/powerpoint/2010/main" val="574254658"/>
+        <p14:creationId xmlns:p14="http://schemas.microsoft.com/office/powerpoint/2010/main" val="1497363059"/>
       </p:ext>
     </p:extLst>
   </p:cSld>
@@ -5829,6 +6644,235 @@
           <a:chExt cx="0" cy="0"/>
         </a:xfrm>
       </p:grpSpPr>
+      <p:sp>
+        <p:nvSpPr>
+          <p:cNvPr id="148" name="CustomShape 1"/>
+          <p:cNvSpPr/>
+          <p:nvPr/>
+        </p:nvSpPr>
+        <p:spPr>
+          <a:xfrm>
+            <a:off x="8221680" y="7197840"/>
+            <a:ext cx="864360" cy="178560"/>
+          </a:xfrm>
+          <a:prstGeom prst="rect">
+            <a:avLst/>
+          </a:prstGeom>
+        </p:spPr>
+        <p:txBody>
+          <a:bodyPr lIns="0" tIns="0" rIns="0" bIns="0" anchor="b"/>
+          <a:lstStyle/>
+          <a:p>
+            <a:pPr>
+              <a:lnSpc>
+                <a:spcPct val="100000"/>
+              </a:lnSpc>
+            </a:pPr>
+            <a:r>
+              <a:rPr lang="en-US" sz="1200">
+                <a:solidFill>
+                  <a:srgbClr val="000000"/>
+                </a:solidFill>
+                <a:latin typeface="Calibri"/>
+              </a:rPr>
+              <a:t>6/5/13</a:t>
+            </a:r>
+            <a:endParaRPr/>
+          </a:p>
+        </p:txBody>
+      </p:sp>
+      <p:sp>
+        <p:nvSpPr>
+          <p:cNvPr id="149" name="CustomShape 2"/>
+          <p:cNvSpPr/>
+          <p:nvPr/>
+        </p:nvSpPr>
+        <p:spPr>
+          <a:xfrm>
+            <a:off x="736560" y="7197840"/>
+            <a:ext cx="7484400" cy="178560"/>
+          </a:xfrm>
+          <a:prstGeom prst="rect">
+            <a:avLst/>
+          </a:prstGeom>
+        </p:spPr>
+        <p:txBody>
+          <a:bodyPr lIns="0" tIns="0" rIns="0" bIns="0" anchor="b"/>
+          <a:lstStyle/>
+          <a:p>
+            <a:pPr>
+              <a:lnSpc>
+                <a:spcPct val="100000"/>
+              </a:lnSpc>
+            </a:pPr>
+            <a:r>
+              <a:rPr lang="en-US" sz="1200">
+                <a:solidFill>
+                  <a:srgbClr val="000000"/>
+                </a:solidFill>
+                <a:latin typeface="Calibri"/>
+              </a:rPr>
+              <a:t>Terrorismus</a:t>
+            </a:r>
+            <a:endParaRPr/>
+          </a:p>
+        </p:txBody>
+      </p:sp>
+      <p:sp>
+        <p:nvSpPr>
+          <p:cNvPr id="150" name="CustomShape 3"/>
+          <p:cNvSpPr/>
+          <p:nvPr/>
+        </p:nvSpPr>
+        <p:spPr>
+          <a:xfrm>
+            <a:off x="9086760" y="7197840"/>
+            <a:ext cx="862920" cy="178560"/>
+          </a:xfrm>
+          <a:prstGeom prst="rect">
+            <a:avLst/>
+          </a:prstGeom>
+        </p:spPr>
+        <p:txBody>
+          <a:bodyPr lIns="0" tIns="0" rIns="0" bIns="0" anchor="b"/>
+          <a:lstStyle/>
+          <a:p>
+            <a:pPr>
+              <a:lnSpc>
+                <a:spcPct val="100000"/>
+              </a:lnSpc>
+            </a:pPr>
+            <a:fld id="{21FBB5D7-22DB-470E-AA37-9D582303BBB4}" type="slidenum">
+              <a:rPr lang="en-US" sz="1200">
+                <a:solidFill>
+                  <a:srgbClr val="000000"/>
+                </a:solidFill>
+                <a:latin typeface="Calibri"/>
+              </a:rPr>
+              <a:t>12</a:t>
+            </a:fld>
+            <a:endParaRPr/>
+          </a:p>
+        </p:txBody>
+      </p:sp>
+      <p:sp>
+        <p:nvSpPr>
+          <p:cNvPr id="151" name="CustomShape 4"/>
+          <p:cNvSpPr/>
+          <p:nvPr/>
+        </p:nvSpPr>
+        <p:spPr>
+          <a:xfrm>
+            <a:off x="736560" y="1509840"/>
+            <a:ext cx="9213120" cy="361080"/>
+          </a:xfrm>
+          <a:prstGeom prst="rect">
+            <a:avLst/>
+          </a:prstGeom>
+        </p:spPr>
+        <p:txBody>
+          <a:bodyPr lIns="0" tIns="0" rIns="0" bIns="0"/>
+          <a:lstStyle/>
+          <a:p>
+            <a:pPr>
+              <a:lnSpc>
+                <a:spcPct val="100000"/>
+              </a:lnSpc>
+            </a:pPr>
+            <a:r>
+              <a:rPr lang="en-US" sz="2000" b="1" dirty="0" err="1" smtClean="0">
+                <a:solidFill>
+                  <a:srgbClr val="000000"/>
+                </a:solidFill>
+                <a:latin typeface="Calibri"/>
+              </a:rPr>
+              <a:t>Erkenntnisse</a:t>
+            </a:r>
+            <a:endParaRPr dirty="0"/>
+          </a:p>
+        </p:txBody>
+      </p:sp>
+      <p:graphicFrame>
+        <p:nvGraphicFramePr>
+          <p:cNvPr id="8" name="Diagramm 7"/>
+          <p:cNvGraphicFramePr>
+            <a:graphicFrameLocks/>
+          </p:cNvGraphicFramePr>
+          <p:nvPr>
+            <p:extLst>
+              <p:ext uri="{D42A27DB-BD31-4B8C-83A1-F6EECF244321}">
+                <p14:modId xmlns:p14="http://schemas.microsoft.com/office/powerpoint/2010/main" val="2300890442"/>
+              </p:ext>
+            </p:extLst>
+          </p:nvPr>
+        </p:nvGraphicFramePr>
+        <p:xfrm>
+          <a:off x="736560" y="1891837"/>
+          <a:ext cx="9213120" cy="4889500"/>
+        </p:xfrm>
+        <a:graphic>
+          <a:graphicData uri="http://schemas.openxmlformats.org/drawingml/2006/chart">
+            <c:chart xmlns:c="http://schemas.openxmlformats.org/drawingml/2006/chart" xmlns:r="http://schemas.openxmlformats.org/officeDocument/2006/relationships" r:id="rId2"/>
+          </a:graphicData>
+        </a:graphic>
+      </p:graphicFrame>
+    </p:spTree>
+    <p:extLst>
+      <p:ext uri="{BB962C8B-B14F-4D97-AF65-F5344CB8AC3E}">
+        <p14:creationId xmlns:p14="http://schemas.microsoft.com/office/powerpoint/2010/main" val="574254658"/>
+      </p:ext>
+    </p:extLst>
+  </p:cSld>
+  <p:clrMapOvr>
+    <a:masterClrMapping/>
+  </p:clrMapOvr>
+  <p:timing>
+    <p:tnLst>
+      <p:par>
+        <p:cTn xmlns:p14="http://schemas.microsoft.com/office/powerpoint/2010/main" id="1" dur="indefinite" restart="never" nodeType="tmRoot">
+          <p:childTnLst>
+            <p:seq>
+              <p:cTn id="2" nodeType="mainSeq"/>
+              <p:prevCondLst>
+                <p:cond evt="onPrev" delay="0">
+                  <p:tgtEl>
+                    <p:sldTgt/>
+                  </p:tgtEl>
+                </p:cond>
+              </p:prevCondLst>
+              <p:nextCondLst>
+                <p:cond evt="onNext" delay="0">
+                  <p:tgtEl>
+                    <p:sldTgt/>
+                  </p:tgtEl>
+                </p:cond>
+              </p:nextCondLst>
+            </p:seq>
+          </p:childTnLst>
+        </p:cTn>
+      </p:par>
+    </p:tnLst>
+  </p:timing>
+</p:sld>
+</file>
+
+<file path=ppt/slides/slide13.xml><?xml version="1.0" encoding="utf-8"?>
+<p:sld xmlns:a="http://schemas.openxmlformats.org/drawingml/2006/main" xmlns:r="http://schemas.openxmlformats.org/officeDocument/2006/relationships" xmlns:p="http://schemas.openxmlformats.org/presentationml/2006/main">
+  <p:cSld>
+    <p:spTree>
+      <p:nvGrpSpPr>
+        <p:cNvPr id="1" name=""/>
+        <p:cNvGrpSpPr/>
+        <p:nvPr/>
+      </p:nvGrpSpPr>
+      <p:grpSpPr>
+        <a:xfrm>
+          <a:off x="0" y="0"/>
+          <a:ext cx="0" cy="0"/>
+          <a:chOff x="0" y="0"/>
+          <a:chExt cx="0" cy="0"/>
+        </a:xfrm>
+      </p:grpSpPr>
       <p:pic>
         <p:nvPicPr>
           <p:cNvPr id="153" name="Grafik 3"/>
@@ -6437,15 +7481,156 @@
               <a:buChar char="•"/>
             </a:pPr>
             <a:r>
-              <a:rPr lang="en-US" sz="2000">
-                <a:solidFill>
-                  <a:srgbClr val="000000"/>
-                </a:solidFill>
-                <a:latin typeface="Calibri"/>
-              </a:rPr>
-              <a:t> K-Medoids</a:t>
-            </a:r>
-            <a:endParaRPr/>
+              <a:rPr lang="en-US" sz="2000" dirty="0">
+                <a:solidFill>
+                  <a:srgbClr val="000000"/>
+                </a:solidFill>
+                <a:latin typeface="Calibri"/>
+              </a:rPr>
+              <a:t> K-</a:t>
+            </a:r>
+            <a:r>
+              <a:rPr lang="en-US" sz="2000" dirty="0" err="1" smtClean="0">
+                <a:solidFill>
+                  <a:srgbClr val="000000"/>
+                </a:solidFill>
+                <a:latin typeface="Calibri"/>
+              </a:rPr>
+              <a:t>Medoids</a:t>
+            </a:r>
+            <a:endParaRPr lang="en-US" sz="2000" dirty="0" smtClean="0">
+              <a:solidFill>
+                <a:srgbClr val="000000"/>
+              </a:solidFill>
+              <a:latin typeface="Calibri"/>
+            </a:endParaRPr>
+          </a:p>
+          <a:p>
+            <a:pPr lvl="1">
+              <a:buFont typeface="Arial"/>
+              <a:buChar char="•"/>
+            </a:pPr>
+            <a:r>
+              <a:rPr lang="en-US" sz="2000" dirty="0" smtClean="0">
+                <a:solidFill>
+                  <a:srgbClr val="000000"/>
+                </a:solidFill>
+                <a:latin typeface="Calibri"/>
+              </a:rPr>
+              <a:t> </a:t>
+            </a:r>
+            <a:r>
+              <a:rPr lang="en-US" sz="2000" dirty="0" err="1" smtClean="0">
+                <a:solidFill>
+                  <a:srgbClr val="000000"/>
+                </a:solidFill>
+                <a:latin typeface="Calibri"/>
+              </a:rPr>
+              <a:t>keine</a:t>
+            </a:r>
+            <a:r>
+              <a:rPr lang="en-US" sz="2000" dirty="0" smtClean="0">
+                <a:solidFill>
+                  <a:srgbClr val="000000"/>
+                </a:solidFill>
+                <a:latin typeface="Calibri"/>
+              </a:rPr>
+              <a:t> </a:t>
+            </a:r>
+            <a:r>
+              <a:rPr lang="en-US" sz="2000" dirty="0" err="1">
+                <a:solidFill>
+                  <a:srgbClr val="000000"/>
+                </a:solidFill>
+                <a:latin typeface="Calibri"/>
+              </a:rPr>
+              <a:t>Mindestklassengrösse</a:t>
+            </a:r>
+            <a:endParaRPr lang="en-US" sz="2000" dirty="0">
+              <a:solidFill>
+                <a:srgbClr val="000000"/>
+              </a:solidFill>
+              <a:latin typeface="Calibri"/>
+            </a:endParaRPr>
+          </a:p>
+          <a:p>
+            <a:pPr lvl="1">
+              <a:buFont typeface="Arial"/>
+              <a:buChar char="•"/>
+            </a:pPr>
+            <a:r>
+              <a:rPr lang="en-US" sz="2000" dirty="0">
+                <a:solidFill>
+                  <a:srgbClr val="000000"/>
+                </a:solidFill>
+                <a:latin typeface="Calibri"/>
+              </a:rPr>
+              <a:t> </a:t>
+            </a:r>
+            <a:r>
+              <a:rPr lang="en-US" sz="2000" dirty="0" err="1">
+                <a:solidFill>
+                  <a:srgbClr val="000000"/>
+                </a:solidFill>
+                <a:latin typeface="Calibri"/>
+              </a:rPr>
+              <a:t>Abbruch</a:t>
+            </a:r>
+            <a:r>
+              <a:rPr lang="en-US" sz="2000" dirty="0">
+                <a:solidFill>
+                  <a:srgbClr val="000000"/>
+                </a:solidFill>
+                <a:latin typeface="Calibri"/>
+              </a:rPr>
+              <a:t>: </a:t>
+            </a:r>
+            <a:r>
+              <a:rPr lang="en-US" sz="2000" dirty="0" err="1">
+                <a:solidFill>
+                  <a:srgbClr val="000000"/>
+                </a:solidFill>
+                <a:latin typeface="Calibri"/>
+              </a:rPr>
+              <a:t>keine</a:t>
+            </a:r>
+            <a:r>
+              <a:rPr lang="en-US" sz="2000" dirty="0">
+                <a:solidFill>
+                  <a:srgbClr val="000000"/>
+                </a:solidFill>
+                <a:latin typeface="Calibri"/>
+              </a:rPr>
+              <a:t> </a:t>
+            </a:r>
+            <a:r>
+              <a:rPr lang="en-US" sz="2000" dirty="0" err="1">
+                <a:solidFill>
+                  <a:srgbClr val="000000"/>
+                </a:solidFill>
+                <a:latin typeface="Calibri"/>
+              </a:rPr>
+              <a:t>Änderung</a:t>
+            </a:r>
+            <a:r>
+              <a:rPr lang="en-US" sz="2000" dirty="0">
+                <a:solidFill>
+                  <a:srgbClr val="000000"/>
+                </a:solidFill>
+                <a:latin typeface="Calibri"/>
+              </a:rPr>
+              <a:t> der </a:t>
+            </a:r>
+            <a:r>
+              <a:rPr lang="en-US" sz="2000" dirty="0" err="1" smtClean="0">
+                <a:solidFill>
+                  <a:srgbClr val="000000"/>
+                </a:solidFill>
+                <a:latin typeface="Calibri"/>
+              </a:rPr>
+              <a:t>Distorsion</a:t>
+            </a:r>
+            <a:endParaRPr dirty="0"/>
           </a:p>
           <a:p>
             <a:pPr>
@@ -6456,15 +7641,51 @@
               <a:buChar char="•"/>
             </a:pPr>
             <a:r>
-              <a:rPr lang="en-US" sz="2000">
-                <a:solidFill>
-                  <a:srgbClr val="000000"/>
-                </a:solidFill>
-                <a:latin typeface="Calibri"/>
-              </a:rPr>
-              <a:t> Erste K Features als Center</a:t>
-            </a:r>
-            <a:endParaRPr/>
+              <a:rPr lang="en-US" sz="2000" dirty="0">
+                <a:solidFill>
+                  <a:srgbClr val="000000"/>
+                </a:solidFill>
+                <a:latin typeface="Calibri"/>
+              </a:rPr>
+              <a:t> </a:t>
+            </a:r>
+            <a:r>
+              <a:rPr lang="en-US" sz="2000" dirty="0" err="1">
+                <a:solidFill>
+                  <a:srgbClr val="000000"/>
+                </a:solidFill>
+                <a:latin typeface="Calibri"/>
+              </a:rPr>
+              <a:t>Erste</a:t>
+            </a:r>
+            <a:r>
+              <a:rPr lang="en-US" sz="2000" dirty="0">
+                <a:solidFill>
+                  <a:srgbClr val="000000"/>
+                </a:solidFill>
+                <a:latin typeface="Calibri"/>
+              </a:rPr>
+              <a:t> K Features </a:t>
+            </a:r>
+            <a:r>
+              <a:rPr lang="en-US" sz="2000" dirty="0" err="1">
+                <a:solidFill>
+                  <a:srgbClr val="000000"/>
+                </a:solidFill>
+                <a:latin typeface="Calibri"/>
+              </a:rPr>
+              <a:t>als</a:t>
+            </a:r>
+            <a:r>
+              <a:rPr lang="en-US" sz="2000" dirty="0">
+                <a:solidFill>
+                  <a:srgbClr val="000000"/>
+                </a:solidFill>
+                <a:latin typeface="Calibri"/>
+              </a:rPr>
+              <a:t> Center</a:t>
+            </a:r>
+            <a:endParaRPr dirty="0"/>
           </a:p>
           <a:p>
             <a:pPr>
@@ -6475,15 +7696,51 @@
               <a:buChar char="•"/>
             </a:pPr>
             <a:r>
-              <a:rPr lang="en-US" sz="2000">
-                <a:solidFill>
-                  <a:srgbClr val="000000"/>
-                </a:solidFill>
-                <a:latin typeface="Calibri"/>
-              </a:rPr>
-              <a:t> Parallelisierte Suche der Center</a:t>
-            </a:r>
-            <a:endParaRPr/>
+              <a:rPr lang="en-US" sz="2000" dirty="0">
+                <a:solidFill>
+                  <a:srgbClr val="000000"/>
+                </a:solidFill>
+                <a:latin typeface="Calibri"/>
+              </a:rPr>
+              <a:t> </a:t>
+            </a:r>
+            <a:r>
+              <a:rPr lang="en-US" sz="2000" dirty="0" err="1">
+                <a:solidFill>
+                  <a:srgbClr val="000000"/>
+                </a:solidFill>
+                <a:latin typeface="Calibri"/>
+              </a:rPr>
+              <a:t>Parallelisierte</a:t>
+            </a:r>
+            <a:r>
+              <a:rPr lang="en-US" sz="2000" dirty="0">
+                <a:solidFill>
+                  <a:srgbClr val="000000"/>
+                </a:solidFill>
+                <a:latin typeface="Calibri"/>
+              </a:rPr>
+              <a:t> </a:t>
+            </a:r>
+            <a:r>
+              <a:rPr lang="en-US" sz="2000" dirty="0" err="1">
+                <a:solidFill>
+                  <a:srgbClr val="000000"/>
+                </a:solidFill>
+                <a:latin typeface="Calibri"/>
+              </a:rPr>
+              <a:t>Suche</a:t>
+            </a:r>
+            <a:r>
+              <a:rPr lang="en-US" sz="2000" dirty="0">
+                <a:solidFill>
+                  <a:srgbClr val="000000"/>
+                </a:solidFill>
+                <a:latin typeface="Calibri"/>
+              </a:rPr>
+              <a:t> der Center</a:t>
+            </a:r>
+            <a:endParaRPr dirty="0"/>
           </a:p>
           <a:p>
             <a:pPr>
@@ -6494,15 +7751,78 @@
               <a:buChar char="•"/>
             </a:pPr>
             <a:r>
-              <a:rPr lang="en-US" sz="2000">
-                <a:solidFill>
-                  <a:srgbClr val="000000"/>
-                </a:solidFill>
-                <a:latin typeface="Calibri"/>
-              </a:rPr>
-              <a:t> Parallelisierte Bearbeitung der Cluster</a:t>
-            </a:r>
-            <a:endParaRPr/>
+              <a:rPr lang="en-US" sz="2000" dirty="0">
+                <a:solidFill>
+                  <a:srgbClr val="000000"/>
+                </a:solidFill>
+                <a:latin typeface="Calibri"/>
+              </a:rPr>
+              <a:t> </a:t>
+            </a:r>
+            <a:r>
+              <a:rPr lang="en-US" sz="2000" dirty="0" err="1">
+                <a:solidFill>
+                  <a:srgbClr val="000000"/>
+                </a:solidFill>
+                <a:latin typeface="Calibri"/>
+              </a:rPr>
+              <a:t>Parallelisierte</a:t>
+            </a:r>
+            <a:r>
+              <a:rPr lang="en-US" sz="2000" dirty="0">
+                <a:solidFill>
+                  <a:srgbClr val="000000"/>
+                </a:solidFill>
+                <a:latin typeface="Calibri"/>
+              </a:rPr>
+              <a:t> </a:t>
+            </a:r>
+            <a:r>
+              <a:rPr lang="en-US" sz="2000" dirty="0" err="1">
+                <a:solidFill>
+                  <a:srgbClr val="000000"/>
+                </a:solidFill>
+                <a:latin typeface="Calibri"/>
+              </a:rPr>
+              <a:t>Bearbeitung</a:t>
+            </a:r>
+            <a:r>
+              <a:rPr lang="en-US" sz="2000" dirty="0">
+                <a:solidFill>
+                  <a:srgbClr val="000000"/>
+                </a:solidFill>
+                <a:latin typeface="Calibri"/>
+              </a:rPr>
+              <a:t> der </a:t>
+            </a:r>
+            <a:r>
+              <a:rPr lang="en-US" sz="2000" dirty="0" smtClean="0">
+                <a:solidFill>
+                  <a:srgbClr val="000000"/>
+                </a:solidFill>
+                <a:latin typeface="Calibri"/>
+              </a:rPr>
+              <a:t>Cluster</a:t>
+            </a:r>
+          </a:p>
+          <a:p>
+            <a:pPr>
+              <a:lnSpc>
+                <a:spcPct val="100000"/>
+              </a:lnSpc>
+              <a:buFont typeface="Arial"/>
+              <a:buChar char="•"/>
+            </a:pPr>
+            <a:r>
+              <a:rPr lang="en-US" sz="2000" dirty="0" smtClean="0">
+                <a:solidFill>
+                  <a:srgbClr val="000000"/>
+                </a:solidFill>
+                <a:latin typeface="Calibri"/>
+              </a:rPr>
+              <a:t> </a:t>
+            </a:r>
+            <a:endParaRPr dirty="0"/>
           </a:p>
         </p:txBody>
       </p:sp>
@@ -6511,6 +7831,13 @@
   <p:clrMapOvr>
     <a:masterClrMapping/>
   </p:clrMapOvr>
+  <p:timing>
+    <p:tnLst>
+      <p:par>
+        <p:cTn xmlns:p14="http://schemas.microsoft.com/office/powerpoint/2010/main" id="1" dur="indefinite" restart="never" nodeType="tmRoot"/>
+      </p:par>
+    </p:tnLst>
+  </p:timing>
 </p:sld>
 </file>
 
@@ -8741,4 +10068,324 @@
   <a:objectDefaults/>
   <a:extraClrSchemeLst/>
 </a:theme>
+</file>
+
+<file path=ppt/theme/theme4.xml><?xml version="1.0" encoding="utf-8"?>
+<a:theme xmlns:a="http://schemas.openxmlformats.org/drawingml/2006/main" name="Office Theme">
+  <a:themeElements>
+    <a:clrScheme name="Office">
+      <a:dk1>
+        <a:sysClr val="windowText" lastClr="000000"/>
+      </a:dk1>
+      <a:lt1>
+        <a:sysClr val="window" lastClr="FFFFFF"/>
+      </a:lt1>
+      <a:dk2>
+        <a:srgbClr val="1F497D"/>
+      </a:dk2>
+      <a:lt2>
+        <a:srgbClr val="EEECE1"/>
+      </a:lt2>
+      <a:accent1>
+        <a:srgbClr val="4F81BD"/>
+      </a:accent1>
+      <a:accent2>
+        <a:srgbClr val="C0504D"/>
+      </a:accent2>
+      <a:accent3>
+        <a:srgbClr val="9BBB59"/>
+      </a:accent3>
+      <a:accent4>
+        <a:srgbClr val="8064A2"/>
+      </a:accent4>
+      <a:accent5>
+        <a:srgbClr val="4BACC6"/>
+      </a:accent5>
+      <a:accent6>
+        <a:srgbClr val="F79646"/>
+      </a:accent6>
+      <a:hlink>
+        <a:srgbClr val="0000FF"/>
+      </a:hlink>
+      <a:folHlink>
+        <a:srgbClr val="800080"/>
+      </a:folHlink>
+    </a:clrScheme>
+    <a:fontScheme name="Office">
+      <a:majorFont>
+        <a:latin typeface="Calibri"/>
+        <a:ea typeface=""/>
+        <a:cs typeface=""/>
+        <a:font script="Jpan" typeface="ＭＳ Ｐゴシック"/>
+        <a:font script="Hang" typeface="맑은 고딕"/>
+        <a:font script="Hans" typeface="宋体"/>
+        <a:font script="Hant" typeface="新細明體"/>
+        <a:font script="Arab" typeface="Times New Roman"/>
+        <a:font script="Hebr" typeface="Times New Roman"/>
+        <a:font script="Thai" typeface="Angsana New"/>
+        <a:font script="Ethi" typeface="Nyala"/>
+        <a:font script="Beng" typeface="Vrinda"/>
+        <a:font script="Gujr" typeface="Shruti"/>
+        <a:font script="Khmr" typeface="MoolBoran"/>
+        <a:font script="Knda" typeface="Tunga"/>
+        <a:font script="Guru" typeface="Raavi"/>
+        <a:font script="Cans" typeface="Euphemia"/>
+        <a:font script="Cher" typeface="Plantagenet Cherokee"/>
+        <a:font script="Yiii" typeface="Microsoft Yi Baiti"/>
+        <a:font script="Tibt" typeface="Microsoft Himalaya"/>
+        <a:font script="Thaa" typeface="MV Boli"/>
+        <a:font script="Deva" typeface="Mangal"/>
+        <a:font script="Telu" typeface="Gautami"/>
+        <a:font script="Taml" typeface="Latha"/>
+        <a:font script="Syrc" typeface="Estrangelo Edessa"/>
+        <a:font script="Orya" typeface="Kalinga"/>
+        <a:font script="Mlym" typeface="Kartika"/>
+        <a:font script="Laoo" typeface="DokChampa"/>
+        <a:font script="Sinh" typeface="Iskoola Pota"/>
+        <a:font script="Mong" typeface="Mongolian Baiti"/>
+        <a:font script="Viet" typeface="Times New Roman"/>
+        <a:font script="Uigh" typeface="Microsoft Uighur"/>
+        <a:font script="Geor" typeface="Sylfaen"/>
+      </a:majorFont>
+      <a:minorFont>
+        <a:latin typeface="Calibri"/>
+        <a:ea typeface=""/>
+        <a:cs typeface=""/>
+        <a:font script="Jpan" typeface="ＭＳ Ｐゴシック"/>
+        <a:font script="Hang" typeface="맑은 고딕"/>
+        <a:font script="Hans" typeface="宋体"/>
+        <a:font script="Hant" typeface="新細明體"/>
+        <a:font script="Arab" typeface="Arial"/>
+        <a:font script="Hebr" typeface="Arial"/>
+        <a:font script="Thai" typeface="Cordia New"/>
+        <a:font script="Ethi" typeface="Nyala"/>
+        <a:font script="Beng" typeface="Vrinda"/>
+        <a:font script="Gujr" typeface="Shruti"/>
+        <a:font script="Khmr" typeface="DaunPenh"/>
+        <a:font script="Knda" typeface="Tunga"/>
+        <a:font script="Guru" typeface="Raavi"/>
+        <a:font script="Cans" typeface="Euphemia"/>
+        <a:font script="Cher" typeface="Plantagenet Cherokee"/>
+        <a:font script="Yiii" typeface="Microsoft Yi Baiti"/>
+        <a:font script="Tibt" typeface="Microsoft Himalaya"/>
+        <a:font script="Thaa" typeface="MV Boli"/>
+        <a:font script="Deva" typeface="Mangal"/>
+        <a:font script="Telu" typeface="Gautami"/>
+        <a:font script="Taml" typeface="Latha"/>
+        <a:font script="Syrc" typeface="Estrangelo Edessa"/>
+        <a:font script="Orya" typeface="Kalinga"/>
+        <a:font script="Mlym" typeface="Kartika"/>
+        <a:font script="Laoo" typeface="DokChampa"/>
+        <a:font script="Sinh" typeface="Iskoola Pota"/>
+        <a:font script="Mong" typeface="Mongolian Baiti"/>
+        <a:font script="Viet" typeface="Arial"/>
+        <a:font script="Uigh" typeface="Microsoft Uighur"/>
+        <a:font script="Geor" typeface="Sylfaen"/>
+      </a:minorFont>
+    </a:fontScheme>
+    <a:fmtScheme name="Office">
+      <a:fillStyleLst>
+        <a:solidFill>
+          <a:schemeClr val="phClr"/>
+        </a:solidFill>
+        <a:gradFill rotWithShape="1">
+          <a:gsLst>
+            <a:gs pos="0">
+              <a:schemeClr val="phClr">
+                <a:tint val="50000"/>
+                <a:satMod val="300000"/>
+              </a:schemeClr>
+            </a:gs>
+            <a:gs pos="35000">
+              <a:schemeClr val="phClr">
+                <a:tint val="37000"/>
+                <a:satMod val="300000"/>
+              </a:schemeClr>
+            </a:gs>
+            <a:gs pos="100000">
+              <a:schemeClr val="phClr">
+                <a:tint val="15000"/>
+                <a:satMod val="350000"/>
+              </a:schemeClr>
+            </a:gs>
+          </a:gsLst>
+          <a:lin ang="16200000" scaled="1"/>
+        </a:gradFill>
+        <a:gradFill rotWithShape="1">
+          <a:gsLst>
+            <a:gs pos="0">
+              <a:schemeClr val="phClr">
+                <a:tint val="100000"/>
+                <a:shade val="100000"/>
+                <a:satMod val="130000"/>
+              </a:schemeClr>
+            </a:gs>
+            <a:gs pos="100000">
+              <a:schemeClr val="phClr">
+                <a:tint val="50000"/>
+                <a:shade val="100000"/>
+                <a:satMod val="350000"/>
+              </a:schemeClr>
+            </a:gs>
+          </a:gsLst>
+          <a:lin ang="16200000" scaled="0"/>
+        </a:gradFill>
+      </a:fillStyleLst>
+      <a:lnStyleLst>
+        <a:ln w="9525" cap="flat" cmpd="sng" algn="ctr">
+          <a:solidFill>
+            <a:schemeClr val="phClr">
+              <a:shade val="95000"/>
+              <a:satMod val="105000"/>
+            </a:schemeClr>
+          </a:solidFill>
+          <a:prstDash val="solid"/>
+        </a:ln>
+        <a:ln w="25400" cap="flat" cmpd="sng" algn="ctr">
+          <a:solidFill>
+            <a:schemeClr val="phClr"/>
+          </a:solidFill>
+          <a:prstDash val="solid"/>
+        </a:ln>
+        <a:ln w="38100" cap="flat" cmpd="sng" algn="ctr">
+          <a:solidFill>
+            <a:schemeClr val="phClr"/>
+          </a:solidFill>
+          <a:prstDash val="solid"/>
+        </a:ln>
+      </a:lnStyleLst>
+      <a:effectStyleLst>
+        <a:effectStyle>
+          <a:effectLst>
+            <a:outerShdw blurRad="40000" dist="20000" dir="5400000" rotWithShape="0">
+              <a:srgbClr val="000000">
+                <a:alpha val="38000"/>
+              </a:srgbClr>
+            </a:outerShdw>
+          </a:effectLst>
+        </a:effectStyle>
+        <a:effectStyle>
+          <a:effectLst>
+            <a:outerShdw blurRad="40000" dist="23000" dir="5400000" rotWithShape="0">
+              <a:srgbClr val="000000">
+                <a:alpha val="35000"/>
+              </a:srgbClr>
+            </a:outerShdw>
+          </a:effectLst>
+        </a:effectStyle>
+        <a:effectStyle>
+          <a:effectLst>
+            <a:outerShdw blurRad="40000" dist="23000" dir="5400000" rotWithShape="0">
+              <a:srgbClr val="000000">
+                <a:alpha val="35000"/>
+              </a:srgbClr>
+            </a:outerShdw>
+          </a:effectLst>
+          <a:scene3d>
+            <a:camera prst="orthographicFront">
+              <a:rot lat="0" lon="0" rev="0"/>
+            </a:camera>
+            <a:lightRig rig="threePt" dir="t">
+              <a:rot lat="0" lon="0" rev="1200000"/>
+            </a:lightRig>
+          </a:scene3d>
+          <a:sp3d>
+            <a:bevelT w="63500" h="25400"/>
+          </a:sp3d>
+        </a:effectStyle>
+      </a:effectStyleLst>
+      <a:bgFillStyleLst>
+        <a:solidFill>
+          <a:schemeClr val="phClr"/>
+        </a:solidFill>
+        <a:gradFill rotWithShape="1">
+          <a:gsLst>
+            <a:gs pos="0">
+              <a:schemeClr val="phClr">
+                <a:tint val="40000"/>
+                <a:satMod val="350000"/>
+              </a:schemeClr>
+            </a:gs>
+            <a:gs pos="40000">
+              <a:schemeClr val="phClr">
+                <a:tint val="45000"/>
+                <a:shade val="99000"/>
+                <a:satMod val="350000"/>
+              </a:schemeClr>
+            </a:gs>
+            <a:gs pos="100000">
+              <a:schemeClr val="phClr">
+                <a:shade val="20000"/>
+                <a:satMod val="255000"/>
+              </a:schemeClr>
+            </a:gs>
+          </a:gsLst>
+          <a:path path="circle">
+            <a:fillToRect l="50000" t="-80000" r="50000" b="180000"/>
+          </a:path>
+        </a:gradFill>
+        <a:gradFill rotWithShape="1">
+          <a:gsLst>
+            <a:gs pos="0">
+              <a:schemeClr val="phClr">
+                <a:tint val="80000"/>
+                <a:satMod val="300000"/>
+              </a:schemeClr>
+            </a:gs>
+            <a:gs pos="100000">
+              <a:schemeClr val="phClr">
+                <a:shade val="30000"/>
+                <a:satMod val="200000"/>
+              </a:schemeClr>
+            </a:gs>
+          </a:gsLst>
+          <a:path path="circle">
+            <a:fillToRect l="50000" t="50000" r="50000" b="50000"/>
+          </a:path>
+        </a:gradFill>
+      </a:bgFillStyleLst>
+    </a:fmtScheme>
+  </a:themeElements>
+  <a:objectDefaults>
+    <a:spDef>
+      <a:spPr/>
+      <a:bodyPr/>
+      <a:lstStyle/>
+      <a:style>
+        <a:lnRef idx="1">
+          <a:schemeClr val="accent1"/>
+        </a:lnRef>
+        <a:fillRef idx="3">
+          <a:schemeClr val="accent1"/>
+        </a:fillRef>
+        <a:effectRef idx="2">
+          <a:schemeClr val="accent1"/>
+        </a:effectRef>
+        <a:fontRef idx="minor">
+          <a:schemeClr val="lt1"/>
+        </a:fontRef>
+      </a:style>
+    </a:spDef>
+    <a:lnDef>
+      <a:spPr/>
+      <a:bodyPr/>
+      <a:lstStyle/>
+      <a:style>
+        <a:lnRef idx="2">
+          <a:schemeClr val="accent1"/>
+        </a:lnRef>
+        <a:fillRef idx="0">
+          <a:schemeClr val="accent1"/>
+        </a:fillRef>
+        <a:effectRef idx="1">
+          <a:schemeClr val="accent1"/>
+        </a:effectRef>
+        <a:fontRef idx="minor">
+          <a:schemeClr val="tx1"/>
+        </a:fontRef>
+      </a:style>
+    </a:lnDef>
+  </a:objectDefaults>
+  <a:extraClrSchemeLst/>
+</a:theme>
 </file>
</xml_diff>

<commit_message>
last minute slide changes the second
</commit_message>
<xml_diff>
--- a/Contest.pptx
+++ b/Contest.pptx
@@ -7,22 +7,23 @@
     <p:sldMasterId id="2147483674" r:id="rId3"/>
   </p:sldMasterIdLst>
   <p:notesMasterIdLst>
-    <p:notesMasterId r:id="rId17"/>
+    <p:notesMasterId r:id="rId18"/>
   </p:notesMasterIdLst>
   <p:sldIdLst>
     <p:sldId id="256" r:id="rId4"/>
     <p:sldId id="257" r:id="rId5"/>
-    <p:sldId id="258" r:id="rId6"/>
-    <p:sldId id="259" r:id="rId7"/>
-    <p:sldId id="260" r:id="rId8"/>
-    <p:sldId id="261" r:id="rId9"/>
-    <p:sldId id="262" r:id="rId10"/>
-    <p:sldId id="263" r:id="rId11"/>
-    <p:sldId id="264" r:id="rId12"/>
-    <p:sldId id="269" r:id="rId13"/>
-    <p:sldId id="267" r:id="rId14"/>
-    <p:sldId id="268" r:id="rId15"/>
-    <p:sldId id="265" r:id="rId16"/>
+    <p:sldId id="270" r:id="rId6"/>
+    <p:sldId id="258" r:id="rId7"/>
+    <p:sldId id="259" r:id="rId8"/>
+    <p:sldId id="260" r:id="rId9"/>
+    <p:sldId id="261" r:id="rId10"/>
+    <p:sldId id="262" r:id="rId11"/>
+    <p:sldId id="263" r:id="rId12"/>
+    <p:sldId id="264" r:id="rId13"/>
+    <p:sldId id="269" r:id="rId14"/>
+    <p:sldId id="267" r:id="rId15"/>
+    <p:sldId id="268" r:id="rId16"/>
+    <p:sldId id="265" r:id="rId17"/>
   </p:sldIdLst>
   <p:sldSz cx="10693400" cy="7561263"/>
   <p:notesSz cx="7559675" cy="10691813"/>
@@ -1379,7 +1380,7 @@
           <a:p>
             <a:fld id="{3C082AAF-E8A5-CA4F-B030-53A1DB0BCE5F}" type="slidenum">
               <a:rPr lang="en-US" smtClean="0"/>
-              <a:t>11</a:t>
+              <a:t>12</a:t>
             </a:fld>
             <a:endParaRPr lang="en-US"/>
           </a:p>
@@ -5871,43 +5872,6 @@
       </p:sp>
       <p:sp>
         <p:nvSpPr>
-          <p:cNvPr id="149" name="CustomShape 2"/>
-          <p:cNvSpPr/>
-          <p:nvPr/>
-        </p:nvSpPr>
-        <p:spPr>
-          <a:xfrm>
-            <a:off x="736560" y="7197840"/>
-            <a:ext cx="7484400" cy="178560"/>
-          </a:xfrm>
-          <a:prstGeom prst="rect">
-            <a:avLst/>
-          </a:prstGeom>
-        </p:spPr>
-        <p:txBody>
-          <a:bodyPr lIns="0" tIns="0" rIns="0" bIns="0" anchor="b"/>
-          <a:lstStyle/>
-          <a:p>
-            <a:pPr>
-              <a:lnSpc>
-                <a:spcPct val="100000"/>
-              </a:lnSpc>
-            </a:pPr>
-            <a:r>
-              <a:rPr lang="en-US" sz="1200">
-                <a:solidFill>
-                  <a:srgbClr val="000000"/>
-                </a:solidFill>
-                <a:latin typeface="Calibri"/>
-              </a:rPr>
-              <a:t>Terrorismus</a:t>
-            </a:r>
-            <a:endParaRPr/>
-          </a:p>
-        </p:txBody>
-      </p:sp>
-      <p:sp>
-        <p:nvSpPr>
           <p:cNvPr id="150" name="CustomShape 3"/>
           <p:cNvSpPr/>
           <p:nvPr/>
@@ -5968,15 +5932,15 @@
               </a:lnSpc>
             </a:pPr>
             <a:r>
-              <a:rPr lang="en-US" sz="2000" b="1" dirty="0" err="1" smtClean="0">
-                <a:solidFill>
-                  <a:srgbClr val="000000"/>
-                </a:solidFill>
-                <a:latin typeface="Calibri"/>
-              </a:rPr>
-              <a:t>Erkenntnisse</a:t>
-            </a:r>
-            <a:endParaRPr dirty="0"/>
+              <a:rPr lang="en-US" sz="2000" b="1">
+                <a:solidFill>
+                  <a:srgbClr val="000000"/>
+                </a:solidFill>
+                <a:latin typeface="Calibri"/>
+              </a:rPr>
+              <a:t>Support Vector Machine</a:t>
+            </a:r>
+            <a:endParaRPr/>
           </a:p>
         </p:txBody>
       </p:sp>
@@ -6007,363 +5971,157 @@
               <a:buChar char="•"/>
             </a:pPr>
             <a:r>
-              <a:rPr lang="en-US" sz="2000" dirty="0">
-                <a:solidFill>
-                  <a:srgbClr val="000000"/>
-                </a:solidFill>
-                <a:latin typeface="Calibri"/>
-              </a:rPr>
-              <a:t> </a:t>
-            </a:r>
-            <a:r>
-              <a:rPr lang="en-US" sz="2000" dirty="0" smtClean="0">
-                <a:solidFill>
-                  <a:srgbClr val="000000"/>
-                </a:solidFill>
-                <a:latin typeface="Calibri"/>
-              </a:rPr>
-              <a:t>Clustering </a:t>
-            </a:r>
-            <a:r>
-              <a:rPr lang="en-US" sz="2000" dirty="0" err="1" smtClean="0">
-                <a:solidFill>
-                  <a:srgbClr val="000000"/>
-                </a:solidFill>
-                <a:latin typeface="Calibri"/>
-              </a:rPr>
-              <a:t>zufällig</a:t>
-            </a:r>
-            <a:r>
-              <a:rPr lang="en-US" sz="2000" dirty="0" smtClean="0">
-                <a:solidFill>
-                  <a:srgbClr val="000000"/>
-                </a:solidFill>
-                <a:latin typeface="Calibri"/>
-              </a:rPr>
-              <a:t> </a:t>
-            </a:r>
-            <a:r>
-              <a:rPr lang="en-US" sz="2000" dirty="0" err="1" smtClean="0">
-                <a:solidFill>
-                  <a:srgbClr val="000000"/>
-                </a:solidFill>
-                <a:latin typeface="Calibri"/>
-              </a:rPr>
-              <a:t>wählen</a:t>
-            </a:r>
-            <a:endParaRPr lang="en-US" sz="2000" dirty="0" smtClean="0">
-              <a:solidFill>
-                <a:srgbClr val="000000"/>
-              </a:solidFill>
-              <a:latin typeface="Calibri"/>
-            </a:endParaRPr>
+              <a:rPr lang="en-US" sz="2000">
+                <a:solidFill>
+                  <a:srgbClr val="000000"/>
+                </a:solidFill>
+                <a:latin typeface="Calibri"/>
+              </a:rPr>
+              <a:t> RBF- Kernel ist parametrisierbar</a:t>
+            </a:r>
+            <a:endParaRPr/>
           </a:p>
           <a:p>
             <a:pPr lvl="1">
+              <a:lnSpc>
+                <a:spcPct val="100000"/>
+              </a:lnSpc>
+              <a:buSzPct val="25000"/>
+              <a:buFont typeface="StarSymbol"/>
+              <a:buChar char=""/>
+            </a:pPr>
+            <a:r>
+              <a:rPr lang="en-US" sz="2000">
+                <a:solidFill>
+                  <a:srgbClr val="000000"/>
+                </a:solidFill>
+                <a:latin typeface="Calibri"/>
+              </a:rPr>
+              <a:t>Parametersuche notwendig</a:t>
+            </a:r>
+            <a:endParaRPr/>
+          </a:p>
+          <a:p>
+            <a:pPr lvl="1">
+              <a:lnSpc>
+                <a:spcPct val="100000"/>
+              </a:lnSpc>
+              <a:buSzPct val="25000"/>
+              <a:buFont typeface="StarSymbol"/>
+              <a:buChar char=""/>
+            </a:pPr>
+            <a:r>
+              <a:rPr lang="en-US" sz="2000">
+                <a:solidFill>
+                  <a:srgbClr val="000000"/>
+                </a:solidFill>
+                <a:latin typeface="Calibri"/>
+              </a:rPr>
+              <a:t>C: Fehlertoleranz</a:t>
+            </a:r>
+            <a:endParaRPr/>
+          </a:p>
+          <a:p>
+            <a:pPr lvl="1">
+              <a:lnSpc>
+                <a:spcPct val="100000"/>
+              </a:lnSpc>
+              <a:buSzPct val="25000"/>
+              <a:buFont typeface="StarSymbol"/>
+              <a:buChar char=""/>
+            </a:pPr>
+            <a:r>
+              <a:rPr lang="en-US" sz="2000">
+                <a:solidFill>
+                  <a:srgbClr val="000000"/>
+                </a:solidFill>
+                <a:latin typeface="Calibri"/>
+              </a:rPr>
+              <a:t>Gamma: Parameter der Basisfunktion</a:t>
+            </a:r>
+            <a:endParaRPr/>
+          </a:p>
+          <a:p>
+            <a:pPr>
+              <a:lnSpc>
+                <a:spcPct val="100000"/>
+              </a:lnSpc>
               <a:buFont typeface="Arial"/>
               <a:buChar char="•"/>
             </a:pPr>
             <a:r>
-              <a:rPr lang="en-US" dirty="0" smtClean="0">
-                <a:solidFill>
-                  <a:srgbClr val="000000"/>
-                </a:solidFill>
-                <a:latin typeface="Calibri"/>
-              </a:rPr>
-              <a:t> </a:t>
-            </a:r>
-            <a:r>
-              <a:rPr lang="en-US" dirty="0" err="1" smtClean="0">
-                <a:solidFill>
-                  <a:srgbClr val="000000"/>
-                </a:solidFill>
-                <a:latin typeface="Calibri"/>
-              </a:rPr>
-              <a:t>Einbusse</a:t>
-            </a:r>
-            <a:r>
-              <a:rPr lang="en-US" dirty="0" smtClean="0">
-                <a:solidFill>
-                  <a:srgbClr val="000000"/>
-                </a:solidFill>
-                <a:latin typeface="Calibri"/>
-              </a:rPr>
-              <a:t>: ca. </a:t>
-            </a:r>
-            <a:r>
-              <a:rPr lang="en-US" dirty="0" smtClean="0">
-                <a:solidFill>
-                  <a:srgbClr val="000000"/>
-                </a:solidFill>
-                <a:latin typeface="Calibri"/>
-              </a:rPr>
-              <a:t>5% in der </a:t>
-            </a:r>
-            <a:r>
-              <a:rPr lang="en-US" dirty="0" err="1" smtClean="0">
-                <a:solidFill>
-                  <a:srgbClr val="000000"/>
-                </a:solidFill>
-                <a:latin typeface="Calibri"/>
-              </a:rPr>
-              <a:t>Genauigkeit</a:t>
-            </a:r>
-            <a:endParaRPr lang="en-US" dirty="0" smtClean="0">
-              <a:solidFill>
-                <a:srgbClr val="000000"/>
-              </a:solidFill>
-              <a:latin typeface="Calibri"/>
-            </a:endParaRPr>
+              <a:rPr lang="en-US" sz="2000">
+                <a:solidFill>
+                  <a:srgbClr val="000000"/>
+                </a:solidFill>
+                <a:latin typeface="Calibri"/>
+              </a:rPr>
+              <a:t>Normalisieren der Parameter</a:t>
+            </a:r>
+            <a:endParaRPr/>
           </a:p>
           <a:p>
             <a:pPr lvl="1">
+              <a:lnSpc>
+                <a:spcPct val="100000"/>
+              </a:lnSpc>
+              <a:buSzPct val="25000"/>
+              <a:buFont typeface="StarSymbol"/>
+              <a:buChar char=""/>
+            </a:pPr>
+            <a:r>
+              <a:rPr lang="en-US" sz="2000">
+                <a:solidFill>
+                  <a:srgbClr val="000000"/>
+                </a:solidFill>
+                <a:latin typeface="Calibri"/>
+              </a:rPr>
+              <a:t>[0,1]</a:t>
+            </a:r>
+            <a:endParaRPr/>
+          </a:p>
+          <a:p>
+            <a:pPr lvl="1">
+              <a:lnSpc>
+                <a:spcPct val="100000"/>
+              </a:lnSpc>
+              <a:buSzPct val="25000"/>
+              <a:buFont typeface="StarSymbol"/>
+              <a:buChar char=""/>
+            </a:pPr>
+            <a:r>
+              <a:rPr lang="en-US" sz="2000">
+                <a:solidFill>
+                  <a:srgbClr val="000000"/>
+                </a:solidFill>
+                <a:latin typeface="Calibri"/>
+              </a:rPr>
+              <a:t>Anfällig auf unterschiedliche grosse Features</a:t>
+            </a:r>
+            <a:endParaRPr/>
+          </a:p>
+          <a:p>
+            <a:pPr>
+              <a:lnSpc>
+                <a:spcPct val="100000"/>
+              </a:lnSpc>
               <a:buFont typeface="Arial"/>
               <a:buChar char="•"/>
             </a:pPr>
             <a:r>
-              <a:rPr lang="en-US" dirty="0">
-                <a:solidFill>
-                  <a:srgbClr val="000000"/>
-                </a:solidFill>
-                <a:latin typeface="Calibri"/>
-              </a:rPr>
-              <a:t> </a:t>
-            </a:r>
-            <a:r>
-              <a:rPr lang="en-US" dirty="0" err="1" smtClean="0">
-                <a:solidFill>
-                  <a:srgbClr val="000000"/>
-                </a:solidFill>
-                <a:latin typeface="Calibri"/>
-              </a:rPr>
-              <a:t>Zeitgewinn</a:t>
-            </a:r>
-            <a:r>
-              <a:rPr lang="en-US" dirty="0" smtClean="0">
-                <a:solidFill>
-                  <a:srgbClr val="000000"/>
-                </a:solidFill>
-                <a:latin typeface="Calibri"/>
-              </a:rPr>
-              <a:t>: </a:t>
-            </a:r>
-            <a:r>
-              <a:rPr lang="en-US" dirty="0" err="1" smtClean="0">
-                <a:solidFill>
-                  <a:srgbClr val="000000"/>
-                </a:solidFill>
-                <a:latin typeface="Calibri"/>
-              </a:rPr>
-              <a:t>sehr</a:t>
-            </a:r>
-            <a:r>
-              <a:rPr lang="en-US" dirty="0" smtClean="0">
-                <a:solidFill>
-                  <a:srgbClr val="000000"/>
-                </a:solidFill>
-                <a:latin typeface="Calibri"/>
-              </a:rPr>
-              <a:t> gross</a:t>
-            </a:r>
-          </a:p>
-          <a:p>
-            <a:pPr>
-              <a:buFont typeface="Arial"/>
-              <a:buChar char="•"/>
-            </a:pPr>
-            <a:r>
-              <a:rPr lang="en-US" dirty="0">
-                <a:solidFill>
-                  <a:srgbClr val="000000"/>
-                </a:solidFill>
-                <a:latin typeface="Calibri"/>
-              </a:rPr>
-              <a:t> </a:t>
-            </a:r>
-            <a:r>
-              <a:rPr lang="en-US" dirty="0" err="1" smtClean="0">
-                <a:solidFill>
-                  <a:srgbClr val="000000"/>
-                </a:solidFill>
-                <a:latin typeface="Calibri"/>
-              </a:rPr>
-              <a:t>Anzahl</a:t>
-            </a:r>
-            <a:r>
-              <a:rPr lang="en-US" dirty="0" smtClean="0">
-                <a:solidFill>
-                  <a:srgbClr val="000000"/>
-                </a:solidFill>
-                <a:latin typeface="Calibri"/>
-              </a:rPr>
-              <a:t> Features</a:t>
-            </a:r>
-          </a:p>
-          <a:p>
-            <a:pPr lvl="1">
-              <a:buFont typeface="Arial"/>
-              <a:buChar char="•"/>
-            </a:pPr>
-            <a:r>
-              <a:rPr lang="en-US" dirty="0">
-                <a:solidFill>
-                  <a:srgbClr val="000000"/>
-                </a:solidFill>
-                <a:latin typeface="Calibri"/>
-              </a:rPr>
-              <a:t> </a:t>
-            </a:r>
-            <a:r>
-              <a:rPr lang="en-US" dirty="0" err="1" smtClean="0">
-                <a:solidFill>
-                  <a:srgbClr val="000000"/>
-                </a:solidFill>
-                <a:latin typeface="Calibri"/>
-              </a:rPr>
-              <a:t>Genauigkeit</a:t>
-            </a:r>
-            <a:r>
-              <a:rPr lang="en-US" dirty="0" smtClean="0">
-                <a:solidFill>
-                  <a:srgbClr val="000000"/>
-                </a:solidFill>
-                <a:latin typeface="Calibri"/>
-              </a:rPr>
-              <a:t> </a:t>
-            </a:r>
-            <a:r>
-              <a:rPr lang="en-US" dirty="0" err="1" smtClean="0">
-                <a:solidFill>
-                  <a:srgbClr val="000000"/>
-                </a:solidFill>
-                <a:latin typeface="Calibri"/>
-              </a:rPr>
-              <a:t>kein</a:t>
-            </a:r>
-            <a:r>
-              <a:rPr lang="en-US" dirty="0" smtClean="0">
-                <a:solidFill>
-                  <a:srgbClr val="000000"/>
-                </a:solidFill>
-                <a:latin typeface="Calibri"/>
-              </a:rPr>
-              <a:t> </a:t>
-            </a:r>
-            <a:r>
-              <a:rPr lang="en-US" dirty="0" err="1" smtClean="0">
-                <a:solidFill>
-                  <a:srgbClr val="000000"/>
-                </a:solidFill>
-                <a:latin typeface="Calibri"/>
-              </a:rPr>
-              <a:t>grossen</a:t>
-            </a:r>
-            <a:r>
-              <a:rPr lang="en-US" dirty="0" smtClean="0">
-                <a:solidFill>
-                  <a:srgbClr val="000000"/>
-                </a:solidFill>
-                <a:latin typeface="Calibri"/>
-              </a:rPr>
-              <a:t> </a:t>
-            </a:r>
-            <a:r>
-              <a:rPr lang="en-US" dirty="0" err="1" smtClean="0">
-                <a:solidFill>
-                  <a:srgbClr val="000000"/>
-                </a:solidFill>
-                <a:latin typeface="Calibri"/>
-              </a:rPr>
-              <a:t>Einfluss</a:t>
-            </a:r>
-            <a:endParaRPr lang="en-US" dirty="0" smtClean="0">
-              <a:solidFill>
-                <a:srgbClr val="000000"/>
-              </a:solidFill>
-              <a:latin typeface="Calibri"/>
-            </a:endParaRPr>
-          </a:p>
-          <a:p>
-            <a:pPr lvl="1">
-              <a:buFont typeface="Arial"/>
-              <a:buChar char="•"/>
-            </a:pPr>
-            <a:r>
-              <a:rPr lang="en-US" dirty="0" smtClean="0">
-                <a:solidFill>
-                  <a:srgbClr val="000000"/>
-                </a:solidFill>
-                <a:latin typeface="Calibri"/>
-              </a:rPr>
-              <a:t> </a:t>
-            </a:r>
-            <a:r>
-              <a:rPr lang="en-US" dirty="0" err="1" smtClean="0">
-                <a:solidFill>
-                  <a:srgbClr val="000000"/>
-                </a:solidFill>
-                <a:latin typeface="Calibri"/>
-              </a:rPr>
-              <a:t>Zeit</a:t>
-            </a:r>
-            <a:r>
-              <a:rPr lang="en-US" dirty="0" smtClean="0">
-                <a:solidFill>
-                  <a:srgbClr val="000000"/>
-                </a:solidFill>
-                <a:latin typeface="Calibri"/>
-              </a:rPr>
-              <a:t> </a:t>
-            </a:r>
-            <a:r>
-              <a:rPr lang="en-US" dirty="0" err="1" smtClean="0">
-                <a:solidFill>
-                  <a:srgbClr val="000000"/>
-                </a:solidFill>
-                <a:latin typeface="Calibri"/>
-              </a:rPr>
-              <a:t>nimmt</a:t>
-            </a:r>
-            <a:r>
-              <a:rPr lang="en-US" dirty="0" smtClean="0">
-                <a:solidFill>
-                  <a:srgbClr val="000000"/>
-                </a:solidFill>
-                <a:latin typeface="Calibri"/>
-              </a:rPr>
-              <a:t> </a:t>
-            </a:r>
-            <a:r>
-              <a:rPr lang="en-US" smtClean="0">
-                <a:solidFill>
-                  <a:srgbClr val="000000"/>
-                </a:solidFill>
-                <a:latin typeface="Calibri"/>
-              </a:rPr>
-              <a:t>zu</a:t>
-            </a:r>
-            <a:endParaRPr lang="en-US" dirty="0" smtClean="0">
-              <a:solidFill>
-                <a:srgbClr val="000000"/>
-              </a:solidFill>
-              <a:latin typeface="Calibri"/>
-            </a:endParaRPr>
-          </a:p>
-          <a:p>
-            <a:pPr>
-              <a:buFont typeface="Arial"/>
-              <a:buChar char="•"/>
-            </a:pPr>
-            <a:endParaRPr dirty="0"/>
+              <a:rPr lang="en-US" sz="2000">
+                <a:solidFill>
+                  <a:srgbClr val="000000"/>
+                </a:solidFill>
+                <a:latin typeface="Calibri"/>
+              </a:rPr>
+              <a:t>Grid Suche über Parameterraum</a:t>
+            </a:r>
+            <a:endParaRPr/>
           </a:p>
         </p:txBody>
       </p:sp>
     </p:spTree>
-    <p:extLst>
-      <p:ext uri="{BB962C8B-B14F-4D97-AF65-F5344CB8AC3E}">
-        <p14:creationId xmlns:p14="http://schemas.microsoft.com/office/powerpoint/2010/main" val="2766054698"/>
-      </p:ext>
-    </p:extLst>
   </p:cSld>
   <p:clrMapOvr>
     <a:masterClrMapping/>
@@ -6454,43 +6212,6 @@
       </p:sp>
       <p:sp>
         <p:nvSpPr>
-          <p:cNvPr id="149" name="CustomShape 2"/>
-          <p:cNvSpPr/>
-          <p:nvPr/>
-        </p:nvSpPr>
-        <p:spPr>
-          <a:xfrm>
-            <a:off x="736560" y="7197840"/>
-            <a:ext cx="7484400" cy="178560"/>
-          </a:xfrm>
-          <a:prstGeom prst="rect">
-            <a:avLst/>
-          </a:prstGeom>
-        </p:spPr>
-        <p:txBody>
-          <a:bodyPr lIns="0" tIns="0" rIns="0" bIns="0" anchor="b"/>
-          <a:lstStyle/>
-          <a:p>
-            <a:pPr>
-              <a:lnSpc>
-                <a:spcPct val="100000"/>
-              </a:lnSpc>
-            </a:pPr>
-            <a:r>
-              <a:rPr lang="en-US" sz="1200">
-                <a:solidFill>
-                  <a:srgbClr val="000000"/>
-                </a:solidFill>
-                <a:latin typeface="Calibri"/>
-              </a:rPr>
-              <a:t>Terrorismus</a:t>
-            </a:r>
-            <a:endParaRPr/>
-          </a:p>
-        </p:txBody>
-      </p:sp>
-      <p:sp>
-        <p:nvSpPr>
           <p:cNvPr id="150" name="CustomShape 3"/>
           <p:cNvSpPr/>
           <p:nvPr/>
@@ -6563,34 +6284,535 @@
           </a:p>
         </p:txBody>
       </p:sp>
-      <p:graphicFrame>
-        <p:nvGraphicFramePr>
-          <p:cNvPr id="8" name="Diagramm 7"/>
-          <p:cNvGraphicFramePr>
-            <a:graphicFrameLocks/>
-          </p:cNvGraphicFramePr>
-          <p:nvPr>
-            <p:extLst>
-              <p:ext uri="{D42A27DB-BD31-4B8C-83A1-F6EECF244321}">
-                <p14:modId xmlns:p14="http://schemas.microsoft.com/office/powerpoint/2010/main" val="2123035825"/>
-              </p:ext>
-            </p:extLst>
-          </p:nvPr>
-        </p:nvGraphicFramePr>
-        <p:xfrm>
-          <a:off x="736560" y="2004457"/>
-          <a:ext cx="9213120" cy="4832350"/>
-        </p:xfrm>
-        <a:graphic>
-          <a:graphicData uri="http://schemas.openxmlformats.org/drawingml/2006/chart">
-            <c:chart xmlns:c="http://schemas.openxmlformats.org/drawingml/2006/chart" xmlns:r="http://schemas.openxmlformats.org/officeDocument/2006/relationships" r:id="rId3"/>
-          </a:graphicData>
-        </a:graphic>
-      </p:graphicFrame>
+      <p:sp>
+        <p:nvSpPr>
+          <p:cNvPr id="152" name="CustomShape 5"/>
+          <p:cNvSpPr/>
+          <p:nvPr/>
+        </p:nvSpPr>
+        <p:spPr>
+          <a:xfrm>
+            <a:off x="738360" y="2197080"/>
+            <a:ext cx="9213120" cy="4463280"/>
+          </a:xfrm>
+          <a:prstGeom prst="rect">
+            <a:avLst/>
+          </a:prstGeom>
+        </p:spPr>
+        <p:txBody>
+          <a:bodyPr lIns="0" tIns="0" rIns="0" bIns="0"/>
+          <a:lstStyle/>
+          <a:p>
+            <a:pPr>
+              <a:lnSpc>
+                <a:spcPct val="100000"/>
+              </a:lnSpc>
+              <a:buFont typeface="Arial"/>
+              <a:buChar char="•"/>
+            </a:pPr>
+            <a:r>
+              <a:rPr lang="en-US" sz="2000" dirty="0">
+                <a:solidFill>
+                  <a:srgbClr val="000000"/>
+                </a:solidFill>
+                <a:latin typeface="Calibri"/>
+              </a:rPr>
+              <a:t> </a:t>
+            </a:r>
+            <a:r>
+              <a:rPr lang="en-US" sz="2000" dirty="0" smtClean="0">
+                <a:solidFill>
+                  <a:srgbClr val="000000"/>
+                </a:solidFill>
+                <a:latin typeface="Calibri"/>
+              </a:rPr>
+              <a:t>Clustering </a:t>
+            </a:r>
+            <a:r>
+              <a:rPr lang="en-US" sz="2000" dirty="0" err="1" smtClean="0">
+                <a:solidFill>
+                  <a:srgbClr val="000000"/>
+                </a:solidFill>
+                <a:latin typeface="Calibri"/>
+              </a:rPr>
+              <a:t>zufällig</a:t>
+            </a:r>
+            <a:r>
+              <a:rPr lang="en-US" sz="2000" dirty="0" smtClean="0">
+                <a:solidFill>
+                  <a:srgbClr val="000000"/>
+                </a:solidFill>
+                <a:latin typeface="Calibri"/>
+              </a:rPr>
+              <a:t> </a:t>
+            </a:r>
+            <a:r>
+              <a:rPr lang="en-US" sz="2000" dirty="0" err="1" smtClean="0">
+                <a:solidFill>
+                  <a:srgbClr val="000000"/>
+                </a:solidFill>
+                <a:latin typeface="Calibri"/>
+              </a:rPr>
+              <a:t>wählen</a:t>
+            </a:r>
+            <a:endParaRPr lang="en-US" sz="2000" dirty="0" smtClean="0">
+              <a:solidFill>
+                <a:srgbClr val="000000"/>
+              </a:solidFill>
+              <a:latin typeface="Calibri"/>
+            </a:endParaRPr>
+          </a:p>
+          <a:p>
+            <a:pPr lvl="1">
+              <a:buFont typeface="Arial"/>
+              <a:buChar char="•"/>
+            </a:pPr>
+            <a:r>
+              <a:rPr lang="en-US" dirty="0" smtClean="0">
+                <a:solidFill>
+                  <a:srgbClr val="000000"/>
+                </a:solidFill>
+                <a:latin typeface="Calibri"/>
+              </a:rPr>
+              <a:t> </a:t>
+            </a:r>
+            <a:r>
+              <a:rPr lang="en-US" dirty="0" err="1" smtClean="0">
+                <a:solidFill>
+                  <a:srgbClr val="000000"/>
+                </a:solidFill>
+                <a:latin typeface="Calibri"/>
+              </a:rPr>
+              <a:t>Einbusse</a:t>
+            </a:r>
+            <a:r>
+              <a:rPr lang="en-US" dirty="0" smtClean="0">
+                <a:solidFill>
+                  <a:srgbClr val="000000"/>
+                </a:solidFill>
+                <a:latin typeface="Calibri"/>
+              </a:rPr>
+              <a:t>: ca. </a:t>
+            </a:r>
+            <a:r>
+              <a:rPr lang="en-US" dirty="0" smtClean="0">
+                <a:solidFill>
+                  <a:srgbClr val="000000"/>
+                </a:solidFill>
+                <a:latin typeface="Calibri"/>
+              </a:rPr>
+              <a:t>5% in der </a:t>
+            </a:r>
+            <a:r>
+              <a:rPr lang="en-US" dirty="0" err="1" smtClean="0">
+                <a:solidFill>
+                  <a:srgbClr val="000000"/>
+                </a:solidFill>
+                <a:latin typeface="Calibri"/>
+              </a:rPr>
+              <a:t>Genauigkeit</a:t>
+            </a:r>
+            <a:endParaRPr lang="en-US" dirty="0" smtClean="0">
+              <a:solidFill>
+                <a:srgbClr val="000000"/>
+              </a:solidFill>
+              <a:latin typeface="Calibri"/>
+            </a:endParaRPr>
+          </a:p>
+          <a:p>
+            <a:pPr lvl="1">
+              <a:buFont typeface="Arial"/>
+              <a:buChar char="•"/>
+            </a:pPr>
+            <a:r>
+              <a:rPr lang="en-US" dirty="0">
+                <a:solidFill>
+                  <a:srgbClr val="000000"/>
+                </a:solidFill>
+                <a:latin typeface="Calibri"/>
+              </a:rPr>
+              <a:t> </a:t>
+            </a:r>
+            <a:r>
+              <a:rPr lang="en-US" dirty="0" err="1" smtClean="0">
+                <a:solidFill>
+                  <a:srgbClr val="000000"/>
+                </a:solidFill>
+                <a:latin typeface="Calibri"/>
+              </a:rPr>
+              <a:t>Zeitgewinn</a:t>
+            </a:r>
+            <a:r>
+              <a:rPr lang="en-US" dirty="0" smtClean="0">
+                <a:solidFill>
+                  <a:srgbClr val="000000"/>
+                </a:solidFill>
+                <a:latin typeface="Calibri"/>
+              </a:rPr>
+              <a:t>: </a:t>
+            </a:r>
+            <a:r>
+              <a:rPr lang="en-US" dirty="0" err="1" smtClean="0">
+                <a:solidFill>
+                  <a:srgbClr val="000000"/>
+                </a:solidFill>
+                <a:latin typeface="Calibri"/>
+              </a:rPr>
+              <a:t>sehr</a:t>
+            </a:r>
+            <a:r>
+              <a:rPr lang="en-US" dirty="0" smtClean="0">
+                <a:solidFill>
+                  <a:srgbClr val="000000"/>
+                </a:solidFill>
+                <a:latin typeface="Calibri"/>
+              </a:rPr>
+              <a:t> gross</a:t>
+            </a:r>
+          </a:p>
+          <a:p>
+            <a:pPr>
+              <a:buFont typeface="Arial"/>
+              <a:buChar char="•"/>
+            </a:pPr>
+            <a:r>
+              <a:rPr lang="en-US" dirty="0" smtClean="0">
+                <a:solidFill>
+                  <a:srgbClr val="000000"/>
+                </a:solidFill>
+                <a:latin typeface="Calibri"/>
+              </a:rPr>
+              <a:t> Clustering</a:t>
+            </a:r>
+            <a:r>
+              <a:rPr lang="en-US" dirty="0">
+                <a:solidFill>
+                  <a:srgbClr val="000000"/>
+                </a:solidFill>
+                <a:latin typeface="Calibri"/>
+              </a:rPr>
+              <a:t>: K-</a:t>
+            </a:r>
+            <a:r>
+              <a:rPr lang="en-US" dirty="0" err="1">
+                <a:solidFill>
+                  <a:srgbClr val="000000"/>
+                </a:solidFill>
+                <a:latin typeface="Calibri"/>
+              </a:rPr>
+              <a:t>Medoids</a:t>
+            </a:r>
+            <a:endParaRPr lang="en-US" dirty="0">
+              <a:solidFill>
+                <a:srgbClr val="000000"/>
+              </a:solidFill>
+              <a:latin typeface="Calibri"/>
+            </a:endParaRPr>
+          </a:p>
+          <a:p>
+            <a:pPr lvl="1">
+              <a:buFont typeface="Arial"/>
+              <a:buChar char="•"/>
+            </a:pPr>
+            <a:r>
+              <a:rPr lang="en-US" dirty="0">
+                <a:solidFill>
+                  <a:srgbClr val="000000"/>
+                </a:solidFill>
+                <a:latin typeface="Calibri"/>
+              </a:rPr>
+              <a:t> Performance </a:t>
+            </a:r>
+            <a:r>
+              <a:rPr lang="en-US" dirty="0" err="1">
+                <a:solidFill>
+                  <a:srgbClr val="000000"/>
+                </a:solidFill>
+                <a:latin typeface="Calibri"/>
+              </a:rPr>
+              <a:t>Gewinn</a:t>
+            </a:r>
+            <a:r>
+              <a:rPr lang="en-US" dirty="0">
+                <a:solidFill>
+                  <a:srgbClr val="000000"/>
+                </a:solidFill>
+                <a:latin typeface="Calibri"/>
+              </a:rPr>
+              <a:t> </a:t>
+            </a:r>
+            <a:r>
+              <a:rPr lang="en-US" dirty="0" err="1">
+                <a:solidFill>
+                  <a:srgbClr val="000000"/>
+                </a:solidFill>
+                <a:latin typeface="Calibri"/>
+              </a:rPr>
+              <a:t>mit</a:t>
+            </a:r>
+            <a:r>
+              <a:rPr lang="en-US" dirty="0">
+                <a:solidFill>
+                  <a:srgbClr val="000000"/>
+                </a:solidFill>
+                <a:latin typeface="Calibri"/>
+              </a:rPr>
+              <a:t> </a:t>
+            </a:r>
+            <a:r>
+              <a:rPr lang="en-US" dirty="0" err="1">
+                <a:solidFill>
+                  <a:srgbClr val="000000"/>
+                </a:solidFill>
+                <a:latin typeface="Calibri"/>
+              </a:rPr>
+              <a:t>Distanzmatrix</a:t>
+            </a:r>
+            <a:r>
+              <a:rPr lang="en-US" dirty="0">
+                <a:solidFill>
+                  <a:srgbClr val="000000"/>
+                </a:solidFill>
+                <a:latin typeface="Calibri"/>
+              </a:rPr>
+              <a:t> </a:t>
+            </a:r>
+            <a:r>
+              <a:rPr lang="en-US" dirty="0">
+                <a:solidFill>
+                  <a:srgbClr val="000000"/>
+                </a:solidFill>
+                <a:latin typeface="Calibri"/>
+                <a:sym typeface="Wingdings"/>
+              </a:rPr>
+              <a:t> </a:t>
+            </a:r>
+            <a:r>
+              <a:rPr lang="en-US" dirty="0" err="1">
+                <a:solidFill>
+                  <a:srgbClr val="000000"/>
+                </a:solidFill>
+                <a:latin typeface="Calibri"/>
+                <a:sym typeface="Wingdings"/>
+              </a:rPr>
+              <a:t>Speicherverbrauch</a:t>
+            </a:r>
+            <a:r>
+              <a:rPr lang="en-US" dirty="0">
+                <a:solidFill>
+                  <a:srgbClr val="000000"/>
+                </a:solidFill>
+                <a:latin typeface="Calibri"/>
+                <a:sym typeface="Wingdings"/>
+              </a:rPr>
+              <a:t>!!</a:t>
+            </a:r>
+            <a:r>
+              <a:rPr lang="en-US" dirty="0" smtClean="0">
+                <a:solidFill>
+                  <a:srgbClr val="000000"/>
+                </a:solidFill>
+                <a:latin typeface="Calibri"/>
+                <a:sym typeface="Wingdings"/>
+              </a:rPr>
+              <a:t>!</a:t>
+            </a:r>
+            <a:endParaRPr lang="en-US" dirty="0" smtClean="0">
+              <a:solidFill>
+                <a:srgbClr val="000000"/>
+              </a:solidFill>
+              <a:latin typeface="Calibri"/>
+            </a:endParaRPr>
+          </a:p>
+          <a:p>
+            <a:pPr>
+              <a:buFont typeface="Arial"/>
+              <a:buChar char="•"/>
+            </a:pPr>
+            <a:r>
+              <a:rPr lang="en-US" dirty="0">
+                <a:solidFill>
+                  <a:srgbClr val="000000"/>
+                </a:solidFill>
+                <a:latin typeface="Calibri"/>
+              </a:rPr>
+              <a:t> </a:t>
+            </a:r>
+            <a:r>
+              <a:rPr lang="en-US" dirty="0" err="1" smtClean="0">
+                <a:solidFill>
+                  <a:srgbClr val="000000"/>
+                </a:solidFill>
+                <a:latin typeface="Calibri"/>
+              </a:rPr>
+              <a:t>Anzahl</a:t>
+            </a:r>
+            <a:r>
+              <a:rPr lang="en-US" dirty="0" smtClean="0">
+                <a:solidFill>
+                  <a:srgbClr val="000000"/>
+                </a:solidFill>
+                <a:latin typeface="Calibri"/>
+              </a:rPr>
+              <a:t> Features</a:t>
+            </a:r>
+          </a:p>
+          <a:p>
+            <a:pPr lvl="1">
+              <a:buFont typeface="Arial"/>
+              <a:buChar char="•"/>
+            </a:pPr>
+            <a:r>
+              <a:rPr lang="en-US" dirty="0">
+                <a:solidFill>
+                  <a:srgbClr val="000000"/>
+                </a:solidFill>
+                <a:latin typeface="Calibri"/>
+              </a:rPr>
+              <a:t> </a:t>
+            </a:r>
+            <a:r>
+              <a:rPr lang="en-US" dirty="0" err="1" smtClean="0">
+                <a:solidFill>
+                  <a:srgbClr val="000000"/>
+                </a:solidFill>
+                <a:latin typeface="Calibri"/>
+              </a:rPr>
+              <a:t>Genauigkeit</a:t>
+            </a:r>
+            <a:r>
+              <a:rPr lang="en-US" dirty="0" smtClean="0">
+                <a:solidFill>
+                  <a:srgbClr val="000000"/>
+                </a:solidFill>
+                <a:latin typeface="Calibri"/>
+              </a:rPr>
+              <a:t> </a:t>
+            </a:r>
+            <a:r>
+              <a:rPr lang="en-US" dirty="0" err="1" smtClean="0">
+                <a:solidFill>
+                  <a:srgbClr val="000000"/>
+                </a:solidFill>
+                <a:latin typeface="Calibri"/>
+              </a:rPr>
+              <a:t>kein</a:t>
+            </a:r>
+            <a:r>
+              <a:rPr lang="en-US" dirty="0" smtClean="0">
+                <a:solidFill>
+                  <a:srgbClr val="000000"/>
+                </a:solidFill>
+                <a:latin typeface="Calibri"/>
+              </a:rPr>
+              <a:t> </a:t>
+            </a:r>
+            <a:r>
+              <a:rPr lang="en-US" dirty="0" err="1" smtClean="0">
+                <a:solidFill>
+                  <a:srgbClr val="000000"/>
+                </a:solidFill>
+                <a:latin typeface="Calibri"/>
+              </a:rPr>
+              <a:t>grossen</a:t>
+            </a:r>
+            <a:r>
+              <a:rPr lang="en-US" dirty="0" smtClean="0">
+                <a:solidFill>
+                  <a:srgbClr val="000000"/>
+                </a:solidFill>
+                <a:latin typeface="Calibri"/>
+              </a:rPr>
+              <a:t> </a:t>
+            </a:r>
+            <a:r>
+              <a:rPr lang="en-US" dirty="0" err="1" smtClean="0">
+                <a:solidFill>
+                  <a:srgbClr val="000000"/>
+                </a:solidFill>
+                <a:latin typeface="Calibri"/>
+              </a:rPr>
+              <a:t>Einfluss</a:t>
+            </a:r>
+            <a:endParaRPr lang="en-US" dirty="0" smtClean="0">
+              <a:solidFill>
+                <a:srgbClr val="000000"/>
+              </a:solidFill>
+              <a:latin typeface="Calibri"/>
+            </a:endParaRPr>
+          </a:p>
+          <a:p>
+            <a:pPr lvl="1">
+              <a:buFont typeface="Arial"/>
+              <a:buChar char="•"/>
+            </a:pPr>
+            <a:r>
+              <a:rPr lang="en-US" dirty="0" smtClean="0">
+                <a:solidFill>
+                  <a:srgbClr val="000000"/>
+                </a:solidFill>
+                <a:latin typeface="Calibri"/>
+              </a:rPr>
+              <a:t> </a:t>
+            </a:r>
+            <a:r>
+              <a:rPr lang="en-US" dirty="0" err="1" smtClean="0">
+                <a:solidFill>
+                  <a:srgbClr val="000000"/>
+                </a:solidFill>
+                <a:latin typeface="Calibri"/>
+              </a:rPr>
+              <a:t>Zeit</a:t>
+            </a:r>
+            <a:r>
+              <a:rPr lang="en-US" dirty="0" smtClean="0">
+                <a:solidFill>
+                  <a:srgbClr val="000000"/>
+                </a:solidFill>
+                <a:latin typeface="Calibri"/>
+              </a:rPr>
+              <a:t> </a:t>
+            </a:r>
+            <a:r>
+              <a:rPr lang="en-US" dirty="0" err="1" smtClean="0">
+                <a:solidFill>
+                  <a:srgbClr val="000000"/>
+                </a:solidFill>
+                <a:latin typeface="Calibri"/>
+              </a:rPr>
+              <a:t>nimmt</a:t>
+            </a:r>
+            <a:r>
+              <a:rPr lang="en-US" dirty="0" smtClean="0">
+                <a:solidFill>
+                  <a:srgbClr val="000000"/>
+                </a:solidFill>
+                <a:latin typeface="Calibri"/>
+              </a:rPr>
+              <a:t> </a:t>
+            </a:r>
+            <a:r>
+              <a:rPr lang="en-US" dirty="0" err="1" smtClean="0">
+                <a:solidFill>
+                  <a:srgbClr val="000000"/>
+                </a:solidFill>
+                <a:latin typeface="Calibri"/>
+              </a:rPr>
+              <a:t>zu</a:t>
+            </a:r>
+            <a:endParaRPr lang="en-US" dirty="0" smtClean="0">
+              <a:solidFill>
+                <a:srgbClr val="000000"/>
+              </a:solidFill>
+              <a:latin typeface="Calibri"/>
+            </a:endParaRPr>
+          </a:p>
+        </p:txBody>
+      </p:sp>
     </p:spTree>
     <p:extLst>
       <p:ext uri="{BB962C8B-B14F-4D97-AF65-F5344CB8AC3E}">
-        <p14:creationId xmlns:p14="http://schemas.microsoft.com/office/powerpoint/2010/main" val="1497363059"/>
+        <p14:creationId xmlns:p14="http://schemas.microsoft.com/office/powerpoint/2010/main" val="2766054698"/>
       </p:ext>
     </p:extLst>
   </p:cSld>
@@ -6683,43 +6905,6 @@
       </p:sp>
       <p:sp>
         <p:nvSpPr>
-          <p:cNvPr id="149" name="CustomShape 2"/>
-          <p:cNvSpPr/>
-          <p:nvPr/>
-        </p:nvSpPr>
-        <p:spPr>
-          <a:xfrm>
-            <a:off x="736560" y="7197840"/>
-            <a:ext cx="7484400" cy="178560"/>
-          </a:xfrm>
-          <a:prstGeom prst="rect">
-            <a:avLst/>
-          </a:prstGeom>
-        </p:spPr>
-        <p:txBody>
-          <a:bodyPr lIns="0" tIns="0" rIns="0" bIns="0" anchor="b"/>
-          <a:lstStyle/>
-          <a:p>
-            <a:pPr>
-              <a:lnSpc>
-                <a:spcPct val="100000"/>
-              </a:lnSpc>
-            </a:pPr>
-            <a:r>
-              <a:rPr lang="en-US" sz="1200">
-                <a:solidFill>
-                  <a:srgbClr val="000000"/>
-                </a:solidFill>
-                <a:latin typeface="Calibri"/>
-              </a:rPr>
-              <a:t>Terrorismus</a:t>
-            </a:r>
-            <a:endParaRPr/>
-          </a:p>
-        </p:txBody>
-      </p:sp>
-      <p:sp>
-        <p:nvSpPr>
           <p:cNvPr id="150" name="CustomShape 3"/>
           <p:cNvSpPr/>
           <p:nvPr/>
@@ -6801,25 +6986,25 @@
           <p:nvPr>
             <p:extLst>
               <p:ext uri="{D42A27DB-BD31-4B8C-83A1-F6EECF244321}">
-                <p14:modId xmlns:p14="http://schemas.microsoft.com/office/powerpoint/2010/main" val="2300890442"/>
+                <p14:modId xmlns:p14="http://schemas.microsoft.com/office/powerpoint/2010/main" val="2123035825"/>
               </p:ext>
             </p:extLst>
           </p:nvPr>
         </p:nvGraphicFramePr>
         <p:xfrm>
-          <a:off x="736560" y="1891837"/>
-          <a:ext cx="9213120" cy="4889500"/>
+          <a:off x="736560" y="2004457"/>
+          <a:ext cx="9213120" cy="4832350"/>
         </p:xfrm>
         <a:graphic>
           <a:graphicData uri="http://schemas.openxmlformats.org/drawingml/2006/chart">
-            <c:chart xmlns:c="http://schemas.openxmlformats.org/drawingml/2006/chart" xmlns:r="http://schemas.openxmlformats.org/officeDocument/2006/relationships" r:id="rId2"/>
+            <c:chart xmlns:c="http://schemas.openxmlformats.org/drawingml/2006/chart" xmlns:r="http://schemas.openxmlformats.org/officeDocument/2006/relationships" r:id="rId3"/>
           </a:graphicData>
         </a:graphic>
       </p:graphicFrame>
     </p:spTree>
     <p:extLst>
       <p:ext uri="{BB962C8B-B14F-4D97-AF65-F5344CB8AC3E}">
-        <p14:creationId xmlns:p14="http://schemas.microsoft.com/office/powerpoint/2010/main" val="574254658"/>
+        <p14:creationId xmlns:p14="http://schemas.microsoft.com/office/powerpoint/2010/main" val="1497363059"/>
       </p:ext>
     </p:extLst>
   </p:cSld>
@@ -6873,6 +7058,198 @@
           <a:chExt cx="0" cy="0"/>
         </a:xfrm>
       </p:grpSpPr>
+      <p:sp>
+        <p:nvSpPr>
+          <p:cNvPr id="148" name="CustomShape 1"/>
+          <p:cNvSpPr/>
+          <p:nvPr/>
+        </p:nvSpPr>
+        <p:spPr>
+          <a:xfrm>
+            <a:off x="8221680" y="7197840"/>
+            <a:ext cx="864360" cy="178560"/>
+          </a:xfrm>
+          <a:prstGeom prst="rect">
+            <a:avLst/>
+          </a:prstGeom>
+        </p:spPr>
+        <p:txBody>
+          <a:bodyPr lIns="0" tIns="0" rIns="0" bIns="0" anchor="b"/>
+          <a:lstStyle/>
+          <a:p>
+            <a:pPr>
+              <a:lnSpc>
+                <a:spcPct val="100000"/>
+              </a:lnSpc>
+            </a:pPr>
+            <a:r>
+              <a:rPr lang="en-US" sz="1200">
+                <a:solidFill>
+                  <a:srgbClr val="000000"/>
+                </a:solidFill>
+                <a:latin typeface="Calibri"/>
+              </a:rPr>
+              <a:t>6/5/13</a:t>
+            </a:r>
+            <a:endParaRPr/>
+          </a:p>
+        </p:txBody>
+      </p:sp>
+      <p:sp>
+        <p:nvSpPr>
+          <p:cNvPr id="150" name="CustomShape 3"/>
+          <p:cNvSpPr/>
+          <p:nvPr/>
+        </p:nvSpPr>
+        <p:spPr>
+          <a:xfrm>
+            <a:off x="9086760" y="7197840"/>
+            <a:ext cx="862920" cy="178560"/>
+          </a:xfrm>
+          <a:prstGeom prst="rect">
+            <a:avLst/>
+          </a:prstGeom>
+        </p:spPr>
+        <p:txBody>
+          <a:bodyPr lIns="0" tIns="0" rIns="0" bIns="0" anchor="b"/>
+          <a:lstStyle/>
+          <a:p>
+            <a:pPr>
+              <a:lnSpc>
+                <a:spcPct val="100000"/>
+              </a:lnSpc>
+            </a:pPr>
+            <a:fld id="{21FBB5D7-22DB-470E-AA37-9D582303BBB4}" type="slidenum">
+              <a:rPr lang="en-US" sz="1200">
+                <a:solidFill>
+                  <a:srgbClr val="000000"/>
+                </a:solidFill>
+                <a:latin typeface="Calibri"/>
+              </a:rPr>
+              <a:t>13</a:t>
+            </a:fld>
+            <a:endParaRPr/>
+          </a:p>
+        </p:txBody>
+      </p:sp>
+      <p:sp>
+        <p:nvSpPr>
+          <p:cNvPr id="151" name="CustomShape 4"/>
+          <p:cNvSpPr/>
+          <p:nvPr/>
+        </p:nvSpPr>
+        <p:spPr>
+          <a:xfrm>
+            <a:off x="736560" y="1509840"/>
+            <a:ext cx="9213120" cy="361080"/>
+          </a:xfrm>
+          <a:prstGeom prst="rect">
+            <a:avLst/>
+          </a:prstGeom>
+        </p:spPr>
+        <p:txBody>
+          <a:bodyPr lIns="0" tIns="0" rIns="0" bIns="0"/>
+          <a:lstStyle/>
+          <a:p>
+            <a:pPr>
+              <a:lnSpc>
+                <a:spcPct val="100000"/>
+              </a:lnSpc>
+            </a:pPr>
+            <a:r>
+              <a:rPr lang="en-US" sz="2000" b="1" dirty="0" err="1" smtClean="0">
+                <a:solidFill>
+                  <a:srgbClr val="000000"/>
+                </a:solidFill>
+                <a:latin typeface="Calibri"/>
+              </a:rPr>
+              <a:t>Erkenntnisse</a:t>
+            </a:r>
+            <a:endParaRPr dirty="0"/>
+          </a:p>
+        </p:txBody>
+      </p:sp>
+      <p:graphicFrame>
+        <p:nvGraphicFramePr>
+          <p:cNvPr id="8" name="Diagramm 7"/>
+          <p:cNvGraphicFramePr>
+            <a:graphicFrameLocks/>
+          </p:cNvGraphicFramePr>
+          <p:nvPr>
+            <p:extLst>
+              <p:ext uri="{D42A27DB-BD31-4B8C-83A1-F6EECF244321}">
+                <p14:modId xmlns:p14="http://schemas.microsoft.com/office/powerpoint/2010/main" val="2300890442"/>
+              </p:ext>
+            </p:extLst>
+          </p:nvPr>
+        </p:nvGraphicFramePr>
+        <p:xfrm>
+          <a:off x="736560" y="1891837"/>
+          <a:ext cx="9213120" cy="4889500"/>
+        </p:xfrm>
+        <a:graphic>
+          <a:graphicData uri="http://schemas.openxmlformats.org/drawingml/2006/chart">
+            <c:chart xmlns:c="http://schemas.openxmlformats.org/drawingml/2006/chart" xmlns:r="http://schemas.openxmlformats.org/officeDocument/2006/relationships" r:id="rId2"/>
+          </a:graphicData>
+        </a:graphic>
+      </p:graphicFrame>
+    </p:spTree>
+    <p:extLst>
+      <p:ext uri="{BB962C8B-B14F-4D97-AF65-F5344CB8AC3E}">
+        <p14:creationId xmlns:p14="http://schemas.microsoft.com/office/powerpoint/2010/main" val="574254658"/>
+      </p:ext>
+    </p:extLst>
+  </p:cSld>
+  <p:clrMapOvr>
+    <a:masterClrMapping/>
+  </p:clrMapOvr>
+  <p:timing>
+    <p:tnLst>
+      <p:par>
+        <p:cTn xmlns:p14="http://schemas.microsoft.com/office/powerpoint/2010/main" id="1" dur="indefinite" restart="never" nodeType="tmRoot">
+          <p:childTnLst>
+            <p:seq>
+              <p:cTn id="2" nodeType="mainSeq"/>
+              <p:prevCondLst>
+                <p:cond evt="onPrev" delay="0">
+                  <p:tgtEl>
+                    <p:sldTgt/>
+                  </p:tgtEl>
+                </p:cond>
+              </p:prevCondLst>
+              <p:nextCondLst>
+                <p:cond evt="onNext" delay="0">
+                  <p:tgtEl>
+                    <p:sldTgt/>
+                  </p:tgtEl>
+                </p:cond>
+              </p:nextCondLst>
+            </p:seq>
+          </p:childTnLst>
+        </p:cTn>
+      </p:par>
+    </p:tnLst>
+  </p:timing>
+</p:sld>
+</file>
+
+<file path=ppt/slides/slide14.xml><?xml version="1.0" encoding="utf-8"?>
+<p:sld xmlns:a="http://schemas.openxmlformats.org/drawingml/2006/main" xmlns:r="http://schemas.openxmlformats.org/officeDocument/2006/relationships" xmlns:p="http://schemas.openxmlformats.org/presentationml/2006/main">
+  <p:cSld>
+    <p:spTree>
+      <p:nvGrpSpPr>
+        <p:cNvPr id="1" name=""/>
+        <p:cNvGrpSpPr/>
+        <p:nvPr/>
+      </p:nvGrpSpPr>
+      <p:grpSpPr>
+        <a:xfrm>
+          <a:off x="0" y="0"/>
+          <a:ext cx="0" cy="0"/>
+          <a:chOff x="0" y="0"/>
+          <a:chExt cx="0" cy="0"/>
+        </a:xfrm>
+      </p:grpSpPr>
       <p:pic>
         <p:nvPicPr>
           <p:cNvPr id="153" name="Grafik 3"/>
@@ -6990,6 +7367,13 @@
   <p:clrMapOvr>
     <a:masterClrMapping/>
   </p:clrMapOvr>
+  <p:timing>
+    <p:tnLst>
+      <p:par>
+        <p:cTn xmlns:p14="http://schemas.microsoft.com/office/powerpoint/2010/main" id="1" dur="indefinite" restart="never" nodeType="tmRoot"/>
+      </p:par>
+    </p:tnLst>
+  </p:timing>
 </p:sld>
 </file>
 
@@ -7042,43 +7426,6 @@
                 <a:latin typeface="Calibri"/>
               </a:rPr>
               <a:t>6/5/13</a:t>
-            </a:r>
-            <a:endParaRPr/>
-          </a:p>
-        </p:txBody>
-      </p:sp>
-      <p:sp>
-        <p:nvSpPr>
-          <p:cNvPr id="115" name="CustomShape 2"/>
-          <p:cNvSpPr/>
-          <p:nvPr/>
-        </p:nvSpPr>
-        <p:spPr>
-          <a:xfrm>
-            <a:off x="736560" y="7197840"/>
-            <a:ext cx="7484400" cy="178560"/>
-          </a:xfrm>
-          <a:prstGeom prst="rect">
-            <a:avLst/>
-          </a:prstGeom>
-        </p:spPr>
-        <p:txBody>
-          <a:bodyPr lIns="0" tIns="0" rIns="0" bIns="0" anchor="b"/>
-          <a:lstStyle/>
-          <a:p>
-            <a:pPr>
-              <a:lnSpc>
-                <a:spcPct val="100000"/>
-              </a:lnSpc>
-            </a:pPr>
-            <a:r>
-              <a:rPr lang="en-US" sz="1200">
-                <a:solidFill>
-                  <a:srgbClr val="000000"/>
-                </a:solidFill>
-                <a:latin typeface="Calibri"/>
-              </a:rPr>
-              <a:t>Terrorismus</a:t>
             </a:r>
             <a:endParaRPr/>
           </a:p>
@@ -7308,7 +7655,7 @@
       </p:grpSpPr>
       <p:sp>
         <p:nvSpPr>
-          <p:cNvPr id="119" name="CustomShape 1"/>
+          <p:cNvPr id="114" name="CustomShape 1"/>
           <p:cNvSpPr/>
           <p:nvPr/>
         </p:nvSpPr>
@@ -7345,14 +7692,14 @@
       </p:sp>
       <p:sp>
         <p:nvSpPr>
-          <p:cNvPr id="120" name="CustomShape 2"/>
+          <p:cNvPr id="116" name="CustomShape 3"/>
           <p:cNvSpPr/>
           <p:nvPr/>
         </p:nvSpPr>
         <p:spPr>
           <a:xfrm>
-            <a:off x="736560" y="7197840"/>
-            <a:ext cx="7484400" cy="178560"/>
+            <a:off x="9086760" y="7197840"/>
+            <a:ext cx="862920" cy="178560"/>
           </a:xfrm>
           <a:prstGeom prst="rect">
             <a:avLst/>
@@ -7367,36 +7714,36 @@
                 <a:spcPct val="100000"/>
               </a:lnSpc>
             </a:pPr>
-            <a:r>
+            <a:fld id="{4312E052-FE75-4DE4-BAE4-F750BE101167}" type="slidenum">
               <a:rPr lang="en-US" sz="1200">
                 <a:solidFill>
                   <a:srgbClr val="000000"/>
                 </a:solidFill>
                 <a:latin typeface="Calibri"/>
               </a:rPr>
-              <a:t>Terrorismus</a:t>
-            </a:r>
-            <a:endParaRPr/>
-          </a:p>
-        </p:txBody>
-      </p:sp>
-      <p:sp>
-        <p:nvSpPr>
-          <p:cNvPr id="121" name="CustomShape 3"/>
+              <a:t>3</a:t>
+            </a:fld>
+            <a:endParaRPr/>
+          </a:p>
+        </p:txBody>
+      </p:sp>
+      <p:sp>
+        <p:nvSpPr>
+          <p:cNvPr id="117" name="CustomShape 4"/>
           <p:cNvSpPr/>
           <p:nvPr/>
         </p:nvSpPr>
         <p:spPr>
           <a:xfrm>
-            <a:off x="9086760" y="7197840"/>
-            <a:ext cx="862920" cy="178560"/>
-          </a:xfrm>
-          <a:prstGeom prst="rect">
-            <a:avLst/>
-          </a:prstGeom>
-        </p:spPr>
-        <p:txBody>
-          <a:bodyPr lIns="0" tIns="0" rIns="0" bIns="0" anchor="b"/>
+            <a:off x="736560" y="1509840"/>
+            <a:ext cx="9213120" cy="361080"/>
+          </a:xfrm>
+          <a:prstGeom prst="rect">
+            <a:avLst/>
+          </a:prstGeom>
+        </p:spPr>
+        <p:txBody>
+          <a:bodyPr lIns="0" tIns="0" rIns="0" bIns="0"/>
           <a:lstStyle/>
           <a:p>
             <a:pPr>
@@ -7404,59 +7751,22 @@
                 <a:spcPct val="100000"/>
               </a:lnSpc>
             </a:pPr>
-            <a:fld id="{393F1610-C4E6-4F0D-B031-039013E54449}" type="slidenum">
-              <a:rPr lang="en-US" sz="1200">
-                <a:solidFill>
-                  <a:srgbClr val="000000"/>
-                </a:solidFill>
-                <a:latin typeface="Calibri"/>
-              </a:rPr>
-              <a:t>3</a:t>
-            </a:fld>
-            <a:endParaRPr/>
-          </a:p>
-        </p:txBody>
-      </p:sp>
-      <p:sp>
-        <p:nvSpPr>
-          <p:cNvPr id="122" name="CustomShape 4"/>
-          <p:cNvSpPr/>
-          <p:nvPr/>
-        </p:nvSpPr>
-        <p:spPr>
-          <a:xfrm>
-            <a:off x="736560" y="1509840"/>
-            <a:ext cx="9213120" cy="361080"/>
-          </a:xfrm>
-          <a:prstGeom prst="rect">
-            <a:avLst/>
-          </a:prstGeom>
-        </p:spPr>
-        <p:txBody>
-          <a:bodyPr lIns="0" tIns="0" rIns="0" bIns="0"/>
-          <a:lstStyle/>
-          <a:p>
-            <a:pPr>
-              <a:lnSpc>
-                <a:spcPct val="100000"/>
-              </a:lnSpc>
-            </a:pPr>
-            <a:r>
-              <a:rPr lang="en-US" sz="2000" b="1">
-                <a:solidFill>
-                  <a:srgbClr val="000000"/>
-                </a:solidFill>
-                <a:latin typeface="Calibri"/>
-              </a:rPr>
-              <a:t>Clustering</a:t>
-            </a:r>
-            <a:endParaRPr/>
-          </a:p>
-        </p:txBody>
-      </p:sp>
-      <p:sp>
-        <p:nvSpPr>
-          <p:cNvPr id="123" name="CustomShape 5"/>
+            <a:r>
+              <a:rPr lang="en-US" sz="2000" b="1" dirty="0" err="1" smtClean="0">
+                <a:solidFill>
+                  <a:srgbClr val="000000"/>
+                </a:solidFill>
+                <a:latin typeface="Calibri"/>
+              </a:rPr>
+              <a:t>Ablauf</a:t>
+            </a:r>
+            <a:endParaRPr dirty="0"/>
+          </a:p>
+        </p:txBody>
+      </p:sp>
+      <p:sp>
+        <p:nvSpPr>
+          <p:cNvPr id="118" name="CustomShape 5"/>
           <p:cNvSpPr/>
           <p:nvPr/>
         </p:nvSpPr>
@@ -7487,7 +7797,16 @@
                 </a:solidFill>
                 <a:latin typeface="Calibri"/>
               </a:rPr>
-              <a:t> K-</a:t>
+              <a:t> </a:t>
+            </a:r>
+            <a:r>
+              <a:rPr lang="en-US" sz="2000" dirty="0" smtClean="0">
+                <a:solidFill>
+                  <a:srgbClr val="000000"/>
+                </a:solidFill>
+                <a:latin typeface="Calibri"/>
+              </a:rPr>
+              <a:t>Feature </a:t>
             </a:r>
             <a:r>
               <a:rPr lang="en-US" sz="2000" dirty="0" err="1" smtClean="0">
@@ -7496,139 +7815,7 @@
                 </a:solidFill>
                 <a:latin typeface="Calibri"/>
               </a:rPr>
-              <a:t>Medoids</a:t>
-            </a:r>
-            <a:endParaRPr lang="en-US" sz="2000" dirty="0" smtClean="0">
-              <a:solidFill>
-                <a:srgbClr val="000000"/>
-              </a:solidFill>
-              <a:latin typeface="Calibri"/>
-            </a:endParaRPr>
-          </a:p>
-          <a:p>
-            <a:pPr lvl="1">
-              <a:buFont typeface="Arial"/>
-              <a:buChar char="•"/>
-            </a:pPr>
-            <a:r>
-              <a:rPr lang="en-US" sz="2000" dirty="0" smtClean="0">
-                <a:solidFill>
-                  <a:srgbClr val="000000"/>
-                </a:solidFill>
-                <a:latin typeface="Calibri"/>
-              </a:rPr>
-              <a:t> </a:t>
-            </a:r>
-            <a:r>
-              <a:rPr lang="en-US" sz="2000" dirty="0" err="1" smtClean="0">
-                <a:solidFill>
-                  <a:srgbClr val="000000"/>
-                </a:solidFill>
-                <a:latin typeface="Calibri"/>
-              </a:rPr>
-              <a:t>keine</a:t>
-            </a:r>
-            <a:r>
-              <a:rPr lang="en-US" sz="2000" dirty="0" smtClean="0">
-                <a:solidFill>
-                  <a:srgbClr val="000000"/>
-                </a:solidFill>
-                <a:latin typeface="Calibri"/>
-              </a:rPr>
-              <a:t> </a:t>
-            </a:r>
-            <a:r>
-              <a:rPr lang="en-US" sz="2000" dirty="0" err="1">
-                <a:solidFill>
-                  <a:srgbClr val="000000"/>
-                </a:solidFill>
-                <a:latin typeface="Calibri"/>
-              </a:rPr>
-              <a:t>Mindestklassengrösse</a:t>
-            </a:r>
-            <a:endParaRPr lang="en-US" sz="2000" dirty="0">
-              <a:solidFill>
-                <a:srgbClr val="000000"/>
-              </a:solidFill>
-              <a:latin typeface="Calibri"/>
-            </a:endParaRPr>
-          </a:p>
-          <a:p>
-            <a:pPr lvl="1">
-              <a:buFont typeface="Arial"/>
-              <a:buChar char="•"/>
-            </a:pPr>
-            <a:r>
-              <a:rPr lang="en-US" sz="2000" dirty="0">
-                <a:solidFill>
-                  <a:srgbClr val="000000"/>
-                </a:solidFill>
-                <a:latin typeface="Calibri"/>
-              </a:rPr>
-              <a:t> </a:t>
-            </a:r>
-            <a:r>
-              <a:rPr lang="en-US" sz="2000" dirty="0" err="1">
-                <a:solidFill>
-                  <a:srgbClr val="000000"/>
-                </a:solidFill>
-                <a:latin typeface="Calibri"/>
-              </a:rPr>
-              <a:t>Abbruch</a:t>
-            </a:r>
-            <a:r>
-              <a:rPr lang="en-US" sz="2000" dirty="0">
-                <a:solidFill>
-                  <a:srgbClr val="000000"/>
-                </a:solidFill>
-                <a:latin typeface="Calibri"/>
-              </a:rPr>
-              <a:t>: </a:t>
-            </a:r>
-            <a:r>
-              <a:rPr lang="en-US" sz="2000" dirty="0" err="1">
-                <a:solidFill>
-                  <a:srgbClr val="000000"/>
-                </a:solidFill>
-                <a:latin typeface="Calibri"/>
-              </a:rPr>
-              <a:t>keine</a:t>
-            </a:r>
-            <a:r>
-              <a:rPr lang="en-US" sz="2000" dirty="0">
-                <a:solidFill>
-                  <a:srgbClr val="000000"/>
-                </a:solidFill>
-                <a:latin typeface="Calibri"/>
-              </a:rPr>
-              <a:t> </a:t>
-            </a:r>
-            <a:r>
-              <a:rPr lang="en-US" sz="2000" dirty="0" err="1">
-                <a:solidFill>
-                  <a:srgbClr val="000000"/>
-                </a:solidFill>
-                <a:latin typeface="Calibri"/>
-              </a:rPr>
-              <a:t>Änderung</a:t>
-            </a:r>
-            <a:r>
-              <a:rPr lang="en-US" sz="2000" dirty="0">
-                <a:solidFill>
-                  <a:srgbClr val="000000"/>
-                </a:solidFill>
-                <a:latin typeface="Calibri"/>
-              </a:rPr>
-              <a:t> der </a:t>
-            </a:r>
-            <a:r>
-              <a:rPr lang="en-US" sz="2000" dirty="0" err="1" smtClean="0">
-                <a:solidFill>
-                  <a:srgbClr val="000000"/>
-                </a:solidFill>
-                <a:latin typeface="Calibri"/>
-              </a:rPr>
-              <a:t>Distorsion</a:t>
+              <a:t>Extraktion</a:t>
             </a:r>
             <a:endParaRPr dirty="0"/>
           </a:p>
@@ -7650,40 +7837,13 @@
               <a:t> </a:t>
             </a:r>
             <a:r>
-              <a:rPr lang="en-US" sz="2000" dirty="0" err="1">
-                <a:solidFill>
-                  <a:srgbClr val="000000"/>
-                </a:solidFill>
-                <a:latin typeface="Calibri"/>
-              </a:rPr>
-              <a:t>Erste</a:t>
-            </a:r>
-            <a:r>
-              <a:rPr lang="en-US" sz="2000" dirty="0">
-                <a:solidFill>
-                  <a:srgbClr val="000000"/>
-                </a:solidFill>
-                <a:latin typeface="Calibri"/>
-              </a:rPr>
-              <a:t> K Features </a:t>
-            </a:r>
-            <a:r>
-              <a:rPr lang="en-US" sz="2000" dirty="0" err="1">
-                <a:solidFill>
-                  <a:srgbClr val="000000"/>
-                </a:solidFill>
-                <a:latin typeface="Calibri"/>
-              </a:rPr>
-              <a:t>als</a:t>
-            </a:r>
-            <a:r>
-              <a:rPr lang="en-US" sz="2000" dirty="0">
-                <a:solidFill>
-                  <a:srgbClr val="000000"/>
-                </a:solidFill>
-                <a:latin typeface="Calibri"/>
-              </a:rPr>
-              <a:t> Center</a:t>
+              <a:rPr lang="de-CH" sz="2000" dirty="0" smtClean="0">
+                <a:solidFill>
+                  <a:srgbClr val="000000"/>
+                </a:solidFill>
+                <a:latin typeface="Calibri"/>
+              </a:rPr>
+              <a:t>Clustering um die K ähnlichsten Features zu entdecken</a:t>
             </a:r>
             <a:endParaRPr dirty="0"/>
           </a:p>
@@ -7705,40 +7865,31 @@
               <a:t> </a:t>
             </a:r>
             <a:r>
-              <a:rPr lang="en-US" sz="2000" dirty="0" err="1">
-                <a:solidFill>
-                  <a:srgbClr val="000000"/>
-                </a:solidFill>
-                <a:latin typeface="Calibri"/>
-              </a:rPr>
-              <a:t>Parallelisierte</a:t>
-            </a:r>
-            <a:r>
-              <a:rPr lang="en-US" sz="2000" dirty="0">
-                <a:solidFill>
-                  <a:srgbClr val="000000"/>
-                </a:solidFill>
-                <a:latin typeface="Calibri"/>
-              </a:rPr>
-              <a:t> </a:t>
-            </a:r>
-            <a:r>
-              <a:rPr lang="en-US" sz="2000" dirty="0" err="1">
-                <a:solidFill>
-                  <a:srgbClr val="000000"/>
-                </a:solidFill>
-                <a:latin typeface="Calibri"/>
-              </a:rPr>
-              <a:t>Suche</a:t>
-            </a:r>
-            <a:r>
-              <a:rPr lang="en-US" sz="2000" dirty="0">
-                <a:solidFill>
-                  <a:srgbClr val="000000"/>
-                </a:solidFill>
-                <a:latin typeface="Calibri"/>
-              </a:rPr>
-              <a:t> der Center</a:t>
+              <a:rPr lang="de-CH" sz="2000" dirty="0" smtClean="0">
+                <a:solidFill>
+                  <a:srgbClr val="000000"/>
+                </a:solidFill>
+                <a:latin typeface="Calibri"/>
+              </a:rPr>
+              <a:t>Anlernen des </a:t>
+            </a:r>
+            <a:r>
+              <a:rPr lang="de-CH" sz="2000" dirty="0" err="1" smtClean="0">
+                <a:solidFill>
+                  <a:srgbClr val="000000"/>
+                </a:solidFill>
+                <a:latin typeface="Calibri"/>
+              </a:rPr>
+              <a:t>Klassifikators</a:t>
+            </a:r>
+            <a:r>
+              <a:rPr lang="de-CH" sz="2000" dirty="0" smtClean="0">
+                <a:solidFill>
+                  <a:srgbClr val="000000"/>
+                </a:solidFill>
+                <a:latin typeface="Calibri"/>
+              </a:rPr>
+              <a:t> mit den K Features</a:t>
             </a:r>
             <a:endParaRPr dirty="0"/>
           </a:p>
@@ -7760,40 +7911,13 @@
               <a:t> </a:t>
             </a:r>
             <a:r>
-              <a:rPr lang="en-US" sz="2000" dirty="0" err="1">
-                <a:solidFill>
-                  <a:srgbClr val="000000"/>
-                </a:solidFill>
-                <a:latin typeface="Calibri"/>
-              </a:rPr>
-              <a:t>Parallelisierte</a:t>
-            </a:r>
-            <a:r>
-              <a:rPr lang="en-US" sz="2000" dirty="0">
-                <a:solidFill>
-                  <a:srgbClr val="000000"/>
-                </a:solidFill>
-                <a:latin typeface="Calibri"/>
-              </a:rPr>
-              <a:t> </a:t>
-            </a:r>
-            <a:r>
-              <a:rPr lang="en-US" sz="2000" dirty="0" err="1">
-                <a:solidFill>
-                  <a:srgbClr val="000000"/>
-                </a:solidFill>
-                <a:latin typeface="Calibri"/>
-              </a:rPr>
-              <a:t>Bearbeitung</a:t>
-            </a:r>
-            <a:r>
-              <a:rPr lang="en-US" sz="2000" dirty="0">
-                <a:solidFill>
-                  <a:srgbClr val="000000"/>
-                </a:solidFill>
-                <a:latin typeface="Calibri"/>
-              </a:rPr>
-              <a:t> der </a:t>
+              <a:rPr lang="en-US" sz="2000" dirty="0" err="1" smtClean="0">
+                <a:solidFill>
+                  <a:srgbClr val="000000"/>
+                </a:solidFill>
+                <a:latin typeface="Calibri"/>
+              </a:rPr>
+              <a:t>Anfragen</a:t>
             </a:r>
             <a:r>
               <a:rPr lang="en-US" sz="2000" dirty="0" smtClean="0">
@@ -7802,332 +7926,27 @@
                 </a:solidFill>
                 <a:latin typeface="Calibri"/>
               </a:rPr>
-              <a:t>Cluster</a:t>
-            </a:r>
-          </a:p>
-          <a:p>
-            <a:pPr>
-              <a:lnSpc>
-                <a:spcPct val="100000"/>
-              </a:lnSpc>
-              <a:buFont typeface="Arial"/>
-              <a:buChar char="•"/>
-            </a:pPr>
-            <a:r>
-              <a:rPr lang="en-US" sz="2000" dirty="0" smtClean="0">
-                <a:solidFill>
-                  <a:srgbClr val="000000"/>
-                </a:solidFill>
-                <a:latin typeface="Calibri"/>
-              </a:rPr>
-              <a:t> </a:t>
+              <a:t> an den </a:t>
+            </a:r>
+            <a:r>
+              <a:rPr lang="en-US" sz="2000" dirty="0" err="1" smtClean="0">
+                <a:solidFill>
+                  <a:srgbClr val="000000"/>
+                </a:solidFill>
+                <a:latin typeface="Calibri"/>
+              </a:rPr>
+              <a:t>Klassifikator</a:t>
             </a:r>
             <a:endParaRPr dirty="0"/>
           </a:p>
         </p:txBody>
       </p:sp>
     </p:spTree>
-  </p:cSld>
-  <p:clrMapOvr>
-    <a:masterClrMapping/>
-  </p:clrMapOvr>
-  <p:timing>
-    <p:tnLst>
-      <p:par>
-        <p:cTn xmlns:p14="http://schemas.microsoft.com/office/powerpoint/2010/main" id="1" dur="indefinite" restart="never" nodeType="tmRoot"/>
-      </p:par>
-    </p:tnLst>
-  </p:timing>
-</p:sld>
-</file>
-
-<file path=ppt/slides/slide4.xml><?xml version="1.0" encoding="utf-8"?>
-<p:sld xmlns:a="http://schemas.openxmlformats.org/drawingml/2006/main" xmlns:r="http://schemas.openxmlformats.org/officeDocument/2006/relationships" xmlns:p="http://schemas.openxmlformats.org/presentationml/2006/main">
-  <p:cSld>
-    <p:spTree>
-      <p:nvGrpSpPr>
-        <p:cNvPr id="1" name=""/>
-        <p:cNvGrpSpPr/>
-        <p:nvPr/>
-      </p:nvGrpSpPr>
-      <p:grpSpPr>
-        <a:xfrm>
-          <a:off x="0" y="0"/>
-          <a:ext cx="0" cy="0"/>
-          <a:chOff x="0" y="0"/>
-          <a:chExt cx="0" cy="0"/>
-        </a:xfrm>
-      </p:grpSpPr>
-      <p:sp>
-        <p:nvSpPr>
-          <p:cNvPr id="124" name="CustomShape 1"/>
-          <p:cNvSpPr/>
-          <p:nvPr/>
-        </p:nvSpPr>
-        <p:spPr>
-          <a:xfrm>
-            <a:off x="8221680" y="7197840"/>
-            <a:ext cx="864360" cy="178560"/>
-          </a:xfrm>
-          <a:prstGeom prst="rect">
-            <a:avLst/>
-          </a:prstGeom>
-        </p:spPr>
-        <p:txBody>
-          <a:bodyPr lIns="0" tIns="0" rIns="0" bIns="0" anchor="b"/>
-          <a:lstStyle/>
-          <a:p>
-            <a:pPr>
-              <a:lnSpc>
-                <a:spcPct val="100000"/>
-              </a:lnSpc>
-            </a:pPr>
-            <a:r>
-              <a:rPr lang="en-US" sz="1200">
-                <a:solidFill>
-                  <a:srgbClr val="000000"/>
-                </a:solidFill>
-                <a:latin typeface="Calibri"/>
-              </a:rPr>
-              <a:t>6/5/13</a:t>
-            </a:r>
-            <a:endParaRPr/>
-          </a:p>
-        </p:txBody>
-      </p:sp>
-      <p:sp>
-        <p:nvSpPr>
-          <p:cNvPr id="125" name="CustomShape 2"/>
-          <p:cNvSpPr/>
-          <p:nvPr/>
-        </p:nvSpPr>
-        <p:spPr>
-          <a:xfrm>
-            <a:off x="736560" y="7197840"/>
-            <a:ext cx="7484400" cy="178560"/>
-          </a:xfrm>
-          <a:prstGeom prst="rect">
-            <a:avLst/>
-          </a:prstGeom>
-        </p:spPr>
-        <p:txBody>
-          <a:bodyPr lIns="0" tIns="0" rIns="0" bIns="0" anchor="b"/>
-          <a:lstStyle/>
-          <a:p>
-            <a:pPr>
-              <a:lnSpc>
-                <a:spcPct val="100000"/>
-              </a:lnSpc>
-            </a:pPr>
-            <a:r>
-              <a:rPr lang="en-US" sz="1200">
-                <a:solidFill>
-                  <a:srgbClr val="000000"/>
-                </a:solidFill>
-                <a:latin typeface="Calibri"/>
-              </a:rPr>
-              <a:t>Terrorismus</a:t>
-            </a:r>
-            <a:endParaRPr/>
-          </a:p>
-        </p:txBody>
-      </p:sp>
-      <p:sp>
-        <p:nvSpPr>
-          <p:cNvPr id="126" name="CustomShape 3"/>
-          <p:cNvSpPr/>
-          <p:nvPr/>
-        </p:nvSpPr>
-        <p:spPr>
-          <a:xfrm>
-            <a:off x="9086760" y="7197840"/>
-            <a:ext cx="862920" cy="178560"/>
-          </a:xfrm>
-          <a:prstGeom prst="rect">
-            <a:avLst/>
-          </a:prstGeom>
-        </p:spPr>
-        <p:txBody>
-          <a:bodyPr lIns="0" tIns="0" rIns="0" bIns="0" anchor="b"/>
-          <a:lstStyle/>
-          <a:p>
-            <a:pPr>
-              <a:lnSpc>
-                <a:spcPct val="100000"/>
-              </a:lnSpc>
-            </a:pPr>
-            <a:fld id="{8A7FBCE4-E60E-4435-A65B-7A08F91ED2DA}" type="slidenum">
-              <a:rPr lang="en-US" sz="1200">
-                <a:solidFill>
-                  <a:srgbClr val="000000"/>
-                </a:solidFill>
-                <a:latin typeface="Calibri"/>
-              </a:rPr>
-              <a:t>4</a:t>
-            </a:fld>
-            <a:endParaRPr/>
-          </a:p>
-        </p:txBody>
-      </p:sp>
-      <p:sp>
-        <p:nvSpPr>
-          <p:cNvPr id="127" name="CustomShape 4"/>
-          <p:cNvSpPr/>
-          <p:nvPr/>
-        </p:nvSpPr>
-        <p:spPr>
-          <a:xfrm>
-            <a:off x="736560" y="1509840"/>
-            <a:ext cx="9213120" cy="361080"/>
-          </a:xfrm>
-          <a:prstGeom prst="rect">
-            <a:avLst/>
-          </a:prstGeom>
-        </p:spPr>
-        <p:txBody>
-          <a:bodyPr lIns="0" tIns="0" rIns="0" bIns="0"/>
-          <a:lstStyle/>
-          <a:p>
-            <a:pPr>
-              <a:lnSpc>
-                <a:spcPct val="100000"/>
-              </a:lnSpc>
-            </a:pPr>
-            <a:r>
-              <a:rPr lang="en-US" sz="2000" b="1">
-                <a:solidFill>
-                  <a:srgbClr val="000000"/>
-                </a:solidFill>
-                <a:latin typeface="Calibri"/>
-              </a:rPr>
-              <a:t>Naive Bayes</a:t>
-            </a:r>
-            <a:endParaRPr/>
-          </a:p>
-        </p:txBody>
-      </p:sp>
-      <p:sp>
-        <p:nvSpPr>
-          <p:cNvPr id="128" name="CustomShape 5"/>
-          <p:cNvSpPr/>
-          <p:nvPr/>
-        </p:nvSpPr>
-        <p:spPr>
-          <a:xfrm>
-            <a:off x="738360" y="2197080"/>
-            <a:ext cx="9213120" cy="4463280"/>
-          </a:xfrm>
-          <a:prstGeom prst="rect">
-            <a:avLst/>
-          </a:prstGeom>
-        </p:spPr>
-        <p:txBody>
-          <a:bodyPr lIns="0" tIns="0" rIns="0" bIns="0"/>
-          <a:lstStyle/>
-          <a:p>
-            <a:pPr>
-              <a:lnSpc>
-                <a:spcPct val="100000"/>
-              </a:lnSpc>
-              <a:buFont typeface="Arial"/>
-              <a:buChar char="•"/>
-            </a:pPr>
-            <a:r>
-              <a:rPr lang="en-US" sz="2000">
-                <a:solidFill>
-                  <a:srgbClr val="000000"/>
-                </a:solidFill>
-                <a:latin typeface="Calibri"/>
-              </a:rPr>
-              <a:t>Probabilistischer Classifier</a:t>
-            </a:r>
-            <a:endParaRPr/>
-          </a:p>
-          <a:p>
-            <a:pPr>
-              <a:lnSpc>
-                <a:spcPct val="100000"/>
-              </a:lnSpc>
-              <a:buFont typeface="Arial"/>
-              <a:buChar char="•"/>
-            </a:pPr>
-            <a:r>
-              <a:rPr lang="en-US" sz="2000">
-                <a:solidFill>
-                  <a:srgbClr val="000000"/>
-                </a:solidFill>
-                <a:latin typeface="Calibri"/>
-              </a:rPr>
-              <a:t>Sehr einfach</a:t>
-            </a:r>
-            <a:endParaRPr/>
-          </a:p>
-          <a:p>
-            <a:pPr>
-              <a:lnSpc>
-                <a:spcPct val="100000"/>
-              </a:lnSpc>
-              <a:buFont typeface="Arial"/>
-              <a:buChar char="•"/>
-            </a:pPr>
-            <a:r>
-              <a:rPr lang="en-US" sz="2000">
-                <a:solidFill>
-                  <a:srgbClr val="000000"/>
-                </a:solidFill>
-                <a:latin typeface="Calibri"/>
-              </a:rPr>
-              <a:t>Sehr schnell</a:t>
-            </a:r>
-            <a:endParaRPr/>
-          </a:p>
-        </p:txBody>
-      </p:sp>
-      <p:pic>
-        <p:nvPicPr>
-          <p:cNvPr id="129" name="Bild 128"/>
-          <p:cNvPicPr/>
-          <p:nvPr/>
-        </p:nvPicPr>
-        <p:blipFill>
-          <a:blip r:embed="rId2"/>
-          <a:stretch>
-            <a:fillRect/>
-          </a:stretch>
-        </p:blipFill>
-        <p:spPr>
-          <a:xfrm>
-            <a:off x="1104120" y="4114800"/>
-            <a:ext cx="2644560" cy="423360"/>
-          </a:xfrm>
-          <a:prstGeom prst="rect">
-            <a:avLst/>
-          </a:prstGeom>
-        </p:spPr>
-      </p:pic>
-      <p:pic>
-        <p:nvPicPr>
-          <p:cNvPr id="130" name="Bild 129"/>
-          <p:cNvPicPr/>
-          <p:nvPr/>
-        </p:nvPicPr>
-        <p:blipFill>
-          <a:blip r:embed="rId3"/>
-          <a:stretch>
-            <a:fillRect/>
-          </a:stretch>
-        </p:blipFill>
-        <p:spPr>
-          <a:xfrm>
-            <a:off x="1097280" y="5303520"/>
-            <a:ext cx="7255080" cy="1005480"/>
-          </a:xfrm>
-          <a:prstGeom prst="rect">
-            <a:avLst/>
-          </a:prstGeom>
-        </p:spPr>
-      </p:pic>
-    </p:spTree>
+    <p:extLst>
+      <p:ext uri="{BB962C8B-B14F-4D97-AF65-F5344CB8AC3E}">
+        <p14:creationId xmlns:p14="http://schemas.microsoft.com/office/powerpoint/2010/main" val="2880118480"/>
+      </p:ext>
+    </p:extLst>
   </p:cSld>
   <p:clrMapOvr>
     <a:masterClrMapping/>
@@ -8162,6 +7981,521 @@
 </p:sld>
 </file>
 
+<file path=ppt/slides/slide4.xml><?xml version="1.0" encoding="utf-8"?>
+<p:sld xmlns:a="http://schemas.openxmlformats.org/drawingml/2006/main" xmlns:r="http://schemas.openxmlformats.org/officeDocument/2006/relationships" xmlns:p="http://schemas.openxmlformats.org/presentationml/2006/main">
+  <p:cSld>
+    <p:spTree>
+      <p:nvGrpSpPr>
+        <p:cNvPr id="1" name=""/>
+        <p:cNvGrpSpPr/>
+        <p:nvPr/>
+      </p:nvGrpSpPr>
+      <p:grpSpPr>
+        <a:xfrm>
+          <a:off x="0" y="0"/>
+          <a:ext cx="0" cy="0"/>
+          <a:chOff x="0" y="0"/>
+          <a:chExt cx="0" cy="0"/>
+        </a:xfrm>
+      </p:grpSpPr>
+      <p:sp>
+        <p:nvSpPr>
+          <p:cNvPr id="119" name="CustomShape 1"/>
+          <p:cNvSpPr/>
+          <p:nvPr/>
+        </p:nvSpPr>
+        <p:spPr>
+          <a:xfrm>
+            <a:off x="8221680" y="7197840"/>
+            <a:ext cx="864360" cy="178560"/>
+          </a:xfrm>
+          <a:prstGeom prst="rect">
+            <a:avLst/>
+          </a:prstGeom>
+        </p:spPr>
+        <p:txBody>
+          <a:bodyPr lIns="0" tIns="0" rIns="0" bIns="0" anchor="b"/>
+          <a:lstStyle/>
+          <a:p>
+            <a:pPr>
+              <a:lnSpc>
+                <a:spcPct val="100000"/>
+              </a:lnSpc>
+            </a:pPr>
+            <a:r>
+              <a:rPr lang="en-US" sz="1200">
+                <a:solidFill>
+                  <a:srgbClr val="000000"/>
+                </a:solidFill>
+                <a:latin typeface="Calibri"/>
+              </a:rPr>
+              <a:t>6/5/13</a:t>
+            </a:r>
+            <a:endParaRPr/>
+          </a:p>
+        </p:txBody>
+      </p:sp>
+      <p:sp>
+        <p:nvSpPr>
+          <p:cNvPr id="121" name="CustomShape 3"/>
+          <p:cNvSpPr/>
+          <p:nvPr/>
+        </p:nvSpPr>
+        <p:spPr>
+          <a:xfrm>
+            <a:off x="9086760" y="7197840"/>
+            <a:ext cx="862920" cy="178560"/>
+          </a:xfrm>
+          <a:prstGeom prst="rect">
+            <a:avLst/>
+          </a:prstGeom>
+        </p:spPr>
+        <p:txBody>
+          <a:bodyPr lIns="0" tIns="0" rIns="0" bIns="0" anchor="b"/>
+          <a:lstStyle/>
+          <a:p>
+            <a:pPr>
+              <a:lnSpc>
+                <a:spcPct val="100000"/>
+              </a:lnSpc>
+            </a:pPr>
+            <a:fld id="{393F1610-C4E6-4F0D-B031-039013E54449}" type="slidenum">
+              <a:rPr lang="en-US" sz="1200">
+                <a:solidFill>
+                  <a:srgbClr val="000000"/>
+                </a:solidFill>
+                <a:latin typeface="Calibri"/>
+              </a:rPr>
+              <a:t>4</a:t>
+            </a:fld>
+            <a:endParaRPr/>
+          </a:p>
+        </p:txBody>
+      </p:sp>
+      <p:sp>
+        <p:nvSpPr>
+          <p:cNvPr id="122" name="CustomShape 4"/>
+          <p:cNvSpPr/>
+          <p:nvPr/>
+        </p:nvSpPr>
+        <p:spPr>
+          <a:xfrm>
+            <a:off x="736560" y="1509840"/>
+            <a:ext cx="9213120" cy="361080"/>
+          </a:xfrm>
+          <a:prstGeom prst="rect">
+            <a:avLst/>
+          </a:prstGeom>
+        </p:spPr>
+        <p:txBody>
+          <a:bodyPr lIns="0" tIns="0" rIns="0" bIns="0"/>
+          <a:lstStyle/>
+          <a:p>
+            <a:pPr>
+              <a:lnSpc>
+                <a:spcPct val="100000"/>
+              </a:lnSpc>
+            </a:pPr>
+            <a:r>
+              <a:rPr lang="en-US" sz="2000" b="1">
+                <a:solidFill>
+                  <a:srgbClr val="000000"/>
+                </a:solidFill>
+                <a:latin typeface="Calibri"/>
+              </a:rPr>
+              <a:t>Clustering</a:t>
+            </a:r>
+            <a:endParaRPr/>
+          </a:p>
+        </p:txBody>
+      </p:sp>
+      <p:sp>
+        <p:nvSpPr>
+          <p:cNvPr id="123" name="CustomShape 5"/>
+          <p:cNvSpPr/>
+          <p:nvPr/>
+        </p:nvSpPr>
+        <p:spPr>
+          <a:xfrm>
+            <a:off x="738360" y="2197080"/>
+            <a:ext cx="9213120" cy="4463280"/>
+          </a:xfrm>
+          <a:prstGeom prst="rect">
+            <a:avLst/>
+          </a:prstGeom>
+        </p:spPr>
+        <p:txBody>
+          <a:bodyPr lIns="0" tIns="0" rIns="0" bIns="0"/>
+          <a:lstStyle/>
+          <a:p>
+            <a:pPr>
+              <a:lnSpc>
+                <a:spcPct val="100000"/>
+              </a:lnSpc>
+              <a:buFont typeface="Arial"/>
+              <a:buChar char="•"/>
+            </a:pPr>
+            <a:r>
+              <a:rPr lang="en-US" sz="2000" dirty="0">
+                <a:solidFill>
+                  <a:srgbClr val="000000"/>
+                </a:solidFill>
+                <a:latin typeface="Calibri"/>
+              </a:rPr>
+              <a:t> K-</a:t>
+            </a:r>
+            <a:r>
+              <a:rPr lang="en-US" sz="2000" dirty="0" err="1" smtClean="0">
+                <a:solidFill>
+                  <a:srgbClr val="000000"/>
+                </a:solidFill>
+                <a:latin typeface="Calibri"/>
+              </a:rPr>
+              <a:t>Medoids</a:t>
+            </a:r>
+            <a:endParaRPr lang="en-US" sz="2000" dirty="0" smtClean="0">
+              <a:solidFill>
+                <a:srgbClr val="000000"/>
+              </a:solidFill>
+              <a:latin typeface="Calibri"/>
+            </a:endParaRPr>
+          </a:p>
+          <a:p>
+            <a:pPr lvl="1">
+              <a:buFont typeface="Arial"/>
+              <a:buChar char="•"/>
+            </a:pPr>
+            <a:r>
+              <a:rPr lang="en-US" sz="2000" dirty="0" smtClean="0">
+                <a:solidFill>
+                  <a:srgbClr val="000000"/>
+                </a:solidFill>
+                <a:latin typeface="Calibri"/>
+              </a:rPr>
+              <a:t> </a:t>
+            </a:r>
+            <a:r>
+              <a:rPr lang="en-US" sz="2000" dirty="0" err="1" smtClean="0">
+                <a:solidFill>
+                  <a:srgbClr val="000000"/>
+                </a:solidFill>
+                <a:latin typeface="Calibri"/>
+              </a:rPr>
+              <a:t>keine</a:t>
+            </a:r>
+            <a:r>
+              <a:rPr lang="en-US" sz="2000" dirty="0" smtClean="0">
+                <a:solidFill>
+                  <a:srgbClr val="000000"/>
+                </a:solidFill>
+                <a:latin typeface="Calibri"/>
+              </a:rPr>
+              <a:t> </a:t>
+            </a:r>
+            <a:r>
+              <a:rPr lang="en-US" sz="2000" dirty="0" err="1">
+                <a:solidFill>
+                  <a:srgbClr val="000000"/>
+                </a:solidFill>
+                <a:latin typeface="Calibri"/>
+              </a:rPr>
+              <a:t>Mindestklassengrösse</a:t>
+            </a:r>
+            <a:endParaRPr lang="en-US" sz="2000" dirty="0">
+              <a:solidFill>
+                <a:srgbClr val="000000"/>
+              </a:solidFill>
+              <a:latin typeface="Calibri"/>
+            </a:endParaRPr>
+          </a:p>
+          <a:p>
+            <a:pPr lvl="1">
+              <a:buFont typeface="Arial"/>
+              <a:buChar char="•"/>
+            </a:pPr>
+            <a:r>
+              <a:rPr lang="en-US" sz="2000" dirty="0">
+                <a:solidFill>
+                  <a:srgbClr val="000000"/>
+                </a:solidFill>
+                <a:latin typeface="Calibri"/>
+              </a:rPr>
+              <a:t> </a:t>
+            </a:r>
+            <a:r>
+              <a:rPr lang="en-US" sz="2000" dirty="0" err="1" smtClean="0">
+                <a:solidFill>
+                  <a:srgbClr val="000000"/>
+                </a:solidFill>
+                <a:latin typeface="Calibri"/>
+              </a:rPr>
+              <a:t>Abbruchkriterium</a:t>
+            </a:r>
+            <a:r>
+              <a:rPr lang="en-US" sz="2000" dirty="0" smtClean="0">
+                <a:solidFill>
+                  <a:srgbClr val="000000"/>
+                </a:solidFill>
+                <a:latin typeface="Calibri"/>
+              </a:rPr>
+              <a:t>: </a:t>
+            </a:r>
+            <a:r>
+              <a:rPr lang="en-US" sz="2000" dirty="0" err="1">
+                <a:solidFill>
+                  <a:srgbClr val="000000"/>
+                </a:solidFill>
+                <a:latin typeface="Calibri"/>
+              </a:rPr>
+              <a:t>keine</a:t>
+            </a:r>
+            <a:r>
+              <a:rPr lang="en-US" sz="2000" dirty="0">
+                <a:solidFill>
+                  <a:srgbClr val="000000"/>
+                </a:solidFill>
+                <a:latin typeface="Calibri"/>
+              </a:rPr>
+              <a:t> </a:t>
+            </a:r>
+            <a:r>
+              <a:rPr lang="en-US" sz="2000" dirty="0" err="1">
+                <a:solidFill>
+                  <a:srgbClr val="000000"/>
+                </a:solidFill>
+                <a:latin typeface="Calibri"/>
+              </a:rPr>
+              <a:t>Änderung</a:t>
+            </a:r>
+            <a:r>
+              <a:rPr lang="en-US" sz="2000" dirty="0">
+                <a:solidFill>
+                  <a:srgbClr val="000000"/>
+                </a:solidFill>
+                <a:latin typeface="Calibri"/>
+              </a:rPr>
+              <a:t> der </a:t>
+            </a:r>
+            <a:r>
+              <a:rPr lang="en-US" sz="2000" dirty="0" err="1" smtClean="0">
+                <a:solidFill>
+                  <a:srgbClr val="000000"/>
+                </a:solidFill>
+                <a:latin typeface="Calibri"/>
+              </a:rPr>
+              <a:t>Distorsion</a:t>
+            </a:r>
+            <a:endParaRPr dirty="0"/>
+          </a:p>
+          <a:p>
+            <a:pPr>
+              <a:lnSpc>
+                <a:spcPct val="100000"/>
+              </a:lnSpc>
+              <a:buFont typeface="Arial"/>
+              <a:buChar char="•"/>
+            </a:pPr>
+            <a:r>
+              <a:rPr lang="en-US" sz="2000" dirty="0">
+                <a:solidFill>
+                  <a:srgbClr val="000000"/>
+                </a:solidFill>
+                <a:latin typeface="Calibri"/>
+              </a:rPr>
+              <a:t> </a:t>
+            </a:r>
+            <a:r>
+              <a:rPr lang="en-US" sz="2000" dirty="0" err="1">
+                <a:solidFill>
+                  <a:srgbClr val="000000"/>
+                </a:solidFill>
+                <a:latin typeface="Calibri"/>
+              </a:rPr>
+              <a:t>Erste</a:t>
+            </a:r>
+            <a:r>
+              <a:rPr lang="en-US" sz="2000" dirty="0">
+                <a:solidFill>
+                  <a:srgbClr val="000000"/>
+                </a:solidFill>
+                <a:latin typeface="Calibri"/>
+              </a:rPr>
+              <a:t> K Features </a:t>
+            </a:r>
+            <a:r>
+              <a:rPr lang="en-US" sz="2000" dirty="0" err="1">
+                <a:solidFill>
+                  <a:srgbClr val="000000"/>
+                </a:solidFill>
+                <a:latin typeface="Calibri"/>
+              </a:rPr>
+              <a:t>als</a:t>
+            </a:r>
+            <a:r>
+              <a:rPr lang="en-US" sz="2000" dirty="0">
+                <a:solidFill>
+                  <a:srgbClr val="000000"/>
+                </a:solidFill>
+                <a:latin typeface="Calibri"/>
+              </a:rPr>
+              <a:t> Center</a:t>
+            </a:r>
+            <a:endParaRPr dirty="0"/>
+          </a:p>
+          <a:p>
+            <a:pPr>
+              <a:lnSpc>
+                <a:spcPct val="100000"/>
+              </a:lnSpc>
+              <a:buFont typeface="Arial"/>
+              <a:buChar char="•"/>
+            </a:pPr>
+            <a:r>
+              <a:rPr lang="en-US" sz="2000" dirty="0">
+                <a:solidFill>
+                  <a:srgbClr val="000000"/>
+                </a:solidFill>
+                <a:latin typeface="Calibri"/>
+              </a:rPr>
+              <a:t> </a:t>
+            </a:r>
+            <a:r>
+              <a:rPr lang="en-US" sz="2000" dirty="0" err="1">
+                <a:solidFill>
+                  <a:srgbClr val="000000"/>
+                </a:solidFill>
+                <a:latin typeface="Calibri"/>
+              </a:rPr>
+              <a:t>Parallelisierte</a:t>
+            </a:r>
+            <a:r>
+              <a:rPr lang="en-US" sz="2000" dirty="0">
+                <a:solidFill>
+                  <a:srgbClr val="000000"/>
+                </a:solidFill>
+                <a:latin typeface="Calibri"/>
+              </a:rPr>
+              <a:t> </a:t>
+            </a:r>
+            <a:r>
+              <a:rPr lang="en-US" sz="2000" dirty="0" err="1">
+                <a:solidFill>
+                  <a:srgbClr val="000000"/>
+                </a:solidFill>
+                <a:latin typeface="Calibri"/>
+              </a:rPr>
+              <a:t>Suche</a:t>
+            </a:r>
+            <a:r>
+              <a:rPr lang="en-US" sz="2000" dirty="0">
+                <a:solidFill>
+                  <a:srgbClr val="000000"/>
+                </a:solidFill>
+                <a:latin typeface="Calibri"/>
+              </a:rPr>
+              <a:t> der Center</a:t>
+            </a:r>
+            <a:endParaRPr dirty="0"/>
+          </a:p>
+          <a:p>
+            <a:pPr>
+              <a:lnSpc>
+                <a:spcPct val="100000"/>
+              </a:lnSpc>
+              <a:buFont typeface="Arial"/>
+              <a:buChar char="•"/>
+            </a:pPr>
+            <a:r>
+              <a:rPr lang="en-US" sz="2000" dirty="0">
+                <a:solidFill>
+                  <a:srgbClr val="000000"/>
+                </a:solidFill>
+                <a:latin typeface="Calibri"/>
+              </a:rPr>
+              <a:t> </a:t>
+            </a:r>
+            <a:r>
+              <a:rPr lang="en-US" sz="2000" dirty="0" err="1">
+                <a:solidFill>
+                  <a:srgbClr val="000000"/>
+                </a:solidFill>
+                <a:latin typeface="Calibri"/>
+              </a:rPr>
+              <a:t>Parallelisierte</a:t>
+            </a:r>
+            <a:r>
+              <a:rPr lang="en-US" sz="2000" dirty="0">
+                <a:solidFill>
+                  <a:srgbClr val="000000"/>
+                </a:solidFill>
+                <a:latin typeface="Calibri"/>
+              </a:rPr>
+              <a:t> </a:t>
+            </a:r>
+            <a:r>
+              <a:rPr lang="en-US" sz="2000" dirty="0" err="1">
+                <a:solidFill>
+                  <a:srgbClr val="000000"/>
+                </a:solidFill>
+                <a:latin typeface="Calibri"/>
+              </a:rPr>
+              <a:t>Bearbeitung</a:t>
+            </a:r>
+            <a:r>
+              <a:rPr lang="en-US" sz="2000" dirty="0">
+                <a:solidFill>
+                  <a:srgbClr val="000000"/>
+                </a:solidFill>
+                <a:latin typeface="Calibri"/>
+              </a:rPr>
+              <a:t> der </a:t>
+            </a:r>
+            <a:r>
+              <a:rPr lang="en-US" sz="2000" dirty="0" smtClean="0">
+                <a:solidFill>
+                  <a:srgbClr val="000000"/>
+                </a:solidFill>
+                <a:latin typeface="Calibri"/>
+              </a:rPr>
+              <a:t>Cluster</a:t>
+            </a:r>
+          </a:p>
+          <a:p>
+            <a:pPr>
+              <a:lnSpc>
+                <a:spcPct val="100000"/>
+              </a:lnSpc>
+              <a:buFont typeface="Arial"/>
+              <a:buChar char="•"/>
+            </a:pPr>
+            <a:r>
+              <a:rPr lang="en-US" sz="2000" dirty="0" smtClean="0">
+                <a:solidFill>
+                  <a:srgbClr val="000000"/>
+                </a:solidFill>
+                <a:latin typeface="Calibri"/>
+              </a:rPr>
+              <a:t> </a:t>
+            </a:r>
+            <a:endParaRPr dirty="0"/>
+          </a:p>
+        </p:txBody>
+      </p:sp>
+    </p:spTree>
+  </p:cSld>
+  <p:clrMapOvr>
+    <a:masterClrMapping/>
+  </p:clrMapOvr>
+  <p:timing>
+    <p:tnLst>
+      <p:par>
+        <p:cTn xmlns:p14="http://schemas.microsoft.com/office/powerpoint/2010/main" id="1" dur="indefinite" restart="never" nodeType="tmRoot"/>
+      </p:par>
+    </p:tnLst>
+  </p:timing>
+</p:sld>
+</file>
+
 <file path=ppt/slides/slide5.xml><?xml version="1.0" encoding="utf-8"?>
 <p:sld xmlns:a="http://schemas.openxmlformats.org/drawingml/2006/main" xmlns:r="http://schemas.openxmlformats.org/officeDocument/2006/relationships" xmlns:p="http://schemas.openxmlformats.org/presentationml/2006/main">
   <p:cSld>
@@ -8181,7 +8515,7 @@
       </p:grpSpPr>
       <p:sp>
         <p:nvSpPr>
-          <p:cNvPr id="131" name="CustomShape 1"/>
+          <p:cNvPr id="124" name="CustomShape 1"/>
           <p:cNvSpPr/>
           <p:nvPr/>
         </p:nvSpPr>
@@ -8218,14 +8552,14 @@
       </p:sp>
       <p:sp>
         <p:nvSpPr>
-          <p:cNvPr id="132" name="CustomShape 2"/>
+          <p:cNvPr id="126" name="CustomShape 3"/>
           <p:cNvSpPr/>
           <p:nvPr/>
         </p:nvSpPr>
         <p:spPr>
           <a:xfrm>
-            <a:off x="736560" y="7197840"/>
-            <a:ext cx="7484400" cy="178560"/>
+            <a:off x="9086760" y="7197840"/>
+            <a:ext cx="862920" cy="178560"/>
           </a:xfrm>
           <a:prstGeom prst="rect">
             <a:avLst/>
@@ -8240,36 +8574,36 @@
                 <a:spcPct val="100000"/>
               </a:lnSpc>
             </a:pPr>
-            <a:r>
+            <a:fld id="{8A7FBCE4-E60E-4435-A65B-7A08F91ED2DA}" type="slidenum">
               <a:rPr lang="en-US" sz="1200">
                 <a:solidFill>
                   <a:srgbClr val="000000"/>
                 </a:solidFill>
                 <a:latin typeface="Calibri"/>
               </a:rPr>
-              <a:t>Terrorismus</a:t>
-            </a:r>
-            <a:endParaRPr/>
-          </a:p>
-        </p:txBody>
-      </p:sp>
-      <p:sp>
-        <p:nvSpPr>
-          <p:cNvPr id="133" name="CustomShape 3"/>
+              <a:t>5</a:t>
+            </a:fld>
+            <a:endParaRPr/>
+          </a:p>
+        </p:txBody>
+      </p:sp>
+      <p:sp>
+        <p:nvSpPr>
+          <p:cNvPr id="127" name="CustomShape 4"/>
           <p:cNvSpPr/>
           <p:nvPr/>
         </p:nvSpPr>
         <p:spPr>
           <a:xfrm>
-            <a:off x="9086760" y="7197840"/>
-            <a:ext cx="862920" cy="178560"/>
-          </a:xfrm>
-          <a:prstGeom prst="rect">
-            <a:avLst/>
-          </a:prstGeom>
-        </p:spPr>
-        <p:txBody>
-          <a:bodyPr lIns="0" tIns="0" rIns="0" bIns="0" anchor="b"/>
+            <a:off x="736560" y="1509840"/>
+            <a:ext cx="9213120" cy="361080"/>
+          </a:xfrm>
+          <a:prstGeom prst="rect">
+            <a:avLst/>
+          </a:prstGeom>
+        </p:spPr>
+        <p:txBody>
+          <a:bodyPr lIns="0" tIns="0" rIns="0" bIns="0"/>
           <a:lstStyle/>
           <a:p>
             <a:pPr>
@@ -8277,64 +8611,27 @@
                 <a:spcPct val="100000"/>
               </a:lnSpc>
             </a:pPr>
-            <a:fld id="{91429520-931B-439C-81F2-41C57ED9BEEC}" type="slidenum">
-              <a:rPr lang="en-US" sz="1200">
-                <a:solidFill>
-                  <a:srgbClr val="000000"/>
-                </a:solidFill>
-                <a:latin typeface="Calibri"/>
-              </a:rPr>
-              <a:t>5</a:t>
-            </a:fld>
-            <a:endParaRPr/>
-          </a:p>
-        </p:txBody>
-      </p:sp>
-      <p:sp>
-        <p:nvSpPr>
-          <p:cNvPr id="134" name="CustomShape 4"/>
+            <a:r>
+              <a:rPr lang="en-US" sz="2000" b="1">
+                <a:solidFill>
+                  <a:srgbClr val="000000"/>
+                </a:solidFill>
+                <a:latin typeface="Calibri"/>
+              </a:rPr>
+              <a:t>Naive Bayes</a:t>
+            </a:r>
+            <a:endParaRPr/>
+          </a:p>
+        </p:txBody>
+      </p:sp>
+      <p:sp>
+        <p:nvSpPr>
+          <p:cNvPr id="128" name="CustomShape 5"/>
           <p:cNvSpPr/>
           <p:nvPr/>
         </p:nvSpPr>
         <p:spPr>
           <a:xfrm>
-            <a:off x="736560" y="1509840"/>
-            <a:ext cx="9213120" cy="361080"/>
-          </a:xfrm>
-          <a:prstGeom prst="rect">
-            <a:avLst/>
-          </a:prstGeom>
-        </p:spPr>
-        <p:txBody>
-          <a:bodyPr lIns="0" tIns="0" rIns="0" bIns="0"/>
-          <a:lstStyle/>
-          <a:p>
-            <a:pPr>
-              <a:lnSpc>
-                <a:spcPct val="100000"/>
-              </a:lnSpc>
-            </a:pPr>
-            <a:r>
-              <a:rPr lang="en-US" sz="2000" b="1">
-                <a:solidFill>
-                  <a:srgbClr val="000000"/>
-                </a:solidFill>
-                <a:latin typeface="Calibri"/>
-              </a:rPr>
-              <a:t>Support Vector Machine</a:t>
-            </a:r>
-            <a:endParaRPr/>
-          </a:p>
-        </p:txBody>
-      </p:sp>
-      <p:sp>
-        <p:nvSpPr>
-          <p:cNvPr id="135" name="CustomShape 5"/>
-          <p:cNvSpPr/>
-          <p:nvPr/>
-        </p:nvSpPr>
-        <p:spPr>
-          <a:xfrm>
             <a:off x="738360" y="2197080"/>
             <a:ext cx="9213120" cy="4463280"/>
           </a:xfrm>
@@ -8345,14 +8642,6 @@
         <p:txBody>
           <a:bodyPr lIns="0" tIns="0" rIns="0" bIns="0"/>
           <a:lstStyle/>
-          <a:p>
-            <a:pPr>
-              <a:lnSpc>
-                <a:spcPct val="100000"/>
-              </a:lnSpc>
-            </a:pPr>
-            <a:endParaRPr/>
-          </a:p>
           <a:p>
             <a:pPr>
               <a:lnSpc>
@@ -8368,7 +8657,7 @@
                 </a:solidFill>
                 <a:latin typeface="Calibri"/>
               </a:rPr>
-              <a:t>Nichtprobabilistisch</a:t>
+              <a:t>Probabilistischer Classifier</a:t>
             </a:r>
             <a:endParaRPr/>
           </a:p>
@@ -8387,7 +8676,7 @@
                 </a:solidFill>
                 <a:latin typeface="Calibri"/>
               </a:rPr>
-              <a:t>Binärer Classifier</a:t>
+              <a:t>Sehr einfach</a:t>
             </a:r>
             <a:endParaRPr/>
           </a:p>
@@ -8406,109 +8695,56 @@
                 </a:solidFill>
                 <a:latin typeface="Calibri"/>
               </a:rPr>
-              <a:t>Large Margin Classifier</a:t>
-            </a:r>
-            <a:endParaRPr/>
-          </a:p>
-          <a:p>
-            <a:pPr lvl="1">
-              <a:lnSpc>
-                <a:spcPct val="100000"/>
-              </a:lnSpc>
-              <a:buSzPct val="25000"/>
-              <a:buFont typeface="StarSymbol"/>
-              <a:buChar char=""/>
-            </a:pPr>
-            <a:r>
-              <a:rPr lang="en-US" sz="2000">
-                <a:solidFill>
-                  <a:srgbClr val="000000"/>
-                </a:solidFill>
-                <a:latin typeface="Calibri"/>
-              </a:rPr>
-              <a:t>Finden der besten Trennlinie</a:t>
-            </a:r>
-            <a:endParaRPr/>
-          </a:p>
-          <a:p>
-            <a:pPr>
-              <a:lnSpc>
-                <a:spcPct val="100000"/>
-              </a:lnSpc>
-              <a:buFont typeface="Arial"/>
-              <a:buChar char="•"/>
-            </a:pPr>
-            <a:r>
-              <a:rPr lang="en-US" sz="2000">
-                <a:solidFill>
-                  <a:srgbClr val="000000"/>
-                </a:solidFill>
-                <a:latin typeface="Calibri"/>
-              </a:rPr>
-              <a:t>Kernel Trick</a:t>
-            </a:r>
-            <a:endParaRPr/>
-          </a:p>
-          <a:p>
-            <a:pPr lvl="1">
-              <a:lnSpc>
-                <a:spcPct val="100000"/>
-              </a:lnSpc>
-              <a:buSzPct val="25000"/>
-              <a:buFont typeface="StarSymbol"/>
-              <a:buChar char=""/>
-            </a:pPr>
-            <a:r>
-              <a:rPr lang="en-US" sz="2000">
-                <a:solidFill>
-                  <a:srgbClr val="000000"/>
-                </a:solidFill>
-                <a:latin typeface="Calibri"/>
-              </a:rPr>
-              <a:t>Lineare Trennung</a:t>
-            </a:r>
-            <a:endParaRPr/>
-          </a:p>
-          <a:p>
-            <a:pPr>
-              <a:lnSpc>
-                <a:spcPct val="100000"/>
-              </a:lnSpc>
-              <a:buFont typeface="Arial"/>
-              <a:buChar char="•"/>
-            </a:pPr>
-            <a:r>
-              <a:rPr lang="en-US" sz="2000">
-                <a:solidFill>
-                  <a:srgbClr val="000000"/>
-                </a:solidFill>
-                <a:latin typeface="Calibri"/>
-              </a:rPr>
-              <a:t>LibSVM</a:t>
-            </a:r>
-            <a:endParaRPr/>
-          </a:p>
-          <a:p>
-            <a:pPr>
-              <a:lnSpc>
-                <a:spcPct val="100000"/>
-              </a:lnSpc>
-              <a:buFont typeface="Arial"/>
-              <a:buChar char="•"/>
-            </a:pPr>
-            <a:r>
-              <a:rPr lang="en-US" sz="2000">
-                <a:solidFill>
-                  <a:srgbClr val="000000"/>
-                </a:solidFill>
-                <a:latin typeface="Calibri"/>
-              </a:rPr>
-              <a:t>RBF-Kernel</a:t>
-            </a:r>
-            <a:endParaRPr/>
-          </a:p>
-        </p:txBody>
-      </p:sp>
+              <a:t>Sehr schnell</a:t>
+            </a:r>
+            <a:endParaRPr/>
+          </a:p>
+        </p:txBody>
+      </p:sp>
+      <p:pic>
+        <p:nvPicPr>
+          <p:cNvPr id="129" name="Bild 128"/>
+          <p:cNvPicPr/>
+          <p:nvPr/>
+        </p:nvPicPr>
+        <p:blipFill>
+          <a:blip r:embed="rId2"/>
+          <a:stretch>
+            <a:fillRect/>
+          </a:stretch>
+        </p:blipFill>
+        <p:spPr>
+          <a:xfrm>
+            <a:off x="1104120" y="4114800"/>
+            <a:ext cx="2644560" cy="423360"/>
+          </a:xfrm>
+          <a:prstGeom prst="rect">
+            <a:avLst/>
+          </a:prstGeom>
+        </p:spPr>
+      </p:pic>
+      <p:pic>
+        <p:nvPicPr>
+          <p:cNvPr id="130" name="Bild 129"/>
+          <p:cNvPicPr/>
+          <p:nvPr/>
+        </p:nvPicPr>
+        <p:blipFill>
+          <a:blip r:embed="rId3"/>
+          <a:stretch>
+            <a:fillRect/>
+          </a:stretch>
+        </p:blipFill>
+        <p:spPr>
+          <a:xfrm>
+            <a:off x="1097280" y="5303520"/>
+            <a:ext cx="7255080" cy="1005480"/>
+          </a:xfrm>
+          <a:prstGeom prst="rect">
+            <a:avLst/>
+          </a:prstGeom>
+        </p:spPr>
+      </p:pic>
     </p:spTree>
   </p:cSld>
   <p:clrMapOvr>
@@ -8563,7 +8799,7 @@
       </p:grpSpPr>
       <p:sp>
         <p:nvSpPr>
-          <p:cNvPr id="136" name="CustomShape 1"/>
+          <p:cNvPr id="131" name="CustomShape 1"/>
           <p:cNvSpPr/>
           <p:nvPr/>
         </p:nvSpPr>
@@ -8600,14 +8836,14 @@
       </p:sp>
       <p:sp>
         <p:nvSpPr>
-          <p:cNvPr id="137" name="CustomShape 2"/>
+          <p:cNvPr id="133" name="CustomShape 3"/>
           <p:cNvSpPr/>
           <p:nvPr/>
         </p:nvSpPr>
         <p:spPr>
           <a:xfrm>
-            <a:off x="736560" y="7197840"/>
-            <a:ext cx="7484400" cy="178560"/>
+            <a:off x="9086760" y="7197840"/>
+            <a:ext cx="862920" cy="178560"/>
           </a:xfrm>
           <a:prstGeom prst="rect">
             <a:avLst/>
@@ -8622,36 +8858,36 @@
                 <a:spcPct val="100000"/>
               </a:lnSpc>
             </a:pPr>
-            <a:r>
+            <a:fld id="{91429520-931B-439C-81F2-41C57ED9BEEC}" type="slidenum">
               <a:rPr lang="en-US" sz="1200">
                 <a:solidFill>
                   <a:srgbClr val="000000"/>
                 </a:solidFill>
                 <a:latin typeface="Calibri"/>
               </a:rPr>
-              <a:t>Terrorismus</a:t>
-            </a:r>
-            <a:endParaRPr/>
-          </a:p>
-        </p:txBody>
-      </p:sp>
-      <p:sp>
-        <p:nvSpPr>
-          <p:cNvPr id="138" name="CustomShape 3"/>
+              <a:t>6</a:t>
+            </a:fld>
+            <a:endParaRPr/>
+          </a:p>
+        </p:txBody>
+      </p:sp>
+      <p:sp>
+        <p:nvSpPr>
+          <p:cNvPr id="134" name="CustomShape 4"/>
           <p:cNvSpPr/>
           <p:nvPr/>
         </p:nvSpPr>
         <p:spPr>
           <a:xfrm>
-            <a:off x="9086760" y="7197840"/>
-            <a:ext cx="862920" cy="178560"/>
-          </a:xfrm>
-          <a:prstGeom prst="rect">
-            <a:avLst/>
-          </a:prstGeom>
-        </p:spPr>
-        <p:txBody>
-          <a:bodyPr lIns="0" tIns="0" rIns="0" bIns="0" anchor="b"/>
+            <a:off x="736560" y="1509840"/>
+            <a:ext cx="9213120" cy="361080"/>
+          </a:xfrm>
+          <a:prstGeom prst="rect">
+            <a:avLst/>
+          </a:prstGeom>
+        </p:spPr>
+        <p:txBody>
+          <a:bodyPr lIns="0" tIns="0" rIns="0" bIns="0"/>
           <a:lstStyle/>
           <a:p>
             <a:pPr>
@@ -8659,83 +8895,36 @@
                 <a:spcPct val="100000"/>
               </a:lnSpc>
             </a:pPr>
-            <a:fld id="{9C662239-809D-4C6F-B8C3-F5C4051A5A90}" type="slidenum">
-              <a:rPr lang="en-US" sz="1200">
-                <a:solidFill>
-                  <a:srgbClr val="000000"/>
-                </a:solidFill>
-                <a:latin typeface="Calibri"/>
-              </a:rPr>
-              <a:t>6</a:t>
-            </a:fld>
-            <a:endParaRPr/>
-          </a:p>
-        </p:txBody>
-      </p:sp>
-      <p:pic>
-        <p:nvPicPr>
-          <p:cNvPr id="139" name="Bild 138"/>
-          <p:cNvPicPr/>
-          <p:nvPr/>
-        </p:nvPicPr>
-        <p:blipFill>
-          <a:blip r:embed="rId2"/>
-          <a:stretch>
-            <a:fillRect/>
-          </a:stretch>
-        </p:blipFill>
-        <p:spPr>
-          <a:xfrm>
-            <a:off x="1800000" y="1152360"/>
-            <a:ext cx="6695640" cy="5793120"/>
-          </a:xfrm>
-          <a:prstGeom prst="rect">
-            <a:avLst/>
-          </a:prstGeom>
-        </p:spPr>
-      </p:pic>
-    </p:spTree>
-  </p:cSld>
-  <p:clrMapOvr>
-    <a:masterClrMapping/>
-  </p:clrMapOvr>
-</p:sld>
-</file>
-
-<file path=ppt/slides/slide7.xml><?xml version="1.0" encoding="utf-8"?>
-<p:sld xmlns:a="http://schemas.openxmlformats.org/drawingml/2006/main" xmlns:r="http://schemas.openxmlformats.org/officeDocument/2006/relationships" xmlns:p="http://schemas.openxmlformats.org/presentationml/2006/main">
-  <p:cSld>
-    <p:spTree>
-      <p:nvGrpSpPr>
-        <p:cNvPr id="1" name=""/>
-        <p:cNvGrpSpPr/>
-        <p:nvPr/>
-      </p:nvGrpSpPr>
-      <p:grpSpPr>
-        <a:xfrm>
-          <a:off x="0" y="0"/>
-          <a:ext cx="0" cy="0"/>
-          <a:chOff x="0" y="0"/>
-          <a:chExt cx="0" cy="0"/>
-        </a:xfrm>
-      </p:grpSpPr>
-      <p:sp>
-        <p:nvSpPr>
-          <p:cNvPr id="140" name="CustomShape 1"/>
+            <a:r>
+              <a:rPr lang="en-US" sz="2000" b="1">
+                <a:solidFill>
+                  <a:srgbClr val="000000"/>
+                </a:solidFill>
+                <a:latin typeface="Calibri"/>
+              </a:rPr>
+              <a:t>Support Vector Machine</a:t>
+            </a:r>
+            <a:endParaRPr/>
+          </a:p>
+        </p:txBody>
+      </p:sp>
+      <p:sp>
+        <p:nvSpPr>
+          <p:cNvPr id="135" name="CustomShape 5"/>
           <p:cNvSpPr/>
           <p:nvPr/>
         </p:nvSpPr>
         <p:spPr>
           <a:xfrm>
-            <a:off x="8221680" y="7197840"/>
-            <a:ext cx="864360" cy="178560"/>
-          </a:xfrm>
-          <a:prstGeom prst="rect">
-            <a:avLst/>
-          </a:prstGeom>
-        </p:spPr>
-        <p:txBody>
-          <a:bodyPr lIns="0" tIns="0" rIns="0" bIns="0" anchor="b"/>
+            <a:off x="738360" y="2197080"/>
+            <a:ext cx="9213120" cy="4463280"/>
+          </a:xfrm>
+          <a:prstGeom prst="rect">
+            <a:avLst/>
+          </a:prstGeom>
+        </p:spPr>
+        <p:txBody>
+          <a:bodyPr lIns="0" tIns="0" rIns="0" bIns="0"/>
           <a:lstStyle/>
           <a:p>
             <a:pPr>
@@ -8743,464 +8932,8 @@
                 <a:spcPct val="100000"/>
               </a:lnSpc>
             </a:pPr>
-            <a:r>
-              <a:rPr lang="en-US" sz="1200">
-                <a:solidFill>
-                  <a:srgbClr val="000000"/>
-                </a:solidFill>
-                <a:latin typeface="Calibri"/>
-              </a:rPr>
-              <a:t>6/5/13</a:t>
-            </a:r>
-            <a:endParaRPr/>
-          </a:p>
-        </p:txBody>
-      </p:sp>
-      <p:sp>
-        <p:nvSpPr>
-          <p:cNvPr id="141" name="CustomShape 2"/>
-          <p:cNvSpPr/>
-          <p:nvPr/>
-        </p:nvSpPr>
-        <p:spPr>
-          <a:xfrm>
-            <a:off x="736560" y="7197840"/>
-            <a:ext cx="7484400" cy="178560"/>
-          </a:xfrm>
-          <a:prstGeom prst="rect">
-            <a:avLst/>
-          </a:prstGeom>
-        </p:spPr>
-        <p:txBody>
-          <a:bodyPr lIns="0" tIns="0" rIns="0" bIns="0" anchor="b"/>
-          <a:lstStyle/>
-          <a:p>
-            <a:pPr>
-              <a:lnSpc>
-                <a:spcPct val="100000"/>
-              </a:lnSpc>
-            </a:pPr>
-            <a:r>
-              <a:rPr lang="en-US" sz="1200">
-                <a:solidFill>
-                  <a:srgbClr val="000000"/>
-                </a:solidFill>
-                <a:latin typeface="Calibri"/>
-              </a:rPr>
-              <a:t>Terrorismus</a:t>
-            </a:r>
-            <a:endParaRPr/>
-          </a:p>
-        </p:txBody>
-      </p:sp>
-      <p:sp>
-        <p:nvSpPr>
-          <p:cNvPr id="142" name="CustomShape 3"/>
-          <p:cNvSpPr/>
-          <p:nvPr/>
-        </p:nvSpPr>
-        <p:spPr>
-          <a:xfrm>
-            <a:off x="9086760" y="7197840"/>
-            <a:ext cx="862920" cy="178560"/>
-          </a:xfrm>
-          <a:prstGeom prst="rect">
-            <a:avLst/>
-          </a:prstGeom>
-        </p:spPr>
-        <p:txBody>
-          <a:bodyPr lIns="0" tIns="0" rIns="0" bIns="0" anchor="b"/>
-          <a:lstStyle/>
-          <a:p>
-            <a:pPr>
-              <a:lnSpc>
-                <a:spcPct val="100000"/>
-              </a:lnSpc>
-            </a:pPr>
-            <a:fld id="{EFBDCEEC-B5FC-49C8-956D-460CE065BDFC}" type="slidenum">
-              <a:rPr lang="en-US" sz="1200">
-                <a:solidFill>
-                  <a:srgbClr val="000000"/>
-                </a:solidFill>
-                <a:latin typeface="Calibri"/>
-              </a:rPr>
-              <a:t>7</a:t>
-            </a:fld>
-            <a:endParaRPr/>
-          </a:p>
-        </p:txBody>
-      </p:sp>
-      <p:pic>
-        <p:nvPicPr>
-          <p:cNvPr id="143" name="Bild 142"/>
-          <p:cNvPicPr/>
-          <p:nvPr/>
-        </p:nvPicPr>
-        <p:blipFill>
-          <a:blip r:embed="rId2"/>
-          <a:stretch>
-            <a:fillRect/>
-          </a:stretch>
-        </p:blipFill>
-        <p:spPr>
-          <a:xfrm>
-            <a:off x="2088000" y="905760"/>
-            <a:ext cx="6263640" cy="6149880"/>
-          </a:xfrm>
-          <a:prstGeom prst="rect">
-            <a:avLst/>
-          </a:prstGeom>
-        </p:spPr>
-      </p:pic>
-    </p:spTree>
-  </p:cSld>
-  <p:clrMapOvr>
-    <a:masterClrMapping/>
-  </p:clrMapOvr>
-</p:sld>
-</file>
-
-<file path=ppt/slides/slide8.xml><?xml version="1.0" encoding="utf-8"?>
-<p:sld xmlns:a="http://schemas.openxmlformats.org/drawingml/2006/main" xmlns:r="http://schemas.openxmlformats.org/officeDocument/2006/relationships" xmlns:p="http://schemas.openxmlformats.org/presentationml/2006/main">
-  <p:cSld>
-    <p:spTree>
-      <p:nvGrpSpPr>
-        <p:cNvPr id="1" name=""/>
-        <p:cNvGrpSpPr/>
-        <p:nvPr/>
-      </p:nvGrpSpPr>
-      <p:grpSpPr>
-        <a:xfrm>
-          <a:off x="0" y="0"/>
-          <a:ext cx="0" cy="0"/>
-          <a:chOff x="0" y="0"/>
-          <a:chExt cx="0" cy="0"/>
-        </a:xfrm>
-      </p:grpSpPr>
-      <p:sp>
-        <p:nvSpPr>
-          <p:cNvPr id="144" name="CustomShape 1"/>
-          <p:cNvSpPr/>
-          <p:nvPr/>
-        </p:nvSpPr>
-        <p:spPr>
-          <a:xfrm>
-            <a:off x="8221680" y="7197840"/>
-            <a:ext cx="864360" cy="178560"/>
-          </a:xfrm>
-          <a:prstGeom prst="rect">
-            <a:avLst/>
-          </a:prstGeom>
-        </p:spPr>
-        <p:txBody>
-          <a:bodyPr lIns="0" tIns="0" rIns="0" bIns="0" anchor="b"/>
-          <a:lstStyle/>
-          <a:p>
-            <a:pPr>
-              <a:lnSpc>
-                <a:spcPct val="100000"/>
-              </a:lnSpc>
-            </a:pPr>
-            <a:r>
-              <a:rPr lang="en-US" sz="1200">
-                <a:solidFill>
-                  <a:srgbClr val="000000"/>
-                </a:solidFill>
-                <a:latin typeface="Calibri"/>
-              </a:rPr>
-              <a:t>6/5/13</a:t>
-            </a:r>
-            <a:endParaRPr/>
-          </a:p>
-        </p:txBody>
-      </p:sp>
-      <p:sp>
-        <p:nvSpPr>
-          <p:cNvPr id="145" name="CustomShape 2"/>
-          <p:cNvSpPr/>
-          <p:nvPr/>
-        </p:nvSpPr>
-        <p:spPr>
-          <a:xfrm>
-            <a:off x="736560" y="7197840"/>
-            <a:ext cx="7484400" cy="178560"/>
-          </a:xfrm>
-          <a:prstGeom prst="rect">
-            <a:avLst/>
-          </a:prstGeom>
-        </p:spPr>
-        <p:txBody>
-          <a:bodyPr lIns="0" tIns="0" rIns="0" bIns="0" anchor="b"/>
-          <a:lstStyle/>
-          <a:p>
-            <a:pPr>
-              <a:lnSpc>
-                <a:spcPct val="100000"/>
-              </a:lnSpc>
-            </a:pPr>
-            <a:r>
-              <a:rPr lang="en-US" sz="1200">
-                <a:solidFill>
-                  <a:srgbClr val="000000"/>
-                </a:solidFill>
-                <a:latin typeface="Calibri"/>
-              </a:rPr>
-              <a:t>Terrorismus</a:t>
-            </a:r>
-            <a:endParaRPr/>
-          </a:p>
-        </p:txBody>
-      </p:sp>
-      <p:sp>
-        <p:nvSpPr>
-          <p:cNvPr id="146" name="CustomShape 3"/>
-          <p:cNvSpPr/>
-          <p:nvPr/>
-        </p:nvSpPr>
-        <p:spPr>
-          <a:xfrm>
-            <a:off x="9086760" y="7197840"/>
-            <a:ext cx="862920" cy="178560"/>
-          </a:xfrm>
-          <a:prstGeom prst="rect">
-            <a:avLst/>
-          </a:prstGeom>
-        </p:spPr>
-        <p:txBody>
-          <a:bodyPr lIns="0" tIns="0" rIns="0" bIns="0" anchor="b"/>
-          <a:lstStyle/>
-          <a:p>
-            <a:pPr>
-              <a:lnSpc>
-                <a:spcPct val="100000"/>
-              </a:lnSpc>
-            </a:pPr>
-            <a:fld id="{9990F60A-E564-4CB9-AC1E-3D1BE84C1046}" type="slidenum">
-              <a:rPr lang="en-US" sz="1200">
-                <a:solidFill>
-                  <a:srgbClr val="000000"/>
-                </a:solidFill>
-                <a:latin typeface="Calibri"/>
-              </a:rPr>
-              <a:t>8</a:t>
-            </a:fld>
-            <a:endParaRPr/>
-          </a:p>
-        </p:txBody>
-      </p:sp>
-      <p:pic>
-        <p:nvPicPr>
-          <p:cNvPr id="147" name="Bild 146"/>
-          <p:cNvPicPr/>
-          <p:nvPr/>
-        </p:nvPicPr>
-        <p:blipFill>
-          <a:blip r:embed="rId2"/>
-          <a:stretch>
-            <a:fillRect/>
-          </a:stretch>
-        </p:blipFill>
-        <p:spPr>
-          <a:xfrm>
-            <a:off x="720360" y="1656360"/>
-            <a:ext cx="8978400" cy="4062240"/>
-          </a:xfrm>
-          <a:prstGeom prst="rect">
-            <a:avLst/>
-          </a:prstGeom>
-        </p:spPr>
-      </p:pic>
-    </p:spTree>
-  </p:cSld>
-  <p:clrMapOvr>
-    <a:masterClrMapping/>
-  </p:clrMapOvr>
-</p:sld>
-</file>
-
-<file path=ppt/slides/slide9.xml><?xml version="1.0" encoding="utf-8"?>
-<p:sld xmlns:a="http://schemas.openxmlformats.org/drawingml/2006/main" xmlns:r="http://schemas.openxmlformats.org/officeDocument/2006/relationships" xmlns:p="http://schemas.openxmlformats.org/presentationml/2006/main">
-  <p:cSld>
-    <p:spTree>
-      <p:nvGrpSpPr>
-        <p:cNvPr id="1" name=""/>
-        <p:cNvGrpSpPr/>
-        <p:nvPr/>
-      </p:nvGrpSpPr>
-      <p:grpSpPr>
-        <a:xfrm>
-          <a:off x="0" y="0"/>
-          <a:ext cx="0" cy="0"/>
-          <a:chOff x="0" y="0"/>
-          <a:chExt cx="0" cy="0"/>
-        </a:xfrm>
-      </p:grpSpPr>
-      <p:sp>
-        <p:nvSpPr>
-          <p:cNvPr id="148" name="CustomShape 1"/>
-          <p:cNvSpPr/>
-          <p:nvPr/>
-        </p:nvSpPr>
-        <p:spPr>
-          <a:xfrm>
-            <a:off x="8221680" y="7197840"/>
-            <a:ext cx="864360" cy="178560"/>
-          </a:xfrm>
-          <a:prstGeom prst="rect">
-            <a:avLst/>
-          </a:prstGeom>
-        </p:spPr>
-        <p:txBody>
-          <a:bodyPr lIns="0" tIns="0" rIns="0" bIns="0" anchor="b"/>
-          <a:lstStyle/>
-          <a:p>
-            <a:pPr>
-              <a:lnSpc>
-                <a:spcPct val="100000"/>
-              </a:lnSpc>
-            </a:pPr>
-            <a:r>
-              <a:rPr lang="en-US" sz="1200">
-                <a:solidFill>
-                  <a:srgbClr val="000000"/>
-                </a:solidFill>
-                <a:latin typeface="Calibri"/>
-              </a:rPr>
-              <a:t>6/5/13</a:t>
-            </a:r>
-            <a:endParaRPr/>
-          </a:p>
-        </p:txBody>
-      </p:sp>
-      <p:sp>
-        <p:nvSpPr>
-          <p:cNvPr id="149" name="CustomShape 2"/>
-          <p:cNvSpPr/>
-          <p:nvPr/>
-        </p:nvSpPr>
-        <p:spPr>
-          <a:xfrm>
-            <a:off x="736560" y="7197840"/>
-            <a:ext cx="7484400" cy="178560"/>
-          </a:xfrm>
-          <a:prstGeom prst="rect">
-            <a:avLst/>
-          </a:prstGeom>
-        </p:spPr>
-        <p:txBody>
-          <a:bodyPr lIns="0" tIns="0" rIns="0" bIns="0" anchor="b"/>
-          <a:lstStyle/>
-          <a:p>
-            <a:pPr>
-              <a:lnSpc>
-                <a:spcPct val="100000"/>
-              </a:lnSpc>
-            </a:pPr>
-            <a:r>
-              <a:rPr lang="en-US" sz="1200">
-                <a:solidFill>
-                  <a:srgbClr val="000000"/>
-                </a:solidFill>
-                <a:latin typeface="Calibri"/>
-              </a:rPr>
-              <a:t>Terrorismus</a:t>
-            </a:r>
-            <a:endParaRPr/>
-          </a:p>
-        </p:txBody>
-      </p:sp>
-      <p:sp>
-        <p:nvSpPr>
-          <p:cNvPr id="150" name="CustomShape 3"/>
-          <p:cNvSpPr/>
-          <p:nvPr/>
-        </p:nvSpPr>
-        <p:spPr>
-          <a:xfrm>
-            <a:off x="9086760" y="7197840"/>
-            <a:ext cx="862920" cy="178560"/>
-          </a:xfrm>
-          <a:prstGeom prst="rect">
-            <a:avLst/>
-          </a:prstGeom>
-        </p:spPr>
-        <p:txBody>
-          <a:bodyPr lIns="0" tIns="0" rIns="0" bIns="0" anchor="b"/>
-          <a:lstStyle/>
-          <a:p>
-            <a:pPr>
-              <a:lnSpc>
-                <a:spcPct val="100000"/>
-              </a:lnSpc>
-            </a:pPr>
-            <a:fld id="{21FBB5D7-22DB-470E-AA37-9D582303BBB4}" type="slidenum">
-              <a:rPr lang="en-US" sz="1200">
-                <a:solidFill>
-                  <a:srgbClr val="000000"/>
-                </a:solidFill>
-                <a:latin typeface="Calibri"/>
-              </a:rPr>
-              <a:t>9</a:t>
-            </a:fld>
-            <a:endParaRPr/>
-          </a:p>
-        </p:txBody>
-      </p:sp>
-      <p:sp>
-        <p:nvSpPr>
-          <p:cNvPr id="151" name="CustomShape 4"/>
-          <p:cNvSpPr/>
-          <p:nvPr/>
-        </p:nvSpPr>
-        <p:spPr>
-          <a:xfrm>
-            <a:off x="736560" y="1509840"/>
-            <a:ext cx="9213120" cy="361080"/>
-          </a:xfrm>
-          <a:prstGeom prst="rect">
-            <a:avLst/>
-          </a:prstGeom>
-        </p:spPr>
-        <p:txBody>
-          <a:bodyPr lIns="0" tIns="0" rIns="0" bIns="0"/>
-          <a:lstStyle/>
-          <a:p>
-            <a:pPr>
-              <a:lnSpc>
-                <a:spcPct val="100000"/>
-              </a:lnSpc>
-            </a:pPr>
-            <a:r>
-              <a:rPr lang="en-US" sz="2000" b="1">
-                <a:solidFill>
-                  <a:srgbClr val="000000"/>
-                </a:solidFill>
-                <a:latin typeface="Calibri"/>
-              </a:rPr>
-              <a:t>Support Vector Machine</a:t>
-            </a:r>
-            <a:endParaRPr/>
-          </a:p>
-        </p:txBody>
-      </p:sp>
-      <p:sp>
-        <p:nvSpPr>
-          <p:cNvPr id="152" name="CustomShape 5"/>
-          <p:cNvSpPr/>
-          <p:nvPr/>
-        </p:nvSpPr>
-        <p:spPr>
-          <a:xfrm>
-            <a:off x="738360" y="2197080"/>
-            <a:ext cx="9213120" cy="4463280"/>
-          </a:xfrm>
-          <a:prstGeom prst="rect">
-            <a:avLst/>
-          </a:prstGeom>
-        </p:spPr>
-        <p:txBody>
-          <a:bodyPr lIns="0" tIns="0" rIns="0" bIns="0"/>
-          <a:lstStyle/>
+            <a:endParaRPr/>
+          </a:p>
           <a:p>
             <a:pPr>
               <a:lnSpc>
@@ -9216,7 +8949,45 @@
                 </a:solidFill>
                 <a:latin typeface="Calibri"/>
               </a:rPr>
-              <a:t> RBF- Kernel ist parametrisierbar</a:t>
+              <a:t>Nichtprobabilistisch</a:t>
+            </a:r>
+            <a:endParaRPr/>
+          </a:p>
+          <a:p>
+            <a:pPr>
+              <a:lnSpc>
+                <a:spcPct val="100000"/>
+              </a:lnSpc>
+              <a:buFont typeface="Arial"/>
+              <a:buChar char="•"/>
+            </a:pPr>
+            <a:r>
+              <a:rPr lang="en-US" sz="2000">
+                <a:solidFill>
+                  <a:srgbClr val="000000"/>
+                </a:solidFill>
+                <a:latin typeface="Calibri"/>
+              </a:rPr>
+              <a:t>Binärer Classifier</a:t>
+            </a:r>
+            <a:endParaRPr/>
+          </a:p>
+          <a:p>
+            <a:pPr>
+              <a:lnSpc>
+                <a:spcPct val="100000"/>
+              </a:lnSpc>
+              <a:buFont typeface="Arial"/>
+              <a:buChar char="•"/>
+            </a:pPr>
+            <a:r>
+              <a:rPr lang="en-US" sz="2000">
+                <a:solidFill>
+                  <a:srgbClr val="000000"/>
+                </a:solidFill>
+                <a:latin typeface="Calibri"/>
+              </a:rPr>
+              <a:t>Large Margin Classifier</a:t>
             </a:r>
             <a:endParaRPr/>
           </a:p>
@@ -9236,7 +9007,26 @@
                 </a:solidFill>
                 <a:latin typeface="Calibri"/>
               </a:rPr>
-              <a:t>Parametersuche notwendig</a:t>
+              <a:t>Finden der besten Trennlinie</a:t>
+            </a:r>
+            <a:endParaRPr/>
+          </a:p>
+          <a:p>
+            <a:pPr>
+              <a:lnSpc>
+                <a:spcPct val="100000"/>
+              </a:lnSpc>
+              <a:buFont typeface="Arial"/>
+              <a:buChar char="•"/>
+            </a:pPr>
+            <a:r>
+              <a:rPr lang="en-US" sz="2000">
+                <a:solidFill>
+                  <a:srgbClr val="000000"/>
+                </a:solidFill>
+                <a:latin typeface="Calibri"/>
+              </a:rPr>
+              <a:t>Kernel Trick</a:t>
             </a:r>
             <a:endParaRPr/>
           </a:p>
@@ -9256,27 +9046,7 @@
                 </a:solidFill>
                 <a:latin typeface="Calibri"/>
               </a:rPr>
-              <a:t>C: Fehlertoleranz</a:t>
-            </a:r>
-            <a:endParaRPr/>
-          </a:p>
-          <a:p>
-            <a:pPr lvl="1">
-              <a:lnSpc>
-                <a:spcPct val="100000"/>
-              </a:lnSpc>
-              <a:buSzPct val="25000"/>
-              <a:buFont typeface="StarSymbol"/>
-              <a:buChar char=""/>
-            </a:pPr>
-            <a:r>
-              <a:rPr lang="en-US" sz="2000">
-                <a:solidFill>
-                  <a:srgbClr val="000000"/>
-                </a:solidFill>
-                <a:latin typeface="Calibri"/>
-              </a:rPr>
-              <a:t>Gamma: Parameter der Basisfunktion</a:t>
+              <a:t>Lineare Trennung</a:t>
             </a:r>
             <a:endParaRPr/>
           </a:p>
@@ -9295,47 +9065,7 @@
                 </a:solidFill>
                 <a:latin typeface="Calibri"/>
               </a:rPr>
-              <a:t>Normalisieren der Parameter</a:t>
-            </a:r>
-            <a:endParaRPr/>
-          </a:p>
-          <a:p>
-            <a:pPr lvl="1">
-              <a:lnSpc>
-                <a:spcPct val="100000"/>
-              </a:lnSpc>
-              <a:buSzPct val="25000"/>
-              <a:buFont typeface="StarSymbol"/>
-              <a:buChar char=""/>
-            </a:pPr>
-            <a:r>
-              <a:rPr lang="en-US" sz="2000">
-                <a:solidFill>
-                  <a:srgbClr val="000000"/>
-                </a:solidFill>
-                <a:latin typeface="Calibri"/>
-              </a:rPr>
-              <a:t>[0,1]</a:t>
-            </a:r>
-            <a:endParaRPr/>
-          </a:p>
-          <a:p>
-            <a:pPr lvl="1">
-              <a:lnSpc>
-                <a:spcPct val="100000"/>
-              </a:lnSpc>
-              <a:buSzPct val="25000"/>
-              <a:buFont typeface="StarSymbol"/>
-              <a:buChar char=""/>
-            </a:pPr>
-            <a:r>
-              <a:rPr lang="en-US" sz="2000">
-                <a:solidFill>
-                  <a:srgbClr val="000000"/>
-                </a:solidFill>
-                <a:latin typeface="Calibri"/>
-              </a:rPr>
-              <a:t>Anfällig auf unterschiedliche grosse Features</a:t>
+              <a:t>LibSVM</a:t>
             </a:r>
             <a:endParaRPr/>
           </a:p>
@@ -9354,7 +9084,7 @@
                 </a:solidFill>
                 <a:latin typeface="Calibri"/>
               </a:rPr>
-              <a:t>Grid Suche über Parameterraum</a:t>
+              <a:t>RBF-Kernel</a:t>
             </a:r>
             <a:endParaRPr/>
           </a:p>
@@ -9389,6 +9119,390 @@
             </p:seq>
           </p:childTnLst>
         </p:cTn>
+      </p:par>
+    </p:tnLst>
+  </p:timing>
+</p:sld>
+</file>
+
+<file path=ppt/slides/slide7.xml><?xml version="1.0" encoding="utf-8"?>
+<p:sld xmlns:a="http://schemas.openxmlformats.org/drawingml/2006/main" xmlns:r="http://schemas.openxmlformats.org/officeDocument/2006/relationships" xmlns:p="http://schemas.openxmlformats.org/presentationml/2006/main">
+  <p:cSld>
+    <p:spTree>
+      <p:nvGrpSpPr>
+        <p:cNvPr id="1" name=""/>
+        <p:cNvGrpSpPr/>
+        <p:nvPr/>
+      </p:nvGrpSpPr>
+      <p:grpSpPr>
+        <a:xfrm>
+          <a:off x="0" y="0"/>
+          <a:ext cx="0" cy="0"/>
+          <a:chOff x="0" y="0"/>
+          <a:chExt cx="0" cy="0"/>
+        </a:xfrm>
+      </p:grpSpPr>
+      <p:sp>
+        <p:nvSpPr>
+          <p:cNvPr id="136" name="CustomShape 1"/>
+          <p:cNvSpPr/>
+          <p:nvPr/>
+        </p:nvSpPr>
+        <p:spPr>
+          <a:xfrm>
+            <a:off x="8221680" y="7197840"/>
+            <a:ext cx="864360" cy="178560"/>
+          </a:xfrm>
+          <a:prstGeom prst="rect">
+            <a:avLst/>
+          </a:prstGeom>
+        </p:spPr>
+        <p:txBody>
+          <a:bodyPr lIns="0" tIns="0" rIns="0" bIns="0" anchor="b"/>
+          <a:lstStyle/>
+          <a:p>
+            <a:pPr>
+              <a:lnSpc>
+                <a:spcPct val="100000"/>
+              </a:lnSpc>
+            </a:pPr>
+            <a:r>
+              <a:rPr lang="en-US" sz="1200">
+                <a:solidFill>
+                  <a:srgbClr val="000000"/>
+                </a:solidFill>
+                <a:latin typeface="Calibri"/>
+              </a:rPr>
+              <a:t>6/5/13</a:t>
+            </a:r>
+            <a:endParaRPr/>
+          </a:p>
+        </p:txBody>
+      </p:sp>
+      <p:sp>
+        <p:nvSpPr>
+          <p:cNvPr id="138" name="CustomShape 3"/>
+          <p:cNvSpPr/>
+          <p:nvPr/>
+        </p:nvSpPr>
+        <p:spPr>
+          <a:xfrm>
+            <a:off x="9086760" y="7197840"/>
+            <a:ext cx="862920" cy="178560"/>
+          </a:xfrm>
+          <a:prstGeom prst="rect">
+            <a:avLst/>
+          </a:prstGeom>
+        </p:spPr>
+        <p:txBody>
+          <a:bodyPr lIns="0" tIns="0" rIns="0" bIns="0" anchor="b"/>
+          <a:lstStyle/>
+          <a:p>
+            <a:pPr>
+              <a:lnSpc>
+                <a:spcPct val="100000"/>
+              </a:lnSpc>
+            </a:pPr>
+            <a:fld id="{9C662239-809D-4C6F-B8C3-F5C4051A5A90}" type="slidenum">
+              <a:rPr lang="en-US" sz="1200">
+                <a:solidFill>
+                  <a:srgbClr val="000000"/>
+                </a:solidFill>
+                <a:latin typeface="Calibri"/>
+              </a:rPr>
+              <a:t>7</a:t>
+            </a:fld>
+            <a:endParaRPr/>
+          </a:p>
+        </p:txBody>
+      </p:sp>
+      <p:pic>
+        <p:nvPicPr>
+          <p:cNvPr id="139" name="Bild 138"/>
+          <p:cNvPicPr/>
+          <p:nvPr/>
+        </p:nvPicPr>
+        <p:blipFill>
+          <a:blip r:embed="rId2"/>
+          <a:stretch>
+            <a:fillRect/>
+          </a:stretch>
+        </p:blipFill>
+        <p:spPr>
+          <a:xfrm>
+            <a:off x="1800000" y="1152360"/>
+            <a:ext cx="6695640" cy="5793120"/>
+          </a:xfrm>
+          <a:prstGeom prst="rect">
+            <a:avLst/>
+          </a:prstGeom>
+        </p:spPr>
+      </p:pic>
+    </p:spTree>
+  </p:cSld>
+  <p:clrMapOvr>
+    <a:masterClrMapping/>
+  </p:clrMapOvr>
+  <p:timing>
+    <p:tnLst>
+      <p:par>
+        <p:cTn xmlns:p14="http://schemas.microsoft.com/office/powerpoint/2010/main" id="1" dur="indefinite" restart="never" nodeType="tmRoot"/>
+      </p:par>
+    </p:tnLst>
+  </p:timing>
+</p:sld>
+</file>
+
+<file path=ppt/slides/slide8.xml><?xml version="1.0" encoding="utf-8"?>
+<p:sld xmlns:a="http://schemas.openxmlformats.org/drawingml/2006/main" xmlns:r="http://schemas.openxmlformats.org/officeDocument/2006/relationships" xmlns:p="http://schemas.openxmlformats.org/presentationml/2006/main">
+  <p:cSld>
+    <p:spTree>
+      <p:nvGrpSpPr>
+        <p:cNvPr id="1" name=""/>
+        <p:cNvGrpSpPr/>
+        <p:nvPr/>
+      </p:nvGrpSpPr>
+      <p:grpSpPr>
+        <a:xfrm>
+          <a:off x="0" y="0"/>
+          <a:ext cx="0" cy="0"/>
+          <a:chOff x="0" y="0"/>
+          <a:chExt cx="0" cy="0"/>
+        </a:xfrm>
+      </p:grpSpPr>
+      <p:sp>
+        <p:nvSpPr>
+          <p:cNvPr id="140" name="CustomShape 1"/>
+          <p:cNvSpPr/>
+          <p:nvPr/>
+        </p:nvSpPr>
+        <p:spPr>
+          <a:xfrm>
+            <a:off x="8221680" y="7197840"/>
+            <a:ext cx="864360" cy="178560"/>
+          </a:xfrm>
+          <a:prstGeom prst="rect">
+            <a:avLst/>
+          </a:prstGeom>
+        </p:spPr>
+        <p:txBody>
+          <a:bodyPr lIns="0" tIns="0" rIns="0" bIns="0" anchor="b"/>
+          <a:lstStyle/>
+          <a:p>
+            <a:pPr>
+              <a:lnSpc>
+                <a:spcPct val="100000"/>
+              </a:lnSpc>
+            </a:pPr>
+            <a:r>
+              <a:rPr lang="en-US" sz="1200">
+                <a:solidFill>
+                  <a:srgbClr val="000000"/>
+                </a:solidFill>
+                <a:latin typeface="Calibri"/>
+              </a:rPr>
+              <a:t>6/5/13</a:t>
+            </a:r>
+            <a:endParaRPr/>
+          </a:p>
+        </p:txBody>
+      </p:sp>
+      <p:sp>
+        <p:nvSpPr>
+          <p:cNvPr id="142" name="CustomShape 3"/>
+          <p:cNvSpPr/>
+          <p:nvPr/>
+        </p:nvSpPr>
+        <p:spPr>
+          <a:xfrm>
+            <a:off x="9086760" y="7197840"/>
+            <a:ext cx="862920" cy="178560"/>
+          </a:xfrm>
+          <a:prstGeom prst="rect">
+            <a:avLst/>
+          </a:prstGeom>
+        </p:spPr>
+        <p:txBody>
+          <a:bodyPr lIns="0" tIns="0" rIns="0" bIns="0" anchor="b"/>
+          <a:lstStyle/>
+          <a:p>
+            <a:pPr>
+              <a:lnSpc>
+                <a:spcPct val="100000"/>
+              </a:lnSpc>
+            </a:pPr>
+            <a:fld id="{EFBDCEEC-B5FC-49C8-956D-460CE065BDFC}" type="slidenum">
+              <a:rPr lang="en-US" sz="1200">
+                <a:solidFill>
+                  <a:srgbClr val="000000"/>
+                </a:solidFill>
+                <a:latin typeface="Calibri"/>
+              </a:rPr>
+              <a:t>8</a:t>
+            </a:fld>
+            <a:endParaRPr/>
+          </a:p>
+        </p:txBody>
+      </p:sp>
+      <p:pic>
+        <p:nvPicPr>
+          <p:cNvPr id="143" name="Bild 142"/>
+          <p:cNvPicPr/>
+          <p:nvPr/>
+        </p:nvPicPr>
+        <p:blipFill>
+          <a:blip r:embed="rId2"/>
+          <a:stretch>
+            <a:fillRect/>
+          </a:stretch>
+        </p:blipFill>
+        <p:spPr>
+          <a:xfrm>
+            <a:off x="2088000" y="905760"/>
+            <a:ext cx="6263640" cy="6149880"/>
+          </a:xfrm>
+          <a:prstGeom prst="rect">
+            <a:avLst/>
+          </a:prstGeom>
+        </p:spPr>
+      </p:pic>
+    </p:spTree>
+  </p:cSld>
+  <p:clrMapOvr>
+    <a:masterClrMapping/>
+  </p:clrMapOvr>
+  <p:timing>
+    <p:tnLst>
+      <p:par>
+        <p:cTn xmlns:p14="http://schemas.microsoft.com/office/powerpoint/2010/main" id="1" dur="indefinite" restart="never" nodeType="tmRoot"/>
+      </p:par>
+    </p:tnLst>
+  </p:timing>
+</p:sld>
+</file>
+
+<file path=ppt/slides/slide9.xml><?xml version="1.0" encoding="utf-8"?>
+<p:sld xmlns:a="http://schemas.openxmlformats.org/drawingml/2006/main" xmlns:r="http://schemas.openxmlformats.org/officeDocument/2006/relationships" xmlns:p="http://schemas.openxmlformats.org/presentationml/2006/main">
+  <p:cSld>
+    <p:spTree>
+      <p:nvGrpSpPr>
+        <p:cNvPr id="1" name=""/>
+        <p:cNvGrpSpPr/>
+        <p:nvPr/>
+      </p:nvGrpSpPr>
+      <p:grpSpPr>
+        <a:xfrm>
+          <a:off x="0" y="0"/>
+          <a:ext cx="0" cy="0"/>
+          <a:chOff x="0" y="0"/>
+          <a:chExt cx="0" cy="0"/>
+        </a:xfrm>
+      </p:grpSpPr>
+      <p:sp>
+        <p:nvSpPr>
+          <p:cNvPr id="144" name="CustomShape 1"/>
+          <p:cNvSpPr/>
+          <p:nvPr/>
+        </p:nvSpPr>
+        <p:spPr>
+          <a:xfrm>
+            <a:off x="8221680" y="7197840"/>
+            <a:ext cx="864360" cy="178560"/>
+          </a:xfrm>
+          <a:prstGeom prst="rect">
+            <a:avLst/>
+          </a:prstGeom>
+        </p:spPr>
+        <p:txBody>
+          <a:bodyPr lIns="0" tIns="0" rIns="0" bIns="0" anchor="b"/>
+          <a:lstStyle/>
+          <a:p>
+            <a:pPr>
+              <a:lnSpc>
+                <a:spcPct val="100000"/>
+              </a:lnSpc>
+            </a:pPr>
+            <a:r>
+              <a:rPr lang="en-US" sz="1200">
+                <a:solidFill>
+                  <a:srgbClr val="000000"/>
+                </a:solidFill>
+                <a:latin typeface="Calibri"/>
+              </a:rPr>
+              <a:t>6/5/13</a:t>
+            </a:r>
+            <a:endParaRPr/>
+          </a:p>
+        </p:txBody>
+      </p:sp>
+      <p:sp>
+        <p:nvSpPr>
+          <p:cNvPr id="146" name="CustomShape 3"/>
+          <p:cNvSpPr/>
+          <p:nvPr/>
+        </p:nvSpPr>
+        <p:spPr>
+          <a:xfrm>
+            <a:off x="9086760" y="7197840"/>
+            <a:ext cx="862920" cy="178560"/>
+          </a:xfrm>
+          <a:prstGeom prst="rect">
+            <a:avLst/>
+          </a:prstGeom>
+        </p:spPr>
+        <p:txBody>
+          <a:bodyPr lIns="0" tIns="0" rIns="0" bIns="0" anchor="b"/>
+          <a:lstStyle/>
+          <a:p>
+            <a:pPr>
+              <a:lnSpc>
+                <a:spcPct val="100000"/>
+              </a:lnSpc>
+            </a:pPr>
+            <a:fld id="{9990F60A-E564-4CB9-AC1E-3D1BE84C1046}" type="slidenum">
+              <a:rPr lang="en-US" sz="1200">
+                <a:solidFill>
+                  <a:srgbClr val="000000"/>
+                </a:solidFill>
+                <a:latin typeface="Calibri"/>
+              </a:rPr>
+              <a:t>9</a:t>
+            </a:fld>
+            <a:endParaRPr/>
+          </a:p>
+        </p:txBody>
+      </p:sp>
+      <p:pic>
+        <p:nvPicPr>
+          <p:cNvPr id="147" name="Bild 146"/>
+          <p:cNvPicPr/>
+          <p:nvPr/>
+        </p:nvPicPr>
+        <p:blipFill>
+          <a:blip r:embed="rId2"/>
+          <a:stretch>
+            <a:fillRect/>
+          </a:stretch>
+        </p:blipFill>
+        <p:spPr>
+          <a:xfrm>
+            <a:off x="720360" y="1656360"/>
+            <a:ext cx="8978400" cy="4062240"/>
+          </a:xfrm>
+          <a:prstGeom prst="rect">
+            <a:avLst/>
+          </a:prstGeom>
+        </p:spPr>
+      </p:pic>
+    </p:spTree>
+  </p:cSld>
+  <p:clrMapOvr>
+    <a:masterClrMapping/>
+  </p:clrMapOvr>
+  <p:timing>
+    <p:tnLst>
+      <p:par>
+        <p:cTn xmlns:p14="http://schemas.microsoft.com/office/powerpoint/2010/main" id="1" dur="indefinite" restart="never" nodeType="tmRoot"/>
       </p:par>
     </p:tnLst>
   </p:timing>

</xml_diff>